<commit_message>
Working version of the analysis
</commit_message>
<xml_diff>
--- a/results/plots/FIGURES.pptx
+++ b/results/plots/FIGURES.pptx
@@ -265,7 +265,7 @@
           <a:p>
             <a:fld id="{03CE6F45-9AFD-49D1-9CCA-D11CA817383D}" type="datetimeFigureOut">
               <a:rPr lang="en-US" smtClean="0"/>
-              <a:t>2/27/2021</a:t>
+              <a:t>3/1/2021</a:t>
             </a:fld>
             <a:endParaRPr lang="en-US"/>
           </a:p>
@@ -463,7 +463,7 @@
           <a:p>
             <a:fld id="{03CE6F45-9AFD-49D1-9CCA-D11CA817383D}" type="datetimeFigureOut">
               <a:rPr lang="en-US" smtClean="0"/>
-              <a:t>2/27/2021</a:t>
+              <a:t>3/1/2021</a:t>
             </a:fld>
             <a:endParaRPr lang="en-US"/>
           </a:p>
@@ -671,7 +671,7 @@
           <a:p>
             <a:fld id="{03CE6F45-9AFD-49D1-9CCA-D11CA817383D}" type="datetimeFigureOut">
               <a:rPr lang="en-US" smtClean="0"/>
-              <a:t>2/27/2021</a:t>
+              <a:t>3/1/2021</a:t>
             </a:fld>
             <a:endParaRPr lang="en-US"/>
           </a:p>
@@ -869,7 +869,7 @@
           <a:p>
             <a:fld id="{03CE6F45-9AFD-49D1-9CCA-D11CA817383D}" type="datetimeFigureOut">
               <a:rPr lang="en-US" smtClean="0"/>
-              <a:t>2/27/2021</a:t>
+              <a:t>3/1/2021</a:t>
             </a:fld>
             <a:endParaRPr lang="en-US"/>
           </a:p>
@@ -1144,7 +1144,7 @@
           <a:p>
             <a:fld id="{03CE6F45-9AFD-49D1-9CCA-D11CA817383D}" type="datetimeFigureOut">
               <a:rPr lang="en-US" smtClean="0"/>
-              <a:t>2/27/2021</a:t>
+              <a:t>3/1/2021</a:t>
             </a:fld>
             <a:endParaRPr lang="en-US"/>
           </a:p>
@@ -1409,7 +1409,7 @@
           <a:p>
             <a:fld id="{03CE6F45-9AFD-49D1-9CCA-D11CA817383D}" type="datetimeFigureOut">
               <a:rPr lang="en-US" smtClean="0"/>
-              <a:t>2/27/2021</a:t>
+              <a:t>3/1/2021</a:t>
             </a:fld>
             <a:endParaRPr lang="en-US"/>
           </a:p>
@@ -1821,7 +1821,7 @@
           <a:p>
             <a:fld id="{03CE6F45-9AFD-49D1-9CCA-D11CA817383D}" type="datetimeFigureOut">
               <a:rPr lang="en-US" smtClean="0"/>
-              <a:t>2/27/2021</a:t>
+              <a:t>3/1/2021</a:t>
             </a:fld>
             <a:endParaRPr lang="en-US"/>
           </a:p>
@@ -1962,7 +1962,7 @@
           <a:p>
             <a:fld id="{03CE6F45-9AFD-49D1-9CCA-D11CA817383D}" type="datetimeFigureOut">
               <a:rPr lang="en-US" smtClean="0"/>
-              <a:t>2/27/2021</a:t>
+              <a:t>3/1/2021</a:t>
             </a:fld>
             <a:endParaRPr lang="en-US"/>
           </a:p>
@@ -2075,7 +2075,7 @@
           <a:p>
             <a:fld id="{03CE6F45-9AFD-49D1-9CCA-D11CA817383D}" type="datetimeFigureOut">
               <a:rPr lang="en-US" smtClean="0"/>
-              <a:t>2/27/2021</a:t>
+              <a:t>3/1/2021</a:t>
             </a:fld>
             <a:endParaRPr lang="en-US"/>
           </a:p>
@@ -2386,7 +2386,7 @@
           <a:p>
             <a:fld id="{03CE6F45-9AFD-49D1-9CCA-D11CA817383D}" type="datetimeFigureOut">
               <a:rPr lang="en-US" smtClean="0"/>
-              <a:t>2/27/2021</a:t>
+              <a:t>3/1/2021</a:t>
             </a:fld>
             <a:endParaRPr lang="en-US"/>
           </a:p>
@@ -2674,7 +2674,7 @@
           <a:p>
             <a:fld id="{03CE6F45-9AFD-49D1-9CCA-D11CA817383D}" type="datetimeFigureOut">
               <a:rPr lang="en-US" smtClean="0"/>
-              <a:t>2/27/2021</a:t>
+              <a:t>3/1/2021</a:t>
             </a:fld>
             <a:endParaRPr lang="en-US"/>
           </a:p>
@@ -2915,7 +2915,7 @@
           <a:p>
             <a:fld id="{03CE6F45-9AFD-49D1-9CCA-D11CA817383D}" type="datetimeFigureOut">
               <a:rPr lang="en-US" smtClean="0"/>
-              <a:t>2/27/2021</a:t>
+              <a:t>3/1/2021</a:t>
             </a:fld>
             <a:endParaRPr lang="en-US"/>
           </a:p>
@@ -7366,21 +7366,19 @@
       </p:grpSpPr>
       <p:pic>
         <p:nvPicPr>
-          <p:cNvPr id="16" name="Content Placeholder 15">
-            <a:extLst>
-              <a:ext uri="{FF2B5EF4-FFF2-40B4-BE49-F238E27FC236}">
-                <a16:creationId xmlns:a16="http://schemas.microsoft.com/office/drawing/2014/main" id="{0390B2A3-86A2-4181-A738-F7038A9F14F7}"/>
+          <p:cNvPr id="4" name="Picture 3">
+            <a:extLst>
+              <a:ext uri="{FF2B5EF4-FFF2-40B4-BE49-F238E27FC236}">
+                <a16:creationId xmlns:a16="http://schemas.microsoft.com/office/drawing/2014/main" id="{0FEEC229-220C-4314-A065-72BA03CAE355}"/>
               </a:ext>
             </a:extLst>
           </p:cNvPr>
           <p:cNvPicPr>
-            <a:picLocks noGrp="1" noChangeAspect="1"/>
+            <a:picLocks noChangeAspect="1"/>
           </p:cNvPicPr>
-          <p:nvPr>
-            <p:ph idx="1"/>
-          </p:nvPr>
+          <p:nvPr/>
         </p:nvPicPr>
-        <p:blipFill>
+        <p:blipFill rotWithShape="1">
           <a:blip r:embed="rId2">
             <a:extLst>
               <a:ext uri="{28A0092B-C50C-407E-A947-70E740481C1C}">
@@ -7388,15 +7386,17 @@
               </a:ext>
             </a:extLst>
           </a:blip>
-          <a:stretch>
-            <a:fillRect/>
-          </a:stretch>
+          <a:srcRect t="4869" b="7338"/>
+          <a:stretch/>
         </p:blipFill>
         <p:spPr>
           <a:xfrm>
-            <a:off x="1294737" y="1825625"/>
-            <a:ext cx="9602526" cy="4351338"/>
-          </a:xfrm>
+            <a:off x="1375344" y="1992857"/>
+            <a:ext cx="9825075" cy="3830141"/>
+          </a:xfrm>
+          <a:prstGeom prst="rect">
+            <a:avLst/>
+          </a:prstGeom>
         </p:spPr>
       </p:pic>
       <p:sp>
@@ -7429,46 +7429,6 @@
       </p:sp>
       <p:sp>
         <p:nvSpPr>
-          <p:cNvPr id="6" name="TextBox 5">
-            <a:extLst>
-              <a:ext uri="{FF2B5EF4-FFF2-40B4-BE49-F238E27FC236}">
-                <a16:creationId xmlns:a16="http://schemas.microsoft.com/office/drawing/2014/main" id="{BA48D812-85FD-4276-B9B7-C11648E6CC08}"/>
-              </a:ext>
-            </a:extLst>
-          </p:cNvPr>
-          <p:cNvSpPr txBox="1"/>
-          <p:nvPr/>
-        </p:nvSpPr>
-        <p:spPr>
-          <a:xfrm>
-            <a:off x="10113021" y="3506490"/>
-            <a:ext cx="733855" cy="307777"/>
-          </a:xfrm>
-          <a:prstGeom prst="rect">
-            <a:avLst/>
-          </a:prstGeom>
-          <a:solidFill>
-            <a:schemeClr val="bg1"/>
-          </a:solidFill>
-        </p:spPr>
-        <p:txBody>
-          <a:bodyPr wrap="none" rtlCol="0">
-            <a:spAutoFit/>
-          </a:bodyPr>
-          <a:lstStyle/>
-          <a:p>
-            <a:r>
-              <a:rPr lang="en-US" sz="1400" dirty="0">
-                <a:latin typeface="Times New Roman" panose="02020603050405020304" pitchFamily="18" charset="0"/>
-                <a:cs typeface="Times New Roman" panose="02020603050405020304" pitchFamily="18" charset="0"/>
-              </a:rPr>
-              <a:t>Version</a:t>
-            </a:r>
-          </a:p>
-        </p:txBody>
-      </p:sp>
-      <p:sp>
-        <p:nvSpPr>
           <p:cNvPr id="7" name="TextBox 6">
             <a:extLst>
               <a:ext uri="{FF2B5EF4-FFF2-40B4-BE49-F238E27FC236}">
@@ -7603,7 +7563,7 @@
         </p:nvSpPr>
         <p:spPr>
           <a:xfrm>
-            <a:off x="3148364" y="5945616"/>
+            <a:off x="3148364" y="5820034"/>
             <a:ext cx="1715534" cy="307777"/>
           </a:xfrm>
           <a:prstGeom prst="rect">
@@ -7644,7 +7604,7 @@
         </p:nvSpPr>
         <p:spPr>
           <a:xfrm>
-            <a:off x="7264926" y="5945617"/>
+            <a:off x="7264926" y="5820035"/>
             <a:ext cx="1715534" cy="307777"/>
           </a:xfrm>
           <a:prstGeom prst="rect">

</xml_diff>

<commit_message>
Consolidated evaluations into one file
</commit_message>
<xml_diff>
--- a/results/plots/FIGURES.pptx
+++ b/results/plots/FIGURES.pptx
@@ -6,12 +6,13 @@
   </p:sldMasterIdLst>
   <p:sldIdLst>
     <p:sldId id="260" r:id="rId2"/>
-    <p:sldId id="257" r:id="rId3"/>
-    <p:sldId id="258" r:id="rId4"/>
-    <p:sldId id="262" r:id="rId5"/>
-    <p:sldId id="263" r:id="rId6"/>
-    <p:sldId id="259" r:id="rId7"/>
-    <p:sldId id="261" r:id="rId8"/>
+    <p:sldId id="264" r:id="rId3"/>
+    <p:sldId id="257" r:id="rId4"/>
+    <p:sldId id="258" r:id="rId5"/>
+    <p:sldId id="262" r:id="rId6"/>
+    <p:sldId id="263" r:id="rId7"/>
+    <p:sldId id="259" r:id="rId8"/>
+    <p:sldId id="261" r:id="rId9"/>
   </p:sldIdLst>
   <p:sldSz cx="12192000" cy="6858000"/>
   <p:notesSz cx="6858000" cy="9144000"/>
@@ -265,7 +266,7 @@
           <a:p>
             <a:fld id="{03CE6F45-9AFD-49D1-9CCA-D11CA817383D}" type="datetimeFigureOut">
               <a:rPr lang="en-US" smtClean="0"/>
-              <a:t>3/3/2021</a:t>
+              <a:t>3/8/2021</a:t>
             </a:fld>
             <a:endParaRPr lang="en-US"/>
           </a:p>
@@ -463,7 +464,7 @@
           <a:p>
             <a:fld id="{03CE6F45-9AFD-49D1-9CCA-D11CA817383D}" type="datetimeFigureOut">
               <a:rPr lang="en-US" smtClean="0"/>
-              <a:t>3/3/2021</a:t>
+              <a:t>3/8/2021</a:t>
             </a:fld>
             <a:endParaRPr lang="en-US"/>
           </a:p>
@@ -671,7 +672,7 @@
           <a:p>
             <a:fld id="{03CE6F45-9AFD-49D1-9CCA-D11CA817383D}" type="datetimeFigureOut">
               <a:rPr lang="en-US" smtClean="0"/>
-              <a:t>3/3/2021</a:t>
+              <a:t>3/8/2021</a:t>
             </a:fld>
             <a:endParaRPr lang="en-US"/>
           </a:p>
@@ -869,7 +870,7 @@
           <a:p>
             <a:fld id="{03CE6F45-9AFD-49D1-9CCA-D11CA817383D}" type="datetimeFigureOut">
               <a:rPr lang="en-US" smtClean="0"/>
-              <a:t>3/3/2021</a:t>
+              <a:t>3/8/2021</a:t>
             </a:fld>
             <a:endParaRPr lang="en-US"/>
           </a:p>
@@ -1144,7 +1145,7 @@
           <a:p>
             <a:fld id="{03CE6F45-9AFD-49D1-9CCA-D11CA817383D}" type="datetimeFigureOut">
               <a:rPr lang="en-US" smtClean="0"/>
-              <a:t>3/3/2021</a:t>
+              <a:t>3/8/2021</a:t>
             </a:fld>
             <a:endParaRPr lang="en-US"/>
           </a:p>
@@ -1409,7 +1410,7 @@
           <a:p>
             <a:fld id="{03CE6F45-9AFD-49D1-9CCA-D11CA817383D}" type="datetimeFigureOut">
               <a:rPr lang="en-US" smtClean="0"/>
-              <a:t>3/3/2021</a:t>
+              <a:t>3/8/2021</a:t>
             </a:fld>
             <a:endParaRPr lang="en-US"/>
           </a:p>
@@ -1821,7 +1822,7 @@
           <a:p>
             <a:fld id="{03CE6F45-9AFD-49D1-9CCA-D11CA817383D}" type="datetimeFigureOut">
               <a:rPr lang="en-US" smtClean="0"/>
-              <a:t>3/3/2021</a:t>
+              <a:t>3/8/2021</a:t>
             </a:fld>
             <a:endParaRPr lang="en-US"/>
           </a:p>
@@ -1962,7 +1963,7 @@
           <a:p>
             <a:fld id="{03CE6F45-9AFD-49D1-9CCA-D11CA817383D}" type="datetimeFigureOut">
               <a:rPr lang="en-US" smtClean="0"/>
-              <a:t>3/3/2021</a:t>
+              <a:t>3/8/2021</a:t>
             </a:fld>
             <a:endParaRPr lang="en-US"/>
           </a:p>
@@ -2075,7 +2076,7 @@
           <a:p>
             <a:fld id="{03CE6F45-9AFD-49D1-9CCA-D11CA817383D}" type="datetimeFigureOut">
               <a:rPr lang="en-US" smtClean="0"/>
-              <a:t>3/3/2021</a:t>
+              <a:t>3/8/2021</a:t>
             </a:fld>
             <a:endParaRPr lang="en-US"/>
           </a:p>
@@ -2386,7 +2387,7 @@
           <a:p>
             <a:fld id="{03CE6F45-9AFD-49D1-9CCA-D11CA817383D}" type="datetimeFigureOut">
               <a:rPr lang="en-US" smtClean="0"/>
-              <a:t>3/3/2021</a:t>
+              <a:t>3/8/2021</a:t>
             </a:fld>
             <a:endParaRPr lang="en-US"/>
           </a:p>
@@ -2674,7 +2675,7 @@
           <a:p>
             <a:fld id="{03CE6F45-9AFD-49D1-9CCA-D11CA817383D}" type="datetimeFigureOut">
               <a:rPr lang="en-US" smtClean="0"/>
-              <a:t>3/3/2021</a:t>
+              <a:t>3/8/2021</a:t>
             </a:fld>
             <a:endParaRPr lang="en-US"/>
           </a:p>
@@ -2915,7 +2916,7 @@
           <a:p>
             <a:fld id="{03CE6F45-9AFD-49D1-9CCA-D11CA817383D}" type="datetimeFigureOut">
               <a:rPr lang="en-US" smtClean="0"/>
-              <a:t>3/3/2021</a:t>
+              <a:t>3/8/2021</a:t>
             </a:fld>
             <a:endParaRPr lang="en-US"/>
           </a:p>
@@ -3334,10 +3335,10 @@
       </p:grpSpPr>
       <p:pic>
         <p:nvPicPr>
-          <p:cNvPr id="5" name="Picture 4">
-            <a:extLst>
-              <a:ext uri="{FF2B5EF4-FFF2-40B4-BE49-F238E27FC236}">
-                <a16:creationId xmlns:a16="http://schemas.microsoft.com/office/drawing/2014/main" id="{49735422-C11F-4B22-B6BF-1C834D906709}"/>
+          <p:cNvPr id="30" name="Picture 29">
+            <a:extLst>
+              <a:ext uri="{FF2B5EF4-FFF2-40B4-BE49-F238E27FC236}">
+                <a16:creationId xmlns:a16="http://schemas.microsoft.com/office/drawing/2014/main" id="{426FB9A2-691A-48BE-9AA4-B08BCA83CDFD}"/>
               </a:ext>
             </a:extLst>
           </p:cNvPr>
@@ -3354,13 +3355,13 @@
               </a:ext>
             </a:extLst>
           </a:blip>
-          <a:srcRect l="5192" b="6082"/>
+          <a:srcRect l="4786" b="4682"/>
           <a:stretch/>
         </p:blipFill>
         <p:spPr>
           <a:xfrm>
-            <a:off x="2817790" y="4350744"/>
-            <a:ext cx="2408938" cy="1905943"/>
+            <a:off x="2830630" y="4326605"/>
+            <a:ext cx="2305429" cy="1949095"/>
           </a:xfrm>
           <a:prstGeom prst="rect">
             <a:avLst/>
@@ -4227,7 +4228,7 @@
         </p:nvSpPr>
         <p:spPr>
           <a:xfrm>
-            <a:off x="2445986" y="6206541"/>
+            <a:off x="2442062" y="6206541"/>
             <a:ext cx="417101" cy="492443"/>
           </a:xfrm>
           <a:prstGeom prst="rect">
@@ -4287,7 +4288,7 @@
         </p:nvSpPr>
         <p:spPr>
           <a:xfrm>
-            <a:off x="2877986" y="6206541"/>
+            <a:off x="2859061" y="6206541"/>
             <a:ext cx="344966" cy="523220"/>
           </a:xfrm>
           <a:prstGeom prst="rect">
@@ -4347,7 +4348,7 @@
         </p:nvSpPr>
         <p:spPr>
           <a:xfrm>
-            <a:off x="3237851" y="6206541"/>
+            <a:off x="3203925" y="6206541"/>
             <a:ext cx="314510" cy="523220"/>
           </a:xfrm>
           <a:prstGeom prst="rect">
@@ -4407,7 +4408,7 @@
         </p:nvSpPr>
         <p:spPr>
           <a:xfrm>
-            <a:off x="3567261" y="6206541"/>
+            <a:off x="3518333" y="6206541"/>
             <a:ext cx="314510" cy="523220"/>
           </a:xfrm>
           <a:prstGeom prst="rect">
@@ -4467,7 +4468,7 @@
         </p:nvSpPr>
         <p:spPr>
           <a:xfrm>
-            <a:off x="3896671" y="6206541"/>
+            <a:off x="3832741" y="6206541"/>
             <a:ext cx="293670" cy="523220"/>
           </a:xfrm>
           <a:prstGeom prst="rect">
@@ -4527,7 +4528,7 @@
         </p:nvSpPr>
         <p:spPr>
           <a:xfrm>
-            <a:off x="4205241" y="6206541"/>
+            <a:off x="4126309" y="6206541"/>
             <a:ext cx="293670" cy="523220"/>
           </a:xfrm>
           <a:prstGeom prst="rect">
@@ -4587,7 +4588,7 @@
         </p:nvSpPr>
         <p:spPr>
           <a:xfrm>
-            <a:off x="4455191" y="6210449"/>
+            <a:off x="4419875" y="6210449"/>
             <a:ext cx="460382" cy="492443"/>
           </a:xfrm>
           <a:prstGeom prst="rect">
@@ -4825,7 +4826,7 @@
         </p:nvSpPr>
         <p:spPr>
           <a:xfrm>
-            <a:off x="3172697" y="4776701"/>
+            <a:off x="3160488" y="4757074"/>
             <a:ext cx="326364" cy="360840"/>
           </a:xfrm>
           <a:prstGeom prst="rect">
@@ -4877,7 +4878,7 @@
         </p:nvSpPr>
         <p:spPr>
           <a:xfrm>
-            <a:off x="3502440" y="5508181"/>
+            <a:off x="3486852" y="5511725"/>
             <a:ext cx="326364" cy="360840"/>
           </a:xfrm>
           <a:prstGeom prst="rect">
@@ -4929,7 +4930,7 @@
         </p:nvSpPr>
         <p:spPr>
           <a:xfrm>
-            <a:off x="3838060" y="4421441"/>
+            <a:off x="3798798" y="4389143"/>
             <a:ext cx="326364" cy="360840"/>
           </a:xfrm>
           <a:prstGeom prst="rect">
@@ -4981,7 +4982,7 @@
         </p:nvSpPr>
         <p:spPr>
           <a:xfrm>
-            <a:off x="4167404" y="5147341"/>
+            <a:off x="4125162" y="5128480"/>
             <a:ext cx="326364" cy="360840"/>
           </a:xfrm>
           <a:prstGeom prst="rect">
@@ -5015,7 +5016,7 @@
           <a:lstStyle/>
           <a:p>
             <a:pPr algn="ctr"/>
-            <a:endParaRPr lang="en-US"/>
+            <a:endParaRPr lang="en-US" dirty="0"/>
           </a:p>
         </p:txBody>
       </p:sp>
@@ -5033,7 +5034,7 @@
         </p:nvSpPr>
         <p:spPr>
           <a:xfrm>
-            <a:off x="4493768" y="5504053"/>
+            <a:off x="4449546" y="5506977"/>
             <a:ext cx="326364" cy="360840"/>
           </a:xfrm>
           <a:prstGeom prst="rect">
@@ -5854,6 +5855,51 @@
           </a:fontRef>
         </p:style>
       </p:cxnSp>
+      <p:sp>
+        <p:nvSpPr>
+          <p:cNvPr id="3" name="TextBox 2">
+            <a:extLst>
+              <a:ext uri="{FF2B5EF4-FFF2-40B4-BE49-F238E27FC236}">
+                <a16:creationId xmlns:a16="http://schemas.microsoft.com/office/drawing/2014/main" id="{597FB1EC-55A5-4ABE-8D52-7B21D76F55C7}"/>
+              </a:ext>
+            </a:extLst>
+          </p:cNvPr>
+          <p:cNvSpPr txBox="1"/>
+          <p:nvPr/>
+        </p:nvSpPr>
+        <p:spPr>
+          <a:xfrm rot="16200000">
+            <a:off x="4598780" y="5147263"/>
+            <a:ext cx="1285929" cy="307777"/>
+          </a:xfrm>
+          <a:prstGeom prst="rect">
+            <a:avLst/>
+          </a:prstGeom>
+          <a:noFill/>
+        </p:spPr>
+        <p:txBody>
+          <a:bodyPr wrap="none" rtlCol="0">
+            <a:spAutoFit/>
+          </a:bodyPr>
+          <a:lstStyle/>
+          <a:p>
+            <a:r>
+              <a:rPr lang="en-US" sz="1400" i="1" dirty="0">
+                <a:latin typeface="Times New Roman" panose="02020603050405020304" pitchFamily="18" charset="0"/>
+                <a:cs typeface="Times New Roman" panose="02020603050405020304" pitchFamily="18" charset="0"/>
+              </a:rPr>
+              <a:t>P</a:t>
+            </a:r>
+            <a:r>
+              <a:rPr lang="en-US" sz="1400" dirty="0">
+                <a:latin typeface="Times New Roman" panose="02020603050405020304" pitchFamily="18" charset="0"/>
+                <a:cs typeface="Times New Roman" panose="02020603050405020304" pitchFamily="18" charset="0"/>
+              </a:rPr>
+              <a:t>(char|context)</a:t>
+            </a:r>
+          </a:p>
+        </p:txBody>
+      </p:sp>
     </p:spTree>
     <p:extLst>
       <p:ext uri="{BB962C8B-B14F-4D97-AF65-F5344CB8AC3E}">
@@ -5886,19 +5932,17 @@
       </p:grpSpPr>
       <p:pic>
         <p:nvPicPr>
-          <p:cNvPr id="7" name="Content Placeholder 6">
-            <a:extLst>
-              <a:ext uri="{FF2B5EF4-FFF2-40B4-BE49-F238E27FC236}">
-                <a16:creationId xmlns:a16="http://schemas.microsoft.com/office/drawing/2014/main" id="{981DF9AA-663D-4039-A1F8-CEFBFABB8E57}"/>
+          <p:cNvPr id="41" name="Picture 40">
+            <a:extLst>
+              <a:ext uri="{FF2B5EF4-FFF2-40B4-BE49-F238E27FC236}">
+                <a16:creationId xmlns:a16="http://schemas.microsoft.com/office/drawing/2014/main" id="{93630B06-365F-47A1-A88E-1D1C8E5DD935}"/>
               </a:ext>
             </a:extLst>
           </p:cNvPr>
           <p:cNvPicPr>
-            <a:picLocks noGrp="1" noChangeAspect="1"/>
+            <a:picLocks noChangeAspect="1"/>
           </p:cNvPicPr>
-          <p:nvPr>
-            <p:ph idx="1"/>
-          </p:nvPr>
+          <p:nvPr/>
         </p:nvPicPr>
         <p:blipFill rotWithShape="1">
           <a:blip r:embed="rId2">
@@ -5908,14 +5952,17 @@
               </a:ext>
             </a:extLst>
           </a:blip>
-          <a:srcRect t="6419"/>
+          <a:srcRect t="8002" b="6547"/>
           <a:stretch/>
         </p:blipFill>
         <p:spPr>
           <a:xfrm>
-            <a:off x="838200" y="2664704"/>
-            <a:ext cx="10515600" cy="3023364"/>
-          </a:xfrm>
+            <a:off x="637285" y="4519528"/>
+            <a:ext cx="10651063" cy="2251655"/>
+          </a:xfrm>
+          <a:prstGeom prst="rect">
+            <a:avLst/>
+          </a:prstGeom>
         </p:spPr>
       </p:pic>
       <p:sp>
@@ -5923,7 +5970,7 @@
           <p:cNvPr id="2" name="Title 1">
             <a:extLst>
               <a:ext uri="{FF2B5EF4-FFF2-40B4-BE49-F238E27FC236}">
-                <a16:creationId xmlns:a16="http://schemas.microsoft.com/office/drawing/2014/main" id="{F3E6B28E-F078-4193-B215-E598325B79B2}"/>
+                <a16:creationId xmlns:a16="http://schemas.microsoft.com/office/drawing/2014/main" id="{B756BABF-320A-4671-AFEF-EE04F74D113A}"/>
               </a:ext>
             </a:extLst>
           </p:cNvPr>
@@ -5934,7 +5981,12 @@
             <p:ph type="title"/>
           </p:nvPr>
         </p:nvSpPr>
-        <p:spPr/>
+        <p:spPr>
+          <a:xfrm>
+            <a:off x="-35018" y="-377655"/>
+            <a:ext cx="10515600" cy="1325563"/>
+          </a:xfrm>
+        </p:spPr>
         <p:txBody>
           <a:bodyPr/>
           <a:lstStyle/>
@@ -5946,172 +5998,12 @@
           </a:p>
         </p:txBody>
       </p:sp>
-      <p:sp>
-        <p:nvSpPr>
-          <p:cNvPr id="11" name="TextBox 10">
-            <a:extLst>
-              <a:ext uri="{FF2B5EF4-FFF2-40B4-BE49-F238E27FC236}">
-                <a16:creationId xmlns:a16="http://schemas.microsoft.com/office/drawing/2014/main" id="{D2A26610-6458-421B-B51D-2C84493B196A}"/>
-              </a:ext>
-            </a:extLst>
-          </p:cNvPr>
-          <p:cNvSpPr txBox="1"/>
-          <p:nvPr/>
-        </p:nvSpPr>
-        <p:spPr>
-          <a:xfrm>
-            <a:off x="5651768" y="5339167"/>
-            <a:ext cx="413896" cy="307777"/>
-          </a:xfrm>
-          <a:prstGeom prst="rect">
-            <a:avLst/>
-          </a:prstGeom>
-          <a:solidFill>
-            <a:schemeClr val="bg1"/>
-          </a:solidFill>
-        </p:spPr>
-        <p:txBody>
-          <a:bodyPr wrap="none" rtlCol="0">
-            <a:spAutoFit/>
-          </a:bodyPr>
-          <a:lstStyle/>
-          <a:p>
-            <a:r>
-              <a:rPr lang="en-US" sz="1400" dirty="0">
-                <a:latin typeface="Times New Roman" panose="02020603050405020304" pitchFamily="18" charset="0"/>
-                <a:cs typeface="Times New Roman" panose="02020603050405020304" pitchFamily="18" charset="0"/>
-              </a:rPr>
-              <a:t>Set</a:t>
-            </a:r>
-          </a:p>
-        </p:txBody>
-      </p:sp>
-      <p:sp>
-        <p:nvSpPr>
-          <p:cNvPr id="12" name="TextBox 11">
-            <a:extLst>
-              <a:ext uri="{FF2B5EF4-FFF2-40B4-BE49-F238E27FC236}">
-                <a16:creationId xmlns:a16="http://schemas.microsoft.com/office/drawing/2014/main" id="{6A53F9EE-7341-4945-BE60-B6CF3BE87B69}"/>
-              </a:ext>
-            </a:extLst>
-          </p:cNvPr>
-          <p:cNvSpPr txBox="1"/>
-          <p:nvPr/>
-        </p:nvSpPr>
-        <p:spPr>
-          <a:xfrm>
-            <a:off x="2537900" y="5325355"/>
-            <a:ext cx="413896" cy="307777"/>
-          </a:xfrm>
-          <a:prstGeom prst="rect">
-            <a:avLst/>
-          </a:prstGeom>
-          <a:solidFill>
-            <a:schemeClr val="bg1"/>
-          </a:solidFill>
-        </p:spPr>
-        <p:txBody>
-          <a:bodyPr wrap="none" rtlCol="0">
-            <a:spAutoFit/>
-          </a:bodyPr>
-          <a:lstStyle/>
-          <a:p>
-            <a:r>
-              <a:rPr lang="en-US" sz="1400" dirty="0">
-                <a:latin typeface="Times New Roman" panose="02020603050405020304" pitchFamily="18" charset="0"/>
-                <a:cs typeface="Times New Roman" panose="02020603050405020304" pitchFamily="18" charset="0"/>
-              </a:rPr>
-              <a:t>Set</a:t>
-            </a:r>
-          </a:p>
-        </p:txBody>
-      </p:sp>
-      <p:sp>
-        <p:nvSpPr>
-          <p:cNvPr id="13" name="TextBox 12">
-            <a:extLst>
-              <a:ext uri="{FF2B5EF4-FFF2-40B4-BE49-F238E27FC236}">
-                <a16:creationId xmlns:a16="http://schemas.microsoft.com/office/drawing/2014/main" id="{301F71EB-0675-4E3C-8AE6-566BB803E7EE}"/>
-              </a:ext>
-            </a:extLst>
-          </p:cNvPr>
-          <p:cNvSpPr txBox="1"/>
-          <p:nvPr/>
-        </p:nvSpPr>
-        <p:spPr>
-          <a:xfrm>
-            <a:off x="8765636" y="5325355"/>
-            <a:ext cx="413896" cy="307777"/>
-          </a:xfrm>
-          <a:prstGeom prst="rect">
-            <a:avLst/>
-          </a:prstGeom>
-          <a:solidFill>
-            <a:schemeClr val="bg1"/>
-          </a:solidFill>
-        </p:spPr>
-        <p:txBody>
-          <a:bodyPr wrap="none" rtlCol="0">
-            <a:spAutoFit/>
-          </a:bodyPr>
-          <a:lstStyle/>
-          <a:p>
-            <a:r>
-              <a:rPr lang="en-US" sz="1400" dirty="0">
-                <a:latin typeface="Times New Roman" panose="02020603050405020304" pitchFamily="18" charset="0"/>
-                <a:cs typeface="Times New Roman" panose="02020603050405020304" pitchFamily="18" charset="0"/>
-              </a:rPr>
-              <a:t>Set</a:t>
-            </a:r>
-          </a:p>
-        </p:txBody>
-      </p:sp>
-      <p:sp>
-        <p:nvSpPr>
-          <p:cNvPr id="14" name="TextBox 13">
-            <a:extLst>
-              <a:ext uri="{FF2B5EF4-FFF2-40B4-BE49-F238E27FC236}">
-                <a16:creationId xmlns:a16="http://schemas.microsoft.com/office/drawing/2014/main" id="{EE007ABB-DB88-44C2-8221-57D78FD24678}"/>
-              </a:ext>
-            </a:extLst>
-          </p:cNvPr>
-          <p:cNvSpPr txBox="1"/>
-          <p:nvPr/>
-        </p:nvSpPr>
-        <p:spPr>
-          <a:xfrm rot="16200000">
-            <a:off x="-90692" y="3660380"/>
-            <a:ext cx="1927131" cy="307777"/>
-          </a:xfrm>
-          <a:prstGeom prst="rect">
-            <a:avLst/>
-          </a:prstGeom>
-          <a:solidFill>
-            <a:schemeClr val="bg1"/>
-          </a:solidFill>
-        </p:spPr>
-        <p:txBody>
-          <a:bodyPr wrap="none" rtlCol="0">
-            <a:spAutoFit/>
-          </a:bodyPr>
-          <a:lstStyle/>
-          <a:p>
-            <a:r>
-              <a:rPr lang="en-US" sz="1400" dirty="0">
-                <a:latin typeface="Times New Roman" panose="02020603050405020304" pitchFamily="18" charset="0"/>
-                <a:cs typeface="Times New Roman" panose="02020603050405020304" pitchFamily="18" charset="0"/>
-              </a:rPr>
-              <a:t>Accuracy (%) ± 99% CI</a:t>
-            </a:r>
-          </a:p>
-        </p:txBody>
-      </p:sp>
       <p:cxnSp>
         <p:nvCxnSpPr>
-          <p:cNvPr id="16" name="Straight Connector 15">
-            <a:extLst>
-              <a:ext uri="{FF2B5EF4-FFF2-40B4-BE49-F238E27FC236}">
-                <a16:creationId xmlns:a16="http://schemas.microsoft.com/office/drawing/2014/main" id="{7CC6FB2A-FACA-4705-8242-BF31B69F0B39}"/>
+          <p:cNvPr id="17" name="Straight Connector 16">
+            <a:extLst>
+              <a:ext uri="{FF2B5EF4-FFF2-40B4-BE49-F238E27FC236}">
+                <a16:creationId xmlns:a16="http://schemas.microsoft.com/office/drawing/2014/main" id="{545DBEDF-45BF-4771-96AD-7C5F50446BA8}"/>
               </a:ext>
             </a:extLst>
           </p:cNvPr>
@@ -6122,82 +6014,35 @@
         </p:nvCxnSpPr>
         <p:spPr>
           <a:xfrm>
-            <a:off x="1604078" y="2657959"/>
-            <a:ext cx="817533" cy="0"/>
+            <a:off x="6190765" y="0"/>
+            <a:ext cx="0" cy="6847563"/>
           </a:xfrm>
           <a:prstGeom prst="line">
             <a:avLst/>
           </a:prstGeom>
-          <a:ln w="19050">
-            <a:solidFill>
-              <a:schemeClr val="tx1"/>
-            </a:solidFill>
-          </a:ln>
+          <a:ln w="19050"/>
         </p:spPr>
         <p:style>
           <a:lnRef idx="1">
-            <a:schemeClr val="accent1"/>
+            <a:schemeClr val="dk1"/>
           </a:lnRef>
           <a:fillRef idx="0">
-            <a:schemeClr val="accent1"/>
+            <a:schemeClr val="dk1"/>
           </a:fillRef>
           <a:effectRef idx="0">
-            <a:schemeClr val="accent1"/>
+            <a:schemeClr val="dk1"/>
           </a:effectRef>
           <a:fontRef idx="minor">
             <a:schemeClr val="tx1"/>
           </a:fontRef>
         </p:style>
       </p:cxnSp>
-      <p:cxnSp>
-        <p:nvCxnSpPr>
-          <p:cNvPr id="19" name="Straight Connector 18">
-            <a:extLst>
-              <a:ext uri="{FF2B5EF4-FFF2-40B4-BE49-F238E27FC236}">
-                <a16:creationId xmlns:a16="http://schemas.microsoft.com/office/drawing/2014/main" id="{4619940A-3D44-471F-A1CA-D1E96AC15E8B}"/>
-              </a:ext>
-            </a:extLst>
-          </p:cNvPr>
-          <p:cNvCxnSpPr>
-            <a:cxnSpLocks/>
-          </p:cNvCxnSpPr>
-          <p:nvPr/>
-        </p:nvCxnSpPr>
-        <p:spPr>
-          <a:xfrm>
-            <a:off x="3089333" y="2657959"/>
-            <a:ext cx="817533" cy="0"/>
-          </a:xfrm>
-          <a:prstGeom prst="line">
-            <a:avLst/>
-          </a:prstGeom>
-          <a:ln w="19050">
-            <a:solidFill>
-              <a:schemeClr val="tx1"/>
-            </a:solidFill>
-          </a:ln>
-        </p:spPr>
-        <p:style>
-          <a:lnRef idx="1">
-            <a:schemeClr val="accent1"/>
-          </a:lnRef>
-          <a:fillRef idx="0">
-            <a:schemeClr val="accent1"/>
-          </a:fillRef>
-          <a:effectRef idx="0">
-            <a:schemeClr val="accent1"/>
-          </a:effectRef>
-          <a:fontRef idx="minor">
-            <a:schemeClr val="tx1"/>
-          </a:fontRef>
-        </p:style>
-      </p:cxnSp>
-      <p:sp>
-        <p:nvSpPr>
-          <p:cNvPr id="20" name="TextBox 19">
-            <a:extLst>
-              <a:ext uri="{FF2B5EF4-FFF2-40B4-BE49-F238E27FC236}">
-                <a16:creationId xmlns:a16="http://schemas.microsoft.com/office/drawing/2014/main" id="{87138E18-9EC4-443E-9BDC-6D8C049CC66D}"/>
+      <p:sp>
+        <p:nvSpPr>
+          <p:cNvPr id="21" name="TextBox 20">
+            <a:extLst>
+              <a:ext uri="{FF2B5EF4-FFF2-40B4-BE49-F238E27FC236}">
+                <a16:creationId xmlns:a16="http://schemas.microsoft.com/office/drawing/2014/main" id="{1EB42A5A-7F44-4520-890E-A17DAF6189E9}"/>
               </a:ext>
             </a:extLst>
           </p:cNvPr>
@@ -6206,824 +6051,8 @@
         </p:nvSpPr>
         <p:spPr>
           <a:xfrm>
-            <a:off x="1831127" y="2411738"/>
-            <a:ext cx="363434" cy="246221"/>
-          </a:xfrm>
-          <a:prstGeom prst="rect">
-            <a:avLst/>
-          </a:prstGeom>
-          <a:noFill/>
-        </p:spPr>
-        <p:txBody>
-          <a:bodyPr wrap="square" rtlCol="0">
-            <a:spAutoFit/>
-          </a:bodyPr>
-          <a:lstStyle/>
-          <a:p>
-            <a:pPr algn="ctr"/>
-            <a:r>
-              <a:rPr lang="en-US" sz="1000" dirty="0">
-                <a:latin typeface="Times New Roman" panose="02020603050405020304" pitchFamily="18" charset="0"/>
-                <a:cs typeface="Times New Roman" panose="02020603050405020304" pitchFamily="18" charset="0"/>
-              </a:rPr>
-              <a:t>n.s.</a:t>
-            </a:r>
-          </a:p>
-        </p:txBody>
-      </p:sp>
-      <p:sp>
-        <p:nvSpPr>
-          <p:cNvPr id="21" name="TextBox 20">
-            <a:extLst>
-              <a:ext uri="{FF2B5EF4-FFF2-40B4-BE49-F238E27FC236}">
-                <a16:creationId xmlns:a16="http://schemas.microsoft.com/office/drawing/2014/main" id="{AAB8A998-3EBC-43C2-9F0B-A2F92BA31576}"/>
-              </a:ext>
-            </a:extLst>
-          </p:cNvPr>
-          <p:cNvSpPr txBox="1"/>
-          <p:nvPr/>
-        </p:nvSpPr>
-        <p:spPr>
-          <a:xfrm>
-            <a:off x="3316382" y="2411738"/>
-            <a:ext cx="363434" cy="246221"/>
-          </a:xfrm>
-          <a:prstGeom prst="rect">
-            <a:avLst/>
-          </a:prstGeom>
-          <a:noFill/>
-        </p:spPr>
-        <p:txBody>
-          <a:bodyPr wrap="square" rtlCol="0">
-            <a:spAutoFit/>
-          </a:bodyPr>
-          <a:lstStyle/>
-          <a:p>
-            <a:pPr algn="ctr"/>
-            <a:r>
-              <a:rPr lang="en-US" sz="1000" dirty="0">
-                <a:latin typeface="Times New Roman" panose="02020603050405020304" pitchFamily="18" charset="0"/>
-                <a:cs typeface="Times New Roman" panose="02020603050405020304" pitchFamily="18" charset="0"/>
-              </a:rPr>
-              <a:t>n.s.</a:t>
-            </a:r>
-          </a:p>
-        </p:txBody>
-      </p:sp>
-      <p:cxnSp>
-        <p:nvCxnSpPr>
-          <p:cNvPr id="22" name="Straight Connector 21">
-            <a:extLst>
-              <a:ext uri="{FF2B5EF4-FFF2-40B4-BE49-F238E27FC236}">
-                <a16:creationId xmlns:a16="http://schemas.microsoft.com/office/drawing/2014/main" id="{7A75D440-B16B-4BAE-92CA-FE6496321E7C}"/>
-              </a:ext>
-            </a:extLst>
-          </p:cNvPr>
-          <p:cNvCxnSpPr>
-            <a:cxnSpLocks/>
-          </p:cNvCxnSpPr>
-          <p:nvPr/>
-        </p:nvCxnSpPr>
-        <p:spPr>
-          <a:xfrm>
-            <a:off x="5120905" y="2945970"/>
-            <a:ext cx="380995" cy="0"/>
-          </a:xfrm>
-          <a:prstGeom prst="line">
-            <a:avLst/>
-          </a:prstGeom>
-          <a:ln w="19050">
-            <a:solidFill>
-              <a:schemeClr val="tx1"/>
-            </a:solidFill>
-          </a:ln>
-        </p:spPr>
-        <p:style>
-          <a:lnRef idx="1">
-            <a:schemeClr val="accent1"/>
-          </a:lnRef>
-          <a:fillRef idx="0">
-            <a:schemeClr val="accent1"/>
-          </a:fillRef>
-          <a:effectRef idx="0">
-            <a:schemeClr val="accent1"/>
-          </a:effectRef>
-          <a:fontRef idx="minor">
-            <a:schemeClr val="tx1"/>
-          </a:fontRef>
-        </p:style>
-      </p:cxnSp>
-      <p:cxnSp>
-        <p:nvCxnSpPr>
-          <p:cNvPr id="24" name="Straight Connector 23">
-            <a:extLst>
-              <a:ext uri="{FF2B5EF4-FFF2-40B4-BE49-F238E27FC236}">
-                <a16:creationId xmlns:a16="http://schemas.microsoft.com/office/drawing/2014/main" id="{3D5AD9DC-4C52-4C1E-82A2-B63898E17BCF}"/>
-              </a:ext>
-            </a:extLst>
-          </p:cNvPr>
-          <p:cNvCxnSpPr>
-            <a:cxnSpLocks/>
-          </p:cNvCxnSpPr>
-          <p:nvPr/>
-        </p:nvCxnSpPr>
-        <p:spPr>
-          <a:xfrm>
-            <a:off x="4719232" y="2945970"/>
-            <a:ext cx="366798" cy="0"/>
-          </a:xfrm>
-          <a:prstGeom prst="line">
-            <a:avLst/>
-          </a:prstGeom>
-          <a:ln w="19050">
-            <a:solidFill>
-              <a:schemeClr val="tx1"/>
-            </a:solidFill>
-          </a:ln>
-        </p:spPr>
-        <p:style>
-          <a:lnRef idx="1">
-            <a:schemeClr val="accent1"/>
-          </a:lnRef>
-          <a:fillRef idx="0">
-            <a:schemeClr val="accent1"/>
-          </a:fillRef>
-          <a:effectRef idx="0">
-            <a:schemeClr val="accent1"/>
-          </a:effectRef>
-          <a:fontRef idx="minor">
-            <a:schemeClr val="tx1"/>
-          </a:fontRef>
-        </p:style>
-      </p:cxnSp>
-      <p:cxnSp>
-        <p:nvCxnSpPr>
-          <p:cNvPr id="27" name="Straight Connector 26">
-            <a:extLst>
-              <a:ext uri="{FF2B5EF4-FFF2-40B4-BE49-F238E27FC236}">
-                <a16:creationId xmlns:a16="http://schemas.microsoft.com/office/drawing/2014/main" id="{5A3271C6-09E9-4E94-8015-C4F7EF298B32}"/>
-              </a:ext>
-            </a:extLst>
-          </p:cNvPr>
-          <p:cNvCxnSpPr>
-            <a:cxnSpLocks/>
-          </p:cNvCxnSpPr>
-          <p:nvPr/>
-        </p:nvCxnSpPr>
-        <p:spPr>
-          <a:xfrm>
-            <a:off x="4729571" y="2657959"/>
-            <a:ext cx="782668" cy="0"/>
-          </a:xfrm>
-          <a:prstGeom prst="line">
-            <a:avLst/>
-          </a:prstGeom>
-          <a:ln w="19050">
-            <a:solidFill>
-              <a:schemeClr val="tx1"/>
-            </a:solidFill>
-          </a:ln>
-        </p:spPr>
-        <p:style>
-          <a:lnRef idx="1">
-            <a:schemeClr val="accent1"/>
-          </a:lnRef>
-          <a:fillRef idx="0">
-            <a:schemeClr val="accent1"/>
-          </a:fillRef>
-          <a:effectRef idx="0">
-            <a:schemeClr val="accent1"/>
-          </a:effectRef>
-          <a:fontRef idx="minor">
-            <a:schemeClr val="tx1"/>
-          </a:fontRef>
-        </p:style>
-      </p:cxnSp>
-      <p:sp>
-        <p:nvSpPr>
-          <p:cNvPr id="29" name="TextBox 28">
-            <a:extLst>
-              <a:ext uri="{FF2B5EF4-FFF2-40B4-BE49-F238E27FC236}">
-                <a16:creationId xmlns:a16="http://schemas.microsoft.com/office/drawing/2014/main" id="{79476358-A8B8-42E1-9892-ACBB3DF4691A}"/>
-              </a:ext>
-            </a:extLst>
-          </p:cNvPr>
-          <p:cNvSpPr txBox="1"/>
-          <p:nvPr/>
-        </p:nvSpPr>
-        <p:spPr>
-          <a:xfrm>
-            <a:off x="4947968" y="2411738"/>
-            <a:ext cx="363434" cy="246221"/>
-          </a:xfrm>
-          <a:prstGeom prst="rect">
-            <a:avLst/>
-          </a:prstGeom>
-          <a:noFill/>
-        </p:spPr>
-        <p:txBody>
-          <a:bodyPr wrap="square" rtlCol="0">
-            <a:spAutoFit/>
-          </a:bodyPr>
-          <a:lstStyle/>
-          <a:p>
-            <a:pPr algn="ctr"/>
-            <a:r>
-              <a:rPr lang="en-US" sz="1000" dirty="0">
-                <a:latin typeface="Times New Roman" panose="02020603050405020304" pitchFamily="18" charset="0"/>
-                <a:cs typeface="Times New Roman" panose="02020603050405020304" pitchFamily="18" charset="0"/>
-              </a:rPr>
-              <a:t>n.s.</a:t>
-            </a:r>
-          </a:p>
-        </p:txBody>
-      </p:sp>
-      <p:cxnSp>
-        <p:nvCxnSpPr>
-          <p:cNvPr id="30" name="Straight Connector 29">
-            <a:extLst>
-              <a:ext uri="{FF2B5EF4-FFF2-40B4-BE49-F238E27FC236}">
-                <a16:creationId xmlns:a16="http://schemas.microsoft.com/office/drawing/2014/main" id="{37560A6D-4576-4D13-8C6F-ACDF56F1D2E9}"/>
-              </a:ext>
-            </a:extLst>
-          </p:cNvPr>
-          <p:cNvCxnSpPr>
-            <a:cxnSpLocks/>
-          </p:cNvCxnSpPr>
-          <p:nvPr/>
-        </p:nvCxnSpPr>
-        <p:spPr>
-          <a:xfrm>
-            <a:off x="6214826" y="2657959"/>
-            <a:ext cx="782668" cy="0"/>
-          </a:xfrm>
-          <a:prstGeom prst="line">
-            <a:avLst/>
-          </a:prstGeom>
-          <a:ln w="19050">
-            <a:solidFill>
-              <a:schemeClr val="tx1"/>
-            </a:solidFill>
-          </a:ln>
-        </p:spPr>
-        <p:style>
-          <a:lnRef idx="1">
-            <a:schemeClr val="accent1"/>
-          </a:lnRef>
-          <a:fillRef idx="0">
-            <a:schemeClr val="accent1"/>
-          </a:fillRef>
-          <a:effectRef idx="0">
-            <a:schemeClr val="accent1"/>
-          </a:effectRef>
-          <a:fontRef idx="minor">
-            <a:schemeClr val="tx1"/>
-          </a:fontRef>
-        </p:style>
-      </p:cxnSp>
-      <p:sp>
-        <p:nvSpPr>
-          <p:cNvPr id="31" name="TextBox 30">
-            <a:extLst>
-              <a:ext uri="{FF2B5EF4-FFF2-40B4-BE49-F238E27FC236}">
-                <a16:creationId xmlns:a16="http://schemas.microsoft.com/office/drawing/2014/main" id="{46B02236-037F-4167-8DEE-CBF11C38213F}"/>
-              </a:ext>
-            </a:extLst>
-          </p:cNvPr>
-          <p:cNvSpPr txBox="1"/>
-          <p:nvPr/>
-        </p:nvSpPr>
-        <p:spPr>
-          <a:xfrm>
-            <a:off x="6418894" y="2417801"/>
-            <a:ext cx="363434" cy="246221"/>
-          </a:xfrm>
-          <a:prstGeom prst="rect">
-            <a:avLst/>
-          </a:prstGeom>
-          <a:noFill/>
-        </p:spPr>
-        <p:txBody>
-          <a:bodyPr wrap="square" rtlCol="0">
-            <a:spAutoFit/>
-          </a:bodyPr>
-          <a:lstStyle/>
-          <a:p>
-            <a:pPr algn="ctr"/>
-            <a:r>
-              <a:rPr lang="en-US" sz="1000" dirty="0">
-                <a:latin typeface="Times New Roman" panose="02020603050405020304" pitchFamily="18" charset="0"/>
-                <a:cs typeface="Times New Roman" panose="02020603050405020304" pitchFamily="18" charset="0"/>
-              </a:rPr>
-              <a:t>n.s.</a:t>
-            </a:r>
-          </a:p>
-        </p:txBody>
-      </p:sp>
-      <p:sp>
-        <p:nvSpPr>
-          <p:cNvPr id="32" name="TextBox 31">
-            <a:extLst>
-              <a:ext uri="{FF2B5EF4-FFF2-40B4-BE49-F238E27FC236}">
-                <a16:creationId xmlns:a16="http://schemas.microsoft.com/office/drawing/2014/main" id="{43B948B4-DDC6-4315-A030-B777FE82008C}"/>
-              </a:ext>
-            </a:extLst>
-          </p:cNvPr>
-          <p:cNvSpPr txBox="1"/>
-          <p:nvPr/>
-        </p:nvSpPr>
-        <p:spPr>
-          <a:xfrm>
-            <a:off x="5096686" y="2759945"/>
-            <a:ext cx="429431" cy="246221"/>
-          </a:xfrm>
-          <a:prstGeom prst="rect">
-            <a:avLst/>
-          </a:prstGeom>
-          <a:noFill/>
-        </p:spPr>
-        <p:txBody>
-          <a:bodyPr wrap="square" rtlCol="0">
-            <a:spAutoFit/>
-          </a:bodyPr>
-          <a:lstStyle/>
-          <a:p>
-            <a:pPr algn="ctr"/>
-            <a:r>
-              <a:rPr lang="en-US" sz="1000" dirty="0">
-                <a:latin typeface="Times New Roman" panose="02020603050405020304" pitchFamily="18" charset="0"/>
-                <a:cs typeface="Times New Roman" panose="02020603050405020304" pitchFamily="18" charset="0"/>
-              </a:rPr>
-              <a:t>***</a:t>
-            </a:r>
-          </a:p>
-        </p:txBody>
-      </p:sp>
-      <p:sp>
-        <p:nvSpPr>
-          <p:cNvPr id="33" name="TextBox 32">
-            <a:extLst>
-              <a:ext uri="{FF2B5EF4-FFF2-40B4-BE49-F238E27FC236}">
-                <a16:creationId xmlns:a16="http://schemas.microsoft.com/office/drawing/2014/main" id="{B3955643-7C48-434D-A9ED-49189D6759DB}"/>
-              </a:ext>
-            </a:extLst>
-          </p:cNvPr>
-          <p:cNvSpPr txBox="1"/>
-          <p:nvPr/>
-        </p:nvSpPr>
-        <p:spPr>
-          <a:xfrm>
-            <a:off x="4691474" y="2759944"/>
-            <a:ext cx="429431" cy="246221"/>
-          </a:xfrm>
-          <a:prstGeom prst="rect">
-            <a:avLst/>
-          </a:prstGeom>
-          <a:noFill/>
-        </p:spPr>
-        <p:txBody>
-          <a:bodyPr wrap="square" rtlCol="0">
-            <a:spAutoFit/>
-          </a:bodyPr>
-          <a:lstStyle/>
-          <a:p>
-            <a:pPr algn="ctr"/>
-            <a:r>
-              <a:rPr lang="en-US" sz="1000" dirty="0">
-                <a:latin typeface="Times New Roman" panose="02020603050405020304" pitchFamily="18" charset="0"/>
-                <a:cs typeface="Times New Roman" panose="02020603050405020304" pitchFamily="18" charset="0"/>
-              </a:rPr>
-              <a:t>***</a:t>
-            </a:r>
-          </a:p>
-        </p:txBody>
-      </p:sp>
-      <p:sp>
-        <p:nvSpPr>
-          <p:cNvPr id="34" name="TextBox 33">
-            <a:extLst>
-              <a:ext uri="{FF2B5EF4-FFF2-40B4-BE49-F238E27FC236}">
-                <a16:creationId xmlns:a16="http://schemas.microsoft.com/office/drawing/2014/main" id="{BAD2B7DA-4A90-4FD6-8AB4-B057D54793BA}"/>
-              </a:ext>
-            </a:extLst>
-          </p:cNvPr>
-          <p:cNvSpPr txBox="1"/>
-          <p:nvPr/>
-        </p:nvSpPr>
-        <p:spPr>
-          <a:xfrm>
-            <a:off x="6581941" y="2759946"/>
-            <a:ext cx="429431" cy="246221"/>
-          </a:xfrm>
-          <a:prstGeom prst="rect">
-            <a:avLst/>
-          </a:prstGeom>
-          <a:noFill/>
-        </p:spPr>
-        <p:txBody>
-          <a:bodyPr wrap="square" rtlCol="0">
-            <a:spAutoFit/>
-          </a:bodyPr>
-          <a:lstStyle/>
-          <a:p>
-            <a:pPr algn="ctr"/>
-            <a:r>
-              <a:rPr lang="en-US" sz="1000" dirty="0">
-                <a:latin typeface="Times New Roman" panose="02020603050405020304" pitchFamily="18" charset="0"/>
-                <a:cs typeface="Times New Roman" panose="02020603050405020304" pitchFamily="18" charset="0"/>
-              </a:rPr>
-              <a:t>***</a:t>
-            </a:r>
-          </a:p>
-        </p:txBody>
-      </p:sp>
-      <p:sp>
-        <p:nvSpPr>
-          <p:cNvPr id="35" name="TextBox 34">
-            <a:extLst>
-              <a:ext uri="{FF2B5EF4-FFF2-40B4-BE49-F238E27FC236}">
-                <a16:creationId xmlns:a16="http://schemas.microsoft.com/office/drawing/2014/main" id="{FF91B486-AD91-4B22-8D82-FA19E651109B}"/>
-              </a:ext>
-            </a:extLst>
-          </p:cNvPr>
-          <p:cNvSpPr txBox="1"/>
-          <p:nvPr/>
-        </p:nvSpPr>
-        <p:spPr>
-          <a:xfrm>
-            <a:off x="6176729" y="2759945"/>
-            <a:ext cx="429431" cy="246221"/>
-          </a:xfrm>
-          <a:prstGeom prst="rect">
-            <a:avLst/>
-          </a:prstGeom>
-          <a:noFill/>
-        </p:spPr>
-        <p:txBody>
-          <a:bodyPr wrap="square" rtlCol="0">
-            <a:spAutoFit/>
-          </a:bodyPr>
-          <a:lstStyle/>
-          <a:p>
-            <a:pPr algn="ctr"/>
-            <a:r>
-              <a:rPr lang="en-US" sz="1000" dirty="0">
-                <a:latin typeface="Times New Roman" panose="02020603050405020304" pitchFamily="18" charset="0"/>
-                <a:cs typeface="Times New Roman" panose="02020603050405020304" pitchFamily="18" charset="0"/>
-              </a:rPr>
-              <a:t>***</a:t>
-            </a:r>
-          </a:p>
-        </p:txBody>
-      </p:sp>
-      <p:cxnSp>
-        <p:nvCxnSpPr>
-          <p:cNvPr id="36" name="Straight Connector 35">
-            <a:extLst>
-              <a:ext uri="{FF2B5EF4-FFF2-40B4-BE49-F238E27FC236}">
-                <a16:creationId xmlns:a16="http://schemas.microsoft.com/office/drawing/2014/main" id="{F9164B92-33D6-4D3B-8799-E2B76EC99404}"/>
-              </a:ext>
-            </a:extLst>
-          </p:cNvPr>
-          <p:cNvCxnSpPr>
-            <a:cxnSpLocks/>
-          </p:cNvCxnSpPr>
-          <p:nvPr/>
-        </p:nvCxnSpPr>
-        <p:spPr>
-          <a:xfrm>
-            <a:off x="6616499" y="2945970"/>
-            <a:ext cx="380995" cy="0"/>
-          </a:xfrm>
-          <a:prstGeom prst="line">
-            <a:avLst/>
-          </a:prstGeom>
-          <a:ln w="19050">
-            <a:solidFill>
-              <a:schemeClr val="tx1"/>
-            </a:solidFill>
-          </a:ln>
-        </p:spPr>
-        <p:style>
-          <a:lnRef idx="1">
-            <a:schemeClr val="accent1"/>
-          </a:lnRef>
-          <a:fillRef idx="0">
-            <a:schemeClr val="accent1"/>
-          </a:fillRef>
-          <a:effectRef idx="0">
-            <a:schemeClr val="accent1"/>
-          </a:effectRef>
-          <a:fontRef idx="minor">
-            <a:schemeClr val="tx1"/>
-          </a:fontRef>
-        </p:style>
-      </p:cxnSp>
-      <p:cxnSp>
-        <p:nvCxnSpPr>
-          <p:cNvPr id="37" name="Straight Connector 36">
-            <a:extLst>
-              <a:ext uri="{FF2B5EF4-FFF2-40B4-BE49-F238E27FC236}">
-                <a16:creationId xmlns:a16="http://schemas.microsoft.com/office/drawing/2014/main" id="{FD29D5FD-0941-431B-990A-CCA32E3DA870}"/>
-              </a:ext>
-            </a:extLst>
-          </p:cNvPr>
-          <p:cNvCxnSpPr>
-            <a:cxnSpLocks/>
-          </p:cNvCxnSpPr>
-          <p:nvPr/>
-        </p:nvCxnSpPr>
-        <p:spPr>
-          <a:xfrm>
-            <a:off x="6214826" y="2945970"/>
-            <a:ext cx="366798" cy="0"/>
-          </a:xfrm>
-          <a:prstGeom prst="line">
-            <a:avLst/>
-          </a:prstGeom>
-          <a:ln w="19050">
-            <a:solidFill>
-              <a:schemeClr val="tx1"/>
-            </a:solidFill>
-          </a:ln>
-        </p:spPr>
-        <p:style>
-          <a:lnRef idx="1">
-            <a:schemeClr val="accent1"/>
-          </a:lnRef>
-          <a:fillRef idx="0">
-            <a:schemeClr val="accent1"/>
-          </a:fillRef>
-          <a:effectRef idx="0">
-            <a:schemeClr val="accent1"/>
-          </a:effectRef>
-          <a:fontRef idx="minor">
-            <a:schemeClr val="tx1"/>
-          </a:fontRef>
-        </p:style>
-      </p:cxnSp>
-      <p:cxnSp>
-        <p:nvCxnSpPr>
-          <p:cNvPr id="38" name="Straight Connector 37">
-            <a:extLst>
-              <a:ext uri="{FF2B5EF4-FFF2-40B4-BE49-F238E27FC236}">
-                <a16:creationId xmlns:a16="http://schemas.microsoft.com/office/drawing/2014/main" id="{EDD68DFB-83B0-4830-B2A3-02696F52BF17}"/>
-              </a:ext>
-            </a:extLst>
-          </p:cNvPr>
-          <p:cNvCxnSpPr>
-            <a:cxnSpLocks/>
-          </p:cNvCxnSpPr>
-          <p:nvPr/>
-        </p:nvCxnSpPr>
-        <p:spPr>
-          <a:xfrm>
-            <a:off x="7828277" y="3506062"/>
-            <a:ext cx="380995" cy="0"/>
-          </a:xfrm>
-          <a:prstGeom prst="line">
-            <a:avLst/>
-          </a:prstGeom>
-          <a:ln w="19050">
-            <a:solidFill>
-              <a:schemeClr val="tx1"/>
-            </a:solidFill>
-          </a:ln>
-        </p:spPr>
-        <p:style>
-          <a:lnRef idx="1">
-            <a:schemeClr val="accent1"/>
-          </a:lnRef>
-          <a:fillRef idx="0">
-            <a:schemeClr val="accent1"/>
-          </a:fillRef>
-          <a:effectRef idx="0">
-            <a:schemeClr val="accent1"/>
-          </a:effectRef>
-          <a:fontRef idx="minor">
-            <a:schemeClr val="tx1"/>
-          </a:fontRef>
-        </p:style>
-      </p:cxnSp>
-      <p:sp>
-        <p:nvSpPr>
-          <p:cNvPr id="41" name="TextBox 40">
-            <a:extLst>
-              <a:ext uri="{FF2B5EF4-FFF2-40B4-BE49-F238E27FC236}">
-                <a16:creationId xmlns:a16="http://schemas.microsoft.com/office/drawing/2014/main" id="{C7842704-C940-4498-80E4-42EC776DC828}"/>
-              </a:ext>
-            </a:extLst>
-          </p:cNvPr>
-          <p:cNvSpPr txBox="1"/>
-          <p:nvPr/>
-        </p:nvSpPr>
-        <p:spPr>
-          <a:xfrm>
-            <a:off x="9454551" y="2417801"/>
-            <a:ext cx="429431" cy="246221"/>
-          </a:xfrm>
-          <a:prstGeom prst="rect">
-            <a:avLst/>
-          </a:prstGeom>
-          <a:noFill/>
-        </p:spPr>
-        <p:txBody>
-          <a:bodyPr wrap="square" rtlCol="0">
-            <a:spAutoFit/>
-          </a:bodyPr>
-          <a:lstStyle/>
-          <a:p>
-            <a:pPr algn="ctr"/>
-            <a:r>
-              <a:rPr lang="en-US" sz="1000" dirty="0">
-                <a:latin typeface="Times New Roman" panose="02020603050405020304" pitchFamily="18" charset="0"/>
-                <a:cs typeface="Times New Roman" panose="02020603050405020304" pitchFamily="18" charset="0"/>
-              </a:rPr>
-              <a:t>***</a:t>
-            </a:r>
-          </a:p>
-        </p:txBody>
-      </p:sp>
-      <p:cxnSp>
-        <p:nvCxnSpPr>
-          <p:cNvPr id="42" name="Straight Connector 41">
-            <a:extLst>
-              <a:ext uri="{FF2B5EF4-FFF2-40B4-BE49-F238E27FC236}">
-                <a16:creationId xmlns:a16="http://schemas.microsoft.com/office/drawing/2014/main" id="{825E5A9B-A661-4A2D-BDBD-0D444490A317}"/>
-              </a:ext>
-            </a:extLst>
-          </p:cNvPr>
-          <p:cNvCxnSpPr>
-            <a:cxnSpLocks/>
-          </p:cNvCxnSpPr>
-          <p:nvPr/>
-        </p:nvCxnSpPr>
-        <p:spPr>
-          <a:xfrm>
-            <a:off x="9292668" y="2657959"/>
-            <a:ext cx="783982" cy="0"/>
-          </a:xfrm>
-          <a:prstGeom prst="line">
-            <a:avLst/>
-          </a:prstGeom>
-          <a:ln w="19050">
-            <a:solidFill>
-              <a:schemeClr val="tx1"/>
-            </a:solidFill>
-          </a:ln>
-        </p:spPr>
-        <p:style>
-          <a:lnRef idx="1">
-            <a:schemeClr val="accent1"/>
-          </a:lnRef>
-          <a:fillRef idx="0">
-            <a:schemeClr val="accent1"/>
-          </a:fillRef>
-          <a:effectRef idx="0">
-            <a:schemeClr val="accent1"/>
-          </a:effectRef>
-          <a:fontRef idx="minor">
-            <a:schemeClr val="tx1"/>
-          </a:fontRef>
-        </p:style>
-      </p:cxnSp>
-      <p:sp>
-        <p:nvSpPr>
-          <p:cNvPr id="43" name="TextBox 42">
-            <a:extLst>
-              <a:ext uri="{FF2B5EF4-FFF2-40B4-BE49-F238E27FC236}">
-                <a16:creationId xmlns:a16="http://schemas.microsoft.com/office/drawing/2014/main" id="{BAD732C9-4FF4-40C4-A3A2-915EFD60F4C6}"/>
-              </a:ext>
-            </a:extLst>
-          </p:cNvPr>
-          <p:cNvSpPr txBox="1"/>
-          <p:nvPr/>
-        </p:nvSpPr>
-        <p:spPr>
-          <a:xfrm>
-            <a:off x="9268449" y="3305889"/>
-            <a:ext cx="429431" cy="246221"/>
-          </a:xfrm>
-          <a:prstGeom prst="rect">
-            <a:avLst/>
-          </a:prstGeom>
-          <a:noFill/>
-        </p:spPr>
-        <p:txBody>
-          <a:bodyPr wrap="square" rtlCol="0">
-            <a:spAutoFit/>
-          </a:bodyPr>
-          <a:lstStyle/>
-          <a:p>
-            <a:pPr algn="ctr"/>
-            <a:r>
-              <a:rPr lang="en-US" sz="1000" dirty="0">
-                <a:latin typeface="Times New Roman" panose="02020603050405020304" pitchFamily="18" charset="0"/>
-                <a:cs typeface="Times New Roman" panose="02020603050405020304" pitchFamily="18" charset="0"/>
-              </a:rPr>
-              <a:t>***</a:t>
-            </a:r>
-          </a:p>
-        </p:txBody>
-      </p:sp>
-      <p:cxnSp>
-        <p:nvCxnSpPr>
-          <p:cNvPr id="46" name="Straight Connector 45">
-            <a:extLst>
-              <a:ext uri="{FF2B5EF4-FFF2-40B4-BE49-F238E27FC236}">
-                <a16:creationId xmlns:a16="http://schemas.microsoft.com/office/drawing/2014/main" id="{55884C9A-E556-4E67-B1F8-B6F27B27AE04}"/>
-              </a:ext>
-            </a:extLst>
-          </p:cNvPr>
-          <p:cNvCxnSpPr>
-            <a:cxnSpLocks/>
-          </p:cNvCxnSpPr>
-          <p:nvPr/>
-        </p:nvCxnSpPr>
-        <p:spPr>
-          <a:xfrm>
-            <a:off x="7851581" y="2657959"/>
-            <a:ext cx="761990" cy="0"/>
-          </a:xfrm>
-          <a:prstGeom prst="line">
-            <a:avLst/>
-          </a:prstGeom>
-          <a:ln w="19050">
-            <a:solidFill>
-              <a:schemeClr val="tx1"/>
-            </a:solidFill>
-          </a:ln>
-        </p:spPr>
-        <p:style>
-          <a:lnRef idx="1">
-            <a:schemeClr val="accent1"/>
-          </a:lnRef>
-          <a:fillRef idx="0">
-            <a:schemeClr val="accent1"/>
-          </a:fillRef>
-          <a:effectRef idx="0">
-            <a:schemeClr val="accent1"/>
-          </a:effectRef>
-          <a:fontRef idx="minor">
-            <a:schemeClr val="tx1"/>
-          </a:fontRef>
-        </p:style>
-      </p:cxnSp>
-      <p:sp>
-        <p:nvSpPr>
-          <p:cNvPr id="47" name="TextBox 46">
-            <a:extLst>
-              <a:ext uri="{FF2B5EF4-FFF2-40B4-BE49-F238E27FC236}">
-                <a16:creationId xmlns:a16="http://schemas.microsoft.com/office/drawing/2014/main" id="{571358FF-869E-4BD8-9365-C908CB2A1B58}"/>
-              </a:ext>
-            </a:extLst>
-          </p:cNvPr>
-          <p:cNvSpPr txBox="1"/>
-          <p:nvPr/>
-        </p:nvSpPr>
-        <p:spPr>
-          <a:xfrm>
-            <a:off x="8011307" y="2410279"/>
-            <a:ext cx="429431" cy="246221"/>
-          </a:xfrm>
-          <a:prstGeom prst="rect">
-            <a:avLst/>
-          </a:prstGeom>
-          <a:noFill/>
-        </p:spPr>
-        <p:txBody>
-          <a:bodyPr wrap="square" rtlCol="0">
-            <a:spAutoFit/>
-          </a:bodyPr>
-          <a:lstStyle/>
-          <a:p>
-            <a:pPr algn="ctr"/>
-            <a:r>
-              <a:rPr lang="en-US" sz="1000" dirty="0">
-                <a:latin typeface="Times New Roman" panose="02020603050405020304" pitchFamily="18" charset="0"/>
-                <a:cs typeface="Times New Roman" panose="02020603050405020304" pitchFamily="18" charset="0"/>
-              </a:rPr>
-              <a:t>***</a:t>
-            </a:r>
-          </a:p>
-        </p:txBody>
-      </p:sp>
-      <p:sp>
-        <p:nvSpPr>
-          <p:cNvPr id="49" name="TextBox 48">
-            <a:extLst>
-              <a:ext uri="{FF2B5EF4-FFF2-40B4-BE49-F238E27FC236}">
-                <a16:creationId xmlns:a16="http://schemas.microsoft.com/office/drawing/2014/main" id="{11ED2B12-BE38-48FB-9198-12420CCB0EED}"/>
-              </a:ext>
-            </a:extLst>
-          </p:cNvPr>
-          <p:cNvSpPr txBox="1"/>
-          <p:nvPr/>
-        </p:nvSpPr>
-        <p:spPr>
-          <a:xfrm>
-            <a:off x="2182033" y="2196293"/>
-            <a:ext cx="1125629" cy="307777"/>
+            <a:off x="2841837" y="848038"/>
+            <a:ext cx="1361271" cy="307777"/>
           </a:xfrm>
           <a:prstGeom prst="rect">
             <a:avLst/>
@@ -7044,17 +6073,17 @@
                 <a:latin typeface="Times New Roman" panose="02020603050405020304" pitchFamily="18" charset="0"/>
                 <a:cs typeface="Times New Roman" panose="02020603050405020304" pitchFamily="18" charset="0"/>
               </a:rPr>
-              <a:t>Spanish (ES)</a:t>
-            </a:r>
-          </a:p>
-        </p:txBody>
-      </p:sp>
-      <p:sp>
-        <p:nvSpPr>
-          <p:cNvPr id="52" name="TextBox 51">
-            <a:extLst>
-              <a:ext uri="{FF2B5EF4-FFF2-40B4-BE49-F238E27FC236}">
-                <a16:creationId xmlns:a16="http://schemas.microsoft.com/office/drawing/2014/main" id="{5A635ED0-5D4C-495C-BEA6-7B41BD819BB0}"/>
+              <a:t>Spanish-English</a:t>
+            </a:r>
+          </a:p>
+        </p:txBody>
+      </p:sp>
+      <p:sp>
+        <p:nvSpPr>
+          <p:cNvPr id="22" name="TextBox 21">
+            <a:extLst>
+              <a:ext uri="{FF2B5EF4-FFF2-40B4-BE49-F238E27FC236}">
+                <a16:creationId xmlns:a16="http://schemas.microsoft.com/office/drawing/2014/main" id="{59725D22-6FDC-4F19-9480-80FB1FBFE810}"/>
               </a:ext>
             </a:extLst>
           </p:cNvPr>
@@ -7063,8 +6092,8 @@
         </p:nvSpPr>
         <p:spPr>
           <a:xfrm>
-            <a:off x="5287899" y="2196293"/>
-            <a:ext cx="1135247" cy="307777"/>
+            <a:off x="8076580" y="850693"/>
+            <a:ext cx="1343638" cy="307777"/>
           </a:xfrm>
           <a:prstGeom prst="rect">
             <a:avLst/>
@@ -7085,17 +6114,17 @@
                 <a:latin typeface="Times New Roman" panose="02020603050405020304" pitchFamily="18" charset="0"/>
                 <a:cs typeface="Times New Roman" panose="02020603050405020304" pitchFamily="18" charset="0"/>
               </a:rPr>
-              <a:t>English (EN)</a:t>
-            </a:r>
-          </a:p>
-        </p:txBody>
-      </p:sp>
-      <p:sp>
-        <p:nvSpPr>
-          <p:cNvPr id="53" name="TextBox 52">
-            <a:extLst>
-              <a:ext uri="{FF2B5EF4-FFF2-40B4-BE49-F238E27FC236}">
-                <a16:creationId xmlns:a16="http://schemas.microsoft.com/office/drawing/2014/main" id="{505C270D-9F24-40AE-9A4B-A14316CD7D2E}"/>
+              <a:t>Spanish-Basque</a:t>
+            </a:r>
+          </a:p>
+        </p:txBody>
+      </p:sp>
+      <p:sp>
+        <p:nvSpPr>
+          <p:cNvPr id="23" name="TextBox 22">
+            <a:extLst>
+              <a:ext uri="{FF2B5EF4-FFF2-40B4-BE49-F238E27FC236}">
+                <a16:creationId xmlns:a16="http://schemas.microsoft.com/office/drawing/2014/main" id="{0F40DD5C-472C-4D0E-AAF0-C8CFFF65A812}"/>
               </a:ext>
             </a:extLst>
           </p:cNvPr>
@@ -7104,8 +6133,8 @@
         </p:nvSpPr>
         <p:spPr>
           <a:xfrm>
-            <a:off x="8413776" y="2194155"/>
-            <a:ext cx="1117615" cy="307777"/>
+            <a:off x="1933242" y="1280732"/>
+            <a:ext cx="691216" cy="307777"/>
           </a:xfrm>
           <a:prstGeom prst="rect">
             <a:avLst/>
@@ -7126,17 +6155,17 @@
                 <a:latin typeface="Times New Roman" panose="02020603050405020304" pitchFamily="18" charset="0"/>
                 <a:cs typeface="Times New Roman" panose="02020603050405020304" pitchFamily="18" charset="0"/>
               </a:rPr>
-              <a:t>Basque (EU)</a:t>
-            </a:r>
-          </a:p>
-        </p:txBody>
-      </p:sp>
-      <p:sp>
-        <p:nvSpPr>
-          <p:cNvPr id="54" name="TextBox 53">
-            <a:extLst>
-              <a:ext uri="{FF2B5EF4-FFF2-40B4-BE49-F238E27FC236}">
-                <a16:creationId xmlns:a16="http://schemas.microsoft.com/office/drawing/2014/main" id="{65410239-08B7-44D2-B9D9-39E6DE726ADF}"/>
+              <a:t>ES-EN</a:t>
+            </a:r>
+          </a:p>
+        </p:txBody>
+      </p:sp>
+      <p:sp>
+        <p:nvSpPr>
+          <p:cNvPr id="24" name="TextBox 23">
+            <a:extLst>
+              <a:ext uri="{FF2B5EF4-FFF2-40B4-BE49-F238E27FC236}">
+                <a16:creationId xmlns:a16="http://schemas.microsoft.com/office/drawing/2014/main" id="{423E92B0-0B90-46E3-8DE1-C8D8C44D5746}"/>
               </a:ext>
             </a:extLst>
           </p:cNvPr>
@@ -7145,37 +6174,39 @@
         </p:nvSpPr>
         <p:spPr>
           <a:xfrm>
-            <a:off x="7804058" y="3305888"/>
-            <a:ext cx="429431" cy="246221"/>
+            <a:off x="4488286" y="1280732"/>
+            <a:ext cx="734496" cy="307777"/>
           </a:xfrm>
           <a:prstGeom prst="rect">
             <a:avLst/>
           </a:prstGeom>
-          <a:noFill/>
-        </p:spPr>
-        <p:txBody>
-          <a:bodyPr wrap="square" rtlCol="0">
+          <a:solidFill>
+            <a:schemeClr val="bg1"/>
+          </a:solidFill>
+        </p:spPr>
+        <p:txBody>
+          <a:bodyPr wrap="none" rtlCol="0">
             <a:spAutoFit/>
           </a:bodyPr>
           <a:lstStyle/>
           <a:p>
             <a:pPr algn="ctr"/>
             <a:r>
-              <a:rPr lang="en-US" sz="1000" dirty="0">
+              <a:rPr lang="en-US" sz="1400" dirty="0">
                 <a:latin typeface="Times New Roman" panose="02020603050405020304" pitchFamily="18" charset="0"/>
                 <a:cs typeface="Times New Roman" panose="02020603050405020304" pitchFamily="18" charset="0"/>
               </a:rPr>
-              <a:t>***</a:t>
-            </a:r>
-          </a:p>
-        </p:txBody>
-      </p:sp>
-      <p:sp>
-        <p:nvSpPr>
-          <p:cNvPr id="55" name="TextBox 54">
-            <a:extLst>
-              <a:ext uri="{FF2B5EF4-FFF2-40B4-BE49-F238E27FC236}">
-                <a16:creationId xmlns:a16="http://schemas.microsoft.com/office/drawing/2014/main" id="{2CBEA336-F452-4B27-B7A2-17A6D5A438EE}"/>
+              <a:t>MONO</a:t>
+            </a:r>
+          </a:p>
+        </p:txBody>
+      </p:sp>
+      <p:sp>
+        <p:nvSpPr>
+          <p:cNvPr id="26" name="TextBox 25">
+            <a:extLst>
+              <a:ext uri="{FF2B5EF4-FFF2-40B4-BE49-F238E27FC236}">
+                <a16:creationId xmlns:a16="http://schemas.microsoft.com/office/drawing/2014/main" id="{97E2DD86-3725-4A0E-8F5C-C866B1B01F7B}"/>
               </a:ext>
             </a:extLst>
           </p:cNvPr>
@@ -7184,80 +6215,39 @@
         </p:nvSpPr>
         <p:spPr>
           <a:xfrm>
-            <a:off x="8233489" y="2646564"/>
-            <a:ext cx="429431" cy="246221"/>
+            <a:off x="7086610" y="1280732"/>
+            <a:ext cx="691216" cy="307777"/>
           </a:xfrm>
           <a:prstGeom prst="rect">
             <a:avLst/>
           </a:prstGeom>
-          <a:noFill/>
-        </p:spPr>
-        <p:txBody>
-          <a:bodyPr wrap="square" rtlCol="0">
+          <a:solidFill>
+            <a:schemeClr val="bg1"/>
+          </a:solidFill>
+        </p:spPr>
+        <p:txBody>
+          <a:bodyPr wrap="none" rtlCol="0">
             <a:spAutoFit/>
           </a:bodyPr>
           <a:lstStyle/>
           <a:p>
             <a:pPr algn="ctr"/>
             <a:r>
-              <a:rPr lang="en-US" sz="1000" dirty="0">
+              <a:rPr lang="en-US" sz="1400" dirty="0">
                 <a:latin typeface="Times New Roman" panose="02020603050405020304" pitchFamily="18" charset="0"/>
                 <a:cs typeface="Times New Roman" panose="02020603050405020304" pitchFamily="18" charset="0"/>
               </a:rPr>
-              <a:t>***</a:t>
-            </a:r>
-          </a:p>
-        </p:txBody>
-      </p:sp>
-      <p:cxnSp>
-        <p:nvCxnSpPr>
-          <p:cNvPr id="56" name="Straight Connector 55">
-            <a:extLst>
-              <a:ext uri="{FF2B5EF4-FFF2-40B4-BE49-F238E27FC236}">
-                <a16:creationId xmlns:a16="http://schemas.microsoft.com/office/drawing/2014/main" id="{73D42AEC-CE2E-450E-B19C-0A06468DFFD2}"/>
-              </a:ext>
-            </a:extLst>
-          </p:cNvPr>
-          <p:cNvCxnSpPr>
-            <a:cxnSpLocks/>
-          </p:cNvCxnSpPr>
-          <p:nvPr/>
-        </p:nvCxnSpPr>
-        <p:spPr>
-          <a:xfrm>
-            <a:off x="8257708" y="2829363"/>
-            <a:ext cx="380995" cy="0"/>
-          </a:xfrm>
-          <a:prstGeom prst="line">
-            <a:avLst/>
-          </a:prstGeom>
-          <a:ln w="19050">
-            <a:solidFill>
-              <a:schemeClr val="tx1"/>
-            </a:solidFill>
-          </a:ln>
-        </p:spPr>
-        <p:style>
-          <a:lnRef idx="1">
-            <a:schemeClr val="accent1"/>
-          </a:lnRef>
-          <a:fillRef idx="0">
-            <a:schemeClr val="accent1"/>
-          </a:fillRef>
-          <a:effectRef idx="0">
-            <a:schemeClr val="accent1"/>
-          </a:effectRef>
-          <a:fontRef idx="minor">
-            <a:schemeClr val="tx1"/>
-          </a:fontRef>
-        </p:style>
-      </p:cxnSp>
-      <p:sp>
-        <p:nvSpPr>
-          <p:cNvPr id="59" name="TextBox 58">
-            <a:extLst>
-              <a:ext uri="{FF2B5EF4-FFF2-40B4-BE49-F238E27FC236}">
-                <a16:creationId xmlns:a16="http://schemas.microsoft.com/office/drawing/2014/main" id="{3E87625C-F3C5-4B6D-8958-F22BB6D3E179}"/>
+              <a:t>ES-EU</a:t>
+            </a:r>
+          </a:p>
+        </p:txBody>
+      </p:sp>
+      <p:sp>
+        <p:nvSpPr>
+          <p:cNvPr id="27" name="TextBox 26">
+            <a:extLst>
+              <a:ext uri="{FF2B5EF4-FFF2-40B4-BE49-F238E27FC236}">
+                <a16:creationId xmlns:a16="http://schemas.microsoft.com/office/drawing/2014/main" id="{3549548F-7C55-41FF-803A-6FD011576483}"/>
               </a:ext>
             </a:extLst>
           </p:cNvPr>
@@ -7266,121 +6256,177 @@
         </p:nvSpPr>
         <p:spPr>
           <a:xfrm>
-            <a:off x="9693393" y="2646565"/>
-            <a:ext cx="429431" cy="246221"/>
+            <a:off x="9641655" y="1289361"/>
+            <a:ext cx="734496" cy="307777"/>
           </a:xfrm>
           <a:prstGeom prst="rect">
             <a:avLst/>
           </a:prstGeom>
-          <a:noFill/>
-        </p:spPr>
-        <p:txBody>
-          <a:bodyPr wrap="square" rtlCol="0">
+          <a:solidFill>
+            <a:schemeClr val="bg1"/>
+          </a:solidFill>
+        </p:spPr>
+        <p:txBody>
+          <a:bodyPr wrap="none" rtlCol="0">
             <a:spAutoFit/>
           </a:bodyPr>
           <a:lstStyle/>
           <a:p>
             <a:pPr algn="ctr"/>
             <a:r>
-              <a:rPr lang="en-US" sz="1000" dirty="0">
+              <a:rPr lang="en-US" sz="1400" dirty="0">
                 <a:latin typeface="Times New Roman" panose="02020603050405020304" pitchFamily="18" charset="0"/>
                 <a:cs typeface="Times New Roman" panose="02020603050405020304" pitchFamily="18" charset="0"/>
               </a:rPr>
-              <a:t>***</a:t>
-            </a:r>
-          </a:p>
-        </p:txBody>
-      </p:sp>
-      <p:cxnSp>
-        <p:nvCxnSpPr>
-          <p:cNvPr id="61" name="Straight Connector 60">
-            <a:extLst>
-              <a:ext uri="{FF2B5EF4-FFF2-40B4-BE49-F238E27FC236}">
-                <a16:creationId xmlns:a16="http://schemas.microsoft.com/office/drawing/2014/main" id="{F2A9D6A6-C89B-4751-A197-9712D0D10446}"/>
-              </a:ext>
-            </a:extLst>
-          </p:cNvPr>
-          <p:cNvCxnSpPr>
-            <a:cxnSpLocks/>
-          </p:cNvCxnSpPr>
-          <p:nvPr/>
-        </p:nvCxnSpPr>
-        <p:spPr>
-          <a:xfrm>
-            <a:off x="9303664" y="3506062"/>
-            <a:ext cx="380995" cy="0"/>
-          </a:xfrm>
-          <a:prstGeom prst="line">
-            <a:avLst/>
-          </a:prstGeom>
-          <a:ln w="19050">
-            <a:solidFill>
-              <a:schemeClr val="tx1"/>
-            </a:solidFill>
-          </a:ln>
-        </p:spPr>
-        <p:style>
-          <a:lnRef idx="1">
-            <a:schemeClr val="accent1"/>
-          </a:lnRef>
-          <a:fillRef idx="0">
-            <a:schemeClr val="accent1"/>
-          </a:fillRef>
-          <a:effectRef idx="0">
-            <a:schemeClr val="accent1"/>
-          </a:effectRef>
-          <a:fontRef idx="minor">
-            <a:schemeClr val="tx1"/>
-          </a:fontRef>
-        </p:style>
-      </p:cxnSp>
-      <p:cxnSp>
-        <p:nvCxnSpPr>
-          <p:cNvPr id="62" name="Straight Connector 61">
-            <a:extLst>
-              <a:ext uri="{FF2B5EF4-FFF2-40B4-BE49-F238E27FC236}">
-                <a16:creationId xmlns:a16="http://schemas.microsoft.com/office/drawing/2014/main" id="{FDA4883E-D5A2-4F3A-A8E6-2108C75934D2}"/>
-              </a:ext>
-            </a:extLst>
-          </p:cNvPr>
-          <p:cNvCxnSpPr>
-            <a:cxnSpLocks/>
-          </p:cNvCxnSpPr>
-          <p:nvPr/>
-        </p:nvCxnSpPr>
-        <p:spPr>
-          <a:xfrm>
-            <a:off x="9723269" y="2839312"/>
-            <a:ext cx="380995" cy="0"/>
-          </a:xfrm>
-          <a:prstGeom prst="line">
-            <a:avLst/>
-          </a:prstGeom>
-          <a:ln w="19050">
-            <a:solidFill>
-              <a:schemeClr val="tx1"/>
-            </a:solidFill>
-          </a:ln>
-        </p:spPr>
-        <p:style>
-          <a:lnRef idx="1">
-            <a:schemeClr val="accent1"/>
-          </a:lnRef>
-          <a:fillRef idx="0">
-            <a:schemeClr val="accent1"/>
-          </a:fillRef>
-          <a:effectRef idx="0">
-            <a:schemeClr val="accent1"/>
-          </a:effectRef>
-          <a:fontRef idx="minor">
-            <a:schemeClr val="tx1"/>
-          </a:fontRef>
-        </p:style>
-      </p:cxnSp>
+              <a:t>MONO</a:t>
+            </a:r>
+          </a:p>
+        </p:txBody>
+      </p:sp>
+      <p:pic>
+        <p:nvPicPr>
+          <p:cNvPr id="33" name="Picture 32">
+            <a:extLst>
+              <a:ext uri="{FF2B5EF4-FFF2-40B4-BE49-F238E27FC236}">
+                <a16:creationId xmlns:a16="http://schemas.microsoft.com/office/drawing/2014/main" id="{89285785-502E-4734-89EB-89712CF6051B}"/>
+              </a:ext>
+            </a:extLst>
+          </p:cNvPr>
+          <p:cNvPicPr>
+            <a:picLocks noChangeAspect="1"/>
+          </p:cNvPicPr>
+          <p:nvPr/>
+        </p:nvPicPr>
+        <p:blipFill rotWithShape="1">
+          <a:blip r:embed="rId3">
+            <a:extLst>
+              <a:ext uri="{28A0092B-C50C-407E-A947-70E740481C1C}">
+                <a14:useLocalDpi xmlns:a14="http://schemas.microsoft.com/office/drawing/2010/main" val="0"/>
+              </a:ext>
+            </a:extLst>
+          </a:blip>
+          <a:srcRect l="5265" b="5964"/>
+          <a:stretch/>
+        </p:blipFill>
+        <p:spPr>
+          <a:xfrm>
+            <a:off x="924568" y="1645453"/>
+            <a:ext cx="2708564" cy="2688592"/>
+          </a:xfrm>
+          <a:prstGeom prst="rect">
+            <a:avLst/>
+          </a:prstGeom>
+        </p:spPr>
+      </p:pic>
+      <p:pic>
+        <p:nvPicPr>
+          <p:cNvPr id="35" name="Picture 34">
+            <a:extLst>
+              <a:ext uri="{FF2B5EF4-FFF2-40B4-BE49-F238E27FC236}">
+                <a16:creationId xmlns:a16="http://schemas.microsoft.com/office/drawing/2014/main" id="{02C3176C-D32A-49FA-8EE6-0ACCE6AA5108}"/>
+              </a:ext>
+            </a:extLst>
+          </p:cNvPr>
+          <p:cNvPicPr>
+            <a:picLocks noChangeAspect="1"/>
+          </p:cNvPicPr>
+          <p:nvPr/>
+        </p:nvPicPr>
+        <p:blipFill rotWithShape="1">
+          <a:blip r:embed="rId4">
+            <a:extLst>
+              <a:ext uri="{28A0092B-C50C-407E-A947-70E740481C1C}">
+                <a14:useLocalDpi xmlns:a14="http://schemas.microsoft.com/office/drawing/2010/main" val="0"/>
+              </a:ext>
+            </a:extLst>
+          </a:blip>
+          <a:srcRect l="12645" b="5964"/>
+          <a:stretch/>
+        </p:blipFill>
+        <p:spPr>
+          <a:xfrm>
+            <a:off x="3666197" y="1645453"/>
+            <a:ext cx="2497563" cy="2688590"/>
+          </a:xfrm>
+          <a:prstGeom prst="rect">
+            <a:avLst/>
+          </a:prstGeom>
+        </p:spPr>
+      </p:pic>
+      <p:pic>
+        <p:nvPicPr>
+          <p:cNvPr id="37" name="Picture 36">
+            <a:extLst>
+              <a:ext uri="{FF2B5EF4-FFF2-40B4-BE49-F238E27FC236}">
+                <a16:creationId xmlns:a16="http://schemas.microsoft.com/office/drawing/2014/main" id="{7FAD5877-0E78-4D8F-BB2E-BD55C8D97A63}"/>
+              </a:ext>
+            </a:extLst>
+          </p:cNvPr>
+          <p:cNvPicPr>
+            <a:picLocks noChangeAspect="1"/>
+          </p:cNvPicPr>
+          <p:nvPr/>
+        </p:nvPicPr>
+        <p:blipFill rotWithShape="1">
+          <a:blip r:embed="rId5">
+            <a:extLst>
+              <a:ext uri="{28A0092B-C50C-407E-A947-70E740481C1C}">
+                <a14:useLocalDpi xmlns:a14="http://schemas.microsoft.com/office/drawing/2010/main" val="0"/>
+              </a:ext>
+            </a:extLst>
+          </a:blip>
+          <a:srcRect l="11825" b="5964"/>
+          <a:stretch/>
+        </p:blipFill>
+        <p:spPr>
+          <a:xfrm>
+            <a:off x="6205043" y="1645453"/>
+            <a:ext cx="2521008" cy="2688591"/>
+          </a:xfrm>
+          <a:prstGeom prst="rect">
+            <a:avLst/>
+          </a:prstGeom>
+        </p:spPr>
+      </p:pic>
+      <p:pic>
+        <p:nvPicPr>
+          <p:cNvPr id="39" name="Picture 38">
+            <a:extLst>
+              <a:ext uri="{FF2B5EF4-FFF2-40B4-BE49-F238E27FC236}">
+                <a16:creationId xmlns:a16="http://schemas.microsoft.com/office/drawing/2014/main" id="{F4688C10-3933-4E5C-87D6-2F79F2E73C2B}"/>
+              </a:ext>
+            </a:extLst>
+          </p:cNvPr>
+          <p:cNvPicPr>
+            <a:picLocks noChangeAspect="1"/>
+          </p:cNvPicPr>
+          <p:nvPr/>
+        </p:nvPicPr>
+        <p:blipFill rotWithShape="1">
+          <a:blip r:embed="rId6">
+            <a:extLst>
+              <a:ext uri="{28A0092B-C50C-407E-A947-70E740481C1C}">
+                <a14:useLocalDpi xmlns:a14="http://schemas.microsoft.com/office/drawing/2010/main" val="0"/>
+              </a:ext>
+            </a:extLst>
+          </a:blip>
+          <a:srcRect l="11825" b="5964"/>
+          <a:stretch/>
+        </p:blipFill>
+        <p:spPr>
+          <a:xfrm>
+            <a:off x="8748399" y="1645453"/>
+            <a:ext cx="2521009" cy="2688591"/>
+          </a:xfrm>
+          <a:prstGeom prst="rect">
+            <a:avLst/>
+          </a:prstGeom>
+        </p:spPr>
+      </p:pic>
     </p:spTree>
     <p:extLst>
       <p:ext uri="{BB962C8B-B14F-4D97-AF65-F5344CB8AC3E}">
-        <p14:creationId xmlns:p14="http://schemas.microsoft.com/office/powerpoint/2010/main" val="2395570493"/>
+        <p14:creationId xmlns:p14="http://schemas.microsoft.com/office/powerpoint/2010/main" val="1617090707"/>
       </p:ext>
     </p:extLst>
   </p:cSld>
@@ -7409,6 +6455,1529 @@
       </p:grpSpPr>
       <p:pic>
         <p:nvPicPr>
+          <p:cNvPr id="7" name="Content Placeholder 6">
+            <a:extLst>
+              <a:ext uri="{FF2B5EF4-FFF2-40B4-BE49-F238E27FC236}">
+                <a16:creationId xmlns:a16="http://schemas.microsoft.com/office/drawing/2014/main" id="{981DF9AA-663D-4039-A1F8-CEFBFABB8E57}"/>
+              </a:ext>
+            </a:extLst>
+          </p:cNvPr>
+          <p:cNvPicPr>
+            <a:picLocks noGrp="1" noChangeAspect="1"/>
+          </p:cNvPicPr>
+          <p:nvPr>
+            <p:ph idx="1"/>
+          </p:nvPr>
+        </p:nvPicPr>
+        <p:blipFill rotWithShape="1">
+          <a:blip r:embed="rId2">
+            <a:extLst>
+              <a:ext uri="{28A0092B-C50C-407E-A947-70E740481C1C}">
+                <a14:useLocalDpi xmlns:a14="http://schemas.microsoft.com/office/drawing/2010/main" val="0"/>
+              </a:ext>
+            </a:extLst>
+          </a:blip>
+          <a:srcRect t="6419"/>
+          <a:stretch/>
+        </p:blipFill>
+        <p:spPr>
+          <a:xfrm>
+            <a:off x="838200" y="2664704"/>
+            <a:ext cx="10515600" cy="3023364"/>
+          </a:xfrm>
+        </p:spPr>
+      </p:pic>
+      <p:sp>
+        <p:nvSpPr>
+          <p:cNvPr id="2" name="Title 1">
+            <a:extLst>
+              <a:ext uri="{FF2B5EF4-FFF2-40B4-BE49-F238E27FC236}">
+                <a16:creationId xmlns:a16="http://schemas.microsoft.com/office/drawing/2014/main" id="{F3E6B28E-F078-4193-B215-E598325B79B2}"/>
+              </a:ext>
+            </a:extLst>
+          </p:cNvPr>
+          <p:cNvSpPr>
+            <a:spLocks noGrp="1"/>
+          </p:cNvSpPr>
+          <p:nvPr>
+            <p:ph type="title"/>
+          </p:nvPr>
+        </p:nvSpPr>
+        <p:spPr/>
+        <p:txBody>
+          <a:bodyPr/>
+          <a:lstStyle/>
+          <a:p>
+            <a:r>
+              <a:rPr lang="en-US" dirty="0"/>
+              <a:t>Figure 2 (Converted to table)</a:t>
+            </a:r>
+          </a:p>
+        </p:txBody>
+      </p:sp>
+      <p:sp>
+        <p:nvSpPr>
+          <p:cNvPr id="11" name="TextBox 10">
+            <a:extLst>
+              <a:ext uri="{FF2B5EF4-FFF2-40B4-BE49-F238E27FC236}">
+                <a16:creationId xmlns:a16="http://schemas.microsoft.com/office/drawing/2014/main" id="{D2A26610-6458-421B-B51D-2C84493B196A}"/>
+              </a:ext>
+            </a:extLst>
+          </p:cNvPr>
+          <p:cNvSpPr txBox="1"/>
+          <p:nvPr/>
+        </p:nvSpPr>
+        <p:spPr>
+          <a:xfrm>
+            <a:off x="5651768" y="5339167"/>
+            <a:ext cx="413896" cy="307777"/>
+          </a:xfrm>
+          <a:prstGeom prst="rect">
+            <a:avLst/>
+          </a:prstGeom>
+          <a:solidFill>
+            <a:schemeClr val="bg1"/>
+          </a:solidFill>
+        </p:spPr>
+        <p:txBody>
+          <a:bodyPr wrap="none" rtlCol="0">
+            <a:spAutoFit/>
+          </a:bodyPr>
+          <a:lstStyle/>
+          <a:p>
+            <a:r>
+              <a:rPr lang="en-US" sz="1400" dirty="0">
+                <a:latin typeface="Times New Roman" panose="02020603050405020304" pitchFamily="18" charset="0"/>
+                <a:cs typeface="Times New Roman" panose="02020603050405020304" pitchFamily="18" charset="0"/>
+              </a:rPr>
+              <a:t>Set</a:t>
+            </a:r>
+          </a:p>
+        </p:txBody>
+      </p:sp>
+      <p:sp>
+        <p:nvSpPr>
+          <p:cNvPr id="12" name="TextBox 11">
+            <a:extLst>
+              <a:ext uri="{FF2B5EF4-FFF2-40B4-BE49-F238E27FC236}">
+                <a16:creationId xmlns:a16="http://schemas.microsoft.com/office/drawing/2014/main" id="{6A53F9EE-7341-4945-BE60-B6CF3BE87B69}"/>
+              </a:ext>
+            </a:extLst>
+          </p:cNvPr>
+          <p:cNvSpPr txBox="1"/>
+          <p:nvPr/>
+        </p:nvSpPr>
+        <p:spPr>
+          <a:xfrm>
+            <a:off x="2537900" y="5325355"/>
+            <a:ext cx="413896" cy="307777"/>
+          </a:xfrm>
+          <a:prstGeom prst="rect">
+            <a:avLst/>
+          </a:prstGeom>
+          <a:solidFill>
+            <a:schemeClr val="bg1"/>
+          </a:solidFill>
+        </p:spPr>
+        <p:txBody>
+          <a:bodyPr wrap="none" rtlCol="0">
+            <a:spAutoFit/>
+          </a:bodyPr>
+          <a:lstStyle/>
+          <a:p>
+            <a:r>
+              <a:rPr lang="en-US" sz="1400" dirty="0">
+                <a:latin typeface="Times New Roman" panose="02020603050405020304" pitchFamily="18" charset="0"/>
+                <a:cs typeface="Times New Roman" panose="02020603050405020304" pitchFamily="18" charset="0"/>
+              </a:rPr>
+              <a:t>Set</a:t>
+            </a:r>
+          </a:p>
+        </p:txBody>
+      </p:sp>
+      <p:sp>
+        <p:nvSpPr>
+          <p:cNvPr id="13" name="TextBox 12">
+            <a:extLst>
+              <a:ext uri="{FF2B5EF4-FFF2-40B4-BE49-F238E27FC236}">
+                <a16:creationId xmlns:a16="http://schemas.microsoft.com/office/drawing/2014/main" id="{301F71EB-0675-4E3C-8AE6-566BB803E7EE}"/>
+              </a:ext>
+            </a:extLst>
+          </p:cNvPr>
+          <p:cNvSpPr txBox="1"/>
+          <p:nvPr/>
+        </p:nvSpPr>
+        <p:spPr>
+          <a:xfrm>
+            <a:off x="8765636" y="5325355"/>
+            <a:ext cx="413896" cy="307777"/>
+          </a:xfrm>
+          <a:prstGeom prst="rect">
+            <a:avLst/>
+          </a:prstGeom>
+          <a:solidFill>
+            <a:schemeClr val="bg1"/>
+          </a:solidFill>
+        </p:spPr>
+        <p:txBody>
+          <a:bodyPr wrap="none" rtlCol="0">
+            <a:spAutoFit/>
+          </a:bodyPr>
+          <a:lstStyle/>
+          <a:p>
+            <a:r>
+              <a:rPr lang="en-US" sz="1400" dirty="0">
+                <a:latin typeface="Times New Roman" panose="02020603050405020304" pitchFamily="18" charset="0"/>
+                <a:cs typeface="Times New Roman" panose="02020603050405020304" pitchFamily="18" charset="0"/>
+              </a:rPr>
+              <a:t>Set</a:t>
+            </a:r>
+          </a:p>
+        </p:txBody>
+      </p:sp>
+      <p:sp>
+        <p:nvSpPr>
+          <p:cNvPr id="14" name="TextBox 13">
+            <a:extLst>
+              <a:ext uri="{FF2B5EF4-FFF2-40B4-BE49-F238E27FC236}">
+                <a16:creationId xmlns:a16="http://schemas.microsoft.com/office/drawing/2014/main" id="{EE007ABB-DB88-44C2-8221-57D78FD24678}"/>
+              </a:ext>
+            </a:extLst>
+          </p:cNvPr>
+          <p:cNvSpPr txBox="1"/>
+          <p:nvPr/>
+        </p:nvSpPr>
+        <p:spPr>
+          <a:xfrm rot="16200000">
+            <a:off x="-90692" y="3660380"/>
+            <a:ext cx="1927131" cy="307777"/>
+          </a:xfrm>
+          <a:prstGeom prst="rect">
+            <a:avLst/>
+          </a:prstGeom>
+          <a:solidFill>
+            <a:schemeClr val="bg1"/>
+          </a:solidFill>
+        </p:spPr>
+        <p:txBody>
+          <a:bodyPr wrap="none" rtlCol="0">
+            <a:spAutoFit/>
+          </a:bodyPr>
+          <a:lstStyle/>
+          <a:p>
+            <a:r>
+              <a:rPr lang="en-US" sz="1400" dirty="0">
+                <a:latin typeface="Times New Roman" panose="02020603050405020304" pitchFamily="18" charset="0"/>
+                <a:cs typeface="Times New Roman" panose="02020603050405020304" pitchFamily="18" charset="0"/>
+              </a:rPr>
+              <a:t>Accuracy (%) ± 99% CI</a:t>
+            </a:r>
+          </a:p>
+        </p:txBody>
+      </p:sp>
+      <p:cxnSp>
+        <p:nvCxnSpPr>
+          <p:cNvPr id="16" name="Straight Connector 15">
+            <a:extLst>
+              <a:ext uri="{FF2B5EF4-FFF2-40B4-BE49-F238E27FC236}">
+                <a16:creationId xmlns:a16="http://schemas.microsoft.com/office/drawing/2014/main" id="{7CC6FB2A-FACA-4705-8242-BF31B69F0B39}"/>
+              </a:ext>
+            </a:extLst>
+          </p:cNvPr>
+          <p:cNvCxnSpPr>
+            <a:cxnSpLocks/>
+          </p:cNvCxnSpPr>
+          <p:nvPr/>
+        </p:nvCxnSpPr>
+        <p:spPr>
+          <a:xfrm>
+            <a:off x="1604078" y="2657959"/>
+            <a:ext cx="817533" cy="0"/>
+          </a:xfrm>
+          <a:prstGeom prst="line">
+            <a:avLst/>
+          </a:prstGeom>
+          <a:ln w="19050">
+            <a:solidFill>
+              <a:schemeClr val="tx1"/>
+            </a:solidFill>
+          </a:ln>
+        </p:spPr>
+        <p:style>
+          <a:lnRef idx="1">
+            <a:schemeClr val="accent1"/>
+          </a:lnRef>
+          <a:fillRef idx="0">
+            <a:schemeClr val="accent1"/>
+          </a:fillRef>
+          <a:effectRef idx="0">
+            <a:schemeClr val="accent1"/>
+          </a:effectRef>
+          <a:fontRef idx="minor">
+            <a:schemeClr val="tx1"/>
+          </a:fontRef>
+        </p:style>
+      </p:cxnSp>
+      <p:cxnSp>
+        <p:nvCxnSpPr>
+          <p:cNvPr id="19" name="Straight Connector 18">
+            <a:extLst>
+              <a:ext uri="{FF2B5EF4-FFF2-40B4-BE49-F238E27FC236}">
+                <a16:creationId xmlns:a16="http://schemas.microsoft.com/office/drawing/2014/main" id="{4619940A-3D44-471F-A1CA-D1E96AC15E8B}"/>
+              </a:ext>
+            </a:extLst>
+          </p:cNvPr>
+          <p:cNvCxnSpPr>
+            <a:cxnSpLocks/>
+          </p:cNvCxnSpPr>
+          <p:nvPr/>
+        </p:nvCxnSpPr>
+        <p:spPr>
+          <a:xfrm>
+            <a:off x="3089333" y="2657959"/>
+            <a:ext cx="817533" cy="0"/>
+          </a:xfrm>
+          <a:prstGeom prst="line">
+            <a:avLst/>
+          </a:prstGeom>
+          <a:ln w="19050">
+            <a:solidFill>
+              <a:schemeClr val="tx1"/>
+            </a:solidFill>
+          </a:ln>
+        </p:spPr>
+        <p:style>
+          <a:lnRef idx="1">
+            <a:schemeClr val="accent1"/>
+          </a:lnRef>
+          <a:fillRef idx="0">
+            <a:schemeClr val="accent1"/>
+          </a:fillRef>
+          <a:effectRef idx="0">
+            <a:schemeClr val="accent1"/>
+          </a:effectRef>
+          <a:fontRef idx="minor">
+            <a:schemeClr val="tx1"/>
+          </a:fontRef>
+        </p:style>
+      </p:cxnSp>
+      <p:sp>
+        <p:nvSpPr>
+          <p:cNvPr id="20" name="TextBox 19">
+            <a:extLst>
+              <a:ext uri="{FF2B5EF4-FFF2-40B4-BE49-F238E27FC236}">
+                <a16:creationId xmlns:a16="http://schemas.microsoft.com/office/drawing/2014/main" id="{87138E18-9EC4-443E-9BDC-6D8C049CC66D}"/>
+              </a:ext>
+            </a:extLst>
+          </p:cNvPr>
+          <p:cNvSpPr txBox="1"/>
+          <p:nvPr/>
+        </p:nvSpPr>
+        <p:spPr>
+          <a:xfrm>
+            <a:off x="1831127" y="2411738"/>
+            <a:ext cx="363434" cy="246221"/>
+          </a:xfrm>
+          <a:prstGeom prst="rect">
+            <a:avLst/>
+          </a:prstGeom>
+          <a:noFill/>
+        </p:spPr>
+        <p:txBody>
+          <a:bodyPr wrap="square" rtlCol="0">
+            <a:spAutoFit/>
+          </a:bodyPr>
+          <a:lstStyle/>
+          <a:p>
+            <a:pPr algn="ctr"/>
+            <a:r>
+              <a:rPr lang="en-US" sz="1000" dirty="0">
+                <a:latin typeface="Times New Roman" panose="02020603050405020304" pitchFamily="18" charset="0"/>
+                <a:cs typeface="Times New Roman" panose="02020603050405020304" pitchFamily="18" charset="0"/>
+              </a:rPr>
+              <a:t>n.s.</a:t>
+            </a:r>
+          </a:p>
+        </p:txBody>
+      </p:sp>
+      <p:sp>
+        <p:nvSpPr>
+          <p:cNvPr id="21" name="TextBox 20">
+            <a:extLst>
+              <a:ext uri="{FF2B5EF4-FFF2-40B4-BE49-F238E27FC236}">
+                <a16:creationId xmlns:a16="http://schemas.microsoft.com/office/drawing/2014/main" id="{AAB8A998-3EBC-43C2-9F0B-A2F92BA31576}"/>
+              </a:ext>
+            </a:extLst>
+          </p:cNvPr>
+          <p:cNvSpPr txBox="1"/>
+          <p:nvPr/>
+        </p:nvSpPr>
+        <p:spPr>
+          <a:xfrm>
+            <a:off x="3316382" y="2411738"/>
+            <a:ext cx="363434" cy="246221"/>
+          </a:xfrm>
+          <a:prstGeom prst="rect">
+            <a:avLst/>
+          </a:prstGeom>
+          <a:noFill/>
+        </p:spPr>
+        <p:txBody>
+          <a:bodyPr wrap="square" rtlCol="0">
+            <a:spAutoFit/>
+          </a:bodyPr>
+          <a:lstStyle/>
+          <a:p>
+            <a:pPr algn="ctr"/>
+            <a:r>
+              <a:rPr lang="en-US" sz="1000" dirty="0">
+                <a:latin typeface="Times New Roman" panose="02020603050405020304" pitchFamily="18" charset="0"/>
+                <a:cs typeface="Times New Roman" panose="02020603050405020304" pitchFamily="18" charset="0"/>
+              </a:rPr>
+              <a:t>n.s.</a:t>
+            </a:r>
+          </a:p>
+        </p:txBody>
+      </p:sp>
+      <p:cxnSp>
+        <p:nvCxnSpPr>
+          <p:cNvPr id="22" name="Straight Connector 21">
+            <a:extLst>
+              <a:ext uri="{FF2B5EF4-FFF2-40B4-BE49-F238E27FC236}">
+                <a16:creationId xmlns:a16="http://schemas.microsoft.com/office/drawing/2014/main" id="{7A75D440-B16B-4BAE-92CA-FE6496321E7C}"/>
+              </a:ext>
+            </a:extLst>
+          </p:cNvPr>
+          <p:cNvCxnSpPr>
+            <a:cxnSpLocks/>
+          </p:cNvCxnSpPr>
+          <p:nvPr/>
+        </p:nvCxnSpPr>
+        <p:spPr>
+          <a:xfrm>
+            <a:off x="5120905" y="2945970"/>
+            <a:ext cx="380995" cy="0"/>
+          </a:xfrm>
+          <a:prstGeom prst="line">
+            <a:avLst/>
+          </a:prstGeom>
+          <a:ln w="19050">
+            <a:solidFill>
+              <a:schemeClr val="tx1"/>
+            </a:solidFill>
+          </a:ln>
+        </p:spPr>
+        <p:style>
+          <a:lnRef idx="1">
+            <a:schemeClr val="accent1"/>
+          </a:lnRef>
+          <a:fillRef idx="0">
+            <a:schemeClr val="accent1"/>
+          </a:fillRef>
+          <a:effectRef idx="0">
+            <a:schemeClr val="accent1"/>
+          </a:effectRef>
+          <a:fontRef idx="minor">
+            <a:schemeClr val="tx1"/>
+          </a:fontRef>
+        </p:style>
+      </p:cxnSp>
+      <p:cxnSp>
+        <p:nvCxnSpPr>
+          <p:cNvPr id="24" name="Straight Connector 23">
+            <a:extLst>
+              <a:ext uri="{FF2B5EF4-FFF2-40B4-BE49-F238E27FC236}">
+                <a16:creationId xmlns:a16="http://schemas.microsoft.com/office/drawing/2014/main" id="{3D5AD9DC-4C52-4C1E-82A2-B63898E17BCF}"/>
+              </a:ext>
+            </a:extLst>
+          </p:cNvPr>
+          <p:cNvCxnSpPr>
+            <a:cxnSpLocks/>
+          </p:cNvCxnSpPr>
+          <p:nvPr/>
+        </p:nvCxnSpPr>
+        <p:spPr>
+          <a:xfrm>
+            <a:off x="4719232" y="2945970"/>
+            <a:ext cx="366798" cy="0"/>
+          </a:xfrm>
+          <a:prstGeom prst="line">
+            <a:avLst/>
+          </a:prstGeom>
+          <a:ln w="19050">
+            <a:solidFill>
+              <a:schemeClr val="tx1"/>
+            </a:solidFill>
+          </a:ln>
+        </p:spPr>
+        <p:style>
+          <a:lnRef idx="1">
+            <a:schemeClr val="accent1"/>
+          </a:lnRef>
+          <a:fillRef idx="0">
+            <a:schemeClr val="accent1"/>
+          </a:fillRef>
+          <a:effectRef idx="0">
+            <a:schemeClr val="accent1"/>
+          </a:effectRef>
+          <a:fontRef idx="minor">
+            <a:schemeClr val="tx1"/>
+          </a:fontRef>
+        </p:style>
+      </p:cxnSp>
+      <p:cxnSp>
+        <p:nvCxnSpPr>
+          <p:cNvPr id="27" name="Straight Connector 26">
+            <a:extLst>
+              <a:ext uri="{FF2B5EF4-FFF2-40B4-BE49-F238E27FC236}">
+                <a16:creationId xmlns:a16="http://schemas.microsoft.com/office/drawing/2014/main" id="{5A3271C6-09E9-4E94-8015-C4F7EF298B32}"/>
+              </a:ext>
+            </a:extLst>
+          </p:cNvPr>
+          <p:cNvCxnSpPr>
+            <a:cxnSpLocks/>
+          </p:cNvCxnSpPr>
+          <p:nvPr/>
+        </p:nvCxnSpPr>
+        <p:spPr>
+          <a:xfrm>
+            <a:off x="4729571" y="2657959"/>
+            <a:ext cx="782668" cy="0"/>
+          </a:xfrm>
+          <a:prstGeom prst="line">
+            <a:avLst/>
+          </a:prstGeom>
+          <a:ln w="19050">
+            <a:solidFill>
+              <a:schemeClr val="tx1"/>
+            </a:solidFill>
+          </a:ln>
+        </p:spPr>
+        <p:style>
+          <a:lnRef idx="1">
+            <a:schemeClr val="accent1"/>
+          </a:lnRef>
+          <a:fillRef idx="0">
+            <a:schemeClr val="accent1"/>
+          </a:fillRef>
+          <a:effectRef idx="0">
+            <a:schemeClr val="accent1"/>
+          </a:effectRef>
+          <a:fontRef idx="minor">
+            <a:schemeClr val="tx1"/>
+          </a:fontRef>
+        </p:style>
+      </p:cxnSp>
+      <p:sp>
+        <p:nvSpPr>
+          <p:cNvPr id="29" name="TextBox 28">
+            <a:extLst>
+              <a:ext uri="{FF2B5EF4-FFF2-40B4-BE49-F238E27FC236}">
+                <a16:creationId xmlns:a16="http://schemas.microsoft.com/office/drawing/2014/main" id="{79476358-A8B8-42E1-9892-ACBB3DF4691A}"/>
+              </a:ext>
+            </a:extLst>
+          </p:cNvPr>
+          <p:cNvSpPr txBox="1"/>
+          <p:nvPr/>
+        </p:nvSpPr>
+        <p:spPr>
+          <a:xfrm>
+            <a:off x="4947968" y="2411738"/>
+            <a:ext cx="363434" cy="246221"/>
+          </a:xfrm>
+          <a:prstGeom prst="rect">
+            <a:avLst/>
+          </a:prstGeom>
+          <a:noFill/>
+        </p:spPr>
+        <p:txBody>
+          <a:bodyPr wrap="square" rtlCol="0">
+            <a:spAutoFit/>
+          </a:bodyPr>
+          <a:lstStyle/>
+          <a:p>
+            <a:pPr algn="ctr"/>
+            <a:r>
+              <a:rPr lang="en-US" sz="1000" dirty="0">
+                <a:latin typeface="Times New Roman" panose="02020603050405020304" pitchFamily="18" charset="0"/>
+                <a:cs typeface="Times New Roman" panose="02020603050405020304" pitchFamily="18" charset="0"/>
+              </a:rPr>
+              <a:t>n.s.</a:t>
+            </a:r>
+          </a:p>
+        </p:txBody>
+      </p:sp>
+      <p:cxnSp>
+        <p:nvCxnSpPr>
+          <p:cNvPr id="30" name="Straight Connector 29">
+            <a:extLst>
+              <a:ext uri="{FF2B5EF4-FFF2-40B4-BE49-F238E27FC236}">
+                <a16:creationId xmlns:a16="http://schemas.microsoft.com/office/drawing/2014/main" id="{37560A6D-4576-4D13-8C6F-ACDF56F1D2E9}"/>
+              </a:ext>
+            </a:extLst>
+          </p:cNvPr>
+          <p:cNvCxnSpPr>
+            <a:cxnSpLocks/>
+          </p:cNvCxnSpPr>
+          <p:nvPr/>
+        </p:nvCxnSpPr>
+        <p:spPr>
+          <a:xfrm>
+            <a:off x="6214826" y="2657959"/>
+            <a:ext cx="782668" cy="0"/>
+          </a:xfrm>
+          <a:prstGeom prst="line">
+            <a:avLst/>
+          </a:prstGeom>
+          <a:ln w="19050">
+            <a:solidFill>
+              <a:schemeClr val="tx1"/>
+            </a:solidFill>
+          </a:ln>
+        </p:spPr>
+        <p:style>
+          <a:lnRef idx="1">
+            <a:schemeClr val="accent1"/>
+          </a:lnRef>
+          <a:fillRef idx="0">
+            <a:schemeClr val="accent1"/>
+          </a:fillRef>
+          <a:effectRef idx="0">
+            <a:schemeClr val="accent1"/>
+          </a:effectRef>
+          <a:fontRef idx="minor">
+            <a:schemeClr val="tx1"/>
+          </a:fontRef>
+        </p:style>
+      </p:cxnSp>
+      <p:sp>
+        <p:nvSpPr>
+          <p:cNvPr id="31" name="TextBox 30">
+            <a:extLst>
+              <a:ext uri="{FF2B5EF4-FFF2-40B4-BE49-F238E27FC236}">
+                <a16:creationId xmlns:a16="http://schemas.microsoft.com/office/drawing/2014/main" id="{46B02236-037F-4167-8DEE-CBF11C38213F}"/>
+              </a:ext>
+            </a:extLst>
+          </p:cNvPr>
+          <p:cNvSpPr txBox="1"/>
+          <p:nvPr/>
+        </p:nvSpPr>
+        <p:spPr>
+          <a:xfrm>
+            <a:off x="6418894" y="2417801"/>
+            <a:ext cx="363434" cy="246221"/>
+          </a:xfrm>
+          <a:prstGeom prst="rect">
+            <a:avLst/>
+          </a:prstGeom>
+          <a:noFill/>
+        </p:spPr>
+        <p:txBody>
+          <a:bodyPr wrap="square" rtlCol="0">
+            <a:spAutoFit/>
+          </a:bodyPr>
+          <a:lstStyle/>
+          <a:p>
+            <a:pPr algn="ctr"/>
+            <a:r>
+              <a:rPr lang="en-US" sz="1000" dirty="0">
+                <a:latin typeface="Times New Roman" panose="02020603050405020304" pitchFamily="18" charset="0"/>
+                <a:cs typeface="Times New Roman" panose="02020603050405020304" pitchFamily="18" charset="0"/>
+              </a:rPr>
+              <a:t>n.s.</a:t>
+            </a:r>
+          </a:p>
+        </p:txBody>
+      </p:sp>
+      <p:sp>
+        <p:nvSpPr>
+          <p:cNvPr id="32" name="TextBox 31">
+            <a:extLst>
+              <a:ext uri="{FF2B5EF4-FFF2-40B4-BE49-F238E27FC236}">
+                <a16:creationId xmlns:a16="http://schemas.microsoft.com/office/drawing/2014/main" id="{43B948B4-DDC6-4315-A030-B777FE82008C}"/>
+              </a:ext>
+            </a:extLst>
+          </p:cNvPr>
+          <p:cNvSpPr txBox="1"/>
+          <p:nvPr/>
+        </p:nvSpPr>
+        <p:spPr>
+          <a:xfrm>
+            <a:off x="5096686" y="2759945"/>
+            <a:ext cx="429431" cy="246221"/>
+          </a:xfrm>
+          <a:prstGeom prst="rect">
+            <a:avLst/>
+          </a:prstGeom>
+          <a:noFill/>
+        </p:spPr>
+        <p:txBody>
+          <a:bodyPr wrap="square" rtlCol="0">
+            <a:spAutoFit/>
+          </a:bodyPr>
+          <a:lstStyle/>
+          <a:p>
+            <a:pPr algn="ctr"/>
+            <a:r>
+              <a:rPr lang="en-US" sz="1000" dirty="0">
+                <a:latin typeface="Times New Roman" panose="02020603050405020304" pitchFamily="18" charset="0"/>
+                <a:cs typeface="Times New Roman" panose="02020603050405020304" pitchFamily="18" charset="0"/>
+              </a:rPr>
+              <a:t>***</a:t>
+            </a:r>
+          </a:p>
+        </p:txBody>
+      </p:sp>
+      <p:sp>
+        <p:nvSpPr>
+          <p:cNvPr id="33" name="TextBox 32">
+            <a:extLst>
+              <a:ext uri="{FF2B5EF4-FFF2-40B4-BE49-F238E27FC236}">
+                <a16:creationId xmlns:a16="http://schemas.microsoft.com/office/drawing/2014/main" id="{B3955643-7C48-434D-A9ED-49189D6759DB}"/>
+              </a:ext>
+            </a:extLst>
+          </p:cNvPr>
+          <p:cNvSpPr txBox="1"/>
+          <p:nvPr/>
+        </p:nvSpPr>
+        <p:spPr>
+          <a:xfrm>
+            <a:off x="4691474" y="2759944"/>
+            <a:ext cx="429431" cy="246221"/>
+          </a:xfrm>
+          <a:prstGeom prst="rect">
+            <a:avLst/>
+          </a:prstGeom>
+          <a:noFill/>
+        </p:spPr>
+        <p:txBody>
+          <a:bodyPr wrap="square" rtlCol="0">
+            <a:spAutoFit/>
+          </a:bodyPr>
+          <a:lstStyle/>
+          <a:p>
+            <a:pPr algn="ctr"/>
+            <a:r>
+              <a:rPr lang="en-US" sz="1000" dirty="0">
+                <a:latin typeface="Times New Roman" panose="02020603050405020304" pitchFamily="18" charset="0"/>
+                <a:cs typeface="Times New Roman" panose="02020603050405020304" pitchFamily="18" charset="0"/>
+              </a:rPr>
+              <a:t>***</a:t>
+            </a:r>
+          </a:p>
+        </p:txBody>
+      </p:sp>
+      <p:sp>
+        <p:nvSpPr>
+          <p:cNvPr id="34" name="TextBox 33">
+            <a:extLst>
+              <a:ext uri="{FF2B5EF4-FFF2-40B4-BE49-F238E27FC236}">
+                <a16:creationId xmlns:a16="http://schemas.microsoft.com/office/drawing/2014/main" id="{BAD2B7DA-4A90-4FD6-8AB4-B057D54793BA}"/>
+              </a:ext>
+            </a:extLst>
+          </p:cNvPr>
+          <p:cNvSpPr txBox="1"/>
+          <p:nvPr/>
+        </p:nvSpPr>
+        <p:spPr>
+          <a:xfrm>
+            <a:off x="6581941" y="2759946"/>
+            <a:ext cx="429431" cy="246221"/>
+          </a:xfrm>
+          <a:prstGeom prst="rect">
+            <a:avLst/>
+          </a:prstGeom>
+          <a:noFill/>
+        </p:spPr>
+        <p:txBody>
+          <a:bodyPr wrap="square" rtlCol="0">
+            <a:spAutoFit/>
+          </a:bodyPr>
+          <a:lstStyle/>
+          <a:p>
+            <a:pPr algn="ctr"/>
+            <a:r>
+              <a:rPr lang="en-US" sz="1000" dirty="0">
+                <a:latin typeface="Times New Roman" panose="02020603050405020304" pitchFamily="18" charset="0"/>
+                <a:cs typeface="Times New Roman" panose="02020603050405020304" pitchFamily="18" charset="0"/>
+              </a:rPr>
+              <a:t>***</a:t>
+            </a:r>
+          </a:p>
+        </p:txBody>
+      </p:sp>
+      <p:sp>
+        <p:nvSpPr>
+          <p:cNvPr id="35" name="TextBox 34">
+            <a:extLst>
+              <a:ext uri="{FF2B5EF4-FFF2-40B4-BE49-F238E27FC236}">
+                <a16:creationId xmlns:a16="http://schemas.microsoft.com/office/drawing/2014/main" id="{FF91B486-AD91-4B22-8D82-FA19E651109B}"/>
+              </a:ext>
+            </a:extLst>
+          </p:cNvPr>
+          <p:cNvSpPr txBox="1"/>
+          <p:nvPr/>
+        </p:nvSpPr>
+        <p:spPr>
+          <a:xfrm>
+            <a:off x="6176729" y="2759945"/>
+            <a:ext cx="429431" cy="246221"/>
+          </a:xfrm>
+          <a:prstGeom prst="rect">
+            <a:avLst/>
+          </a:prstGeom>
+          <a:noFill/>
+        </p:spPr>
+        <p:txBody>
+          <a:bodyPr wrap="square" rtlCol="0">
+            <a:spAutoFit/>
+          </a:bodyPr>
+          <a:lstStyle/>
+          <a:p>
+            <a:pPr algn="ctr"/>
+            <a:r>
+              <a:rPr lang="en-US" sz="1000" dirty="0">
+                <a:latin typeface="Times New Roman" panose="02020603050405020304" pitchFamily="18" charset="0"/>
+                <a:cs typeface="Times New Roman" panose="02020603050405020304" pitchFamily="18" charset="0"/>
+              </a:rPr>
+              <a:t>***</a:t>
+            </a:r>
+          </a:p>
+        </p:txBody>
+      </p:sp>
+      <p:cxnSp>
+        <p:nvCxnSpPr>
+          <p:cNvPr id="36" name="Straight Connector 35">
+            <a:extLst>
+              <a:ext uri="{FF2B5EF4-FFF2-40B4-BE49-F238E27FC236}">
+                <a16:creationId xmlns:a16="http://schemas.microsoft.com/office/drawing/2014/main" id="{F9164B92-33D6-4D3B-8799-E2B76EC99404}"/>
+              </a:ext>
+            </a:extLst>
+          </p:cNvPr>
+          <p:cNvCxnSpPr>
+            <a:cxnSpLocks/>
+          </p:cNvCxnSpPr>
+          <p:nvPr/>
+        </p:nvCxnSpPr>
+        <p:spPr>
+          <a:xfrm>
+            <a:off x="6616499" y="2945970"/>
+            <a:ext cx="380995" cy="0"/>
+          </a:xfrm>
+          <a:prstGeom prst="line">
+            <a:avLst/>
+          </a:prstGeom>
+          <a:ln w="19050">
+            <a:solidFill>
+              <a:schemeClr val="tx1"/>
+            </a:solidFill>
+          </a:ln>
+        </p:spPr>
+        <p:style>
+          <a:lnRef idx="1">
+            <a:schemeClr val="accent1"/>
+          </a:lnRef>
+          <a:fillRef idx="0">
+            <a:schemeClr val="accent1"/>
+          </a:fillRef>
+          <a:effectRef idx="0">
+            <a:schemeClr val="accent1"/>
+          </a:effectRef>
+          <a:fontRef idx="minor">
+            <a:schemeClr val="tx1"/>
+          </a:fontRef>
+        </p:style>
+      </p:cxnSp>
+      <p:cxnSp>
+        <p:nvCxnSpPr>
+          <p:cNvPr id="37" name="Straight Connector 36">
+            <a:extLst>
+              <a:ext uri="{FF2B5EF4-FFF2-40B4-BE49-F238E27FC236}">
+                <a16:creationId xmlns:a16="http://schemas.microsoft.com/office/drawing/2014/main" id="{FD29D5FD-0941-431B-990A-CCA32E3DA870}"/>
+              </a:ext>
+            </a:extLst>
+          </p:cNvPr>
+          <p:cNvCxnSpPr>
+            <a:cxnSpLocks/>
+          </p:cNvCxnSpPr>
+          <p:nvPr/>
+        </p:nvCxnSpPr>
+        <p:spPr>
+          <a:xfrm>
+            <a:off x="6214826" y="2945970"/>
+            <a:ext cx="366798" cy="0"/>
+          </a:xfrm>
+          <a:prstGeom prst="line">
+            <a:avLst/>
+          </a:prstGeom>
+          <a:ln w="19050">
+            <a:solidFill>
+              <a:schemeClr val="tx1"/>
+            </a:solidFill>
+          </a:ln>
+        </p:spPr>
+        <p:style>
+          <a:lnRef idx="1">
+            <a:schemeClr val="accent1"/>
+          </a:lnRef>
+          <a:fillRef idx="0">
+            <a:schemeClr val="accent1"/>
+          </a:fillRef>
+          <a:effectRef idx="0">
+            <a:schemeClr val="accent1"/>
+          </a:effectRef>
+          <a:fontRef idx="minor">
+            <a:schemeClr val="tx1"/>
+          </a:fontRef>
+        </p:style>
+      </p:cxnSp>
+      <p:cxnSp>
+        <p:nvCxnSpPr>
+          <p:cNvPr id="38" name="Straight Connector 37">
+            <a:extLst>
+              <a:ext uri="{FF2B5EF4-FFF2-40B4-BE49-F238E27FC236}">
+                <a16:creationId xmlns:a16="http://schemas.microsoft.com/office/drawing/2014/main" id="{EDD68DFB-83B0-4830-B2A3-02696F52BF17}"/>
+              </a:ext>
+            </a:extLst>
+          </p:cNvPr>
+          <p:cNvCxnSpPr>
+            <a:cxnSpLocks/>
+          </p:cNvCxnSpPr>
+          <p:nvPr/>
+        </p:nvCxnSpPr>
+        <p:spPr>
+          <a:xfrm>
+            <a:off x="7828277" y="3506062"/>
+            <a:ext cx="380995" cy="0"/>
+          </a:xfrm>
+          <a:prstGeom prst="line">
+            <a:avLst/>
+          </a:prstGeom>
+          <a:ln w="19050">
+            <a:solidFill>
+              <a:schemeClr val="tx1"/>
+            </a:solidFill>
+          </a:ln>
+        </p:spPr>
+        <p:style>
+          <a:lnRef idx="1">
+            <a:schemeClr val="accent1"/>
+          </a:lnRef>
+          <a:fillRef idx="0">
+            <a:schemeClr val="accent1"/>
+          </a:fillRef>
+          <a:effectRef idx="0">
+            <a:schemeClr val="accent1"/>
+          </a:effectRef>
+          <a:fontRef idx="minor">
+            <a:schemeClr val="tx1"/>
+          </a:fontRef>
+        </p:style>
+      </p:cxnSp>
+      <p:sp>
+        <p:nvSpPr>
+          <p:cNvPr id="41" name="TextBox 40">
+            <a:extLst>
+              <a:ext uri="{FF2B5EF4-FFF2-40B4-BE49-F238E27FC236}">
+                <a16:creationId xmlns:a16="http://schemas.microsoft.com/office/drawing/2014/main" id="{C7842704-C940-4498-80E4-42EC776DC828}"/>
+              </a:ext>
+            </a:extLst>
+          </p:cNvPr>
+          <p:cNvSpPr txBox="1"/>
+          <p:nvPr/>
+        </p:nvSpPr>
+        <p:spPr>
+          <a:xfrm>
+            <a:off x="9454551" y="2417801"/>
+            <a:ext cx="429431" cy="246221"/>
+          </a:xfrm>
+          <a:prstGeom prst="rect">
+            <a:avLst/>
+          </a:prstGeom>
+          <a:noFill/>
+        </p:spPr>
+        <p:txBody>
+          <a:bodyPr wrap="square" rtlCol="0">
+            <a:spAutoFit/>
+          </a:bodyPr>
+          <a:lstStyle/>
+          <a:p>
+            <a:pPr algn="ctr"/>
+            <a:r>
+              <a:rPr lang="en-US" sz="1000" dirty="0">
+                <a:latin typeface="Times New Roman" panose="02020603050405020304" pitchFamily="18" charset="0"/>
+                <a:cs typeface="Times New Roman" panose="02020603050405020304" pitchFamily="18" charset="0"/>
+              </a:rPr>
+              <a:t>***</a:t>
+            </a:r>
+          </a:p>
+        </p:txBody>
+      </p:sp>
+      <p:cxnSp>
+        <p:nvCxnSpPr>
+          <p:cNvPr id="42" name="Straight Connector 41">
+            <a:extLst>
+              <a:ext uri="{FF2B5EF4-FFF2-40B4-BE49-F238E27FC236}">
+                <a16:creationId xmlns:a16="http://schemas.microsoft.com/office/drawing/2014/main" id="{825E5A9B-A661-4A2D-BDBD-0D444490A317}"/>
+              </a:ext>
+            </a:extLst>
+          </p:cNvPr>
+          <p:cNvCxnSpPr>
+            <a:cxnSpLocks/>
+          </p:cNvCxnSpPr>
+          <p:nvPr/>
+        </p:nvCxnSpPr>
+        <p:spPr>
+          <a:xfrm>
+            <a:off x="9292668" y="2657959"/>
+            <a:ext cx="783982" cy="0"/>
+          </a:xfrm>
+          <a:prstGeom prst="line">
+            <a:avLst/>
+          </a:prstGeom>
+          <a:ln w="19050">
+            <a:solidFill>
+              <a:schemeClr val="tx1"/>
+            </a:solidFill>
+          </a:ln>
+        </p:spPr>
+        <p:style>
+          <a:lnRef idx="1">
+            <a:schemeClr val="accent1"/>
+          </a:lnRef>
+          <a:fillRef idx="0">
+            <a:schemeClr val="accent1"/>
+          </a:fillRef>
+          <a:effectRef idx="0">
+            <a:schemeClr val="accent1"/>
+          </a:effectRef>
+          <a:fontRef idx="minor">
+            <a:schemeClr val="tx1"/>
+          </a:fontRef>
+        </p:style>
+      </p:cxnSp>
+      <p:sp>
+        <p:nvSpPr>
+          <p:cNvPr id="43" name="TextBox 42">
+            <a:extLst>
+              <a:ext uri="{FF2B5EF4-FFF2-40B4-BE49-F238E27FC236}">
+                <a16:creationId xmlns:a16="http://schemas.microsoft.com/office/drawing/2014/main" id="{BAD732C9-4FF4-40C4-A3A2-915EFD60F4C6}"/>
+              </a:ext>
+            </a:extLst>
+          </p:cNvPr>
+          <p:cNvSpPr txBox="1"/>
+          <p:nvPr/>
+        </p:nvSpPr>
+        <p:spPr>
+          <a:xfrm>
+            <a:off x="9268449" y="3305889"/>
+            <a:ext cx="429431" cy="246221"/>
+          </a:xfrm>
+          <a:prstGeom prst="rect">
+            <a:avLst/>
+          </a:prstGeom>
+          <a:noFill/>
+        </p:spPr>
+        <p:txBody>
+          <a:bodyPr wrap="square" rtlCol="0">
+            <a:spAutoFit/>
+          </a:bodyPr>
+          <a:lstStyle/>
+          <a:p>
+            <a:pPr algn="ctr"/>
+            <a:r>
+              <a:rPr lang="en-US" sz="1000" dirty="0">
+                <a:latin typeface="Times New Roman" panose="02020603050405020304" pitchFamily="18" charset="0"/>
+                <a:cs typeface="Times New Roman" panose="02020603050405020304" pitchFamily="18" charset="0"/>
+              </a:rPr>
+              <a:t>***</a:t>
+            </a:r>
+          </a:p>
+        </p:txBody>
+      </p:sp>
+      <p:cxnSp>
+        <p:nvCxnSpPr>
+          <p:cNvPr id="46" name="Straight Connector 45">
+            <a:extLst>
+              <a:ext uri="{FF2B5EF4-FFF2-40B4-BE49-F238E27FC236}">
+                <a16:creationId xmlns:a16="http://schemas.microsoft.com/office/drawing/2014/main" id="{55884C9A-E556-4E67-B1F8-B6F27B27AE04}"/>
+              </a:ext>
+            </a:extLst>
+          </p:cNvPr>
+          <p:cNvCxnSpPr>
+            <a:cxnSpLocks/>
+          </p:cNvCxnSpPr>
+          <p:nvPr/>
+        </p:nvCxnSpPr>
+        <p:spPr>
+          <a:xfrm>
+            <a:off x="7851581" y="2657959"/>
+            <a:ext cx="761990" cy="0"/>
+          </a:xfrm>
+          <a:prstGeom prst="line">
+            <a:avLst/>
+          </a:prstGeom>
+          <a:ln w="19050">
+            <a:solidFill>
+              <a:schemeClr val="tx1"/>
+            </a:solidFill>
+          </a:ln>
+        </p:spPr>
+        <p:style>
+          <a:lnRef idx="1">
+            <a:schemeClr val="accent1"/>
+          </a:lnRef>
+          <a:fillRef idx="0">
+            <a:schemeClr val="accent1"/>
+          </a:fillRef>
+          <a:effectRef idx="0">
+            <a:schemeClr val="accent1"/>
+          </a:effectRef>
+          <a:fontRef idx="minor">
+            <a:schemeClr val="tx1"/>
+          </a:fontRef>
+        </p:style>
+      </p:cxnSp>
+      <p:sp>
+        <p:nvSpPr>
+          <p:cNvPr id="47" name="TextBox 46">
+            <a:extLst>
+              <a:ext uri="{FF2B5EF4-FFF2-40B4-BE49-F238E27FC236}">
+                <a16:creationId xmlns:a16="http://schemas.microsoft.com/office/drawing/2014/main" id="{571358FF-869E-4BD8-9365-C908CB2A1B58}"/>
+              </a:ext>
+            </a:extLst>
+          </p:cNvPr>
+          <p:cNvSpPr txBox="1"/>
+          <p:nvPr/>
+        </p:nvSpPr>
+        <p:spPr>
+          <a:xfrm>
+            <a:off x="8011307" y="2410279"/>
+            <a:ext cx="429431" cy="246221"/>
+          </a:xfrm>
+          <a:prstGeom prst="rect">
+            <a:avLst/>
+          </a:prstGeom>
+          <a:noFill/>
+        </p:spPr>
+        <p:txBody>
+          <a:bodyPr wrap="square" rtlCol="0">
+            <a:spAutoFit/>
+          </a:bodyPr>
+          <a:lstStyle/>
+          <a:p>
+            <a:pPr algn="ctr"/>
+            <a:r>
+              <a:rPr lang="en-US" sz="1000" dirty="0">
+                <a:latin typeface="Times New Roman" panose="02020603050405020304" pitchFamily="18" charset="0"/>
+                <a:cs typeface="Times New Roman" panose="02020603050405020304" pitchFamily="18" charset="0"/>
+              </a:rPr>
+              <a:t>***</a:t>
+            </a:r>
+          </a:p>
+        </p:txBody>
+      </p:sp>
+      <p:sp>
+        <p:nvSpPr>
+          <p:cNvPr id="49" name="TextBox 48">
+            <a:extLst>
+              <a:ext uri="{FF2B5EF4-FFF2-40B4-BE49-F238E27FC236}">
+                <a16:creationId xmlns:a16="http://schemas.microsoft.com/office/drawing/2014/main" id="{11ED2B12-BE38-48FB-9198-12420CCB0EED}"/>
+              </a:ext>
+            </a:extLst>
+          </p:cNvPr>
+          <p:cNvSpPr txBox="1"/>
+          <p:nvPr/>
+        </p:nvSpPr>
+        <p:spPr>
+          <a:xfrm>
+            <a:off x="2182033" y="2196293"/>
+            <a:ext cx="1125629" cy="307777"/>
+          </a:xfrm>
+          <a:prstGeom prst="rect">
+            <a:avLst/>
+          </a:prstGeom>
+          <a:solidFill>
+            <a:schemeClr val="bg1"/>
+          </a:solidFill>
+        </p:spPr>
+        <p:txBody>
+          <a:bodyPr wrap="none" rtlCol="0">
+            <a:spAutoFit/>
+          </a:bodyPr>
+          <a:lstStyle/>
+          <a:p>
+            <a:pPr algn="ctr"/>
+            <a:r>
+              <a:rPr lang="en-US" sz="1400" dirty="0">
+                <a:latin typeface="Times New Roman" panose="02020603050405020304" pitchFamily="18" charset="0"/>
+                <a:cs typeface="Times New Roman" panose="02020603050405020304" pitchFamily="18" charset="0"/>
+              </a:rPr>
+              <a:t>Spanish (ES)</a:t>
+            </a:r>
+          </a:p>
+        </p:txBody>
+      </p:sp>
+      <p:sp>
+        <p:nvSpPr>
+          <p:cNvPr id="52" name="TextBox 51">
+            <a:extLst>
+              <a:ext uri="{FF2B5EF4-FFF2-40B4-BE49-F238E27FC236}">
+                <a16:creationId xmlns:a16="http://schemas.microsoft.com/office/drawing/2014/main" id="{5A635ED0-5D4C-495C-BEA6-7B41BD819BB0}"/>
+              </a:ext>
+            </a:extLst>
+          </p:cNvPr>
+          <p:cNvSpPr txBox="1"/>
+          <p:nvPr/>
+        </p:nvSpPr>
+        <p:spPr>
+          <a:xfrm>
+            <a:off x="5287899" y="2196293"/>
+            <a:ext cx="1135247" cy="307777"/>
+          </a:xfrm>
+          <a:prstGeom prst="rect">
+            <a:avLst/>
+          </a:prstGeom>
+          <a:solidFill>
+            <a:schemeClr val="bg1"/>
+          </a:solidFill>
+        </p:spPr>
+        <p:txBody>
+          <a:bodyPr wrap="none" rtlCol="0">
+            <a:spAutoFit/>
+          </a:bodyPr>
+          <a:lstStyle/>
+          <a:p>
+            <a:pPr algn="ctr"/>
+            <a:r>
+              <a:rPr lang="en-US" sz="1400" dirty="0">
+                <a:latin typeface="Times New Roman" panose="02020603050405020304" pitchFamily="18" charset="0"/>
+                <a:cs typeface="Times New Roman" panose="02020603050405020304" pitchFamily="18" charset="0"/>
+              </a:rPr>
+              <a:t>English (EN)</a:t>
+            </a:r>
+          </a:p>
+        </p:txBody>
+      </p:sp>
+      <p:sp>
+        <p:nvSpPr>
+          <p:cNvPr id="53" name="TextBox 52">
+            <a:extLst>
+              <a:ext uri="{FF2B5EF4-FFF2-40B4-BE49-F238E27FC236}">
+                <a16:creationId xmlns:a16="http://schemas.microsoft.com/office/drawing/2014/main" id="{505C270D-9F24-40AE-9A4B-A14316CD7D2E}"/>
+              </a:ext>
+            </a:extLst>
+          </p:cNvPr>
+          <p:cNvSpPr txBox="1"/>
+          <p:nvPr/>
+        </p:nvSpPr>
+        <p:spPr>
+          <a:xfrm>
+            <a:off x="8413776" y="2194155"/>
+            <a:ext cx="1117615" cy="307777"/>
+          </a:xfrm>
+          <a:prstGeom prst="rect">
+            <a:avLst/>
+          </a:prstGeom>
+          <a:solidFill>
+            <a:schemeClr val="bg1"/>
+          </a:solidFill>
+        </p:spPr>
+        <p:txBody>
+          <a:bodyPr wrap="none" rtlCol="0">
+            <a:spAutoFit/>
+          </a:bodyPr>
+          <a:lstStyle/>
+          <a:p>
+            <a:pPr algn="ctr"/>
+            <a:r>
+              <a:rPr lang="en-US" sz="1400" dirty="0">
+                <a:latin typeface="Times New Roman" panose="02020603050405020304" pitchFamily="18" charset="0"/>
+                <a:cs typeface="Times New Roman" panose="02020603050405020304" pitchFamily="18" charset="0"/>
+              </a:rPr>
+              <a:t>Basque (EU)</a:t>
+            </a:r>
+          </a:p>
+        </p:txBody>
+      </p:sp>
+      <p:sp>
+        <p:nvSpPr>
+          <p:cNvPr id="54" name="TextBox 53">
+            <a:extLst>
+              <a:ext uri="{FF2B5EF4-FFF2-40B4-BE49-F238E27FC236}">
+                <a16:creationId xmlns:a16="http://schemas.microsoft.com/office/drawing/2014/main" id="{65410239-08B7-44D2-B9D9-39E6DE726ADF}"/>
+              </a:ext>
+            </a:extLst>
+          </p:cNvPr>
+          <p:cNvSpPr txBox="1"/>
+          <p:nvPr/>
+        </p:nvSpPr>
+        <p:spPr>
+          <a:xfrm>
+            <a:off x="7804058" y="3305888"/>
+            <a:ext cx="429431" cy="246221"/>
+          </a:xfrm>
+          <a:prstGeom prst="rect">
+            <a:avLst/>
+          </a:prstGeom>
+          <a:noFill/>
+        </p:spPr>
+        <p:txBody>
+          <a:bodyPr wrap="square" rtlCol="0">
+            <a:spAutoFit/>
+          </a:bodyPr>
+          <a:lstStyle/>
+          <a:p>
+            <a:pPr algn="ctr"/>
+            <a:r>
+              <a:rPr lang="en-US" sz="1000" dirty="0">
+                <a:latin typeface="Times New Roman" panose="02020603050405020304" pitchFamily="18" charset="0"/>
+                <a:cs typeface="Times New Roman" panose="02020603050405020304" pitchFamily="18" charset="0"/>
+              </a:rPr>
+              <a:t>***</a:t>
+            </a:r>
+          </a:p>
+        </p:txBody>
+      </p:sp>
+      <p:sp>
+        <p:nvSpPr>
+          <p:cNvPr id="55" name="TextBox 54">
+            <a:extLst>
+              <a:ext uri="{FF2B5EF4-FFF2-40B4-BE49-F238E27FC236}">
+                <a16:creationId xmlns:a16="http://schemas.microsoft.com/office/drawing/2014/main" id="{2CBEA336-F452-4B27-B7A2-17A6D5A438EE}"/>
+              </a:ext>
+            </a:extLst>
+          </p:cNvPr>
+          <p:cNvSpPr txBox="1"/>
+          <p:nvPr/>
+        </p:nvSpPr>
+        <p:spPr>
+          <a:xfrm>
+            <a:off x="8233489" y="2646564"/>
+            <a:ext cx="429431" cy="246221"/>
+          </a:xfrm>
+          <a:prstGeom prst="rect">
+            <a:avLst/>
+          </a:prstGeom>
+          <a:noFill/>
+        </p:spPr>
+        <p:txBody>
+          <a:bodyPr wrap="square" rtlCol="0">
+            <a:spAutoFit/>
+          </a:bodyPr>
+          <a:lstStyle/>
+          <a:p>
+            <a:pPr algn="ctr"/>
+            <a:r>
+              <a:rPr lang="en-US" sz="1000" dirty="0">
+                <a:latin typeface="Times New Roman" panose="02020603050405020304" pitchFamily="18" charset="0"/>
+                <a:cs typeface="Times New Roman" panose="02020603050405020304" pitchFamily="18" charset="0"/>
+              </a:rPr>
+              <a:t>***</a:t>
+            </a:r>
+          </a:p>
+        </p:txBody>
+      </p:sp>
+      <p:cxnSp>
+        <p:nvCxnSpPr>
+          <p:cNvPr id="56" name="Straight Connector 55">
+            <a:extLst>
+              <a:ext uri="{FF2B5EF4-FFF2-40B4-BE49-F238E27FC236}">
+                <a16:creationId xmlns:a16="http://schemas.microsoft.com/office/drawing/2014/main" id="{73D42AEC-CE2E-450E-B19C-0A06468DFFD2}"/>
+              </a:ext>
+            </a:extLst>
+          </p:cNvPr>
+          <p:cNvCxnSpPr>
+            <a:cxnSpLocks/>
+          </p:cNvCxnSpPr>
+          <p:nvPr/>
+        </p:nvCxnSpPr>
+        <p:spPr>
+          <a:xfrm>
+            <a:off x="8257708" y="2829363"/>
+            <a:ext cx="380995" cy="0"/>
+          </a:xfrm>
+          <a:prstGeom prst="line">
+            <a:avLst/>
+          </a:prstGeom>
+          <a:ln w="19050">
+            <a:solidFill>
+              <a:schemeClr val="tx1"/>
+            </a:solidFill>
+          </a:ln>
+        </p:spPr>
+        <p:style>
+          <a:lnRef idx="1">
+            <a:schemeClr val="accent1"/>
+          </a:lnRef>
+          <a:fillRef idx="0">
+            <a:schemeClr val="accent1"/>
+          </a:fillRef>
+          <a:effectRef idx="0">
+            <a:schemeClr val="accent1"/>
+          </a:effectRef>
+          <a:fontRef idx="minor">
+            <a:schemeClr val="tx1"/>
+          </a:fontRef>
+        </p:style>
+      </p:cxnSp>
+      <p:sp>
+        <p:nvSpPr>
+          <p:cNvPr id="59" name="TextBox 58">
+            <a:extLst>
+              <a:ext uri="{FF2B5EF4-FFF2-40B4-BE49-F238E27FC236}">
+                <a16:creationId xmlns:a16="http://schemas.microsoft.com/office/drawing/2014/main" id="{3E87625C-F3C5-4B6D-8958-F22BB6D3E179}"/>
+              </a:ext>
+            </a:extLst>
+          </p:cNvPr>
+          <p:cNvSpPr txBox="1"/>
+          <p:nvPr/>
+        </p:nvSpPr>
+        <p:spPr>
+          <a:xfrm>
+            <a:off x="9693393" y="2646565"/>
+            <a:ext cx="429431" cy="246221"/>
+          </a:xfrm>
+          <a:prstGeom prst="rect">
+            <a:avLst/>
+          </a:prstGeom>
+          <a:noFill/>
+        </p:spPr>
+        <p:txBody>
+          <a:bodyPr wrap="square" rtlCol="0">
+            <a:spAutoFit/>
+          </a:bodyPr>
+          <a:lstStyle/>
+          <a:p>
+            <a:pPr algn="ctr"/>
+            <a:r>
+              <a:rPr lang="en-US" sz="1000" dirty="0">
+                <a:latin typeface="Times New Roman" panose="02020603050405020304" pitchFamily="18" charset="0"/>
+                <a:cs typeface="Times New Roman" panose="02020603050405020304" pitchFamily="18" charset="0"/>
+              </a:rPr>
+              <a:t>***</a:t>
+            </a:r>
+          </a:p>
+        </p:txBody>
+      </p:sp>
+      <p:cxnSp>
+        <p:nvCxnSpPr>
+          <p:cNvPr id="61" name="Straight Connector 60">
+            <a:extLst>
+              <a:ext uri="{FF2B5EF4-FFF2-40B4-BE49-F238E27FC236}">
+                <a16:creationId xmlns:a16="http://schemas.microsoft.com/office/drawing/2014/main" id="{F2A9D6A6-C89B-4751-A197-9712D0D10446}"/>
+              </a:ext>
+            </a:extLst>
+          </p:cNvPr>
+          <p:cNvCxnSpPr>
+            <a:cxnSpLocks/>
+          </p:cNvCxnSpPr>
+          <p:nvPr/>
+        </p:nvCxnSpPr>
+        <p:spPr>
+          <a:xfrm>
+            <a:off x="9303664" y="3506062"/>
+            <a:ext cx="380995" cy="0"/>
+          </a:xfrm>
+          <a:prstGeom prst="line">
+            <a:avLst/>
+          </a:prstGeom>
+          <a:ln w="19050">
+            <a:solidFill>
+              <a:schemeClr val="tx1"/>
+            </a:solidFill>
+          </a:ln>
+        </p:spPr>
+        <p:style>
+          <a:lnRef idx="1">
+            <a:schemeClr val="accent1"/>
+          </a:lnRef>
+          <a:fillRef idx="0">
+            <a:schemeClr val="accent1"/>
+          </a:fillRef>
+          <a:effectRef idx="0">
+            <a:schemeClr val="accent1"/>
+          </a:effectRef>
+          <a:fontRef idx="minor">
+            <a:schemeClr val="tx1"/>
+          </a:fontRef>
+        </p:style>
+      </p:cxnSp>
+      <p:cxnSp>
+        <p:nvCxnSpPr>
+          <p:cNvPr id="62" name="Straight Connector 61">
+            <a:extLst>
+              <a:ext uri="{FF2B5EF4-FFF2-40B4-BE49-F238E27FC236}">
+                <a16:creationId xmlns:a16="http://schemas.microsoft.com/office/drawing/2014/main" id="{FDA4883E-D5A2-4F3A-A8E6-2108C75934D2}"/>
+              </a:ext>
+            </a:extLst>
+          </p:cNvPr>
+          <p:cNvCxnSpPr>
+            <a:cxnSpLocks/>
+          </p:cNvCxnSpPr>
+          <p:nvPr/>
+        </p:nvCxnSpPr>
+        <p:spPr>
+          <a:xfrm>
+            <a:off x="9723269" y="2839312"/>
+            <a:ext cx="380995" cy="0"/>
+          </a:xfrm>
+          <a:prstGeom prst="line">
+            <a:avLst/>
+          </a:prstGeom>
+          <a:ln w="19050">
+            <a:solidFill>
+              <a:schemeClr val="tx1"/>
+            </a:solidFill>
+          </a:ln>
+        </p:spPr>
+        <p:style>
+          <a:lnRef idx="1">
+            <a:schemeClr val="accent1"/>
+          </a:lnRef>
+          <a:fillRef idx="0">
+            <a:schemeClr val="accent1"/>
+          </a:fillRef>
+          <a:effectRef idx="0">
+            <a:schemeClr val="accent1"/>
+          </a:effectRef>
+          <a:fontRef idx="minor">
+            <a:schemeClr val="tx1"/>
+          </a:fontRef>
+        </p:style>
+      </p:cxnSp>
+    </p:spTree>
+    <p:extLst>
+      <p:ext uri="{BB962C8B-B14F-4D97-AF65-F5344CB8AC3E}">
+        <p14:creationId xmlns:p14="http://schemas.microsoft.com/office/powerpoint/2010/main" val="2395570493"/>
+      </p:ext>
+    </p:extLst>
+  </p:cSld>
+  <p:clrMapOvr>
+    <a:masterClrMapping/>
+  </p:clrMapOvr>
+</p:sld>
+</file>
+
+<file path=ppt/slides/slide4.xml><?xml version="1.0" encoding="utf-8"?>
+<p:sld xmlns:a="http://schemas.openxmlformats.org/drawingml/2006/main" xmlns:r="http://schemas.openxmlformats.org/officeDocument/2006/relationships" xmlns:p="http://schemas.openxmlformats.org/presentationml/2006/main">
+  <p:cSld>
+    <p:spTree>
+      <p:nvGrpSpPr>
+        <p:cNvPr id="1" name=""/>
+        <p:cNvGrpSpPr/>
+        <p:nvPr/>
+      </p:nvGrpSpPr>
+      <p:grpSpPr>
+        <a:xfrm>
+          <a:off x="0" y="0"/>
+          <a:ext cx="0" cy="0"/>
+          <a:chOff x="0" y="0"/>
+          <a:chExt cx="0" cy="0"/>
+        </a:xfrm>
+      </p:grpSpPr>
+      <p:pic>
+        <p:nvPicPr>
           <p:cNvPr id="4" name="Picture 3">
             <a:extLst>
               <a:ext uri="{FF2B5EF4-FFF2-40B4-BE49-F238E27FC236}">
@@ -7687,7 +8256,7 @@
 </p:sld>
 </file>
 
-<file path=ppt/slides/slide4.xml><?xml version="1.0" encoding="utf-8"?>
+<file path=ppt/slides/slide5.xml><?xml version="1.0" encoding="utf-8"?>
 <p:sld xmlns:a="http://schemas.openxmlformats.org/drawingml/2006/main" xmlns:r="http://schemas.openxmlformats.org/officeDocument/2006/relationships" xmlns:p="http://schemas.openxmlformats.org/presentationml/2006/main">
   <p:cSld>
     <p:spTree>
@@ -7901,7 +8470,7 @@
 </p:sld>
 </file>
 
-<file path=ppt/slides/slide5.xml><?xml version="1.0" encoding="utf-8"?>
+<file path=ppt/slides/slide6.xml><?xml version="1.0" encoding="utf-8"?>
 <p:sld xmlns:a="http://schemas.openxmlformats.org/drawingml/2006/main" xmlns:r="http://schemas.openxmlformats.org/officeDocument/2006/relationships" xmlns:p="http://schemas.openxmlformats.org/presentationml/2006/main">
   <p:cSld>
     <p:spTree>
@@ -8074,7 +8643,7 @@
 </p:sld>
 </file>
 
-<file path=ppt/slides/slide6.xml><?xml version="1.0" encoding="utf-8"?>
+<file path=ppt/slides/slide7.xml><?xml version="1.0" encoding="utf-8"?>
 <p:sld xmlns:a="http://schemas.openxmlformats.org/drawingml/2006/main" xmlns:r="http://schemas.openxmlformats.org/officeDocument/2006/relationships" xmlns:p="http://schemas.openxmlformats.org/presentationml/2006/main">
   <p:cSld>
     <p:spTree>
@@ -8288,7 +8857,7 @@
 </p:sld>
 </file>
 
-<file path=ppt/slides/slide7.xml><?xml version="1.0" encoding="utf-8"?>
+<file path=ppt/slides/slide8.xml><?xml version="1.0" encoding="utf-8"?>
 <p:sld xmlns:a="http://schemas.openxmlformats.org/drawingml/2006/main" xmlns:r="http://schemas.openxmlformats.org/officeDocument/2006/relationships" xmlns:p="http://schemas.openxmlformats.org/presentationml/2006/main">
   <p:cSld>
     <p:spTree>

</xml_diff>

<commit_message>
Changes to plots and housekeeping of script
</commit_message>
<xml_diff>
--- a/results/plots/FIGURES.pptx
+++ b/results/plots/FIGURES.pptx
@@ -6,13 +6,14 @@
   </p:sldMasterIdLst>
   <p:sldIdLst>
     <p:sldId id="260" r:id="rId2"/>
-    <p:sldId id="264" r:id="rId3"/>
-    <p:sldId id="257" r:id="rId4"/>
-    <p:sldId id="258" r:id="rId5"/>
-    <p:sldId id="262" r:id="rId6"/>
-    <p:sldId id="263" r:id="rId7"/>
-    <p:sldId id="259" r:id="rId8"/>
-    <p:sldId id="261" r:id="rId9"/>
+    <p:sldId id="257" r:id="rId3"/>
+    <p:sldId id="258" r:id="rId4"/>
+    <p:sldId id="262" r:id="rId5"/>
+    <p:sldId id="263" r:id="rId6"/>
+    <p:sldId id="259" r:id="rId7"/>
+    <p:sldId id="261" r:id="rId8"/>
+    <p:sldId id="264" r:id="rId9"/>
+    <p:sldId id="265" r:id="rId10"/>
   </p:sldIdLst>
   <p:sldSz cx="12192000" cy="6858000"/>
   <p:notesSz cx="6858000" cy="9144000"/>
@@ -266,7 +267,7 @@
           <a:p>
             <a:fld id="{03CE6F45-9AFD-49D1-9CCA-D11CA817383D}" type="datetimeFigureOut">
               <a:rPr lang="en-US" smtClean="0"/>
-              <a:t>3/8/2021</a:t>
+              <a:t>3/17/2021</a:t>
             </a:fld>
             <a:endParaRPr lang="en-US"/>
           </a:p>
@@ -464,7 +465,7 @@
           <a:p>
             <a:fld id="{03CE6F45-9AFD-49D1-9CCA-D11CA817383D}" type="datetimeFigureOut">
               <a:rPr lang="en-US" smtClean="0"/>
-              <a:t>3/8/2021</a:t>
+              <a:t>3/17/2021</a:t>
             </a:fld>
             <a:endParaRPr lang="en-US"/>
           </a:p>
@@ -672,7 +673,7 @@
           <a:p>
             <a:fld id="{03CE6F45-9AFD-49D1-9CCA-D11CA817383D}" type="datetimeFigureOut">
               <a:rPr lang="en-US" smtClean="0"/>
-              <a:t>3/8/2021</a:t>
+              <a:t>3/17/2021</a:t>
             </a:fld>
             <a:endParaRPr lang="en-US"/>
           </a:p>
@@ -870,7 +871,7 @@
           <a:p>
             <a:fld id="{03CE6F45-9AFD-49D1-9CCA-D11CA817383D}" type="datetimeFigureOut">
               <a:rPr lang="en-US" smtClean="0"/>
-              <a:t>3/8/2021</a:t>
+              <a:t>3/17/2021</a:t>
             </a:fld>
             <a:endParaRPr lang="en-US"/>
           </a:p>
@@ -1145,7 +1146,7 @@
           <a:p>
             <a:fld id="{03CE6F45-9AFD-49D1-9CCA-D11CA817383D}" type="datetimeFigureOut">
               <a:rPr lang="en-US" smtClean="0"/>
-              <a:t>3/8/2021</a:t>
+              <a:t>3/17/2021</a:t>
             </a:fld>
             <a:endParaRPr lang="en-US"/>
           </a:p>
@@ -1410,7 +1411,7 @@
           <a:p>
             <a:fld id="{03CE6F45-9AFD-49D1-9CCA-D11CA817383D}" type="datetimeFigureOut">
               <a:rPr lang="en-US" smtClean="0"/>
-              <a:t>3/8/2021</a:t>
+              <a:t>3/17/2021</a:t>
             </a:fld>
             <a:endParaRPr lang="en-US"/>
           </a:p>
@@ -1822,7 +1823,7 @@
           <a:p>
             <a:fld id="{03CE6F45-9AFD-49D1-9CCA-D11CA817383D}" type="datetimeFigureOut">
               <a:rPr lang="en-US" smtClean="0"/>
-              <a:t>3/8/2021</a:t>
+              <a:t>3/17/2021</a:t>
             </a:fld>
             <a:endParaRPr lang="en-US"/>
           </a:p>
@@ -1963,7 +1964,7 @@
           <a:p>
             <a:fld id="{03CE6F45-9AFD-49D1-9CCA-D11CA817383D}" type="datetimeFigureOut">
               <a:rPr lang="en-US" smtClean="0"/>
-              <a:t>3/8/2021</a:t>
+              <a:t>3/17/2021</a:t>
             </a:fld>
             <a:endParaRPr lang="en-US"/>
           </a:p>
@@ -2076,7 +2077,7 @@
           <a:p>
             <a:fld id="{03CE6F45-9AFD-49D1-9CCA-D11CA817383D}" type="datetimeFigureOut">
               <a:rPr lang="en-US" smtClean="0"/>
-              <a:t>3/8/2021</a:t>
+              <a:t>3/17/2021</a:t>
             </a:fld>
             <a:endParaRPr lang="en-US"/>
           </a:p>
@@ -2387,7 +2388,7 @@
           <a:p>
             <a:fld id="{03CE6F45-9AFD-49D1-9CCA-D11CA817383D}" type="datetimeFigureOut">
               <a:rPr lang="en-US" smtClean="0"/>
-              <a:t>3/8/2021</a:t>
+              <a:t>3/17/2021</a:t>
             </a:fld>
             <a:endParaRPr lang="en-US"/>
           </a:p>
@@ -2675,7 +2676,7 @@
           <a:p>
             <a:fld id="{03CE6F45-9AFD-49D1-9CCA-D11CA817383D}" type="datetimeFigureOut">
               <a:rPr lang="en-US" smtClean="0"/>
-              <a:t>3/8/2021</a:t>
+              <a:t>3/17/2021</a:t>
             </a:fld>
             <a:endParaRPr lang="en-US"/>
           </a:p>
@@ -2916,7 +2917,7 @@
           <a:p>
             <a:fld id="{03CE6F45-9AFD-49D1-9CCA-D11CA817383D}" type="datetimeFigureOut">
               <a:rPr lang="en-US" smtClean="0"/>
-              <a:t>3/8/2021</a:t>
+              <a:t>3/17/2021</a:t>
             </a:fld>
             <a:endParaRPr lang="en-US"/>
           </a:p>
@@ -3335,10 +3336,10 @@
       </p:grpSpPr>
       <p:pic>
         <p:nvPicPr>
-          <p:cNvPr id="30" name="Picture 29">
-            <a:extLst>
-              <a:ext uri="{FF2B5EF4-FFF2-40B4-BE49-F238E27FC236}">
-                <a16:creationId xmlns:a16="http://schemas.microsoft.com/office/drawing/2014/main" id="{426FB9A2-691A-48BE-9AA4-B08BCA83CDFD}"/>
+          <p:cNvPr id="5" name="Picture 4">
+            <a:extLst>
+              <a:ext uri="{FF2B5EF4-FFF2-40B4-BE49-F238E27FC236}">
+                <a16:creationId xmlns:a16="http://schemas.microsoft.com/office/drawing/2014/main" id="{E4228E03-6525-4CEE-99F3-B1894E0A3FDD}"/>
               </a:ext>
             </a:extLst>
           </p:cNvPr>
@@ -3349,6 +3350,41 @@
         </p:nvPicPr>
         <p:blipFill rotWithShape="1">
           <a:blip r:embed="rId2">
+            <a:extLst>
+              <a:ext uri="{28A0092B-C50C-407E-A947-70E740481C1C}">
+                <a14:useLocalDpi xmlns:a14="http://schemas.microsoft.com/office/drawing/2010/main" val="0"/>
+              </a:ext>
+            </a:extLst>
+          </a:blip>
+          <a:srcRect l="6033" b="5910"/>
+          <a:stretch/>
+        </p:blipFill>
+        <p:spPr>
+          <a:xfrm>
+            <a:off x="6254562" y="1073202"/>
+            <a:ext cx="2808470" cy="2812145"/>
+          </a:xfrm>
+          <a:prstGeom prst="rect">
+            <a:avLst/>
+          </a:prstGeom>
+        </p:spPr>
+      </p:pic>
+      <p:pic>
+        <p:nvPicPr>
+          <p:cNvPr id="30" name="Picture 29">
+            <a:extLst>
+              <a:ext uri="{FF2B5EF4-FFF2-40B4-BE49-F238E27FC236}">
+                <a16:creationId xmlns:a16="http://schemas.microsoft.com/office/drawing/2014/main" id="{426FB9A2-691A-48BE-9AA4-B08BCA83CDFD}"/>
+              </a:ext>
+            </a:extLst>
+          </p:cNvPr>
+          <p:cNvPicPr>
+            <a:picLocks noChangeAspect="1"/>
+          </p:cNvPicPr>
+          <p:nvPr/>
+        </p:nvPicPr>
+        <p:blipFill rotWithShape="1">
+          <a:blip r:embed="rId3">
             <a:extLst>
               <a:ext uri="{28A0092B-C50C-407E-A947-70E740481C1C}">
                 <a14:useLocalDpi xmlns:a14="http://schemas.microsoft.com/office/drawing/2010/main" val="0"/>
@@ -4085,7 +4121,6 @@
           <p:cNvCxnSpPr>
             <a:cxnSpLocks/>
             <a:stCxn id="8" idx="3"/>
-            <a:endCxn id="84" idx="1"/>
           </p:cNvCxnSpPr>
           <p:nvPr/>
         </p:nvCxnSpPr>
@@ -5168,7 +5203,7 @@
                 <a:latin typeface="Times New Roman" panose="02020603050405020304" pitchFamily="18" charset="0"/>
                 <a:cs typeface="Times New Roman" panose="02020603050405020304" pitchFamily="18" charset="0"/>
               </a:rPr>
-              <a:t>kitty</a:t>
+              <a:t>kids</a:t>
             </a:r>
           </a:p>
           <a:p>
@@ -5178,7 +5213,7 @@
                 <a:latin typeface="Times New Roman" panose="02020603050405020304" pitchFamily="18" charset="0"/>
                 <a:cs typeface="Times New Roman" panose="02020603050405020304" pitchFamily="18" charset="0"/>
               </a:rPr>
-              <a:t>scary</a:t>
+              <a:t>kiddy</a:t>
             </a:r>
           </a:p>
           <a:p>
@@ -5188,7 +5223,7 @@
                 <a:latin typeface="Times New Roman" panose="02020603050405020304" pitchFamily="18" charset="0"/>
                 <a:cs typeface="Times New Roman" panose="02020603050405020304" pitchFamily="18" charset="0"/>
               </a:rPr>
-              <a:t>shady</a:t>
+              <a:t>nifty</a:t>
             </a:r>
           </a:p>
           <a:p>
@@ -5198,7 +5233,7 @@
                 <a:latin typeface="Times New Roman" panose="02020603050405020304" pitchFamily="18" charset="0"/>
                 <a:cs typeface="Times New Roman" panose="02020603050405020304" pitchFamily="18" charset="0"/>
               </a:rPr>
-              <a:t>skill</a:t>
+              <a:t>thank</a:t>
             </a:r>
           </a:p>
           <a:p>
@@ -5208,7 +5243,7 @@
                 <a:latin typeface="Times New Roman" panose="02020603050405020304" pitchFamily="18" charset="0"/>
                 <a:cs typeface="Times New Roman" panose="02020603050405020304" pitchFamily="18" charset="0"/>
               </a:rPr>
-              <a:t>with</a:t>
+              <a:t>they</a:t>
             </a:r>
           </a:p>
           <a:p>
@@ -5237,8 +5272,8 @@
         </p:nvSpPr>
         <p:spPr>
           <a:xfrm>
-            <a:off x="5430493" y="2635821"/>
-            <a:ext cx="659132" cy="1384995"/>
+            <a:off x="5461047" y="2678151"/>
+            <a:ext cx="669853" cy="1384995"/>
           </a:xfrm>
           <a:prstGeom prst="rect">
             <a:avLst/>
@@ -5270,7 +5305,7 @@
                 <a:latin typeface="Times New Roman" panose="02020603050405020304" pitchFamily="18" charset="0"/>
                 <a:cs typeface="Times New Roman" panose="02020603050405020304" pitchFamily="18" charset="0"/>
               </a:rPr>
-              <a:t>estilo</a:t>
+              <a:t>libra</a:t>
             </a:r>
           </a:p>
           <a:p>
@@ -5280,7 +5315,7 @@
                 <a:latin typeface="Times New Roman" panose="02020603050405020304" pitchFamily="18" charset="0"/>
                 <a:cs typeface="Times New Roman" panose="02020603050405020304" pitchFamily="18" charset="0"/>
               </a:rPr>
-              <a:t>essay</a:t>
+              <a:t>liana</a:t>
             </a:r>
           </a:p>
           <a:p>
@@ -5290,7 +5325,7 @@
                 <a:latin typeface="Times New Roman" panose="02020603050405020304" pitchFamily="18" charset="0"/>
                 <a:cs typeface="Times New Roman" panose="02020603050405020304" pitchFamily="18" charset="0"/>
               </a:rPr>
-              <a:t>estate</a:t>
+              <a:t>laguna</a:t>
             </a:r>
           </a:p>
           <a:p>
@@ -5300,7 +5335,7 @@
                 <a:latin typeface="Times New Roman" panose="02020603050405020304" pitchFamily="18" charset="0"/>
                 <a:cs typeface="Times New Roman" panose="02020603050405020304" pitchFamily="18" charset="0"/>
               </a:rPr>
-              <a:t>estado</a:t>
+              <a:t>lagoon</a:t>
             </a:r>
           </a:p>
           <a:p>
@@ -5310,7 +5345,7 @@
                 <a:latin typeface="Times New Roman" panose="02020603050405020304" pitchFamily="18" charset="0"/>
                 <a:cs typeface="Times New Roman" panose="02020603050405020304" pitchFamily="18" charset="0"/>
               </a:rPr>
-              <a:t>estar</a:t>
+              <a:t>legion</a:t>
             </a:r>
           </a:p>
           <a:p>
@@ -5325,41 +5360,6 @@
           </a:p>
         </p:txBody>
       </p:sp>
-      <p:pic>
-        <p:nvPicPr>
-          <p:cNvPr id="84" name="Picture 83">
-            <a:extLst>
-              <a:ext uri="{FF2B5EF4-FFF2-40B4-BE49-F238E27FC236}">
-                <a16:creationId xmlns:a16="http://schemas.microsoft.com/office/drawing/2014/main" id="{D93A9247-4123-455D-947A-32F330FE176E}"/>
-              </a:ext>
-            </a:extLst>
-          </p:cNvPr>
-          <p:cNvPicPr>
-            <a:picLocks noChangeAspect="1"/>
-          </p:cNvPicPr>
-          <p:nvPr/>
-        </p:nvPicPr>
-        <p:blipFill rotWithShape="1">
-          <a:blip r:embed="rId3">
-            <a:extLst>
-              <a:ext uri="{28A0092B-C50C-407E-A947-70E740481C1C}">
-                <a14:useLocalDpi xmlns:a14="http://schemas.microsoft.com/office/drawing/2010/main" val="0"/>
-              </a:ext>
-            </a:extLst>
-          </a:blip>
-          <a:srcRect l="6425" b="5760"/>
-          <a:stretch/>
-        </p:blipFill>
-        <p:spPr>
-          <a:xfrm>
-            <a:off x="6179403" y="1053180"/>
-            <a:ext cx="2922776" cy="2943511"/>
-          </a:xfrm>
-          <a:prstGeom prst="rect">
-            <a:avLst/>
-          </a:prstGeom>
-        </p:spPr>
-      </p:pic>
       <p:sp>
         <p:nvSpPr>
           <p:cNvPr id="42" name="TextBox 41">
@@ -5374,7 +5374,7 @@
         </p:nvSpPr>
         <p:spPr>
           <a:xfrm>
-            <a:off x="5876394" y="744639"/>
+            <a:off x="5948525" y="744639"/>
             <a:ext cx="3030936" cy="338554"/>
           </a:xfrm>
           <a:prstGeom prst="rect">
@@ -5413,7 +5413,7 @@
         </p:nvSpPr>
         <p:spPr>
           <a:xfrm>
-            <a:off x="7815263" y="1731963"/>
+            <a:off x="7502000" y="1731963"/>
             <a:ext cx="320675" cy="327025"/>
           </a:xfrm>
           <a:prstGeom prst="rect">
@@ -5451,58 +5451,6 @@
           </a:p>
         </p:txBody>
       </p:sp>
-      <p:sp>
-        <p:nvSpPr>
-          <p:cNvPr id="95" name="Rectangle 94">
-            <a:extLst>
-              <a:ext uri="{FF2B5EF4-FFF2-40B4-BE49-F238E27FC236}">
-                <a16:creationId xmlns:a16="http://schemas.microsoft.com/office/drawing/2014/main" id="{795D75ED-465D-4404-AE99-87806C056783}"/>
-              </a:ext>
-            </a:extLst>
-          </p:cNvPr>
-          <p:cNvSpPr/>
-          <p:nvPr/>
-        </p:nvSpPr>
-        <p:spPr>
-          <a:xfrm>
-            <a:off x="6559097" y="3033221"/>
-            <a:ext cx="320675" cy="327025"/>
-          </a:xfrm>
-          <a:prstGeom prst="rect">
-            <a:avLst/>
-          </a:prstGeom>
-          <a:noFill/>
-          <a:ln>
-            <a:solidFill>
-              <a:schemeClr val="tx1"/>
-            </a:solidFill>
-          </a:ln>
-        </p:spPr>
-        <p:style>
-          <a:lnRef idx="2">
-            <a:schemeClr val="accent1">
-              <a:shade val="50000"/>
-            </a:schemeClr>
-          </a:lnRef>
-          <a:fillRef idx="1">
-            <a:schemeClr val="accent1"/>
-          </a:fillRef>
-          <a:effectRef idx="0">
-            <a:schemeClr val="accent1"/>
-          </a:effectRef>
-          <a:fontRef idx="minor">
-            <a:schemeClr val="lt1"/>
-          </a:fontRef>
-        </p:style>
-        <p:txBody>
-          <a:bodyPr rtlCol="0" anchor="ctr"/>
-          <a:lstStyle/>
-          <a:p>
-            <a:pPr algn="ctr"/>
-            <a:endParaRPr lang="en-US"/>
-          </a:p>
-        </p:txBody>
-      </p:sp>
       <p:cxnSp>
         <p:nvCxnSpPr>
           <p:cNvPr id="97" name="Straight Connector 96">
@@ -5519,8 +5467,8 @@
         </p:nvCxnSpPr>
         <p:spPr>
           <a:xfrm flipV="1">
-            <a:off x="8135938" y="1021127"/>
-            <a:ext cx="1110174" cy="714808"/>
+            <a:off x="7822675" y="1021127"/>
+            <a:ext cx="1423437" cy="710836"/>
           </a:xfrm>
           <a:prstGeom prst="line">
             <a:avLst/>
@@ -5562,8 +5510,8 @@
         </p:nvCxnSpPr>
         <p:spPr>
           <a:xfrm>
-            <a:off x="7815263" y="2058988"/>
-            <a:ext cx="1430849" cy="347133"/>
+            <a:off x="7502000" y="2058988"/>
+            <a:ext cx="1744112" cy="347133"/>
           </a:xfrm>
           <a:prstGeom prst="line">
             <a:avLst/>
@@ -5600,13 +5548,14 @@
           </p:cNvPr>
           <p:cNvCxnSpPr>
             <a:cxnSpLocks/>
+            <a:endCxn id="31" idx="0"/>
           </p:cNvCxnSpPr>
           <p:nvPr/>
         </p:nvCxnSpPr>
         <p:spPr>
           <a:xfrm>
-            <a:off x="6086438" y="2635821"/>
-            <a:ext cx="481930" cy="394816"/>
+            <a:off x="6130900" y="2678151"/>
+            <a:ext cx="631765" cy="58332"/>
           </a:xfrm>
           <a:prstGeom prst="line">
             <a:avLst/>
@@ -5632,46 +5581,6 @@
           </a:fontRef>
         </p:style>
       </p:cxnSp>
-      <p:pic>
-        <p:nvPicPr>
-          <p:cNvPr id="116" name="Picture 115">
-            <a:extLst>
-              <a:ext uri="{FF2B5EF4-FFF2-40B4-BE49-F238E27FC236}">
-                <a16:creationId xmlns:a16="http://schemas.microsoft.com/office/drawing/2014/main" id="{80C3B44A-2E0C-410C-8997-950BE468971D}"/>
-              </a:ext>
-            </a:extLst>
-          </p:cNvPr>
-          <p:cNvPicPr>
-            <a:picLocks noChangeAspect="1"/>
-          </p:cNvPicPr>
-          <p:nvPr/>
-        </p:nvPicPr>
-        <p:blipFill rotWithShape="1">
-          <a:blip r:embed="rId4">
-            <a:extLst>
-              <a:ext uri="{28A0092B-C50C-407E-A947-70E740481C1C}">
-                <a14:useLocalDpi xmlns:a14="http://schemas.microsoft.com/office/drawing/2010/main" val="0"/>
-              </a:ext>
-            </a:extLst>
-          </a:blip>
-          <a:srcRect l="10256" b="14888"/>
-          <a:stretch/>
-        </p:blipFill>
-        <p:spPr>
-          <a:xfrm>
-            <a:off x="5878267" y="4393753"/>
-            <a:ext cx="3320869" cy="2088984"/>
-          </a:xfrm>
-          <a:prstGeom prst="rect">
-            <a:avLst/>
-          </a:prstGeom>
-          <a:ln w="12700">
-            <a:solidFill>
-              <a:schemeClr val="tx1"/>
-            </a:solidFill>
-          </a:ln>
-        </p:spPr>
-      </p:pic>
       <p:sp>
         <p:nvSpPr>
           <p:cNvPr id="117" name="Rectangle 116">
@@ -5686,8 +5595,8 @@
         </p:nvSpPr>
         <p:spPr>
           <a:xfrm>
-            <a:off x="7478661" y="2577011"/>
-            <a:ext cx="120083" cy="159472"/>
+            <a:off x="6986168" y="2599267"/>
+            <a:ext cx="96198" cy="136868"/>
           </a:xfrm>
           <a:prstGeom prst="rect">
             <a:avLst/>
@@ -5726,30 +5635,30 @@
       </p:sp>
       <p:cxnSp>
         <p:nvCxnSpPr>
-          <p:cNvPr id="118" name="Straight Connector 117">
-            <a:extLst>
-              <a:ext uri="{FF2B5EF4-FFF2-40B4-BE49-F238E27FC236}">
-                <a16:creationId xmlns:a16="http://schemas.microsoft.com/office/drawing/2014/main" id="{A4EDB6C4-B4D4-4A63-95E9-E8327F0EFDC5}"/>
+          <p:cNvPr id="135" name="Straight Connector 134">
+            <a:extLst>
+              <a:ext uri="{FF2B5EF4-FFF2-40B4-BE49-F238E27FC236}">
+                <a16:creationId xmlns:a16="http://schemas.microsoft.com/office/drawing/2014/main" id="{A4E5E0A3-07A5-4ECB-81AD-08D8A85022AE}"/>
               </a:ext>
             </a:extLst>
           </p:cNvPr>
           <p:cNvCxnSpPr>
             <a:cxnSpLocks/>
-            <a:stCxn id="117" idx="2"/>
+            <a:endCxn id="31" idx="5"/>
           </p:cNvCxnSpPr>
           <p:nvPr/>
         </p:nvCxnSpPr>
         <p:spPr>
-          <a:xfrm flipH="1">
-            <a:off x="5876394" y="2736483"/>
-            <a:ext cx="1662309" cy="1654686"/>
+          <a:xfrm flipV="1">
+            <a:off x="6130900" y="2921078"/>
+            <a:ext cx="710281" cy="1142068"/>
           </a:xfrm>
           <a:prstGeom prst="line">
             <a:avLst/>
           </a:prstGeom>
           <a:ln w="12700">
             <a:solidFill>
-              <a:srgbClr val="C00000"/>
+              <a:schemeClr val="tx1"/>
             </a:solidFill>
           </a:ln>
         </p:spPr>
@@ -5768,12 +5677,149 @@
           </a:fontRef>
         </p:style>
       </p:cxnSp>
+      <p:sp>
+        <p:nvSpPr>
+          <p:cNvPr id="3" name="TextBox 2">
+            <a:extLst>
+              <a:ext uri="{FF2B5EF4-FFF2-40B4-BE49-F238E27FC236}">
+                <a16:creationId xmlns:a16="http://schemas.microsoft.com/office/drawing/2014/main" id="{597FB1EC-55A5-4ABE-8D52-7B21D76F55C7}"/>
+              </a:ext>
+            </a:extLst>
+          </p:cNvPr>
+          <p:cNvSpPr txBox="1"/>
+          <p:nvPr/>
+        </p:nvSpPr>
+        <p:spPr>
+          <a:xfrm rot="16200000">
+            <a:off x="4598780" y="5147263"/>
+            <a:ext cx="1285929" cy="307777"/>
+          </a:xfrm>
+          <a:prstGeom prst="rect">
+            <a:avLst/>
+          </a:prstGeom>
+          <a:noFill/>
+        </p:spPr>
+        <p:txBody>
+          <a:bodyPr wrap="none" rtlCol="0">
+            <a:spAutoFit/>
+          </a:bodyPr>
+          <a:lstStyle/>
+          <a:p>
+            <a:r>
+              <a:rPr lang="en-US" sz="1400" i="1" dirty="0">
+                <a:latin typeface="Times New Roman" panose="02020603050405020304" pitchFamily="18" charset="0"/>
+                <a:cs typeface="Times New Roman" panose="02020603050405020304" pitchFamily="18" charset="0"/>
+              </a:rPr>
+              <a:t>P</a:t>
+            </a:r>
+            <a:r>
+              <a:rPr lang="en-US" sz="1400" dirty="0">
+                <a:latin typeface="Times New Roman" panose="02020603050405020304" pitchFamily="18" charset="0"/>
+                <a:cs typeface="Times New Roman" panose="02020603050405020304" pitchFamily="18" charset="0"/>
+              </a:rPr>
+              <a:t>(char|context)</a:t>
+            </a:r>
+          </a:p>
+        </p:txBody>
+      </p:sp>
+      <p:sp>
+        <p:nvSpPr>
+          <p:cNvPr id="31" name="Oval 30">
+            <a:extLst>
+              <a:ext uri="{FF2B5EF4-FFF2-40B4-BE49-F238E27FC236}">
+                <a16:creationId xmlns:a16="http://schemas.microsoft.com/office/drawing/2014/main" id="{869C115E-C482-4CB4-8EF2-E04BDAE9404F}"/>
+              </a:ext>
+            </a:extLst>
+          </p:cNvPr>
+          <p:cNvSpPr/>
+          <p:nvPr/>
+        </p:nvSpPr>
+        <p:spPr>
+          <a:xfrm>
+            <a:off x="6651625" y="2736483"/>
+            <a:ext cx="222079" cy="216267"/>
+          </a:xfrm>
+          <a:prstGeom prst="ellipse">
+            <a:avLst/>
+          </a:prstGeom>
+          <a:noFill/>
+          <a:ln w="12700">
+            <a:solidFill>
+              <a:schemeClr val="tx1"/>
+            </a:solidFill>
+          </a:ln>
+        </p:spPr>
+        <p:style>
+          <a:lnRef idx="2">
+            <a:schemeClr val="accent1">
+              <a:shade val="50000"/>
+            </a:schemeClr>
+          </a:lnRef>
+          <a:fillRef idx="1">
+            <a:schemeClr val="accent1"/>
+          </a:fillRef>
+          <a:effectRef idx="0">
+            <a:schemeClr val="accent1"/>
+          </a:effectRef>
+          <a:fontRef idx="minor">
+            <a:schemeClr val="lt1"/>
+          </a:fontRef>
+        </p:style>
+        <p:txBody>
+          <a:bodyPr rtlCol="0" anchor="ctr"/>
+          <a:lstStyle/>
+          <a:p>
+            <a:pPr algn="ctr"/>
+            <a:endParaRPr lang="en-US"/>
+          </a:p>
+        </p:txBody>
+      </p:sp>
+      <p:pic>
+        <p:nvPicPr>
+          <p:cNvPr id="55" name="Picture 54">
+            <a:extLst>
+              <a:ext uri="{FF2B5EF4-FFF2-40B4-BE49-F238E27FC236}">
+                <a16:creationId xmlns:a16="http://schemas.microsoft.com/office/drawing/2014/main" id="{FB60B88C-4C3D-4E5A-B462-6C4FB81C74A0}"/>
+              </a:ext>
+            </a:extLst>
+          </p:cNvPr>
+          <p:cNvPicPr>
+            <a:picLocks noChangeAspect="1"/>
+          </p:cNvPicPr>
+          <p:nvPr/>
+        </p:nvPicPr>
+        <p:blipFill rotWithShape="1">
+          <a:blip r:embed="rId4">
+            <a:extLst>
+              <a:ext uri="{28A0092B-C50C-407E-A947-70E740481C1C}">
+                <a14:useLocalDpi xmlns:a14="http://schemas.microsoft.com/office/drawing/2010/main" val="0"/>
+              </a:ext>
+            </a:extLst>
+          </a:blip>
+          <a:srcRect l="10344" b="14904"/>
+          <a:stretch/>
+        </p:blipFill>
+        <p:spPr>
+          <a:xfrm>
+            <a:off x="5890682" y="4360004"/>
+            <a:ext cx="3146622" cy="1976956"/>
+          </a:xfrm>
+          <a:prstGeom prst="rect">
+            <a:avLst/>
+          </a:prstGeom>
+          <a:ln w="12700">
+            <a:solidFill>
+              <a:schemeClr val="tx1"/>
+            </a:solidFill>
+          </a:ln>
+        </p:spPr>
+      </p:pic>
       <p:cxnSp>
         <p:nvCxnSpPr>
-          <p:cNvPr id="121" name="Straight Connector 120">
-            <a:extLst>
-              <a:ext uri="{FF2B5EF4-FFF2-40B4-BE49-F238E27FC236}">
-                <a16:creationId xmlns:a16="http://schemas.microsoft.com/office/drawing/2014/main" id="{D169C472-F365-4AEC-9C81-B22F78269BF8}"/>
+          <p:cNvPr id="58" name="Straight Arrow Connector 57">
+            <a:extLst>
+              <a:ext uri="{FF2B5EF4-FFF2-40B4-BE49-F238E27FC236}">
+                <a16:creationId xmlns:a16="http://schemas.microsoft.com/office/drawing/2014/main" id="{C5E031D3-BA06-4E4C-9E23-8FD470874BE5}"/>
               </a:ext>
             </a:extLst>
           </p:cNvPr>
@@ -5785,16 +5831,17 @@
         </p:nvCxnSpPr>
         <p:spPr>
           <a:xfrm>
-            <a:off x="7538703" y="2736483"/>
-            <a:ext cx="1660433" cy="1654686"/>
-          </a:xfrm>
-          <a:prstGeom prst="line">
+            <a:off x="7034267" y="2736135"/>
+            <a:ext cx="0" cy="1623869"/>
+          </a:xfrm>
+          <a:prstGeom prst="straightConnector1">
             <a:avLst/>
           </a:prstGeom>
           <a:ln w="12700">
             <a:solidFill>
               <a:srgbClr val="C00000"/>
             </a:solidFill>
+            <a:tailEnd type="triangle"/>
           </a:ln>
         </p:spPr>
         <p:style>
@@ -5812,94 +5859,6 @@
           </a:fontRef>
         </p:style>
       </p:cxnSp>
-      <p:cxnSp>
-        <p:nvCxnSpPr>
-          <p:cNvPr id="135" name="Straight Connector 134">
-            <a:extLst>
-              <a:ext uri="{FF2B5EF4-FFF2-40B4-BE49-F238E27FC236}">
-                <a16:creationId xmlns:a16="http://schemas.microsoft.com/office/drawing/2014/main" id="{A4E5E0A3-07A5-4ECB-81AD-08D8A85022AE}"/>
-              </a:ext>
-            </a:extLst>
-          </p:cNvPr>
-          <p:cNvCxnSpPr>
-            <a:cxnSpLocks/>
-          </p:cNvCxnSpPr>
-          <p:nvPr/>
-        </p:nvCxnSpPr>
-        <p:spPr>
-          <a:xfrm flipV="1">
-            <a:off x="6086438" y="3360246"/>
-            <a:ext cx="787266" cy="663154"/>
-          </a:xfrm>
-          <a:prstGeom prst="line">
-            <a:avLst/>
-          </a:prstGeom>
-          <a:ln w="12700">
-            <a:solidFill>
-              <a:schemeClr val="tx1"/>
-            </a:solidFill>
-          </a:ln>
-        </p:spPr>
-        <p:style>
-          <a:lnRef idx="1">
-            <a:schemeClr val="accent1"/>
-          </a:lnRef>
-          <a:fillRef idx="0">
-            <a:schemeClr val="accent1"/>
-          </a:fillRef>
-          <a:effectRef idx="0">
-            <a:schemeClr val="accent1"/>
-          </a:effectRef>
-          <a:fontRef idx="minor">
-            <a:schemeClr val="tx1"/>
-          </a:fontRef>
-        </p:style>
-      </p:cxnSp>
-      <p:sp>
-        <p:nvSpPr>
-          <p:cNvPr id="3" name="TextBox 2">
-            <a:extLst>
-              <a:ext uri="{FF2B5EF4-FFF2-40B4-BE49-F238E27FC236}">
-                <a16:creationId xmlns:a16="http://schemas.microsoft.com/office/drawing/2014/main" id="{597FB1EC-55A5-4ABE-8D52-7B21D76F55C7}"/>
-              </a:ext>
-            </a:extLst>
-          </p:cNvPr>
-          <p:cNvSpPr txBox="1"/>
-          <p:nvPr/>
-        </p:nvSpPr>
-        <p:spPr>
-          <a:xfrm rot="16200000">
-            <a:off x="4598780" y="5147263"/>
-            <a:ext cx="1285929" cy="307777"/>
-          </a:xfrm>
-          <a:prstGeom prst="rect">
-            <a:avLst/>
-          </a:prstGeom>
-          <a:noFill/>
-        </p:spPr>
-        <p:txBody>
-          <a:bodyPr wrap="none" rtlCol="0">
-            <a:spAutoFit/>
-          </a:bodyPr>
-          <a:lstStyle/>
-          <a:p>
-            <a:r>
-              <a:rPr lang="en-US" sz="1400" i="1" dirty="0">
-                <a:latin typeface="Times New Roman" panose="02020603050405020304" pitchFamily="18" charset="0"/>
-                <a:cs typeface="Times New Roman" panose="02020603050405020304" pitchFamily="18" charset="0"/>
-              </a:rPr>
-              <a:t>P</a:t>
-            </a:r>
-            <a:r>
-              <a:rPr lang="en-US" sz="1400" dirty="0">
-                <a:latin typeface="Times New Roman" panose="02020603050405020304" pitchFamily="18" charset="0"/>
-                <a:cs typeface="Times New Roman" panose="02020603050405020304" pitchFamily="18" charset="0"/>
-              </a:rPr>
-              <a:t>(char|context)</a:t>
-            </a:r>
-          </a:p>
-        </p:txBody>
-      </p:sp>
     </p:spTree>
     <p:extLst>
       <p:ext uri="{BB962C8B-B14F-4D97-AF65-F5344CB8AC3E}">
@@ -5932,529 +5891,6 @@
       </p:grpSpPr>
       <p:pic>
         <p:nvPicPr>
-          <p:cNvPr id="41" name="Picture 40">
-            <a:extLst>
-              <a:ext uri="{FF2B5EF4-FFF2-40B4-BE49-F238E27FC236}">
-                <a16:creationId xmlns:a16="http://schemas.microsoft.com/office/drawing/2014/main" id="{93630B06-365F-47A1-A88E-1D1C8E5DD935}"/>
-              </a:ext>
-            </a:extLst>
-          </p:cNvPr>
-          <p:cNvPicPr>
-            <a:picLocks noChangeAspect="1"/>
-          </p:cNvPicPr>
-          <p:nvPr/>
-        </p:nvPicPr>
-        <p:blipFill rotWithShape="1">
-          <a:blip r:embed="rId2">
-            <a:extLst>
-              <a:ext uri="{28A0092B-C50C-407E-A947-70E740481C1C}">
-                <a14:useLocalDpi xmlns:a14="http://schemas.microsoft.com/office/drawing/2010/main" val="0"/>
-              </a:ext>
-            </a:extLst>
-          </a:blip>
-          <a:srcRect t="8002" b="6547"/>
-          <a:stretch/>
-        </p:blipFill>
-        <p:spPr>
-          <a:xfrm>
-            <a:off x="637285" y="4519528"/>
-            <a:ext cx="10651063" cy="2251655"/>
-          </a:xfrm>
-          <a:prstGeom prst="rect">
-            <a:avLst/>
-          </a:prstGeom>
-        </p:spPr>
-      </p:pic>
-      <p:sp>
-        <p:nvSpPr>
-          <p:cNvPr id="2" name="Title 1">
-            <a:extLst>
-              <a:ext uri="{FF2B5EF4-FFF2-40B4-BE49-F238E27FC236}">
-                <a16:creationId xmlns:a16="http://schemas.microsoft.com/office/drawing/2014/main" id="{B756BABF-320A-4671-AFEF-EE04F74D113A}"/>
-              </a:ext>
-            </a:extLst>
-          </p:cNvPr>
-          <p:cNvSpPr>
-            <a:spLocks noGrp="1"/>
-          </p:cNvSpPr>
-          <p:nvPr>
-            <p:ph type="title"/>
-          </p:nvPr>
-        </p:nvSpPr>
-        <p:spPr>
-          <a:xfrm>
-            <a:off x="-35018" y="-377655"/>
-            <a:ext cx="10515600" cy="1325563"/>
-          </a:xfrm>
-        </p:spPr>
-        <p:txBody>
-          <a:bodyPr/>
-          <a:lstStyle/>
-          <a:p>
-            <a:r>
-              <a:rPr lang="en-US" dirty="0"/>
-              <a:t>Figure 2</a:t>
-            </a:r>
-          </a:p>
-        </p:txBody>
-      </p:sp>
-      <p:cxnSp>
-        <p:nvCxnSpPr>
-          <p:cNvPr id="17" name="Straight Connector 16">
-            <a:extLst>
-              <a:ext uri="{FF2B5EF4-FFF2-40B4-BE49-F238E27FC236}">
-                <a16:creationId xmlns:a16="http://schemas.microsoft.com/office/drawing/2014/main" id="{545DBEDF-45BF-4771-96AD-7C5F50446BA8}"/>
-              </a:ext>
-            </a:extLst>
-          </p:cNvPr>
-          <p:cNvCxnSpPr>
-            <a:cxnSpLocks/>
-          </p:cNvCxnSpPr>
-          <p:nvPr/>
-        </p:nvCxnSpPr>
-        <p:spPr>
-          <a:xfrm>
-            <a:off x="6190765" y="0"/>
-            <a:ext cx="0" cy="6847563"/>
-          </a:xfrm>
-          <a:prstGeom prst="line">
-            <a:avLst/>
-          </a:prstGeom>
-          <a:ln w="19050"/>
-        </p:spPr>
-        <p:style>
-          <a:lnRef idx="1">
-            <a:schemeClr val="dk1"/>
-          </a:lnRef>
-          <a:fillRef idx="0">
-            <a:schemeClr val="dk1"/>
-          </a:fillRef>
-          <a:effectRef idx="0">
-            <a:schemeClr val="dk1"/>
-          </a:effectRef>
-          <a:fontRef idx="minor">
-            <a:schemeClr val="tx1"/>
-          </a:fontRef>
-        </p:style>
-      </p:cxnSp>
-      <p:sp>
-        <p:nvSpPr>
-          <p:cNvPr id="21" name="TextBox 20">
-            <a:extLst>
-              <a:ext uri="{FF2B5EF4-FFF2-40B4-BE49-F238E27FC236}">
-                <a16:creationId xmlns:a16="http://schemas.microsoft.com/office/drawing/2014/main" id="{1EB42A5A-7F44-4520-890E-A17DAF6189E9}"/>
-              </a:ext>
-            </a:extLst>
-          </p:cNvPr>
-          <p:cNvSpPr txBox="1"/>
-          <p:nvPr/>
-        </p:nvSpPr>
-        <p:spPr>
-          <a:xfrm>
-            <a:off x="2841837" y="848038"/>
-            <a:ext cx="1361271" cy="307777"/>
-          </a:xfrm>
-          <a:prstGeom prst="rect">
-            <a:avLst/>
-          </a:prstGeom>
-          <a:solidFill>
-            <a:schemeClr val="bg1"/>
-          </a:solidFill>
-        </p:spPr>
-        <p:txBody>
-          <a:bodyPr wrap="none" rtlCol="0">
-            <a:spAutoFit/>
-          </a:bodyPr>
-          <a:lstStyle/>
-          <a:p>
-            <a:pPr algn="ctr"/>
-            <a:r>
-              <a:rPr lang="en-US" sz="1400" dirty="0">
-                <a:latin typeface="Times New Roman" panose="02020603050405020304" pitchFamily="18" charset="0"/>
-                <a:cs typeface="Times New Roman" panose="02020603050405020304" pitchFamily="18" charset="0"/>
-              </a:rPr>
-              <a:t>Spanish-English</a:t>
-            </a:r>
-          </a:p>
-        </p:txBody>
-      </p:sp>
-      <p:sp>
-        <p:nvSpPr>
-          <p:cNvPr id="22" name="TextBox 21">
-            <a:extLst>
-              <a:ext uri="{FF2B5EF4-FFF2-40B4-BE49-F238E27FC236}">
-                <a16:creationId xmlns:a16="http://schemas.microsoft.com/office/drawing/2014/main" id="{59725D22-6FDC-4F19-9480-80FB1FBFE810}"/>
-              </a:ext>
-            </a:extLst>
-          </p:cNvPr>
-          <p:cNvSpPr txBox="1"/>
-          <p:nvPr/>
-        </p:nvSpPr>
-        <p:spPr>
-          <a:xfrm>
-            <a:off x="8076580" y="850693"/>
-            <a:ext cx="1343638" cy="307777"/>
-          </a:xfrm>
-          <a:prstGeom prst="rect">
-            <a:avLst/>
-          </a:prstGeom>
-          <a:solidFill>
-            <a:schemeClr val="bg1"/>
-          </a:solidFill>
-        </p:spPr>
-        <p:txBody>
-          <a:bodyPr wrap="none" rtlCol="0">
-            <a:spAutoFit/>
-          </a:bodyPr>
-          <a:lstStyle/>
-          <a:p>
-            <a:pPr algn="ctr"/>
-            <a:r>
-              <a:rPr lang="en-US" sz="1400" dirty="0">
-                <a:latin typeface="Times New Roman" panose="02020603050405020304" pitchFamily="18" charset="0"/>
-                <a:cs typeface="Times New Roman" panose="02020603050405020304" pitchFamily="18" charset="0"/>
-              </a:rPr>
-              <a:t>Spanish-Basque</a:t>
-            </a:r>
-          </a:p>
-        </p:txBody>
-      </p:sp>
-      <p:sp>
-        <p:nvSpPr>
-          <p:cNvPr id="23" name="TextBox 22">
-            <a:extLst>
-              <a:ext uri="{FF2B5EF4-FFF2-40B4-BE49-F238E27FC236}">
-                <a16:creationId xmlns:a16="http://schemas.microsoft.com/office/drawing/2014/main" id="{0F40DD5C-472C-4D0E-AAF0-C8CFFF65A812}"/>
-              </a:ext>
-            </a:extLst>
-          </p:cNvPr>
-          <p:cNvSpPr txBox="1"/>
-          <p:nvPr/>
-        </p:nvSpPr>
-        <p:spPr>
-          <a:xfrm>
-            <a:off x="1933242" y="1280732"/>
-            <a:ext cx="691216" cy="307777"/>
-          </a:xfrm>
-          <a:prstGeom prst="rect">
-            <a:avLst/>
-          </a:prstGeom>
-          <a:solidFill>
-            <a:schemeClr val="bg1"/>
-          </a:solidFill>
-        </p:spPr>
-        <p:txBody>
-          <a:bodyPr wrap="none" rtlCol="0">
-            <a:spAutoFit/>
-          </a:bodyPr>
-          <a:lstStyle/>
-          <a:p>
-            <a:pPr algn="ctr"/>
-            <a:r>
-              <a:rPr lang="en-US" sz="1400" dirty="0">
-                <a:latin typeface="Times New Roman" panose="02020603050405020304" pitchFamily="18" charset="0"/>
-                <a:cs typeface="Times New Roman" panose="02020603050405020304" pitchFamily="18" charset="0"/>
-              </a:rPr>
-              <a:t>ES-EN</a:t>
-            </a:r>
-          </a:p>
-        </p:txBody>
-      </p:sp>
-      <p:sp>
-        <p:nvSpPr>
-          <p:cNvPr id="24" name="TextBox 23">
-            <a:extLst>
-              <a:ext uri="{FF2B5EF4-FFF2-40B4-BE49-F238E27FC236}">
-                <a16:creationId xmlns:a16="http://schemas.microsoft.com/office/drawing/2014/main" id="{423E92B0-0B90-46E3-8DE1-C8D8C44D5746}"/>
-              </a:ext>
-            </a:extLst>
-          </p:cNvPr>
-          <p:cNvSpPr txBox="1"/>
-          <p:nvPr/>
-        </p:nvSpPr>
-        <p:spPr>
-          <a:xfrm>
-            <a:off x="4488286" y="1280732"/>
-            <a:ext cx="734496" cy="307777"/>
-          </a:xfrm>
-          <a:prstGeom prst="rect">
-            <a:avLst/>
-          </a:prstGeom>
-          <a:solidFill>
-            <a:schemeClr val="bg1"/>
-          </a:solidFill>
-        </p:spPr>
-        <p:txBody>
-          <a:bodyPr wrap="none" rtlCol="0">
-            <a:spAutoFit/>
-          </a:bodyPr>
-          <a:lstStyle/>
-          <a:p>
-            <a:pPr algn="ctr"/>
-            <a:r>
-              <a:rPr lang="en-US" sz="1400" dirty="0">
-                <a:latin typeface="Times New Roman" panose="02020603050405020304" pitchFamily="18" charset="0"/>
-                <a:cs typeface="Times New Roman" panose="02020603050405020304" pitchFamily="18" charset="0"/>
-              </a:rPr>
-              <a:t>MONO</a:t>
-            </a:r>
-          </a:p>
-        </p:txBody>
-      </p:sp>
-      <p:sp>
-        <p:nvSpPr>
-          <p:cNvPr id="26" name="TextBox 25">
-            <a:extLst>
-              <a:ext uri="{FF2B5EF4-FFF2-40B4-BE49-F238E27FC236}">
-                <a16:creationId xmlns:a16="http://schemas.microsoft.com/office/drawing/2014/main" id="{97E2DD86-3725-4A0E-8F5C-C866B1B01F7B}"/>
-              </a:ext>
-            </a:extLst>
-          </p:cNvPr>
-          <p:cNvSpPr txBox="1"/>
-          <p:nvPr/>
-        </p:nvSpPr>
-        <p:spPr>
-          <a:xfrm>
-            <a:off x="7086610" y="1280732"/>
-            <a:ext cx="691216" cy="307777"/>
-          </a:xfrm>
-          <a:prstGeom prst="rect">
-            <a:avLst/>
-          </a:prstGeom>
-          <a:solidFill>
-            <a:schemeClr val="bg1"/>
-          </a:solidFill>
-        </p:spPr>
-        <p:txBody>
-          <a:bodyPr wrap="none" rtlCol="0">
-            <a:spAutoFit/>
-          </a:bodyPr>
-          <a:lstStyle/>
-          <a:p>
-            <a:pPr algn="ctr"/>
-            <a:r>
-              <a:rPr lang="en-US" sz="1400" dirty="0">
-                <a:latin typeface="Times New Roman" panose="02020603050405020304" pitchFamily="18" charset="0"/>
-                <a:cs typeface="Times New Roman" panose="02020603050405020304" pitchFamily="18" charset="0"/>
-              </a:rPr>
-              <a:t>ES-EU</a:t>
-            </a:r>
-          </a:p>
-        </p:txBody>
-      </p:sp>
-      <p:sp>
-        <p:nvSpPr>
-          <p:cNvPr id="27" name="TextBox 26">
-            <a:extLst>
-              <a:ext uri="{FF2B5EF4-FFF2-40B4-BE49-F238E27FC236}">
-                <a16:creationId xmlns:a16="http://schemas.microsoft.com/office/drawing/2014/main" id="{3549548F-7C55-41FF-803A-6FD011576483}"/>
-              </a:ext>
-            </a:extLst>
-          </p:cNvPr>
-          <p:cNvSpPr txBox="1"/>
-          <p:nvPr/>
-        </p:nvSpPr>
-        <p:spPr>
-          <a:xfrm>
-            <a:off x="9641655" y="1289361"/>
-            <a:ext cx="734496" cy="307777"/>
-          </a:xfrm>
-          <a:prstGeom prst="rect">
-            <a:avLst/>
-          </a:prstGeom>
-          <a:solidFill>
-            <a:schemeClr val="bg1"/>
-          </a:solidFill>
-        </p:spPr>
-        <p:txBody>
-          <a:bodyPr wrap="none" rtlCol="0">
-            <a:spAutoFit/>
-          </a:bodyPr>
-          <a:lstStyle/>
-          <a:p>
-            <a:pPr algn="ctr"/>
-            <a:r>
-              <a:rPr lang="en-US" sz="1400" dirty="0">
-                <a:latin typeface="Times New Roman" panose="02020603050405020304" pitchFamily="18" charset="0"/>
-                <a:cs typeface="Times New Roman" panose="02020603050405020304" pitchFamily="18" charset="0"/>
-              </a:rPr>
-              <a:t>MONO</a:t>
-            </a:r>
-          </a:p>
-        </p:txBody>
-      </p:sp>
-      <p:pic>
-        <p:nvPicPr>
-          <p:cNvPr id="33" name="Picture 32">
-            <a:extLst>
-              <a:ext uri="{FF2B5EF4-FFF2-40B4-BE49-F238E27FC236}">
-                <a16:creationId xmlns:a16="http://schemas.microsoft.com/office/drawing/2014/main" id="{89285785-502E-4734-89EB-89712CF6051B}"/>
-              </a:ext>
-            </a:extLst>
-          </p:cNvPr>
-          <p:cNvPicPr>
-            <a:picLocks noChangeAspect="1"/>
-          </p:cNvPicPr>
-          <p:nvPr/>
-        </p:nvPicPr>
-        <p:blipFill rotWithShape="1">
-          <a:blip r:embed="rId3">
-            <a:extLst>
-              <a:ext uri="{28A0092B-C50C-407E-A947-70E740481C1C}">
-                <a14:useLocalDpi xmlns:a14="http://schemas.microsoft.com/office/drawing/2010/main" val="0"/>
-              </a:ext>
-            </a:extLst>
-          </a:blip>
-          <a:srcRect l="5265" b="5964"/>
-          <a:stretch/>
-        </p:blipFill>
-        <p:spPr>
-          <a:xfrm>
-            <a:off x="924568" y="1645453"/>
-            <a:ext cx="2708564" cy="2688592"/>
-          </a:xfrm>
-          <a:prstGeom prst="rect">
-            <a:avLst/>
-          </a:prstGeom>
-        </p:spPr>
-      </p:pic>
-      <p:pic>
-        <p:nvPicPr>
-          <p:cNvPr id="35" name="Picture 34">
-            <a:extLst>
-              <a:ext uri="{FF2B5EF4-FFF2-40B4-BE49-F238E27FC236}">
-                <a16:creationId xmlns:a16="http://schemas.microsoft.com/office/drawing/2014/main" id="{02C3176C-D32A-49FA-8EE6-0ACCE6AA5108}"/>
-              </a:ext>
-            </a:extLst>
-          </p:cNvPr>
-          <p:cNvPicPr>
-            <a:picLocks noChangeAspect="1"/>
-          </p:cNvPicPr>
-          <p:nvPr/>
-        </p:nvPicPr>
-        <p:blipFill rotWithShape="1">
-          <a:blip r:embed="rId4">
-            <a:extLst>
-              <a:ext uri="{28A0092B-C50C-407E-A947-70E740481C1C}">
-                <a14:useLocalDpi xmlns:a14="http://schemas.microsoft.com/office/drawing/2010/main" val="0"/>
-              </a:ext>
-            </a:extLst>
-          </a:blip>
-          <a:srcRect l="12645" b="5964"/>
-          <a:stretch/>
-        </p:blipFill>
-        <p:spPr>
-          <a:xfrm>
-            <a:off x="3666197" y="1645453"/>
-            <a:ext cx="2497563" cy="2688590"/>
-          </a:xfrm>
-          <a:prstGeom prst="rect">
-            <a:avLst/>
-          </a:prstGeom>
-        </p:spPr>
-      </p:pic>
-      <p:pic>
-        <p:nvPicPr>
-          <p:cNvPr id="37" name="Picture 36">
-            <a:extLst>
-              <a:ext uri="{FF2B5EF4-FFF2-40B4-BE49-F238E27FC236}">
-                <a16:creationId xmlns:a16="http://schemas.microsoft.com/office/drawing/2014/main" id="{7FAD5877-0E78-4D8F-BB2E-BD55C8D97A63}"/>
-              </a:ext>
-            </a:extLst>
-          </p:cNvPr>
-          <p:cNvPicPr>
-            <a:picLocks noChangeAspect="1"/>
-          </p:cNvPicPr>
-          <p:nvPr/>
-        </p:nvPicPr>
-        <p:blipFill rotWithShape="1">
-          <a:blip r:embed="rId5">
-            <a:extLst>
-              <a:ext uri="{28A0092B-C50C-407E-A947-70E740481C1C}">
-                <a14:useLocalDpi xmlns:a14="http://schemas.microsoft.com/office/drawing/2010/main" val="0"/>
-              </a:ext>
-            </a:extLst>
-          </a:blip>
-          <a:srcRect l="11825" b="5964"/>
-          <a:stretch/>
-        </p:blipFill>
-        <p:spPr>
-          <a:xfrm>
-            <a:off x="6205043" y="1645453"/>
-            <a:ext cx="2521008" cy="2688591"/>
-          </a:xfrm>
-          <a:prstGeom prst="rect">
-            <a:avLst/>
-          </a:prstGeom>
-        </p:spPr>
-      </p:pic>
-      <p:pic>
-        <p:nvPicPr>
-          <p:cNvPr id="39" name="Picture 38">
-            <a:extLst>
-              <a:ext uri="{FF2B5EF4-FFF2-40B4-BE49-F238E27FC236}">
-                <a16:creationId xmlns:a16="http://schemas.microsoft.com/office/drawing/2014/main" id="{F4688C10-3933-4E5C-87D6-2F79F2E73C2B}"/>
-              </a:ext>
-            </a:extLst>
-          </p:cNvPr>
-          <p:cNvPicPr>
-            <a:picLocks noChangeAspect="1"/>
-          </p:cNvPicPr>
-          <p:nvPr/>
-        </p:nvPicPr>
-        <p:blipFill rotWithShape="1">
-          <a:blip r:embed="rId6">
-            <a:extLst>
-              <a:ext uri="{28A0092B-C50C-407E-A947-70E740481C1C}">
-                <a14:useLocalDpi xmlns:a14="http://schemas.microsoft.com/office/drawing/2010/main" val="0"/>
-              </a:ext>
-            </a:extLst>
-          </a:blip>
-          <a:srcRect l="11825" b="5964"/>
-          <a:stretch/>
-        </p:blipFill>
-        <p:spPr>
-          <a:xfrm>
-            <a:off x="8748399" y="1645453"/>
-            <a:ext cx="2521009" cy="2688591"/>
-          </a:xfrm>
-          <a:prstGeom prst="rect">
-            <a:avLst/>
-          </a:prstGeom>
-        </p:spPr>
-      </p:pic>
-    </p:spTree>
-    <p:extLst>
-      <p:ext uri="{BB962C8B-B14F-4D97-AF65-F5344CB8AC3E}">
-        <p14:creationId xmlns:p14="http://schemas.microsoft.com/office/powerpoint/2010/main" val="1617090707"/>
-      </p:ext>
-    </p:extLst>
-  </p:cSld>
-  <p:clrMapOvr>
-    <a:masterClrMapping/>
-  </p:clrMapOvr>
-</p:sld>
-</file>
-
-<file path=ppt/slides/slide3.xml><?xml version="1.0" encoding="utf-8"?>
-<p:sld xmlns:a="http://schemas.openxmlformats.org/drawingml/2006/main" xmlns:r="http://schemas.openxmlformats.org/officeDocument/2006/relationships" xmlns:p="http://schemas.openxmlformats.org/presentationml/2006/main">
-  <p:cSld>
-    <p:spTree>
-      <p:nvGrpSpPr>
-        <p:cNvPr id="1" name=""/>
-        <p:cNvGrpSpPr/>
-        <p:nvPr/>
-      </p:nvGrpSpPr>
-      <p:grpSpPr>
-        <a:xfrm>
-          <a:off x="0" y="0"/>
-          <a:ext cx="0" cy="0"/>
-          <a:chOff x="0" y="0"/>
-          <a:chExt cx="0" cy="0"/>
-        </a:xfrm>
-      </p:grpSpPr>
-      <p:pic>
-        <p:nvPicPr>
           <p:cNvPr id="7" name="Content Placeholder 6">
             <a:extLst>
               <a:ext uri="{FF2B5EF4-FFF2-40B4-BE49-F238E27FC236}">
@@ -7959,6 +7395,100 @@
 </p:sld>
 </file>
 
+<file path=ppt/slides/slide3.xml><?xml version="1.0" encoding="utf-8"?>
+<p:sld xmlns:a="http://schemas.openxmlformats.org/drawingml/2006/main" xmlns:r="http://schemas.openxmlformats.org/officeDocument/2006/relationships" xmlns:p="http://schemas.openxmlformats.org/presentationml/2006/main">
+  <p:cSld>
+    <p:spTree>
+      <p:nvGrpSpPr>
+        <p:cNvPr id="1" name=""/>
+        <p:cNvGrpSpPr/>
+        <p:nvPr/>
+      </p:nvGrpSpPr>
+      <p:grpSpPr>
+        <a:xfrm>
+          <a:off x="0" y="0"/>
+          <a:ext cx="0" cy="0"/>
+          <a:chOff x="0" y="0"/>
+          <a:chExt cx="0" cy="0"/>
+        </a:xfrm>
+      </p:grpSpPr>
+      <p:sp>
+        <p:nvSpPr>
+          <p:cNvPr id="2" name="Title 1">
+            <a:extLst>
+              <a:ext uri="{FF2B5EF4-FFF2-40B4-BE49-F238E27FC236}">
+                <a16:creationId xmlns:a16="http://schemas.microsoft.com/office/drawing/2014/main" id="{E53BD661-4862-4750-8992-5D0EBD6182C5}"/>
+              </a:ext>
+            </a:extLst>
+          </p:cNvPr>
+          <p:cNvSpPr>
+            <a:spLocks noGrp="1"/>
+          </p:cNvSpPr>
+          <p:nvPr>
+            <p:ph type="title"/>
+          </p:nvPr>
+        </p:nvSpPr>
+        <p:spPr/>
+        <p:txBody>
+          <a:bodyPr/>
+          <a:lstStyle/>
+          <a:p>
+            <a:r>
+              <a:rPr lang="en-US" dirty="0"/>
+              <a:t>Figure 2</a:t>
+            </a:r>
+          </a:p>
+        </p:txBody>
+      </p:sp>
+      <p:pic>
+        <p:nvPicPr>
+          <p:cNvPr id="10" name="Picture 9">
+            <a:extLst>
+              <a:ext uri="{FF2B5EF4-FFF2-40B4-BE49-F238E27FC236}">
+                <a16:creationId xmlns:a16="http://schemas.microsoft.com/office/drawing/2014/main" id="{1CB12311-7DAB-4E4D-B8C7-025033797CCB}"/>
+              </a:ext>
+            </a:extLst>
+          </p:cNvPr>
+          <p:cNvPicPr>
+            <a:picLocks noChangeAspect="1"/>
+          </p:cNvPicPr>
+          <p:nvPr/>
+        </p:nvPicPr>
+        <p:blipFill>
+          <a:blip r:embed="rId2">
+            <a:extLst>
+              <a:ext uri="{28A0092B-C50C-407E-A947-70E740481C1C}">
+                <a14:useLocalDpi xmlns:a14="http://schemas.microsoft.com/office/drawing/2010/main" val="0"/>
+              </a:ext>
+            </a:extLst>
+          </a:blip>
+          <a:stretch>
+            <a:fillRect/>
+          </a:stretch>
+        </p:blipFill>
+        <p:spPr>
+          <a:xfrm>
+            <a:off x="1070624" y="1770050"/>
+            <a:ext cx="10615873" cy="4495238"/>
+          </a:xfrm>
+          <a:prstGeom prst="rect">
+            <a:avLst/>
+          </a:prstGeom>
+        </p:spPr>
+      </p:pic>
+    </p:spTree>
+    <p:extLst>
+      <p:ext uri="{BB962C8B-B14F-4D97-AF65-F5344CB8AC3E}">
+        <p14:creationId xmlns:p14="http://schemas.microsoft.com/office/powerpoint/2010/main" val="2446785340"/>
+      </p:ext>
+    </p:extLst>
+  </p:cSld>
+  <p:clrMapOvr>
+    <a:masterClrMapping/>
+  </p:clrMapOvr>
+</p:sld>
+</file>
+
 <file path=ppt/slides/slide4.xml><?xml version="1.0" encoding="utf-8"?>
 <p:sld xmlns:a="http://schemas.openxmlformats.org/drawingml/2006/main" xmlns:r="http://schemas.openxmlformats.org/officeDocument/2006/relationships" xmlns:p="http://schemas.openxmlformats.org/presentationml/2006/main">
   <p:cSld>
@@ -7976,47 +7506,12 @@
           <a:chExt cx="0" cy="0"/>
         </a:xfrm>
       </p:grpSpPr>
-      <p:pic>
-        <p:nvPicPr>
-          <p:cNvPr id="4" name="Picture 3">
-            <a:extLst>
-              <a:ext uri="{FF2B5EF4-FFF2-40B4-BE49-F238E27FC236}">
-                <a16:creationId xmlns:a16="http://schemas.microsoft.com/office/drawing/2014/main" id="{0FEEC229-220C-4314-A065-72BA03CAE355}"/>
-              </a:ext>
-            </a:extLst>
-          </p:cNvPr>
-          <p:cNvPicPr>
-            <a:picLocks noChangeAspect="1"/>
-          </p:cNvPicPr>
-          <p:nvPr/>
-        </p:nvPicPr>
-        <p:blipFill rotWithShape="1">
-          <a:blip r:embed="rId2">
-            <a:extLst>
-              <a:ext uri="{28A0092B-C50C-407E-A947-70E740481C1C}">
-                <a14:useLocalDpi xmlns:a14="http://schemas.microsoft.com/office/drawing/2010/main" val="0"/>
-              </a:ext>
-            </a:extLst>
-          </a:blip>
-          <a:srcRect t="4869" b="7338"/>
-          <a:stretch/>
-        </p:blipFill>
-        <p:spPr>
-          <a:xfrm>
-            <a:off x="1375344" y="1992857"/>
-            <a:ext cx="9825075" cy="3830141"/>
-          </a:xfrm>
-          <a:prstGeom prst="rect">
-            <a:avLst/>
-          </a:prstGeom>
-        </p:spPr>
-      </p:pic>
       <p:sp>
         <p:nvSpPr>
           <p:cNvPr id="2" name="Title 1">
             <a:extLst>
               <a:ext uri="{FF2B5EF4-FFF2-40B4-BE49-F238E27FC236}">
-                <a16:creationId xmlns:a16="http://schemas.microsoft.com/office/drawing/2014/main" id="{E53BD661-4862-4750-8992-5D0EBD6182C5}"/>
+                <a16:creationId xmlns:a16="http://schemas.microsoft.com/office/drawing/2014/main" id="{A268EED6-D2B4-4F53-A44C-8283B9513631}"/>
               </a:ext>
             </a:extLst>
           </p:cNvPr>
@@ -8027,268 +7522,6 @@
             <p:ph type="title"/>
           </p:nvPr>
         </p:nvSpPr>
-        <p:spPr/>
-        <p:txBody>
-          <a:bodyPr/>
-          <a:lstStyle/>
-          <a:p>
-            <a:r>
-              <a:rPr lang="en-US" dirty="0"/>
-              <a:t>Figure 3</a:t>
-            </a:r>
-          </a:p>
-        </p:txBody>
-      </p:sp>
-      <p:sp>
-        <p:nvSpPr>
-          <p:cNvPr id="7" name="TextBox 6">
-            <a:extLst>
-              <a:ext uri="{FF2B5EF4-FFF2-40B4-BE49-F238E27FC236}">
-                <a16:creationId xmlns:a16="http://schemas.microsoft.com/office/drawing/2014/main" id="{CAB2C6C1-D1C5-4AC1-8812-DE040559ADFB}"/>
-              </a:ext>
-            </a:extLst>
-          </p:cNvPr>
-          <p:cNvSpPr txBox="1"/>
-          <p:nvPr/>
-        </p:nvSpPr>
-        <p:spPr>
-          <a:xfrm>
-            <a:off x="3325496" y="1712913"/>
-            <a:ext cx="1361271" cy="307777"/>
-          </a:xfrm>
-          <a:prstGeom prst="rect">
-            <a:avLst/>
-          </a:prstGeom>
-          <a:solidFill>
-            <a:schemeClr val="bg1"/>
-          </a:solidFill>
-        </p:spPr>
-        <p:txBody>
-          <a:bodyPr wrap="none" rtlCol="0">
-            <a:spAutoFit/>
-          </a:bodyPr>
-          <a:lstStyle/>
-          <a:p>
-            <a:pPr algn="ctr"/>
-            <a:r>
-              <a:rPr lang="en-US" sz="1400" dirty="0">
-                <a:latin typeface="Times New Roman" panose="02020603050405020304" pitchFamily="18" charset="0"/>
-                <a:cs typeface="Times New Roman" panose="02020603050405020304" pitchFamily="18" charset="0"/>
-              </a:rPr>
-              <a:t>Spanish-English</a:t>
-            </a:r>
-          </a:p>
-        </p:txBody>
-      </p:sp>
-      <p:sp>
-        <p:nvSpPr>
-          <p:cNvPr id="8" name="TextBox 7">
-            <a:extLst>
-              <a:ext uri="{FF2B5EF4-FFF2-40B4-BE49-F238E27FC236}">
-                <a16:creationId xmlns:a16="http://schemas.microsoft.com/office/drawing/2014/main" id="{0E3610B8-4C36-46E9-98FB-F8B8990D404D}"/>
-              </a:ext>
-            </a:extLst>
-          </p:cNvPr>
-          <p:cNvSpPr txBox="1"/>
-          <p:nvPr/>
-        </p:nvSpPr>
-        <p:spPr>
-          <a:xfrm>
-            <a:off x="7450874" y="1749194"/>
-            <a:ext cx="1343638" cy="307777"/>
-          </a:xfrm>
-          <a:prstGeom prst="rect">
-            <a:avLst/>
-          </a:prstGeom>
-          <a:solidFill>
-            <a:schemeClr val="bg1"/>
-          </a:solidFill>
-        </p:spPr>
-        <p:txBody>
-          <a:bodyPr wrap="none" rtlCol="0">
-            <a:spAutoFit/>
-          </a:bodyPr>
-          <a:lstStyle/>
-          <a:p>
-            <a:pPr algn="ctr"/>
-            <a:r>
-              <a:rPr lang="en-US" sz="1400" dirty="0">
-                <a:latin typeface="Times New Roman" panose="02020603050405020304" pitchFamily="18" charset="0"/>
-                <a:cs typeface="Times New Roman" panose="02020603050405020304" pitchFamily="18" charset="0"/>
-              </a:rPr>
-              <a:t>Spanish-Basque</a:t>
-            </a:r>
-          </a:p>
-        </p:txBody>
-      </p:sp>
-      <p:sp>
-        <p:nvSpPr>
-          <p:cNvPr id="9" name="TextBox 8">
-            <a:extLst>
-              <a:ext uri="{FF2B5EF4-FFF2-40B4-BE49-F238E27FC236}">
-                <a16:creationId xmlns:a16="http://schemas.microsoft.com/office/drawing/2014/main" id="{8771022C-C4E7-4AC4-A4D7-C41DDE25D4B9}"/>
-              </a:ext>
-            </a:extLst>
-          </p:cNvPr>
-          <p:cNvSpPr txBox="1"/>
-          <p:nvPr/>
-        </p:nvSpPr>
-        <p:spPr>
-          <a:xfrm rot="16200000">
-            <a:off x="609368" y="3660379"/>
-            <a:ext cx="1659429" cy="307777"/>
-          </a:xfrm>
-          <a:prstGeom prst="rect">
-            <a:avLst/>
-          </a:prstGeom>
-          <a:solidFill>
-            <a:schemeClr val="bg1"/>
-          </a:solidFill>
-        </p:spPr>
-        <p:txBody>
-          <a:bodyPr wrap="none" rtlCol="0">
-            <a:spAutoFit/>
-          </a:bodyPr>
-          <a:lstStyle/>
-          <a:p>
-            <a:r>
-              <a:rPr lang="en-US" sz="1400" dirty="0">
-                <a:latin typeface="Times New Roman" panose="02020603050405020304" pitchFamily="18" charset="0"/>
-                <a:cs typeface="Times New Roman" panose="02020603050405020304" pitchFamily="18" charset="0"/>
-              </a:rPr>
-              <a:t>AUROC  ± 99% CI</a:t>
-            </a:r>
-          </a:p>
-        </p:txBody>
-      </p:sp>
-      <p:sp>
-        <p:nvSpPr>
-          <p:cNvPr id="14" name="TextBox 13">
-            <a:extLst>
-              <a:ext uri="{FF2B5EF4-FFF2-40B4-BE49-F238E27FC236}">
-                <a16:creationId xmlns:a16="http://schemas.microsoft.com/office/drawing/2014/main" id="{8C9F8E17-A4B6-4374-B463-2FEDA1B135EF}"/>
-              </a:ext>
-            </a:extLst>
-          </p:cNvPr>
-          <p:cNvSpPr txBox="1"/>
-          <p:nvPr/>
-        </p:nvSpPr>
-        <p:spPr>
-          <a:xfrm>
-            <a:off x="3148364" y="5820034"/>
-            <a:ext cx="1715534" cy="307777"/>
-          </a:xfrm>
-          <a:prstGeom prst="rect">
-            <a:avLst/>
-          </a:prstGeom>
-          <a:solidFill>
-            <a:schemeClr val="bg1"/>
-          </a:solidFill>
-        </p:spPr>
-        <p:txBody>
-          <a:bodyPr wrap="none" rtlCol="0">
-            <a:spAutoFit/>
-          </a:bodyPr>
-          <a:lstStyle/>
-          <a:p>
-            <a:pPr algn="ctr"/>
-            <a:r>
-              <a:rPr lang="en-US" sz="1400" dirty="0">
-                <a:latin typeface="Times New Roman" panose="02020603050405020304" pitchFamily="18" charset="0"/>
-                <a:cs typeface="Times New Roman" panose="02020603050405020304" pitchFamily="18" charset="0"/>
-              </a:rPr>
-              <a:t>Character (time-step)</a:t>
-            </a:r>
-          </a:p>
-        </p:txBody>
-      </p:sp>
-      <p:sp>
-        <p:nvSpPr>
-          <p:cNvPr id="15" name="TextBox 14">
-            <a:extLst>
-              <a:ext uri="{FF2B5EF4-FFF2-40B4-BE49-F238E27FC236}">
-                <a16:creationId xmlns:a16="http://schemas.microsoft.com/office/drawing/2014/main" id="{062F5F16-D382-41BC-A266-A1A0602D638F}"/>
-              </a:ext>
-            </a:extLst>
-          </p:cNvPr>
-          <p:cNvSpPr txBox="1"/>
-          <p:nvPr/>
-        </p:nvSpPr>
-        <p:spPr>
-          <a:xfrm>
-            <a:off x="7264926" y="5820035"/>
-            <a:ext cx="1715534" cy="307777"/>
-          </a:xfrm>
-          <a:prstGeom prst="rect">
-            <a:avLst/>
-          </a:prstGeom>
-          <a:solidFill>
-            <a:schemeClr val="bg1"/>
-          </a:solidFill>
-        </p:spPr>
-        <p:txBody>
-          <a:bodyPr wrap="none" rtlCol="0">
-            <a:spAutoFit/>
-          </a:bodyPr>
-          <a:lstStyle/>
-          <a:p>
-            <a:pPr algn="ctr"/>
-            <a:r>
-              <a:rPr lang="en-US" sz="1400" dirty="0">
-                <a:latin typeface="Times New Roman" panose="02020603050405020304" pitchFamily="18" charset="0"/>
-                <a:cs typeface="Times New Roman" panose="02020603050405020304" pitchFamily="18" charset="0"/>
-              </a:rPr>
-              <a:t>Character (time-step)</a:t>
-            </a:r>
-          </a:p>
-        </p:txBody>
-      </p:sp>
-    </p:spTree>
-    <p:extLst>
-      <p:ext uri="{BB962C8B-B14F-4D97-AF65-F5344CB8AC3E}">
-        <p14:creationId xmlns:p14="http://schemas.microsoft.com/office/powerpoint/2010/main" val="2446785340"/>
-      </p:ext>
-    </p:extLst>
-  </p:cSld>
-  <p:clrMapOvr>
-    <a:masterClrMapping/>
-  </p:clrMapOvr>
-</p:sld>
-</file>
-
-<file path=ppt/slides/slide5.xml><?xml version="1.0" encoding="utf-8"?>
-<p:sld xmlns:a="http://schemas.openxmlformats.org/drawingml/2006/main" xmlns:r="http://schemas.openxmlformats.org/officeDocument/2006/relationships" xmlns:p="http://schemas.openxmlformats.org/presentationml/2006/main">
-  <p:cSld>
-    <p:spTree>
-      <p:nvGrpSpPr>
-        <p:cNvPr id="1" name=""/>
-        <p:cNvGrpSpPr/>
-        <p:nvPr/>
-      </p:nvGrpSpPr>
-      <p:grpSpPr>
-        <a:xfrm>
-          <a:off x="0" y="0"/>
-          <a:ext cx="0" cy="0"/>
-          <a:chOff x="0" y="0"/>
-          <a:chExt cx="0" cy="0"/>
-        </a:xfrm>
-      </p:grpSpPr>
-      <p:sp>
-        <p:nvSpPr>
-          <p:cNvPr id="2" name="Title 1">
-            <a:extLst>
-              <a:ext uri="{FF2B5EF4-FFF2-40B4-BE49-F238E27FC236}">
-                <a16:creationId xmlns:a16="http://schemas.microsoft.com/office/drawing/2014/main" id="{A268EED6-D2B4-4F53-A44C-8283B9513631}"/>
-              </a:ext>
-            </a:extLst>
-          </p:cNvPr>
-          <p:cNvSpPr>
-            <a:spLocks noGrp="1"/>
-          </p:cNvSpPr>
-          <p:nvPr>
-            <p:ph type="title"/>
-          </p:nvPr>
-        </p:nvSpPr>
         <p:spPr>
           <a:xfrm>
             <a:off x="36162" y="18255"/>
@@ -8301,7 +7534,7 @@
           <a:p>
             <a:r>
               <a:rPr lang="en-US" dirty="0"/>
-              <a:t>Figure 4: Recognition (models)</a:t>
+              <a:t>Figure 3: Recognition (models)</a:t>
             </a:r>
           </a:p>
         </p:txBody>
@@ -8470,7 +7703,7 @@
 </p:sld>
 </file>
 
-<file path=ppt/slides/slide6.xml><?xml version="1.0" encoding="utf-8"?>
+<file path=ppt/slides/slide5.xml><?xml version="1.0" encoding="utf-8"?>
 <p:sld xmlns:a="http://schemas.openxmlformats.org/drawingml/2006/main" xmlns:r="http://schemas.openxmlformats.org/officeDocument/2006/relationships" xmlns:p="http://schemas.openxmlformats.org/presentationml/2006/main">
   <p:cSld>
     <p:spTree>
@@ -8515,7 +7748,7 @@
           <a:p>
             <a:r>
               <a:rPr lang="en-US" dirty="0"/>
-              <a:t>Figure 5: </a:t>
+              <a:t>Figure 4: </a:t>
             </a:r>
             <a:r>
               <a:rPr lang="en-US" dirty="0" err="1"/>
@@ -8643,7 +7876,7 @@
 </p:sld>
 </file>
 
-<file path=ppt/slides/slide7.xml><?xml version="1.0" encoding="utf-8"?>
+<file path=ppt/slides/slide6.xml><?xml version="1.0" encoding="utf-8"?>
 <p:sld xmlns:a="http://schemas.openxmlformats.org/drawingml/2006/main" xmlns:r="http://schemas.openxmlformats.org/officeDocument/2006/relationships" xmlns:p="http://schemas.openxmlformats.org/presentationml/2006/main">
   <p:cSld>
     <p:spTree>
@@ -8724,7 +7957,7 @@
           <a:p>
             <a:r>
               <a:rPr lang="en-US" dirty="0"/>
-              <a:t>Figure 6: Recognition (participants)</a:t>
+              <a:t>Figure 5: Recognition (participants)</a:t>
             </a:r>
           </a:p>
         </p:txBody>
@@ -8857,6 +8090,171 @@
 </p:sld>
 </file>
 
+<file path=ppt/slides/slide7.xml><?xml version="1.0" encoding="utf-8"?>
+<p:sld xmlns:a="http://schemas.openxmlformats.org/drawingml/2006/main" xmlns:r="http://schemas.openxmlformats.org/officeDocument/2006/relationships" xmlns:p="http://schemas.openxmlformats.org/presentationml/2006/main">
+  <p:cSld>
+    <p:spTree>
+      <p:nvGrpSpPr>
+        <p:cNvPr id="1" name=""/>
+        <p:cNvGrpSpPr/>
+        <p:nvPr/>
+      </p:nvGrpSpPr>
+      <p:grpSpPr>
+        <a:xfrm>
+          <a:off x="0" y="0"/>
+          <a:ext cx="0" cy="0"/>
+          <a:chOff x="0" y="0"/>
+          <a:chExt cx="0" cy="0"/>
+        </a:xfrm>
+      </p:grpSpPr>
+      <p:pic>
+        <p:nvPicPr>
+          <p:cNvPr id="12" name="Picture 11">
+            <a:extLst>
+              <a:ext uri="{FF2B5EF4-FFF2-40B4-BE49-F238E27FC236}">
+                <a16:creationId xmlns:a16="http://schemas.microsoft.com/office/drawing/2014/main" id="{AFE3D6D8-1D1B-4007-9C15-0773AC973C90}"/>
+              </a:ext>
+            </a:extLst>
+          </p:cNvPr>
+          <p:cNvPicPr>
+            <a:picLocks noChangeAspect="1"/>
+          </p:cNvPicPr>
+          <p:nvPr/>
+        </p:nvPicPr>
+        <p:blipFill>
+          <a:blip r:embed="rId2">
+            <a:extLst>
+              <a:ext uri="{28A0092B-C50C-407E-A947-70E740481C1C}">
+                <a14:useLocalDpi xmlns:a14="http://schemas.microsoft.com/office/drawing/2010/main" val="0"/>
+              </a:ext>
+            </a:extLst>
+          </a:blip>
+          <a:stretch>
+            <a:fillRect/>
+          </a:stretch>
+        </p:blipFill>
+        <p:spPr>
+          <a:xfrm>
+            <a:off x="839436" y="1343816"/>
+            <a:ext cx="5256563" cy="4882033"/>
+          </a:xfrm>
+          <a:prstGeom prst="rect">
+            <a:avLst/>
+          </a:prstGeom>
+        </p:spPr>
+      </p:pic>
+      <p:sp>
+        <p:nvSpPr>
+          <p:cNvPr id="2" name="Title 1">
+            <a:extLst>
+              <a:ext uri="{FF2B5EF4-FFF2-40B4-BE49-F238E27FC236}">
+                <a16:creationId xmlns:a16="http://schemas.microsoft.com/office/drawing/2014/main" id="{495E4F3F-E96A-4732-818E-D73A8534D33E}"/>
+              </a:ext>
+            </a:extLst>
+          </p:cNvPr>
+          <p:cNvSpPr>
+            <a:spLocks noGrp="1"/>
+          </p:cNvSpPr>
+          <p:nvPr>
+            <p:ph type="title"/>
+          </p:nvPr>
+        </p:nvSpPr>
+        <p:spPr>
+          <a:xfrm>
+            <a:off x="0" y="0"/>
+            <a:ext cx="10515600" cy="1325563"/>
+          </a:xfrm>
+        </p:spPr>
+        <p:txBody>
+          <a:bodyPr/>
+          <a:lstStyle/>
+          <a:p>
+            <a:r>
+              <a:rPr lang="en-US" dirty="0"/>
+              <a:t>Figure 6: Production (participants)</a:t>
+            </a:r>
+          </a:p>
+        </p:txBody>
+      </p:sp>
+      <p:pic>
+        <p:nvPicPr>
+          <p:cNvPr id="6" name="Picture 5">
+            <a:extLst>
+              <a:ext uri="{FF2B5EF4-FFF2-40B4-BE49-F238E27FC236}">
+                <a16:creationId xmlns:a16="http://schemas.microsoft.com/office/drawing/2014/main" id="{71C00AEE-0C5B-4CFF-9FED-1B9668802961}"/>
+              </a:ext>
+            </a:extLst>
+          </p:cNvPr>
+          <p:cNvPicPr>
+            <a:picLocks noChangeAspect="1"/>
+          </p:cNvPicPr>
+          <p:nvPr/>
+        </p:nvPicPr>
+        <p:blipFill>
+          <a:blip r:embed="rId3">
+            <a:extLst>
+              <a:ext uri="{28A0092B-C50C-407E-A947-70E740481C1C}">
+                <a14:useLocalDpi xmlns:a14="http://schemas.microsoft.com/office/drawing/2010/main" val="0"/>
+              </a:ext>
+            </a:extLst>
+          </a:blip>
+          <a:stretch>
+            <a:fillRect/>
+          </a:stretch>
+        </p:blipFill>
+        <p:spPr>
+          <a:xfrm>
+            <a:off x="6095998" y="1343816"/>
+            <a:ext cx="5256563" cy="4882033"/>
+          </a:xfrm>
+          <a:prstGeom prst="rect">
+            <a:avLst/>
+          </a:prstGeom>
+        </p:spPr>
+      </p:pic>
+      <p:pic>
+        <p:nvPicPr>
+          <p:cNvPr id="13" name="Picture 12">
+            <a:extLst>
+              <a:ext uri="{FF2B5EF4-FFF2-40B4-BE49-F238E27FC236}">
+                <a16:creationId xmlns:a16="http://schemas.microsoft.com/office/drawing/2014/main" id="{42167394-DB95-4D4D-9A3F-844A86A532C1}"/>
+              </a:ext>
+            </a:extLst>
+          </p:cNvPr>
+          <p:cNvPicPr>
+            <a:picLocks noChangeAspect="1"/>
+          </p:cNvPicPr>
+          <p:nvPr/>
+        </p:nvPicPr>
+        <p:blipFill>
+          <a:blip r:embed="rId4"/>
+          <a:stretch>
+            <a:fillRect/>
+          </a:stretch>
+        </p:blipFill>
+        <p:spPr>
+          <a:xfrm>
+            <a:off x="4289187" y="4990145"/>
+            <a:ext cx="1530869" cy="316732"/>
+          </a:xfrm>
+          <a:prstGeom prst="rect">
+            <a:avLst/>
+          </a:prstGeom>
+        </p:spPr>
+      </p:pic>
+    </p:spTree>
+    <p:extLst>
+      <p:ext uri="{BB962C8B-B14F-4D97-AF65-F5344CB8AC3E}">
+        <p14:creationId xmlns:p14="http://schemas.microsoft.com/office/powerpoint/2010/main" val="2096111951"/>
+      </p:ext>
+    </p:extLst>
+  </p:cSld>
+  <p:clrMapOvr>
+    <a:masterClrMapping/>
+  </p:clrMapOvr>
+</p:sld>
+</file>
+
 <file path=ppt/slides/slide8.xml><?xml version="1.0" encoding="utf-8"?>
 <p:sld xmlns:a="http://schemas.openxmlformats.org/drawingml/2006/main" xmlns:r="http://schemas.openxmlformats.org/officeDocument/2006/relationships" xmlns:p="http://schemas.openxmlformats.org/presentationml/2006/main">
   <p:cSld>
@@ -8876,10 +8274,10 @@
       </p:grpSpPr>
       <p:pic>
         <p:nvPicPr>
-          <p:cNvPr id="12" name="Picture 11">
-            <a:extLst>
-              <a:ext uri="{FF2B5EF4-FFF2-40B4-BE49-F238E27FC236}">
-                <a16:creationId xmlns:a16="http://schemas.microsoft.com/office/drawing/2014/main" id="{AFE3D6D8-1D1B-4007-9C15-0773AC973C90}"/>
+          <p:cNvPr id="8" name="Picture 7">
+            <a:extLst>
+              <a:ext uri="{FF2B5EF4-FFF2-40B4-BE49-F238E27FC236}">
+                <a16:creationId xmlns:a16="http://schemas.microsoft.com/office/drawing/2014/main" id="{F16B58C3-E3F6-4094-9009-4980E9D57F2E}"/>
               </a:ext>
             </a:extLst>
           </p:cNvPr>
@@ -8902,8 +8300,8 @@
         </p:blipFill>
         <p:spPr>
           <a:xfrm>
-            <a:off x="839436" y="1343816"/>
-            <a:ext cx="5256563" cy="4882033"/>
+            <a:off x="566032" y="4390987"/>
+            <a:ext cx="10690981" cy="2401223"/>
           </a:xfrm>
           <a:prstGeom prst="rect">
             <a:avLst/>
@@ -8915,7 +8313,7 @@
           <p:cNvPr id="2" name="Title 1">
             <a:extLst>
               <a:ext uri="{FF2B5EF4-FFF2-40B4-BE49-F238E27FC236}">
-                <a16:creationId xmlns:a16="http://schemas.microsoft.com/office/drawing/2014/main" id="{495E4F3F-E96A-4732-818E-D73A8534D33E}"/>
+                <a16:creationId xmlns:a16="http://schemas.microsoft.com/office/drawing/2014/main" id="{B756BABF-320A-4671-AFEF-EE04F74D113A}"/>
               </a:ext>
             </a:extLst>
           </p:cNvPr>
@@ -8928,7 +8326,7 @@
         </p:nvSpPr>
         <p:spPr>
           <a:xfrm>
-            <a:off x="0" y="0"/>
+            <a:off x="-35018" y="-377655"/>
             <a:ext cx="10515600" cy="1325563"/>
           </a:xfrm>
         </p:spPr>
@@ -8938,17 +8336,302 @@
           <a:p>
             <a:r>
               <a:rPr lang="en-US" dirty="0"/>
-              <a:t>Figure 7: Production (participants)</a:t>
+              <a:t>Supplementary Figure 1</a:t>
+            </a:r>
+          </a:p>
+        </p:txBody>
+      </p:sp>
+      <p:cxnSp>
+        <p:nvCxnSpPr>
+          <p:cNvPr id="17" name="Straight Connector 16">
+            <a:extLst>
+              <a:ext uri="{FF2B5EF4-FFF2-40B4-BE49-F238E27FC236}">
+                <a16:creationId xmlns:a16="http://schemas.microsoft.com/office/drawing/2014/main" id="{545DBEDF-45BF-4771-96AD-7C5F50446BA8}"/>
+              </a:ext>
+            </a:extLst>
+          </p:cNvPr>
+          <p:cNvCxnSpPr>
+            <a:cxnSpLocks/>
+          </p:cNvCxnSpPr>
+          <p:nvPr/>
+        </p:nvCxnSpPr>
+        <p:spPr>
+          <a:xfrm>
+            <a:off x="6190765" y="0"/>
+            <a:ext cx="0" cy="6847563"/>
+          </a:xfrm>
+          <a:prstGeom prst="line">
+            <a:avLst/>
+          </a:prstGeom>
+          <a:ln w="19050"/>
+        </p:spPr>
+        <p:style>
+          <a:lnRef idx="1">
+            <a:schemeClr val="dk1"/>
+          </a:lnRef>
+          <a:fillRef idx="0">
+            <a:schemeClr val="dk1"/>
+          </a:fillRef>
+          <a:effectRef idx="0">
+            <a:schemeClr val="dk1"/>
+          </a:effectRef>
+          <a:fontRef idx="minor">
+            <a:schemeClr val="tx1"/>
+          </a:fontRef>
+        </p:style>
+      </p:cxnSp>
+      <p:sp>
+        <p:nvSpPr>
+          <p:cNvPr id="21" name="TextBox 20">
+            <a:extLst>
+              <a:ext uri="{FF2B5EF4-FFF2-40B4-BE49-F238E27FC236}">
+                <a16:creationId xmlns:a16="http://schemas.microsoft.com/office/drawing/2014/main" id="{1EB42A5A-7F44-4520-890E-A17DAF6189E9}"/>
+              </a:ext>
+            </a:extLst>
+          </p:cNvPr>
+          <p:cNvSpPr txBox="1"/>
+          <p:nvPr/>
+        </p:nvSpPr>
+        <p:spPr>
+          <a:xfrm>
+            <a:off x="2841837" y="848038"/>
+            <a:ext cx="1361271" cy="307777"/>
+          </a:xfrm>
+          <a:prstGeom prst="rect">
+            <a:avLst/>
+          </a:prstGeom>
+          <a:solidFill>
+            <a:schemeClr val="bg1"/>
+          </a:solidFill>
+        </p:spPr>
+        <p:txBody>
+          <a:bodyPr wrap="none" rtlCol="0">
+            <a:spAutoFit/>
+          </a:bodyPr>
+          <a:lstStyle/>
+          <a:p>
+            <a:pPr algn="ctr"/>
+            <a:r>
+              <a:rPr lang="en-US" sz="1400" dirty="0">
+                <a:latin typeface="Times New Roman" panose="02020603050405020304" pitchFamily="18" charset="0"/>
+                <a:cs typeface="Times New Roman" panose="02020603050405020304" pitchFamily="18" charset="0"/>
+              </a:rPr>
+              <a:t>Spanish-English</a:t>
+            </a:r>
+          </a:p>
+        </p:txBody>
+      </p:sp>
+      <p:sp>
+        <p:nvSpPr>
+          <p:cNvPr id="22" name="TextBox 21">
+            <a:extLst>
+              <a:ext uri="{FF2B5EF4-FFF2-40B4-BE49-F238E27FC236}">
+                <a16:creationId xmlns:a16="http://schemas.microsoft.com/office/drawing/2014/main" id="{59725D22-6FDC-4F19-9480-80FB1FBFE810}"/>
+              </a:ext>
+            </a:extLst>
+          </p:cNvPr>
+          <p:cNvSpPr txBox="1"/>
+          <p:nvPr/>
+        </p:nvSpPr>
+        <p:spPr>
+          <a:xfrm>
+            <a:off x="8076580" y="850693"/>
+            <a:ext cx="1343638" cy="307777"/>
+          </a:xfrm>
+          <a:prstGeom prst="rect">
+            <a:avLst/>
+          </a:prstGeom>
+          <a:solidFill>
+            <a:schemeClr val="bg1"/>
+          </a:solidFill>
+        </p:spPr>
+        <p:txBody>
+          <a:bodyPr wrap="none" rtlCol="0">
+            <a:spAutoFit/>
+          </a:bodyPr>
+          <a:lstStyle/>
+          <a:p>
+            <a:pPr algn="ctr"/>
+            <a:r>
+              <a:rPr lang="en-US" sz="1400" dirty="0">
+                <a:latin typeface="Times New Roman" panose="02020603050405020304" pitchFamily="18" charset="0"/>
+                <a:cs typeface="Times New Roman" panose="02020603050405020304" pitchFamily="18" charset="0"/>
+              </a:rPr>
+              <a:t>Spanish-Basque</a:t>
+            </a:r>
+          </a:p>
+        </p:txBody>
+      </p:sp>
+      <p:sp>
+        <p:nvSpPr>
+          <p:cNvPr id="23" name="TextBox 22">
+            <a:extLst>
+              <a:ext uri="{FF2B5EF4-FFF2-40B4-BE49-F238E27FC236}">
+                <a16:creationId xmlns:a16="http://schemas.microsoft.com/office/drawing/2014/main" id="{0F40DD5C-472C-4D0E-AAF0-C8CFFF65A812}"/>
+              </a:ext>
+            </a:extLst>
+          </p:cNvPr>
+          <p:cNvSpPr txBox="1"/>
+          <p:nvPr/>
+        </p:nvSpPr>
+        <p:spPr>
+          <a:xfrm>
+            <a:off x="1933242" y="1280732"/>
+            <a:ext cx="691216" cy="307777"/>
+          </a:xfrm>
+          <a:prstGeom prst="rect">
+            <a:avLst/>
+          </a:prstGeom>
+          <a:solidFill>
+            <a:schemeClr val="bg1"/>
+          </a:solidFill>
+        </p:spPr>
+        <p:txBody>
+          <a:bodyPr wrap="none" rtlCol="0">
+            <a:spAutoFit/>
+          </a:bodyPr>
+          <a:lstStyle/>
+          <a:p>
+            <a:pPr algn="ctr"/>
+            <a:r>
+              <a:rPr lang="en-US" sz="1400" dirty="0">
+                <a:latin typeface="Times New Roman" panose="02020603050405020304" pitchFamily="18" charset="0"/>
+                <a:cs typeface="Times New Roman" panose="02020603050405020304" pitchFamily="18" charset="0"/>
+              </a:rPr>
+              <a:t>ES-EN</a:t>
+            </a:r>
+          </a:p>
+        </p:txBody>
+      </p:sp>
+      <p:sp>
+        <p:nvSpPr>
+          <p:cNvPr id="24" name="TextBox 23">
+            <a:extLst>
+              <a:ext uri="{FF2B5EF4-FFF2-40B4-BE49-F238E27FC236}">
+                <a16:creationId xmlns:a16="http://schemas.microsoft.com/office/drawing/2014/main" id="{423E92B0-0B90-46E3-8DE1-C8D8C44D5746}"/>
+              </a:ext>
+            </a:extLst>
+          </p:cNvPr>
+          <p:cNvSpPr txBox="1"/>
+          <p:nvPr/>
+        </p:nvSpPr>
+        <p:spPr>
+          <a:xfrm>
+            <a:off x="4488286" y="1280732"/>
+            <a:ext cx="734496" cy="307777"/>
+          </a:xfrm>
+          <a:prstGeom prst="rect">
+            <a:avLst/>
+          </a:prstGeom>
+          <a:solidFill>
+            <a:schemeClr val="bg1"/>
+          </a:solidFill>
+        </p:spPr>
+        <p:txBody>
+          <a:bodyPr wrap="none" rtlCol="0">
+            <a:spAutoFit/>
+          </a:bodyPr>
+          <a:lstStyle/>
+          <a:p>
+            <a:pPr algn="ctr"/>
+            <a:r>
+              <a:rPr lang="en-US" sz="1400" dirty="0">
+                <a:latin typeface="Times New Roman" panose="02020603050405020304" pitchFamily="18" charset="0"/>
+                <a:cs typeface="Times New Roman" panose="02020603050405020304" pitchFamily="18" charset="0"/>
+              </a:rPr>
+              <a:t>MONO</a:t>
+            </a:r>
+          </a:p>
+        </p:txBody>
+      </p:sp>
+      <p:sp>
+        <p:nvSpPr>
+          <p:cNvPr id="26" name="TextBox 25">
+            <a:extLst>
+              <a:ext uri="{FF2B5EF4-FFF2-40B4-BE49-F238E27FC236}">
+                <a16:creationId xmlns:a16="http://schemas.microsoft.com/office/drawing/2014/main" id="{97E2DD86-3725-4A0E-8F5C-C866B1B01F7B}"/>
+              </a:ext>
+            </a:extLst>
+          </p:cNvPr>
+          <p:cNvSpPr txBox="1"/>
+          <p:nvPr/>
+        </p:nvSpPr>
+        <p:spPr>
+          <a:xfrm>
+            <a:off x="7086610" y="1280732"/>
+            <a:ext cx="691216" cy="307777"/>
+          </a:xfrm>
+          <a:prstGeom prst="rect">
+            <a:avLst/>
+          </a:prstGeom>
+          <a:solidFill>
+            <a:schemeClr val="bg1"/>
+          </a:solidFill>
+        </p:spPr>
+        <p:txBody>
+          <a:bodyPr wrap="none" rtlCol="0">
+            <a:spAutoFit/>
+          </a:bodyPr>
+          <a:lstStyle/>
+          <a:p>
+            <a:pPr algn="ctr"/>
+            <a:r>
+              <a:rPr lang="en-US" sz="1400" dirty="0">
+                <a:latin typeface="Times New Roman" panose="02020603050405020304" pitchFamily="18" charset="0"/>
+                <a:cs typeface="Times New Roman" panose="02020603050405020304" pitchFamily="18" charset="0"/>
+              </a:rPr>
+              <a:t>ES-EU</a:t>
+            </a:r>
+          </a:p>
+        </p:txBody>
+      </p:sp>
+      <p:sp>
+        <p:nvSpPr>
+          <p:cNvPr id="27" name="TextBox 26">
+            <a:extLst>
+              <a:ext uri="{FF2B5EF4-FFF2-40B4-BE49-F238E27FC236}">
+                <a16:creationId xmlns:a16="http://schemas.microsoft.com/office/drawing/2014/main" id="{3549548F-7C55-41FF-803A-6FD011576483}"/>
+              </a:ext>
+            </a:extLst>
+          </p:cNvPr>
+          <p:cNvSpPr txBox="1"/>
+          <p:nvPr/>
+        </p:nvSpPr>
+        <p:spPr>
+          <a:xfrm>
+            <a:off x="9641655" y="1289361"/>
+            <a:ext cx="734496" cy="307777"/>
+          </a:xfrm>
+          <a:prstGeom prst="rect">
+            <a:avLst/>
+          </a:prstGeom>
+          <a:solidFill>
+            <a:schemeClr val="bg1"/>
+          </a:solidFill>
+        </p:spPr>
+        <p:txBody>
+          <a:bodyPr wrap="none" rtlCol="0">
+            <a:spAutoFit/>
+          </a:bodyPr>
+          <a:lstStyle/>
+          <a:p>
+            <a:pPr algn="ctr"/>
+            <a:r>
+              <a:rPr lang="en-US" sz="1400" dirty="0">
+                <a:latin typeface="Times New Roman" panose="02020603050405020304" pitchFamily="18" charset="0"/>
+                <a:cs typeface="Times New Roman" panose="02020603050405020304" pitchFamily="18" charset="0"/>
+              </a:rPr>
+              <a:t>MONO</a:t>
             </a:r>
           </a:p>
         </p:txBody>
       </p:sp>
       <p:pic>
         <p:nvPicPr>
-          <p:cNvPr id="6" name="Picture 5">
-            <a:extLst>
-              <a:ext uri="{FF2B5EF4-FFF2-40B4-BE49-F238E27FC236}">
-                <a16:creationId xmlns:a16="http://schemas.microsoft.com/office/drawing/2014/main" id="{71C00AEE-0C5B-4CFF-9FED-1B9668802961}"/>
+          <p:cNvPr id="10" name="Picture 9">
+            <a:extLst>
+              <a:ext uri="{FF2B5EF4-FFF2-40B4-BE49-F238E27FC236}">
+                <a16:creationId xmlns:a16="http://schemas.microsoft.com/office/drawing/2014/main" id="{BBC9C4E4-A7D5-4219-B490-4F91CA50A536}"/>
               </a:ext>
             </a:extLst>
           </p:cNvPr>
@@ -8957,8 +8640,330 @@
           </p:cNvPicPr>
           <p:nvPr/>
         </p:nvPicPr>
+        <p:blipFill rotWithShape="1">
+          <a:blip r:embed="rId3">
+            <a:extLst>
+              <a:ext uri="{28A0092B-C50C-407E-A947-70E740481C1C}">
+                <a14:useLocalDpi xmlns:a14="http://schemas.microsoft.com/office/drawing/2010/main" val="0"/>
+              </a:ext>
+            </a:extLst>
+          </a:blip>
+          <a:srcRect l="14625" b="5904"/>
+          <a:stretch/>
+        </p:blipFill>
+        <p:spPr>
+          <a:xfrm>
+            <a:off x="8805268" y="1643862"/>
+            <a:ext cx="2439388" cy="2688592"/>
+          </a:xfrm>
+          <a:prstGeom prst="rect">
+            <a:avLst/>
+          </a:prstGeom>
+        </p:spPr>
+      </p:pic>
+      <p:pic>
+        <p:nvPicPr>
+          <p:cNvPr id="12" name="Picture 11">
+            <a:extLst>
+              <a:ext uri="{FF2B5EF4-FFF2-40B4-BE49-F238E27FC236}">
+                <a16:creationId xmlns:a16="http://schemas.microsoft.com/office/drawing/2014/main" id="{D9F7E6F5-6101-408A-862F-C027B849D0EB}"/>
+              </a:ext>
+            </a:extLst>
+          </p:cNvPr>
+          <p:cNvPicPr>
+            <a:picLocks noChangeAspect="1"/>
+          </p:cNvPicPr>
+          <p:nvPr/>
+        </p:nvPicPr>
+        <p:blipFill rotWithShape="1">
+          <a:blip r:embed="rId4">
+            <a:extLst>
+              <a:ext uri="{28A0092B-C50C-407E-A947-70E740481C1C}">
+                <a14:useLocalDpi xmlns:a14="http://schemas.microsoft.com/office/drawing/2010/main" val="0"/>
+              </a:ext>
+            </a:extLst>
+          </a:blip>
+          <a:srcRect l="6147" b="5904"/>
+          <a:stretch/>
+        </p:blipFill>
+        <p:spPr>
+          <a:xfrm>
+            <a:off x="894659" y="1647042"/>
+            <a:ext cx="2681604" cy="2688592"/>
+          </a:xfrm>
+          <a:prstGeom prst="rect">
+            <a:avLst/>
+          </a:prstGeom>
+        </p:spPr>
+      </p:pic>
+      <p:pic>
+        <p:nvPicPr>
+          <p:cNvPr id="14" name="Picture 13">
+            <a:extLst>
+              <a:ext uri="{FF2B5EF4-FFF2-40B4-BE49-F238E27FC236}">
+                <a16:creationId xmlns:a16="http://schemas.microsoft.com/office/drawing/2014/main" id="{C70501CC-0FDA-4477-B7A1-8399F1F1DEBD}"/>
+              </a:ext>
+            </a:extLst>
+          </p:cNvPr>
+          <p:cNvPicPr>
+            <a:picLocks noChangeAspect="1"/>
+          </p:cNvPicPr>
+          <p:nvPr/>
+        </p:nvPicPr>
+        <p:blipFill rotWithShape="1">
+          <a:blip r:embed="rId5">
+            <a:extLst>
+              <a:ext uri="{28A0092B-C50C-407E-A947-70E740481C1C}">
+                <a14:useLocalDpi xmlns:a14="http://schemas.microsoft.com/office/drawing/2010/main" val="0"/>
+              </a:ext>
+            </a:extLst>
+          </a:blip>
+          <a:srcRect l="14279" b="5904"/>
+          <a:stretch/>
+        </p:blipFill>
+        <p:spPr>
+          <a:xfrm>
+            <a:off x="3674229" y="1643862"/>
+            <a:ext cx="2449269" cy="2688592"/>
+          </a:xfrm>
+          <a:prstGeom prst="rect">
+            <a:avLst/>
+          </a:prstGeom>
+        </p:spPr>
+      </p:pic>
+      <p:pic>
+        <p:nvPicPr>
+          <p:cNvPr id="16" name="Picture 15">
+            <a:extLst>
+              <a:ext uri="{FF2B5EF4-FFF2-40B4-BE49-F238E27FC236}">
+                <a16:creationId xmlns:a16="http://schemas.microsoft.com/office/drawing/2014/main" id="{5A49B2B7-2BF8-495C-86FF-EE8D7CEAF1FA}"/>
+              </a:ext>
+            </a:extLst>
+          </p:cNvPr>
+          <p:cNvPicPr>
+            <a:picLocks noChangeAspect="1"/>
+          </p:cNvPicPr>
+          <p:nvPr/>
+        </p:nvPicPr>
+        <p:blipFill rotWithShape="1">
+          <a:blip r:embed="rId6">
+            <a:extLst>
+              <a:ext uri="{28A0092B-C50C-407E-A947-70E740481C1C}">
+                <a14:useLocalDpi xmlns:a14="http://schemas.microsoft.com/office/drawing/2010/main" val="0"/>
+              </a:ext>
+            </a:extLst>
+          </a:blip>
+          <a:srcRect l="14680" b="5904"/>
+          <a:stretch/>
+        </p:blipFill>
+        <p:spPr>
+          <a:xfrm>
+            <a:off x="6271091" y="1643862"/>
+            <a:ext cx="2437792" cy="2688592"/>
+          </a:xfrm>
+          <a:prstGeom prst="rect">
+            <a:avLst/>
+          </a:prstGeom>
+        </p:spPr>
+      </p:pic>
+    </p:spTree>
+    <p:extLst>
+      <p:ext uri="{BB962C8B-B14F-4D97-AF65-F5344CB8AC3E}">
+        <p14:creationId xmlns:p14="http://schemas.microsoft.com/office/powerpoint/2010/main" val="1617090707"/>
+      </p:ext>
+    </p:extLst>
+  </p:cSld>
+  <p:clrMapOvr>
+    <a:masterClrMapping/>
+  </p:clrMapOvr>
+</p:sld>
+</file>
+
+<file path=ppt/slides/slide9.xml><?xml version="1.0" encoding="utf-8"?>
+<p:sld xmlns:a="http://schemas.openxmlformats.org/drawingml/2006/main" xmlns:r="http://schemas.openxmlformats.org/officeDocument/2006/relationships" xmlns:p="http://schemas.openxmlformats.org/presentationml/2006/main">
+  <p:cSld>
+    <p:spTree>
+      <p:nvGrpSpPr>
+        <p:cNvPr id="1" name=""/>
+        <p:cNvGrpSpPr/>
+        <p:nvPr/>
+      </p:nvGrpSpPr>
+      <p:grpSpPr>
+        <a:xfrm>
+          <a:off x="0" y="0"/>
+          <a:ext cx="0" cy="0"/>
+          <a:chOff x="0" y="0"/>
+          <a:chExt cx="0" cy="0"/>
+        </a:xfrm>
+      </p:grpSpPr>
+      <p:sp>
+        <p:nvSpPr>
+          <p:cNvPr id="2" name="Title 1">
+            <a:extLst>
+              <a:ext uri="{FF2B5EF4-FFF2-40B4-BE49-F238E27FC236}">
+                <a16:creationId xmlns:a16="http://schemas.microsoft.com/office/drawing/2014/main" id="{3CA0F6F2-ED6F-44AD-AAB9-6B8EA1E31CCC}"/>
+              </a:ext>
+            </a:extLst>
+          </p:cNvPr>
+          <p:cNvSpPr>
+            <a:spLocks noGrp="1"/>
+          </p:cNvSpPr>
+          <p:nvPr>
+            <p:ph type="title"/>
+          </p:nvPr>
+        </p:nvSpPr>
+        <p:spPr>
+          <a:xfrm>
+            <a:off x="0" y="188374"/>
+            <a:ext cx="2162379" cy="1325563"/>
+          </a:xfrm>
+        </p:spPr>
+        <p:txBody>
+          <a:bodyPr>
+            <a:noAutofit/>
+          </a:bodyPr>
+          <a:lstStyle/>
+          <a:p>
+            <a:r>
+              <a:rPr lang="en-US" sz="3200" dirty="0"/>
+              <a:t>Supplementary Figure 2</a:t>
+            </a:r>
+          </a:p>
+        </p:txBody>
+      </p:sp>
+      <p:sp>
+        <p:nvSpPr>
+          <p:cNvPr id="64" name="TextBox 63">
+            <a:extLst>
+              <a:ext uri="{FF2B5EF4-FFF2-40B4-BE49-F238E27FC236}">
+                <a16:creationId xmlns:a16="http://schemas.microsoft.com/office/drawing/2014/main" id="{B76133AD-A1C4-4788-B355-9B1979125BD4}"/>
+              </a:ext>
+            </a:extLst>
+          </p:cNvPr>
+          <p:cNvSpPr txBox="1"/>
+          <p:nvPr/>
+        </p:nvSpPr>
+        <p:spPr>
+          <a:xfrm>
+            <a:off x="2634540" y="430825"/>
+            <a:ext cx="277724" cy="369332"/>
+          </a:xfrm>
+          <a:prstGeom prst="rect">
+            <a:avLst/>
+          </a:prstGeom>
+          <a:noFill/>
+        </p:spPr>
+        <p:txBody>
+          <a:bodyPr wrap="square" rtlCol="0">
+            <a:spAutoFit/>
+          </a:bodyPr>
+          <a:lstStyle/>
+          <a:p>
+            <a:pPr algn="ctr"/>
+            <a:r>
+              <a:rPr lang="en-US" b="1" dirty="0">
+                <a:latin typeface="Times New Roman" panose="02020603050405020304" pitchFamily="18" charset="0"/>
+                <a:cs typeface="Times New Roman" panose="02020603050405020304" pitchFamily="18" charset="0"/>
+              </a:rPr>
+              <a:t>a</a:t>
+            </a:r>
+          </a:p>
+        </p:txBody>
+      </p:sp>
+      <p:sp>
+        <p:nvSpPr>
+          <p:cNvPr id="65" name="TextBox 64">
+            <a:extLst>
+              <a:ext uri="{FF2B5EF4-FFF2-40B4-BE49-F238E27FC236}">
+                <a16:creationId xmlns:a16="http://schemas.microsoft.com/office/drawing/2014/main" id="{15B628ED-7843-41A0-A80D-5D7038A2673A}"/>
+              </a:ext>
+            </a:extLst>
+          </p:cNvPr>
+          <p:cNvSpPr txBox="1"/>
+          <p:nvPr/>
+        </p:nvSpPr>
+        <p:spPr>
+          <a:xfrm>
+            <a:off x="2634540" y="2828347"/>
+            <a:ext cx="277724" cy="369332"/>
+          </a:xfrm>
+          <a:prstGeom prst="rect">
+            <a:avLst/>
+          </a:prstGeom>
+          <a:noFill/>
+        </p:spPr>
+        <p:txBody>
+          <a:bodyPr wrap="square" rtlCol="0">
+            <a:spAutoFit/>
+          </a:bodyPr>
+          <a:lstStyle/>
+          <a:p>
+            <a:pPr algn="ctr"/>
+            <a:r>
+              <a:rPr lang="en-US" b="1" dirty="0">
+                <a:latin typeface="Times New Roman" panose="02020603050405020304" pitchFamily="18" charset="0"/>
+                <a:cs typeface="Times New Roman" panose="02020603050405020304" pitchFamily="18" charset="0"/>
+              </a:rPr>
+              <a:t>b</a:t>
+            </a:r>
+          </a:p>
+        </p:txBody>
+      </p:sp>
+      <p:sp>
+        <p:nvSpPr>
+          <p:cNvPr id="66" name="TextBox 65">
+            <a:extLst>
+              <a:ext uri="{FF2B5EF4-FFF2-40B4-BE49-F238E27FC236}">
+                <a16:creationId xmlns:a16="http://schemas.microsoft.com/office/drawing/2014/main" id="{39F4C887-C75D-42EB-964D-86DAC263BD66}"/>
+              </a:ext>
+            </a:extLst>
+          </p:cNvPr>
+          <p:cNvSpPr txBox="1"/>
+          <p:nvPr/>
+        </p:nvSpPr>
+        <p:spPr>
+          <a:xfrm>
+            <a:off x="2634540" y="4749232"/>
+            <a:ext cx="277724" cy="369332"/>
+          </a:xfrm>
+          <a:prstGeom prst="rect">
+            <a:avLst/>
+          </a:prstGeom>
+          <a:noFill/>
+        </p:spPr>
+        <p:txBody>
+          <a:bodyPr wrap="square" rtlCol="0">
+            <a:spAutoFit/>
+          </a:bodyPr>
+          <a:lstStyle/>
+          <a:p>
+            <a:pPr algn="ctr"/>
+            <a:r>
+              <a:rPr lang="en-US" b="1" dirty="0">
+                <a:latin typeface="Times New Roman" panose="02020603050405020304" pitchFamily="18" charset="0"/>
+                <a:cs typeface="Times New Roman" panose="02020603050405020304" pitchFamily="18" charset="0"/>
+              </a:rPr>
+              <a:t>c</a:t>
+            </a:r>
+          </a:p>
+        </p:txBody>
+      </p:sp>
+      <p:pic>
+        <p:nvPicPr>
+          <p:cNvPr id="8" name="Picture 7">
+            <a:extLst>
+              <a:ext uri="{FF2B5EF4-FFF2-40B4-BE49-F238E27FC236}">
+                <a16:creationId xmlns:a16="http://schemas.microsoft.com/office/drawing/2014/main" id="{84D12057-F0F1-4A1A-A80F-C3A778C67793}"/>
+              </a:ext>
+            </a:extLst>
+          </p:cNvPr>
+          <p:cNvPicPr>
+            <a:picLocks noChangeAspect="1"/>
+          </p:cNvPicPr>
+          <p:nvPr/>
+        </p:nvPicPr>
         <p:blipFill>
-          <a:blip r:embed="rId3">
+          <a:blip r:embed="rId2">
             <a:extLst>
               <a:ext uri="{28A0092B-C50C-407E-A947-70E740481C1C}">
                 <a14:useLocalDpi xmlns:a14="http://schemas.microsoft.com/office/drawing/2010/main" val="0"/>
@@ -8971,8 +8976,8 @@
         </p:blipFill>
         <p:spPr>
           <a:xfrm>
-            <a:off x="6095998" y="1343816"/>
-            <a:ext cx="5256563" cy="4882033"/>
+            <a:off x="2874517" y="430825"/>
+            <a:ext cx="5156117" cy="2397522"/>
           </a:xfrm>
           <a:prstGeom prst="rect">
             <a:avLst/>
@@ -8981,10 +8986,10 @@
       </p:pic>
       <p:pic>
         <p:nvPicPr>
-          <p:cNvPr id="13" name="Picture 12">
-            <a:extLst>
-              <a:ext uri="{FF2B5EF4-FFF2-40B4-BE49-F238E27FC236}">
-                <a16:creationId xmlns:a16="http://schemas.microsoft.com/office/drawing/2014/main" id="{42167394-DB95-4D4D-9A3F-844A86A532C1}"/>
+          <p:cNvPr id="10" name="Picture 9">
+            <a:extLst>
+              <a:ext uri="{FF2B5EF4-FFF2-40B4-BE49-F238E27FC236}">
+                <a16:creationId xmlns:a16="http://schemas.microsoft.com/office/drawing/2014/main" id="{BEBD444C-A5B6-4C91-834A-145A0EF2DD13}"/>
               </a:ext>
             </a:extLst>
           </p:cNvPr>
@@ -8993,16 +8998,126 @@
           </p:cNvPicPr>
           <p:nvPr/>
         </p:nvPicPr>
-        <p:blipFill>
-          <a:blip r:embed="rId4"/>
-          <a:stretch>
-            <a:fillRect/>
-          </a:stretch>
+        <p:blipFill rotWithShape="1">
+          <a:blip r:embed="rId3">
+            <a:extLst>
+              <a:ext uri="{28A0092B-C50C-407E-A947-70E740481C1C}">
+                <a14:useLocalDpi xmlns:a14="http://schemas.microsoft.com/office/drawing/2010/main" val="0"/>
+              </a:ext>
+            </a:extLst>
+          </a:blip>
+          <a:srcRect l="6038" t="9519" b="5821"/>
+          <a:stretch/>
         </p:blipFill>
         <p:spPr>
           <a:xfrm>
-            <a:off x="4289187" y="4990145"/>
-            <a:ext cx="1530869" cy="316732"/>
+            <a:off x="3412873" y="4859109"/>
+            <a:ext cx="2077450" cy="1903346"/>
+          </a:xfrm>
+          <a:prstGeom prst="rect">
+            <a:avLst/>
+          </a:prstGeom>
+        </p:spPr>
+      </p:pic>
+      <p:pic>
+        <p:nvPicPr>
+          <p:cNvPr id="12" name="Picture 11">
+            <a:extLst>
+              <a:ext uri="{FF2B5EF4-FFF2-40B4-BE49-F238E27FC236}">
+                <a16:creationId xmlns:a16="http://schemas.microsoft.com/office/drawing/2014/main" id="{AEA7788F-57AA-41E9-821D-BA2C3121435C}"/>
+              </a:ext>
+            </a:extLst>
+          </p:cNvPr>
+          <p:cNvPicPr>
+            <a:picLocks noChangeAspect="1"/>
+          </p:cNvPicPr>
+          <p:nvPr/>
+        </p:nvPicPr>
+        <p:blipFill rotWithShape="1">
+          <a:blip r:embed="rId4">
+            <a:extLst>
+              <a:ext uri="{28A0092B-C50C-407E-A947-70E740481C1C}">
+                <a14:useLocalDpi xmlns:a14="http://schemas.microsoft.com/office/drawing/2010/main" val="0"/>
+              </a:ext>
+            </a:extLst>
+          </a:blip>
+          <a:srcRect l="6038" t="9519" b="5821"/>
+          <a:stretch/>
+        </p:blipFill>
+        <p:spPr>
+          <a:xfrm>
+            <a:off x="3412873" y="2845886"/>
+            <a:ext cx="2077450" cy="1903346"/>
+          </a:xfrm>
+          <a:prstGeom prst="rect">
+            <a:avLst/>
+          </a:prstGeom>
+        </p:spPr>
+      </p:pic>
+      <p:pic>
+        <p:nvPicPr>
+          <p:cNvPr id="15" name="Picture 14">
+            <a:extLst>
+              <a:ext uri="{FF2B5EF4-FFF2-40B4-BE49-F238E27FC236}">
+                <a16:creationId xmlns:a16="http://schemas.microsoft.com/office/drawing/2014/main" id="{08C72324-F572-4B2D-ABD8-64DD8FB4FE77}"/>
+              </a:ext>
+            </a:extLst>
+          </p:cNvPr>
+          <p:cNvPicPr>
+            <a:picLocks noChangeAspect="1"/>
+          </p:cNvPicPr>
+          <p:nvPr/>
+        </p:nvPicPr>
+        <p:blipFill rotWithShape="1">
+          <a:blip r:embed="rId5">
+            <a:extLst>
+              <a:ext uri="{28A0092B-C50C-407E-A947-70E740481C1C}">
+                <a14:useLocalDpi xmlns:a14="http://schemas.microsoft.com/office/drawing/2010/main" val="0"/>
+              </a:ext>
+            </a:extLst>
+          </a:blip>
+          <a:srcRect l="6038" t="9519" b="5821"/>
+          <a:stretch/>
+        </p:blipFill>
+        <p:spPr>
+          <a:xfrm>
+            <a:off x="5953184" y="4859109"/>
+            <a:ext cx="2077450" cy="1903346"/>
+          </a:xfrm>
+          <a:prstGeom prst="rect">
+            <a:avLst/>
+          </a:prstGeom>
+        </p:spPr>
+      </p:pic>
+      <p:pic>
+        <p:nvPicPr>
+          <p:cNvPr id="17" name="Picture 16">
+            <a:extLst>
+              <a:ext uri="{FF2B5EF4-FFF2-40B4-BE49-F238E27FC236}">
+                <a16:creationId xmlns:a16="http://schemas.microsoft.com/office/drawing/2014/main" id="{F7AE40B3-1B57-48C5-8C80-B7C254033593}"/>
+              </a:ext>
+            </a:extLst>
+          </p:cNvPr>
+          <p:cNvPicPr>
+            <a:picLocks noChangeAspect="1"/>
+          </p:cNvPicPr>
+          <p:nvPr/>
+        </p:nvPicPr>
+        <p:blipFill rotWithShape="1">
+          <a:blip r:embed="rId6">
+            <a:extLst>
+              <a:ext uri="{28A0092B-C50C-407E-A947-70E740481C1C}">
+                <a14:useLocalDpi xmlns:a14="http://schemas.microsoft.com/office/drawing/2010/main" val="0"/>
+              </a:ext>
+            </a:extLst>
+          </a:blip>
+          <a:srcRect l="6038" t="9519" b="5821"/>
+          <a:stretch/>
+        </p:blipFill>
+        <p:spPr>
+          <a:xfrm>
+            <a:off x="5953184" y="2845887"/>
+            <a:ext cx="2077450" cy="1903346"/>
           </a:xfrm>
           <a:prstGeom prst="rect">
             <a:avLst/>
@@ -9012,7 +9127,7 @@
     </p:spTree>
     <p:extLst>
       <p:ext uri="{BB962C8B-B14F-4D97-AF65-F5344CB8AC3E}">
-        <p14:creationId xmlns:p14="http://schemas.microsoft.com/office/powerpoint/2010/main" val="2096111951"/>
+        <p14:creationId xmlns:p14="http://schemas.microsoft.com/office/powerpoint/2010/main" val="2566605315"/>
       </p:ext>
     </p:extLst>
   </p:cSld>

</xml_diff>

<commit_message>
Autopep8 for some scripts
</commit_message>
<xml_diff>
--- a/results/plots/FIGURES.pptx
+++ b/results/plots/FIGURES.pptx
@@ -6,14 +6,13 @@
   </p:sldMasterIdLst>
   <p:sldIdLst>
     <p:sldId id="260" r:id="rId2"/>
-    <p:sldId id="257" r:id="rId3"/>
-    <p:sldId id="258" r:id="rId4"/>
-    <p:sldId id="262" r:id="rId5"/>
-    <p:sldId id="263" r:id="rId6"/>
-    <p:sldId id="259" r:id="rId7"/>
-    <p:sldId id="261" r:id="rId8"/>
-    <p:sldId id="264" r:id="rId9"/>
-    <p:sldId id="265" r:id="rId10"/>
+    <p:sldId id="258" r:id="rId3"/>
+    <p:sldId id="262" r:id="rId4"/>
+    <p:sldId id="263" r:id="rId5"/>
+    <p:sldId id="259" r:id="rId6"/>
+    <p:sldId id="261" r:id="rId7"/>
+    <p:sldId id="264" r:id="rId8"/>
+    <p:sldId id="265" r:id="rId9"/>
   </p:sldIdLst>
   <p:sldSz cx="12192000" cy="6858000"/>
   <p:notesSz cx="6858000" cy="9144000"/>
@@ -5889,1529 +5888,6 @@
           <a:chExt cx="0" cy="0"/>
         </a:xfrm>
       </p:grpSpPr>
-      <p:pic>
-        <p:nvPicPr>
-          <p:cNvPr id="7" name="Content Placeholder 6">
-            <a:extLst>
-              <a:ext uri="{FF2B5EF4-FFF2-40B4-BE49-F238E27FC236}">
-                <a16:creationId xmlns:a16="http://schemas.microsoft.com/office/drawing/2014/main" id="{981DF9AA-663D-4039-A1F8-CEFBFABB8E57}"/>
-              </a:ext>
-            </a:extLst>
-          </p:cNvPr>
-          <p:cNvPicPr>
-            <a:picLocks noGrp="1" noChangeAspect="1"/>
-          </p:cNvPicPr>
-          <p:nvPr>
-            <p:ph idx="1"/>
-          </p:nvPr>
-        </p:nvPicPr>
-        <p:blipFill rotWithShape="1">
-          <a:blip r:embed="rId2">
-            <a:extLst>
-              <a:ext uri="{28A0092B-C50C-407E-A947-70E740481C1C}">
-                <a14:useLocalDpi xmlns:a14="http://schemas.microsoft.com/office/drawing/2010/main" val="0"/>
-              </a:ext>
-            </a:extLst>
-          </a:blip>
-          <a:srcRect t="6419"/>
-          <a:stretch/>
-        </p:blipFill>
-        <p:spPr>
-          <a:xfrm>
-            <a:off x="838200" y="2664704"/>
-            <a:ext cx="10515600" cy="3023364"/>
-          </a:xfrm>
-        </p:spPr>
-      </p:pic>
-      <p:sp>
-        <p:nvSpPr>
-          <p:cNvPr id="2" name="Title 1">
-            <a:extLst>
-              <a:ext uri="{FF2B5EF4-FFF2-40B4-BE49-F238E27FC236}">
-                <a16:creationId xmlns:a16="http://schemas.microsoft.com/office/drawing/2014/main" id="{F3E6B28E-F078-4193-B215-E598325B79B2}"/>
-              </a:ext>
-            </a:extLst>
-          </p:cNvPr>
-          <p:cNvSpPr>
-            <a:spLocks noGrp="1"/>
-          </p:cNvSpPr>
-          <p:nvPr>
-            <p:ph type="title"/>
-          </p:nvPr>
-        </p:nvSpPr>
-        <p:spPr/>
-        <p:txBody>
-          <a:bodyPr/>
-          <a:lstStyle/>
-          <a:p>
-            <a:r>
-              <a:rPr lang="en-US" dirty="0"/>
-              <a:t>Figure 2 (Converted to table)</a:t>
-            </a:r>
-          </a:p>
-        </p:txBody>
-      </p:sp>
-      <p:sp>
-        <p:nvSpPr>
-          <p:cNvPr id="11" name="TextBox 10">
-            <a:extLst>
-              <a:ext uri="{FF2B5EF4-FFF2-40B4-BE49-F238E27FC236}">
-                <a16:creationId xmlns:a16="http://schemas.microsoft.com/office/drawing/2014/main" id="{D2A26610-6458-421B-B51D-2C84493B196A}"/>
-              </a:ext>
-            </a:extLst>
-          </p:cNvPr>
-          <p:cNvSpPr txBox="1"/>
-          <p:nvPr/>
-        </p:nvSpPr>
-        <p:spPr>
-          <a:xfrm>
-            <a:off x="5651768" y="5339167"/>
-            <a:ext cx="413896" cy="307777"/>
-          </a:xfrm>
-          <a:prstGeom prst="rect">
-            <a:avLst/>
-          </a:prstGeom>
-          <a:solidFill>
-            <a:schemeClr val="bg1"/>
-          </a:solidFill>
-        </p:spPr>
-        <p:txBody>
-          <a:bodyPr wrap="none" rtlCol="0">
-            <a:spAutoFit/>
-          </a:bodyPr>
-          <a:lstStyle/>
-          <a:p>
-            <a:r>
-              <a:rPr lang="en-US" sz="1400" dirty="0">
-                <a:latin typeface="Times New Roman" panose="02020603050405020304" pitchFamily="18" charset="0"/>
-                <a:cs typeface="Times New Roman" panose="02020603050405020304" pitchFamily="18" charset="0"/>
-              </a:rPr>
-              <a:t>Set</a:t>
-            </a:r>
-          </a:p>
-        </p:txBody>
-      </p:sp>
-      <p:sp>
-        <p:nvSpPr>
-          <p:cNvPr id="12" name="TextBox 11">
-            <a:extLst>
-              <a:ext uri="{FF2B5EF4-FFF2-40B4-BE49-F238E27FC236}">
-                <a16:creationId xmlns:a16="http://schemas.microsoft.com/office/drawing/2014/main" id="{6A53F9EE-7341-4945-BE60-B6CF3BE87B69}"/>
-              </a:ext>
-            </a:extLst>
-          </p:cNvPr>
-          <p:cNvSpPr txBox="1"/>
-          <p:nvPr/>
-        </p:nvSpPr>
-        <p:spPr>
-          <a:xfrm>
-            <a:off x="2537900" y="5325355"/>
-            <a:ext cx="413896" cy="307777"/>
-          </a:xfrm>
-          <a:prstGeom prst="rect">
-            <a:avLst/>
-          </a:prstGeom>
-          <a:solidFill>
-            <a:schemeClr val="bg1"/>
-          </a:solidFill>
-        </p:spPr>
-        <p:txBody>
-          <a:bodyPr wrap="none" rtlCol="0">
-            <a:spAutoFit/>
-          </a:bodyPr>
-          <a:lstStyle/>
-          <a:p>
-            <a:r>
-              <a:rPr lang="en-US" sz="1400" dirty="0">
-                <a:latin typeface="Times New Roman" panose="02020603050405020304" pitchFamily="18" charset="0"/>
-                <a:cs typeface="Times New Roman" panose="02020603050405020304" pitchFamily="18" charset="0"/>
-              </a:rPr>
-              <a:t>Set</a:t>
-            </a:r>
-          </a:p>
-        </p:txBody>
-      </p:sp>
-      <p:sp>
-        <p:nvSpPr>
-          <p:cNvPr id="13" name="TextBox 12">
-            <a:extLst>
-              <a:ext uri="{FF2B5EF4-FFF2-40B4-BE49-F238E27FC236}">
-                <a16:creationId xmlns:a16="http://schemas.microsoft.com/office/drawing/2014/main" id="{301F71EB-0675-4E3C-8AE6-566BB803E7EE}"/>
-              </a:ext>
-            </a:extLst>
-          </p:cNvPr>
-          <p:cNvSpPr txBox="1"/>
-          <p:nvPr/>
-        </p:nvSpPr>
-        <p:spPr>
-          <a:xfrm>
-            <a:off x="8765636" y="5325355"/>
-            <a:ext cx="413896" cy="307777"/>
-          </a:xfrm>
-          <a:prstGeom prst="rect">
-            <a:avLst/>
-          </a:prstGeom>
-          <a:solidFill>
-            <a:schemeClr val="bg1"/>
-          </a:solidFill>
-        </p:spPr>
-        <p:txBody>
-          <a:bodyPr wrap="none" rtlCol="0">
-            <a:spAutoFit/>
-          </a:bodyPr>
-          <a:lstStyle/>
-          <a:p>
-            <a:r>
-              <a:rPr lang="en-US" sz="1400" dirty="0">
-                <a:latin typeface="Times New Roman" panose="02020603050405020304" pitchFamily="18" charset="0"/>
-                <a:cs typeface="Times New Roman" panose="02020603050405020304" pitchFamily="18" charset="0"/>
-              </a:rPr>
-              <a:t>Set</a:t>
-            </a:r>
-          </a:p>
-        </p:txBody>
-      </p:sp>
-      <p:sp>
-        <p:nvSpPr>
-          <p:cNvPr id="14" name="TextBox 13">
-            <a:extLst>
-              <a:ext uri="{FF2B5EF4-FFF2-40B4-BE49-F238E27FC236}">
-                <a16:creationId xmlns:a16="http://schemas.microsoft.com/office/drawing/2014/main" id="{EE007ABB-DB88-44C2-8221-57D78FD24678}"/>
-              </a:ext>
-            </a:extLst>
-          </p:cNvPr>
-          <p:cNvSpPr txBox="1"/>
-          <p:nvPr/>
-        </p:nvSpPr>
-        <p:spPr>
-          <a:xfrm rot="16200000">
-            <a:off x="-90692" y="3660380"/>
-            <a:ext cx="1927131" cy="307777"/>
-          </a:xfrm>
-          <a:prstGeom prst="rect">
-            <a:avLst/>
-          </a:prstGeom>
-          <a:solidFill>
-            <a:schemeClr val="bg1"/>
-          </a:solidFill>
-        </p:spPr>
-        <p:txBody>
-          <a:bodyPr wrap="none" rtlCol="0">
-            <a:spAutoFit/>
-          </a:bodyPr>
-          <a:lstStyle/>
-          <a:p>
-            <a:r>
-              <a:rPr lang="en-US" sz="1400" dirty="0">
-                <a:latin typeface="Times New Roman" panose="02020603050405020304" pitchFamily="18" charset="0"/>
-                <a:cs typeface="Times New Roman" panose="02020603050405020304" pitchFamily="18" charset="0"/>
-              </a:rPr>
-              <a:t>Accuracy (%) ± 99% CI</a:t>
-            </a:r>
-          </a:p>
-        </p:txBody>
-      </p:sp>
-      <p:cxnSp>
-        <p:nvCxnSpPr>
-          <p:cNvPr id="16" name="Straight Connector 15">
-            <a:extLst>
-              <a:ext uri="{FF2B5EF4-FFF2-40B4-BE49-F238E27FC236}">
-                <a16:creationId xmlns:a16="http://schemas.microsoft.com/office/drawing/2014/main" id="{7CC6FB2A-FACA-4705-8242-BF31B69F0B39}"/>
-              </a:ext>
-            </a:extLst>
-          </p:cNvPr>
-          <p:cNvCxnSpPr>
-            <a:cxnSpLocks/>
-          </p:cNvCxnSpPr>
-          <p:nvPr/>
-        </p:nvCxnSpPr>
-        <p:spPr>
-          <a:xfrm>
-            <a:off x="1604078" y="2657959"/>
-            <a:ext cx="817533" cy="0"/>
-          </a:xfrm>
-          <a:prstGeom prst="line">
-            <a:avLst/>
-          </a:prstGeom>
-          <a:ln w="19050">
-            <a:solidFill>
-              <a:schemeClr val="tx1"/>
-            </a:solidFill>
-          </a:ln>
-        </p:spPr>
-        <p:style>
-          <a:lnRef idx="1">
-            <a:schemeClr val="accent1"/>
-          </a:lnRef>
-          <a:fillRef idx="0">
-            <a:schemeClr val="accent1"/>
-          </a:fillRef>
-          <a:effectRef idx="0">
-            <a:schemeClr val="accent1"/>
-          </a:effectRef>
-          <a:fontRef idx="minor">
-            <a:schemeClr val="tx1"/>
-          </a:fontRef>
-        </p:style>
-      </p:cxnSp>
-      <p:cxnSp>
-        <p:nvCxnSpPr>
-          <p:cNvPr id="19" name="Straight Connector 18">
-            <a:extLst>
-              <a:ext uri="{FF2B5EF4-FFF2-40B4-BE49-F238E27FC236}">
-                <a16:creationId xmlns:a16="http://schemas.microsoft.com/office/drawing/2014/main" id="{4619940A-3D44-471F-A1CA-D1E96AC15E8B}"/>
-              </a:ext>
-            </a:extLst>
-          </p:cNvPr>
-          <p:cNvCxnSpPr>
-            <a:cxnSpLocks/>
-          </p:cNvCxnSpPr>
-          <p:nvPr/>
-        </p:nvCxnSpPr>
-        <p:spPr>
-          <a:xfrm>
-            <a:off x="3089333" y="2657959"/>
-            <a:ext cx="817533" cy="0"/>
-          </a:xfrm>
-          <a:prstGeom prst="line">
-            <a:avLst/>
-          </a:prstGeom>
-          <a:ln w="19050">
-            <a:solidFill>
-              <a:schemeClr val="tx1"/>
-            </a:solidFill>
-          </a:ln>
-        </p:spPr>
-        <p:style>
-          <a:lnRef idx="1">
-            <a:schemeClr val="accent1"/>
-          </a:lnRef>
-          <a:fillRef idx="0">
-            <a:schemeClr val="accent1"/>
-          </a:fillRef>
-          <a:effectRef idx="0">
-            <a:schemeClr val="accent1"/>
-          </a:effectRef>
-          <a:fontRef idx="minor">
-            <a:schemeClr val="tx1"/>
-          </a:fontRef>
-        </p:style>
-      </p:cxnSp>
-      <p:sp>
-        <p:nvSpPr>
-          <p:cNvPr id="20" name="TextBox 19">
-            <a:extLst>
-              <a:ext uri="{FF2B5EF4-FFF2-40B4-BE49-F238E27FC236}">
-                <a16:creationId xmlns:a16="http://schemas.microsoft.com/office/drawing/2014/main" id="{87138E18-9EC4-443E-9BDC-6D8C049CC66D}"/>
-              </a:ext>
-            </a:extLst>
-          </p:cNvPr>
-          <p:cNvSpPr txBox="1"/>
-          <p:nvPr/>
-        </p:nvSpPr>
-        <p:spPr>
-          <a:xfrm>
-            <a:off x="1831127" y="2411738"/>
-            <a:ext cx="363434" cy="246221"/>
-          </a:xfrm>
-          <a:prstGeom prst="rect">
-            <a:avLst/>
-          </a:prstGeom>
-          <a:noFill/>
-        </p:spPr>
-        <p:txBody>
-          <a:bodyPr wrap="square" rtlCol="0">
-            <a:spAutoFit/>
-          </a:bodyPr>
-          <a:lstStyle/>
-          <a:p>
-            <a:pPr algn="ctr"/>
-            <a:r>
-              <a:rPr lang="en-US" sz="1000" dirty="0">
-                <a:latin typeface="Times New Roman" panose="02020603050405020304" pitchFamily="18" charset="0"/>
-                <a:cs typeface="Times New Roman" panose="02020603050405020304" pitchFamily="18" charset="0"/>
-              </a:rPr>
-              <a:t>n.s.</a:t>
-            </a:r>
-          </a:p>
-        </p:txBody>
-      </p:sp>
-      <p:sp>
-        <p:nvSpPr>
-          <p:cNvPr id="21" name="TextBox 20">
-            <a:extLst>
-              <a:ext uri="{FF2B5EF4-FFF2-40B4-BE49-F238E27FC236}">
-                <a16:creationId xmlns:a16="http://schemas.microsoft.com/office/drawing/2014/main" id="{AAB8A998-3EBC-43C2-9F0B-A2F92BA31576}"/>
-              </a:ext>
-            </a:extLst>
-          </p:cNvPr>
-          <p:cNvSpPr txBox="1"/>
-          <p:nvPr/>
-        </p:nvSpPr>
-        <p:spPr>
-          <a:xfrm>
-            <a:off x="3316382" y="2411738"/>
-            <a:ext cx="363434" cy="246221"/>
-          </a:xfrm>
-          <a:prstGeom prst="rect">
-            <a:avLst/>
-          </a:prstGeom>
-          <a:noFill/>
-        </p:spPr>
-        <p:txBody>
-          <a:bodyPr wrap="square" rtlCol="0">
-            <a:spAutoFit/>
-          </a:bodyPr>
-          <a:lstStyle/>
-          <a:p>
-            <a:pPr algn="ctr"/>
-            <a:r>
-              <a:rPr lang="en-US" sz="1000" dirty="0">
-                <a:latin typeface="Times New Roman" panose="02020603050405020304" pitchFamily="18" charset="0"/>
-                <a:cs typeface="Times New Roman" panose="02020603050405020304" pitchFamily="18" charset="0"/>
-              </a:rPr>
-              <a:t>n.s.</a:t>
-            </a:r>
-          </a:p>
-        </p:txBody>
-      </p:sp>
-      <p:cxnSp>
-        <p:nvCxnSpPr>
-          <p:cNvPr id="22" name="Straight Connector 21">
-            <a:extLst>
-              <a:ext uri="{FF2B5EF4-FFF2-40B4-BE49-F238E27FC236}">
-                <a16:creationId xmlns:a16="http://schemas.microsoft.com/office/drawing/2014/main" id="{7A75D440-B16B-4BAE-92CA-FE6496321E7C}"/>
-              </a:ext>
-            </a:extLst>
-          </p:cNvPr>
-          <p:cNvCxnSpPr>
-            <a:cxnSpLocks/>
-          </p:cNvCxnSpPr>
-          <p:nvPr/>
-        </p:nvCxnSpPr>
-        <p:spPr>
-          <a:xfrm>
-            <a:off x="5120905" y="2945970"/>
-            <a:ext cx="380995" cy="0"/>
-          </a:xfrm>
-          <a:prstGeom prst="line">
-            <a:avLst/>
-          </a:prstGeom>
-          <a:ln w="19050">
-            <a:solidFill>
-              <a:schemeClr val="tx1"/>
-            </a:solidFill>
-          </a:ln>
-        </p:spPr>
-        <p:style>
-          <a:lnRef idx="1">
-            <a:schemeClr val="accent1"/>
-          </a:lnRef>
-          <a:fillRef idx="0">
-            <a:schemeClr val="accent1"/>
-          </a:fillRef>
-          <a:effectRef idx="0">
-            <a:schemeClr val="accent1"/>
-          </a:effectRef>
-          <a:fontRef idx="minor">
-            <a:schemeClr val="tx1"/>
-          </a:fontRef>
-        </p:style>
-      </p:cxnSp>
-      <p:cxnSp>
-        <p:nvCxnSpPr>
-          <p:cNvPr id="24" name="Straight Connector 23">
-            <a:extLst>
-              <a:ext uri="{FF2B5EF4-FFF2-40B4-BE49-F238E27FC236}">
-                <a16:creationId xmlns:a16="http://schemas.microsoft.com/office/drawing/2014/main" id="{3D5AD9DC-4C52-4C1E-82A2-B63898E17BCF}"/>
-              </a:ext>
-            </a:extLst>
-          </p:cNvPr>
-          <p:cNvCxnSpPr>
-            <a:cxnSpLocks/>
-          </p:cNvCxnSpPr>
-          <p:nvPr/>
-        </p:nvCxnSpPr>
-        <p:spPr>
-          <a:xfrm>
-            <a:off x="4719232" y="2945970"/>
-            <a:ext cx="366798" cy="0"/>
-          </a:xfrm>
-          <a:prstGeom prst="line">
-            <a:avLst/>
-          </a:prstGeom>
-          <a:ln w="19050">
-            <a:solidFill>
-              <a:schemeClr val="tx1"/>
-            </a:solidFill>
-          </a:ln>
-        </p:spPr>
-        <p:style>
-          <a:lnRef idx="1">
-            <a:schemeClr val="accent1"/>
-          </a:lnRef>
-          <a:fillRef idx="0">
-            <a:schemeClr val="accent1"/>
-          </a:fillRef>
-          <a:effectRef idx="0">
-            <a:schemeClr val="accent1"/>
-          </a:effectRef>
-          <a:fontRef idx="minor">
-            <a:schemeClr val="tx1"/>
-          </a:fontRef>
-        </p:style>
-      </p:cxnSp>
-      <p:cxnSp>
-        <p:nvCxnSpPr>
-          <p:cNvPr id="27" name="Straight Connector 26">
-            <a:extLst>
-              <a:ext uri="{FF2B5EF4-FFF2-40B4-BE49-F238E27FC236}">
-                <a16:creationId xmlns:a16="http://schemas.microsoft.com/office/drawing/2014/main" id="{5A3271C6-09E9-4E94-8015-C4F7EF298B32}"/>
-              </a:ext>
-            </a:extLst>
-          </p:cNvPr>
-          <p:cNvCxnSpPr>
-            <a:cxnSpLocks/>
-          </p:cNvCxnSpPr>
-          <p:nvPr/>
-        </p:nvCxnSpPr>
-        <p:spPr>
-          <a:xfrm>
-            <a:off x="4729571" y="2657959"/>
-            <a:ext cx="782668" cy="0"/>
-          </a:xfrm>
-          <a:prstGeom prst="line">
-            <a:avLst/>
-          </a:prstGeom>
-          <a:ln w="19050">
-            <a:solidFill>
-              <a:schemeClr val="tx1"/>
-            </a:solidFill>
-          </a:ln>
-        </p:spPr>
-        <p:style>
-          <a:lnRef idx="1">
-            <a:schemeClr val="accent1"/>
-          </a:lnRef>
-          <a:fillRef idx="0">
-            <a:schemeClr val="accent1"/>
-          </a:fillRef>
-          <a:effectRef idx="0">
-            <a:schemeClr val="accent1"/>
-          </a:effectRef>
-          <a:fontRef idx="minor">
-            <a:schemeClr val="tx1"/>
-          </a:fontRef>
-        </p:style>
-      </p:cxnSp>
-      <p:sp>
-        <p:nvSpPr>
-          <p:cNvPr id="29" name="TextBox 28">
-            <a:extLst>
-              <a:ext uri="{FF2B5EF4-FFF2-40B4-BE49-F238E27FC236}">
-                <a16:creationId xmlns:a16="http://schemas.microsoft.com/office/drawing/2014/main" id="{79476358-A8B8-42E1-9892-ACBB3DF4691A}"/>
-              </a:ext>
-            </a:extLst>
-          </p:cNvPr>
-          <p:cNvSpPr txBox="1"/>
-          <p:nvPr/>
-        </p:nvSpPr>
-        <p:spPr>
-          <a:xfrm>
-            <a:off x="4947968" y="2411738"/>
-            <a:ext cx="363434" cy="246221"/>
-          </a:xfrm>
-          <a:prstGeom prst="rect">
-            <a:avLst/>
-          </a:prstGeom>
-          <a:noFill/>
-        </p:spPr>
-        <p:txBody>
-          <a:bodyPr wrap="square" rtlCol="0">
-            <a:spAutoFit/>
-          </a:bodyPr>
-          <a:lstStyle/>
-          <a:p>
-            <a:pPr algn="ctr"/>
-            <a:r>
-              <a:rPr lang="en-US" sz="1000" dirty="0">
-                <a:latin typeface="Times New Roman" panose="02020603050405020304" pitchFamily="18" charset="0"/>
-                <a:cs typeface="Times New Roman" panose="02020603050405020304" pitchFamily="18" charset="0"/>
-              </a:rPr>
-              <a:t>n.s.</a:t>
-            </a:r>
-          </a:p>
-        </p:txBody>
-      </p:sp>
-      <p:cxnSp>
-        <p:nvCxnSpPr>
-          <p:cNvPr id="30" name="Straight Connector 29">
-            <a:extLst>
-              <a:ext uri="{FF2B5EF4-FFF2-40B4-BE49-F238E27FC236}">
-                <a16:creationId xmlns:a16="http://schemas.microsoft.com/office/drawing/2014/main" id="{37560A6D-4576-4D13-8C6F-ACDF56F1D2E9}"/>
-              </a:ext>
-            </a:extLst>
-          </p:cNvPr>
-          <p:cNvCxnSpPr>
-            <a:cxnSpLocks/>
-          </p:cNvCxnSpPr>
-          <p:nvPr/>
-        </p:nvCxnSpPr>
-        <p:spPr>
-          <a:xfrm>
-            <a:off x="6214826" y="2657959"/>
-            <a:ext cx="782668" cy="0"/>
-          </a:xfrm>
-          <a:prstGeom prst="line">
-            <a:avLst/>
-          </a:prstGeom>
-          <a:ln w="19050">
-            <a:solidFill>
-              <a:schemeClr val="tx1"/>
-            </a:solidFill>
-          </a:ln>
-        </p:spPr>
-        <p:style>
-          <a:lnRef idx="1">
-            <a:schemeClr val="accent1"/>
-          </a:lnRef>
-          <a:fillRef idx="0">
-            <a:schemeClr val="accent1"/>
-          </a:fillRef>
-          <a:effectRef idx="0">
-            <a:schemeClr val="accent1"/>
-          </a:effectRef>
-          <a:fontRef idx="minor">
-            <a:schemeClr val="tx1"/>
-          </a:fontRef>
-        </p:style>
-      </p:cxnSp>
-      <p:sp>
-        <p:nvSpPr>
-          <p:cNvPr id="31" name="TextBox 30">
-            <a:extLst>
-              <a:ext uri="{FF2B5EF4-FFF2-40B4-BE49-F238E27FC236}">
-                <a16:creationId xmlns:a16="http://schemas.microsoft.com/office/drawing/2014/main" id="{46B02236-037F-4167-8DEE-CBF11C38213F}"/>
-              </a:ext>
-            </a:extLst>
-          </p:cNvPr>
-          <p:cNvSpPr txBox="1"/>
-          <p:nvPr/>
-        </p:nvSpPr>
-        <p:spPr>
-          <a:xfrm>
-            <a:off x="6418894" y="2417801"/>
-            <a:ext cx="363434" cy="246221"/>
-          </a:xfrm>
-          <a:prstGeom prst="rect">
-            <a:avLst/>
-          </a:prstGeom>
-          <a:noFill/>
-        </p:spPr>
-        <p:txBody>
-          <a:bodyPr wrap="square" rtlCol="0">
-            <a:spAutoFit/>
-          </a:bodyPr>
-          <a:lstStyle/>
-          <a:p>
-            <a:pPr algn="ctr"/>
-            <a:r>
-              <a:rPr lang="en-US" sz="1000" dirty="0">
-                <a:latin typeface="Times New Roman" panose="02020603050405020304" pitchFamily="18" charset="0"/>
-                <a:cs typeface="Times New Roman" panose="02020603050405020304" pitchFamily="18" charset="0"/>
-              </a:rPr>
-              <a:t>n.s.</a:t>
-            </a:r>
-          </a:p>
-        </p:txBody>
-      </p:sp>
-      <p:sp>
-        <p:nvSpPr>
-          <p:cNvPr id="32" name="TextBox 31">
-            <a:extLst>
-              <a:ext uri="{FF2B5EF4-FFF2-40B4-BE49-F238E27FC236}">
-                <a16:creationId xmlns:a16="http://schemas.microsoft.com/office/drawing/2014/main" id="{43B948B4-DDC6-4315-A030-B777FE82008C}"/>
-              </a:ext>
-            </a:extLst>
-          </p:cNvPr>
-          <p:cNvSpPr txBox="1"/>
-          <p:nvPr/>
-        </p:nvSpPr>
-        <p:spPr>
-          <a:xfrm>
-            <a:off x="5096686" y="2759945"/>
-            <a:ext cx="429431" cy="246221"/>
-          </a:xfrm>
-          <a:prstGeom prst="rect">
-            <a:avLst/>
-          </a:prstGeom>
-          <a:noFill/>
-        </p:spPr>
-        <p:txBody>
-          <a:bodyPr wrap="square" rtlCol="0">
-            <a:spAutoFit/>
-          </a:bodyPr>
-          <a:lstStyle/>
-          <a:p>
-            <a:pPr algn="ctr"/>
-            <a:r>
-              <a:rPr lang="en-US" sz="1000" dirty="0">
-                <a:latin typeface="Times New Roman" panose="02020603050405020304" pitchFamily="18" charset="0"/>
-                <a:cs typeface="Times New Roman" panose="02020603050405020304" pitchFamily="18" charset="0"/>
-              </a:rPr>
-              <a:t>***</a:t>
-            </a:r>
-          </a:p>
-        </p:txBody>
-      </p:sp>
-      <p:sp>
-        <p:nvSpPr>
-          <p:cNvPr id="33" name="TextBox 32">
-            <a:extLst>
-              <a:ext uri="{FF2B5EF4-FFF2-40B4-BE49-F238E27FC236}">
-                <a16:creationId xmlns:a16="http://schemas.microsoft.com/office/drawing/2014/main" id="{B3955643-7C48-434D-A9ED-49189D6759DB}"/>
-              </a:ext>
-            </a:extLst>
-          </p:cNvPr>
-          <p:cNvSpPr txBox="1"/>
-          <p:nvPr/>
-        </p:nvSpPr>
-        <p:spPr>
-          <a:xfrm>
-            <a:off x="4691474" y="2759944"/>
-            <a:ext cx="429431" cy="246221"/>
-          </a:xfrm>
-          <a:prstGeom prst="rect">
-            <a:avLst/>
-          </a:prstGeom>
-          <a:noFill/>
-        </p:spPr>
-        <p:txBody>
-          <a:bodyPr wrap="square" rtlCol="0">
-            <a:spAutoFit/>
-          </a:bodyPr>
-          <a:lstStyle/>
-          <a:p>
-            <a:pPr algn="ctr"/>
-            <a:r>
-              <a:rPr lang="en-US" sz="1000" dirty="0">
-                <a:latin typeface="Times New Roman" panose="02020603050405020304" pitchFamily="18" charset="0"/>
-                <a:cs typeface="Times New Roman" panose="02020603050405020304" pitchFamily="18" charset="0"/>
-              </a:rPr>
-              <a:t>***</a:t>
-            </a:r>
-          </a:p>
-        </p:txBody>
-      </p:sp>
-      <p:sp>
-        <p:nvSpPr>
-          <p:cNvPr id="34" name="TextBox 33">
-            <a:extLst>
-              <a:ext uri="{FF2B5EF4-FFF2-40B4-BE49-F238E27FC236}">
-                <a16:creationId xmlns:a16="http://schemas.microsoft.com/office/drawing/2014/main" id="{BAD2B7DA-4A90-4FD6-8AB4-B057D54793BA}"/>
-              </a:ext>
-            </a:extLst>
-          </p:cNvPr>
-          <p:cNvSpPr txBox="1"/>
-          <p:nvPr/>
-        </p:nvSpPr>
-        <p:spPr>
-          <a:xfrm>
-            <a:off x="6581941" y="2759946"/>
-            <a:ext cx="429431" cy="246221"/>
-          </a:xfrm>
-          <a:prstGeom prst="rect">
-            <a:avLst/>
-          </a:prstGeom>
-          <a:noFill/>
-        </p:spPr>
-        <p:txBody>
-          <a:bodyPr wrap="square" rtlCol="0">
-            <a:spAutoFit/>
-          </a:bodyPr>
-          <a:lstStyle/>
-          <a:p>
-            <a:pPr algn="ctr"/>
-            <a:r>
-              <a:rPr lang="en-US" sz="1000" dirty="0">
-                <a:latin typeface="Times New Roman" panose="02020603050405020304" pitchFamily="18" charset="0"/>
-                <a:cs typeface="Times New Roman" panose="02020603050405020304" pitchFamily="18" charset="0"/>
-              </a:rPr>
-              <a:t>***</a:t>
-            </a:r>
-          </a:p>
-        </p:txBody>
-      </p:sp>
-      <p:sp>
-        <p:nvSpPr>
-          <p:cNvPr id="35" name="TextBox 34">
-            <a:extLst>
-              <a:ext uri="{FF2B5EF4-FFF2-40B4-BE49-F238E27FC236}">
-                <a16:creationId xmlns:a16="http://schemas.microsoft.com/office/drawing/2014/main" id="{FF91B486-AD91-4B22-8D82-FA19E651109B}"/>
-              </a:ext>
-            </a:extLst>
-          </p:cNvPr>
-          <p:cNvSpPr txBox="1"/>
-          <p:nvPr/>
-        </p:nvSpPr>
-        <p:spPr>
-          <a:xfrm>
-            <a:off x="6176729" y="2759945"/>
-            <a:ext cx="429431" cy="246221"/>
-          </a:xfrm>
-          <a:prstGeom prst="rect">
-            <a:avLst/>
-          </a:prstGeom>
-          <a:noFill/>
-        </p:spPr>
-        <p:txBody>
-          <a:bodyPr wrap="square" rtlCol="0">
-            <a:spAutoFit/>
-          </a:bodyPr>
-          <a:lstStyle/>
-          <a:p>
-            <a:pPr algn="ctr"/>
-            <a:r>
-              <a:rPr lang="en-US" sz="1000" dirty="0">
-                <a:latin typeface="Times New Roman" panose="02020603050405020304" pitchFamily="18" charset="0"/>
-                <a:cs typeface="Times New Roman" panose="02020603050405020304" pitchFamily="18" charset="0"/>
-              </a:rPr>
-              <a:t>***</a:t>
-            </a:r>
-          </a:p>
-        </p:txBody>
-      </p:sp>
-      <p:cxnSp>
-        <p:nvCxnSpPr>
-          <p:cNvPr id="36" name="Straight Connector 35">
-            <a:extLst>
-              <a:ext uri="{FF2B5EF4-FFF2-40B4-BE49-F238E27FC236}">
-                <a16:creationId xmlns:a16="http://schemas.microsoft.com/office/drawing/2014/main" id="{F9164B92-33D6-4D3B-8799-E2B76EC99404}"/>
-              </a:ext>
-            </a:extLst>
-          </p:cNvPr>
-          <p:cNvCxnSpPr>
-            <a:cxnSpLocks/>
-          </p:cNvCxnSpPr>
-          <p:nvPr/>
-        </p:nvCxnSpPr>
-        <p:spPr>
-          <a:xfrm>
-            <a:off x="6616499" y="2945970"/>
-            <a:ext cx="380995" cy="0"/>
-          </a:xfrm>
-          <a:prstGeom prst="line">
-            <a:avLst/>
-          </a:prstGeom>
-          <a:ln w="19050">
-            <a:solidFill>
-              <a:schemeClr val="tx1"/>
-            </a:solidFill>
-          </a:ln>
-        </p:spPr>
-        <p:style>
-          <a:lnRef idx="1">
-            <a:schemeClr val="accent1"/>
-          </a:lnRef>
-          <a:fillRef idx="0">
-            <a:schemeClr val="accent1"/>
-          </a:fillRef>
-          <a:effectRef idx="0">
-            <a:schemeClr val="accent1"/>
-          </a:effectRef>
-          <a:fontRef idx="minor">
-            <a:schemeClr val="tx1"/>
-          </a:fontRef>
-        </p:style>
-      </p:cxnSp>
-      <p:cxnSp>
-        <p:nvCxnSpPr>
-          <p:cNvPr id="37" name="Straight Connector 36">
-            <a:extLst>
-              <a:ext uri="{FF2B5EF4-FFF2-40B4-BE49-F238E27FC236}">
-                <a16:creationId xmlns:a16="http://schemas.microsoft.com/office/drawing/2014/main" id="{FD29D5FD-0941-431B-990A-CCA32E3DA870}"/>
-              </a:ext>
-            </a:extLst>
-          </p:cNvPr>
-          <p:cNvCxnSpPr>
-            <a:cxnSpLocks/>
-          </p:cNvCxnSpPr>
-          <p:nvPr/>
-        </p:nvCxnSpPr>
-        <p:spPr>
-          <a:xfrm>
-            <a:off x="6214826" y="2945970"/>
-            <a:ext cx="366798" cy="0"/>
-          </a:xfrm>
-          <a:prstGeom prst="line">
-            <a:avLst/>
-          </a:prstGeom>
-          <a:ln w="19050">
-            <a:solidFill>
-              <a:schemeClr val="tx1"/>
-            </a:solidFill>
-          </a:ln>
-        </p:spPr>
-        <p:style>
-          <a:lnRef idx="1">
-            <a:schemeClr val="accent1"/>
-          </a:lnRef>
-          <a:fillRef idx="0">
-            <a:schemeClr val="accent1"/>
-          </a:fillRef>
-          <a:effectRef idx="0">
-            <a:schemeClr val="accent1"/>
-          </a:effectRef>
-          <a:fontRef idx="minor">
-            <a:schemeClr val="tx1"/>
-          </a:fontRef>
-        </p:style>
-      </p:cxnSp>
-      <p:cxnSp>
-        <p:nvCxnSpPr>
-          <p:cNvPr id="38" name="Straight Connector 37">
-            <a:extLst>
-              <a:ext uri="{FF2B5EF4-FFF2-40B4-BE49-F238E27FC236}">
-                <a16:creationId xmlns:a16="http://schemas.microsoft.com/office/drawing/2014/main" id="{EDD68DFB-83B0-4830-B2A3-02696F52BF17}"/>
-              </a:ext>
-            </a:extLst>
-          </p:cNvPr>
-          <p:cNvCxnSpPr>
-            <a:cxnSpLocks/>
-          </p:cNvCxnSpPr>
-          <p:nvPr/>
-        </p:nvCxnSpPr>
-        <p:spPr>
-          <a:xfrm>
-            <a:off x="7828277" y="3506062"/>
-            <a:ext cx="380995" cy="0"/>
-          </a:xfrm>
-          <a:prstGeom prst="line">
-            <a:avLst/>
-          </a:prstGeom>
-          <a:ln w="19050">
-            <a:solidFill>
-              <a:schemeClr val="tx1"/>
-            </a:solidFill>
-          </a:ln>
-        </p:spPr>
-        <p:style>
-          <a:lnRef idx="1">
-            <a:schemeClr val="accent1"/>
-          </a:lnRef>
-          <a:fillRef idx="0">
-            <a:schemeClr val="accent1"/>
-          </a:fillRef>
-          <a:effectRef idx="0">
-            <a:schemeClr val="accent1"/>
-          </a:effectRef>
-          <a:fontRef idx="minor">
-            <a:schemeClr val="tx1"/>
-          </a:fontRef>
-        </p:style>
-      </p:cxnSp>
-      <p:sp>
-        <p:nvSpPr>
-          <p:cNvPr id="41" name="TextBox 40">
-            <a:extLst>
-              <a:ext uri="{FF2B5EF4-FFF2-40B4-BE49-F238E27FC236}">
-                <a16:creationId xmlns:a16="http://schemas.microsoft.com/office/drawing/2014/main" id="{C7842704-C940-4498-80E4-42EC776DC828}"/>
-              </a:ext>
-            </a:extLst>
-          </p:cNvPr>
-          <p:cNvSpPr txBox="1"/>
-          <p:nvPr/>
-        </p:nvSpPr>
-        <p:spPr>
-          <a:xfrm>
-            <a:off x="9454551" y="2417801"/>
-            <a:ext cx="429431" cy="246221"/>
-          </a:xfrm>
-          <a:prstGeom prst="rect">
-            <a:avLst/>
-          </a:prstGeom>
-          <a:noFill/>
-        </p:spPr>
-        <p:txBody>
-          <a:bodyPr wrap="square" rtlCol="0">
-            <a:spAutoFit/>
-          </a:bodyPr>
-          <a:lstStyle/>
-          <a:p>
-            <a:pPr algn="ctr"/>
-            <a:r>
-              <a:rPr lang="en-US" sz="1000" dirty="0">
-                <a:latin typeface="Times New Roman" panose="02020603050405020304" pitchFamily="18" charset="0"/>
-                <a:cs typeface="Times New Roman" panose="02020603050405020304" pitchFamily="18" charset="0"/>
-              </a:rPr>
-              <a:t>***</a:t>
-            </a:r>
-          </a:p>
-        </p:txBody>
-      </p:sp>
-      <p:cxnSp>
-        <p:nvCxnSpPr>
-          <p:cNvPr id="42" name="Straight Connector 41">
-            <a:extLst>
-              <a:ext uri="{FF2B5EF4-FFF2-40B4-BE49-F238E27FC236}">
-                <a16:creationId xmlns:a16="http://schemas.microsoft.com/office/drawing/2014/main" id="{825E5A9B-A661-4A2D-BDBD-0D444490A317}"/>
-              </a:ext>
-            </a:extLst>
-          </p:cNvPr>
-          <p:cNvCxnSpPr>
-            <a:cxnSpLocks/>
-          </p:cNvCxnSpPr>
-          <p:nvPr/>
-        </p:nvCxnSpPr>
-        <p:spPr>
-          <a:xfrm>
-            <a:off x="9292668" y="2657959"/>
-            <a:ext cx="783982" cy="0"/>
-          </a:xfrm>
-          <a:prstGeom prst="line">
-            <a:avLst/>
-          </a:prstGeom>
-          <a:ln w="19050">
-            <a:solidFill>
-              <a:schemeClr val="tx1"/>
-            </a:solidFill>
-          </a:ln>
-        </p:spPr>
-        <p:style>
-          <a:lnRef idx="1">
-            <a:schemeClr val="accent1"/>
-          </a:lnRef>
-          <a:fillRef idx="0">
-            <a:schemeClr val="accent1"/>
-          </a:fillRef>
-          <a:effectRef idx="0">
-            <a:schemeClr val="accent1"/>
-          </a:effectRef>
-          <a:fontRef idx="minor">
-            <a:schemeClr val="tx1"/>
-          </a:fontRef>
-        </p:style>
-      </p:cxnSp>
-      <p:sp>
-        <p:nvSpPr>
-          <p:cNvPr id="43" name="TextBox 42">
-            <a:extLst>
-              <a:ext uri="{FF2B5EF4-FFF2-40B4-BE49-F238E27FC236}">
-                <a16:creationId xmlns:a16="http://schemas.microsoft.com/office/drawing/2014/main" id="{BAD732C9-4FF4-40C4-A3A2-915EFD60F4C6}"/>
-              </a:ext>
-            </a:extLst>
-          </p:cNvPr>
-          <p:cNvSpPr txBox="1"/>
-          <p:nvPr/>
-        </p:nvSpPr>
-        <p:spPr>
-          <a:xfrm>
-            <a:off x="9268449" y="3305889"/>
-            <a:ext cx="429431" cy="246221"/>
-          </a:xfrm>
-          <a:prstGeom prst="rect">
-            <a:avLst/>
-          </a:prstGeom>
-          <a:noFill/>
-        </p:spPr>
-        <p:txBody>
-          <a:bodyPr wrap="square" rtlCol="0">
-            <a:spAutoFit/>
-          </a:bodyPr>
-          <a:lstStyle/>
-          <a:p>
-            <a:pPr algn="ctr"/>
-            <a:r>
-              <a:rPr lang="en-US" sz="1000" dirty="0">
-                <a:latin typeface="Times New Roman" panose="02020603050405020304" pitchFamily="18" charset="0"/>
-                <a:cs typeface="Times New Roman" panose="02020603050405020304" pitchFamily="18" charset="0"/>
-              </a:rPr>
-              <a:t>***</a:t>
-            </a:r>
-          </a:p>
-        </p:txBody>
-      </p:sp>
-      <p:cxnSp>
-        <p:nvCxnSpPr>
-          <p:cNvPr id="46" name="Straight Connector 45">
-            <a:extLst>
-              <a:ext uri="{FF2B5EF4-FFF2-40B4-BE49-F238E27FC236}">
-                <a16:creationId xmlns:a16="http://schemas.microsoft.com/office/drawing/2014/main" id="{55884C9A-E556-4E67-B1F8-B6F27B27AE04}"/>
-              </a:ext>
-            </a:extLst>
-          </p:cNvPr>
-          <p:cNvCxnSpPr>
-            <a:cxnSpLocks/>
-          </p:cNvCxnSpPr>
-          <p:nvPr/>
-        </p:nvCxnSpPr>
-        <p:spPr>
-          <a:xfrm>
-            <a:off x="7851581" y="2657959"/>
-            <a:ext cx="761990" cy="0"/>
-          </a:xfrm>
-          <a:prstGeom prst="line">
-            <a:avLst/>
-          </a:prstGeom>
-          <a:ln w="19050">
-            <a:solidFill>
-              <a:schemeClr val="tx1"/>
-            </a:solidFill>
-          </a:ln>
-        </p:spPr>
-        <p:style>
-          <a:lnRef idx="1">
-            <a:schemeClr val="accent1"/>
-          </a:lnRef>
-          <a:fillRef idx="0">
-            <a:schemeClr val="accent1"/>
-          </a:fillRef>
-          <a:effectRef idx="0">
-            <a:schemeClr val="accent1"/>
-          </a:effectRef>
-          <a:fontRef idx="minor">
-            <a:schemeClr val="tx1"/>
-          </a:fontRef>
-        </p:style>
-      </p:cxnSp>
-      <p:sp>
-        <p:nvSpPr>
-          <p:cNvPr id="47" name="TextBox 46">
-            <a:extLst>
-              <a:ext uri="{FF2B5EF4-FFF2-40B4-BE49-F238E27FC236}">
-                <a16:creationId xmlns:a16="http://schemas.microsoft.com/office/drawing/2014/main" id="{571358FF-869E-4BD8-9365-C908CB2A1B58}"/>
-              </a:ext>
-            </a:extLst>
-          </p:cNvPr>
-          <p:cNvSpPr txBox="1"/>
-          <p:nvPr/>
-        </p:nvSpPr>
-        <p:spPr>
-          <a:xfrm>
-            <a:off x="8011307" y="2410279"/>
-            <a:ext cx="429431" cy="246221"/>
-          </a:xfrm>
-          <a:prstGeom prst="rect">
-            <a:avLst/>
-          </a:prstGeom>
-          <a:noFill/>
-        </p:spPr>
-        <p:txBody>
-          <a:bodyPr wrap="square" rtlCol="0">
-            <a:spAutoFit/>
-          </a:bodyPr>
-          <a:lstStyle/>
-          <a:p>
-            <a:pPr algn="ctr"/>
-            <a:r>
-              <a:rPr lang="en-US" sz="1000" dirty="0">
-                <a:latin typeface="Times New Roman" panose="02020603050405020304" pitchFamily="18" charset="0"/>
-                <a:cs typeface="Times New Roman" panose="02020603050405020304" pitchFamily="18" charset="0"/>
-              </a:rPr>
-              <a:t>***</a:t>
-            </a:r>
-          </a:p>
-        </p:txBody>
-      </p:sp>
-      <p:sp>
-        <p:nvSpPr>
-          <p:cNvPr id="49" name="TextBox 48">
-            <a:extLst>
-              <a:ext uri="{FF2B5EF4-FFF2-40B4-BE49-F238E27FC236}">
-                <a16:creationId xmlns:a16="http://schemas.microsoft.com/office/drawing/2014/main" id="{11ED2B12-BE38-48FB-9198-12420CCB0EED}"/>
-              </a:ext>
-            </a:extLst>
-          </p:cNvPr>
-          <p:cNvSpPr txBox="1"/>
-          <p:nvPr/>
-        </p:nvSpPr>
-        <p:spPr>
-          <a:xfrm>
-            <a:off x="2182033" y="2196293"/>
-            <a:ext cx="1125629" cy="307777"/>
-          </a:xfrm>
-          <a:prstGeom prst="rect">
-            <a:avLst/>
-          </a:prstGeom>
-          <a:solidFill>
-            <a:schemeClr val="bg1"/>
-          </a:solidFill>
-        </p:spPr>
-        <p:txBody>
-          <a:bodyPr wrap="none" rtlCol="0">
-            <a:spAutoFit/>
-          </a:bodyPr>
-          <a:lstStyle/>
-          <a:p>
-            <a:pPr algn="ctr"/>
-            <a:r>
-              <a:rPr lang="en-US" sz="1400" dirty="0">
-                <a:latin typeface="Times New Roman" panose="02020603050405020304" pitchFamily="18" charset="0"/>
-                <a:cs typeface="Times New Roman" panose="02020603050405020304" pitchFamily="18" charset="0"/>
-              </a:rPr>
-              <a:t>Spanish (ES)</a:t>
-            </a:r>
-          </a:p>
-        </p:txBody>
-      </p:sp>
-      <p:sp>
-        <p:nvSpPr>
-          <p:cNvPr id="52" name="TextBox 51">
-            <a:extLst>
-              <a:ext uri="{FF2B5EF4-FFF2-40B4-BE49-F238E27FC236}">
-                <a16:creationId xmlns:a16="http://schemas.microsoft.com/office/drawing/2014/main" id="{5A635ED0-5D4C-495C-BEA6-7B41BD819BB0}"/>
-              </a:ext>
-            </a:extLst>
-          </p:cNvPr>
-          <p:cNvSpPr txBox="1"/>
-          <p:nvPr/>
-        </p:nvSpPr>
-        <p:spPr>
-          <a:xfrm>
-            <a:off x="5287899" y="2196293"/>
-            <a:ext cx="1135247" cy="307777"/>
-          </a:xfrm>
-          <a:prstGeom prst="rect">
-            <a:avLst/>
-          </a:prstGeom>
-          <a:solidFill>
-            <a:schemeClr val="bg1"/>
-          </a:solidFill>
-        </p:spPr>
-        <p:txBody>
-          <a:bodyPr wrap="none" rtlCol="0">
-            <a:spAutoFit/>
-          </a:bodyPr>
-          <a:lstStyle/>
-          <a:p>
-            <a:pPr algn="ctr"/>
-            <a:r>
-              <a:rPr lang="en-US" sz="1400" dirty="0">
-                <a:latin typeface="Times New Roman" panose="02020603050405020304" pitchFamily="18" charset="0"/>
-                <a:cs typeface="Times New Roman" panose="02020603050405020304" pitchFamily="18" charset="0"/>
-              </a:rPr>
-              <a:t>English (EN)</a:t>
-            </a:r>
-          </a:p>
-        </p:txBody>
-      </p:sp>
-      <p:sp>
-        <p:nvSpPr>
-          <p:cNvPr id="53" name="TextBox 52">
-            <a:extLst>
-              <a:ext uri="{FF2B5EF4-FFF2-40B4-BE49-F238E27FC236}">
-                <a16:creationId xmlns:a16="http://schemas.microsoft.com/office/drawing/2014/main" id="{505C270D-9F24-40AE-9A4B-A14316CD7D2E}"/>
-              </a:ext>
-            </a:extLst>
-          </p:cNvPr>
-          <p:cNvSpPr txBox="1"/>
-          <p:nvPr/>
-        </p:nvSpPr>
-        <p:spPr>
-          <a:xfrm>
-            <a:off x="8413776" y="2194155"/>
-            <a:ext cx="1117615" cy="307777"/>
-          </a:xfrm>
-          <a:prstGeom prst="rect">
-            <a:avLst/>
-          </a:prstGeom>
-          <a:solidFill>
-            <a:schemeClr val="bg1"/>
-          </a:solidFill>
-        </p:spPr>
-        <p:txBody>
-          <a:bodyPr wrap="none" rtlCol="0">
-            <a:spAutoFit/>
-          </a:bodyPr>
-          <a:lstStyle/>
-          <a:p>
-            <a:pPr algn="ctr"/>
-            <a:r>
-              <a:rPr lang="en-US" sz="1400" dirty="0">
-                <a:latin typeface="Times New Roman" panose="02020603050405020304" pitchFamily="18" charset="0"/>
-                <a:cs typeface="Times New Roman" panose="02020603050405020304" pitchFamily="18" charset="0"/>
-              </a:rPr>
-              <a:t>Basque (EU)</a:t>
-            </a:r>
-          </a:p>
-        </p:txBody>
-      </p:sp>
-      <p:sp>
-        <p:nvSpPr>
-          <p:cNvPr id="54" name="TextBox 53">
-            <a:extLst>
-              <a:ext uri="{FF2B5EF4-FFF2-40B4-BE49-F238E27FC236}">
-                <a16:creationId xmlns:a16="http://schemas.microsoft.com/office/drawing/2014/main" id="{65410239-08B7-44D2-B9D9-39E6DE726ADF}"/>
-              </a:ext>
-            </a:extLst>
-          </p:cNvPr>
-          <p:cNvSpPr txBox="1"/>
-          <p:nvPr/>
-        </p:nvSpPr>
-        <p:spPr>
-          <a:xfrm>
-            <a:off x="7804058" y="3305888"/>
-            <a:ext cx="429431" cy="246221"/>
-          </a:xfrm>
-          <a:prstGeom prst="rect">
-            <a:avLst/>
-          </a:prstGeom>
-          <a:noFill/>
-        </p:spPr>
-        <p:txBody>
-          <a:bodyPr wrap="square" rtlCol="0">
-            <a:spAutoFit/>
-          </a:bodyPr>
-          <a:lstStyle/>
-          <a:p>
-            <a:pPr algn="ctr"/>
-            <a:r>
-              <a:rPr lang="en-US" sz="1000" dirty="0">
-                <a:latin typeface="Times New Roman" panose="02020603050405020304" pitchFamily="18" charset="0"/>
-                <a:cs typeface="Times New Roman" panose="02020603050405020304" pitchFamily="18" charset="0"/>
-              </a:rPr>
-              <a:t>***</a:t>
-            </a:r>
-          </a:p>
-        </p:txBody>
-      </p:sp>
-      <p:sp>
-        <p:nvSpPr>
-          <p:cNvPr id="55" name="TextBox 54">
-            <a:extLst>
-              <a:ext uri="{FF2B5EF4-FFF2-40B4-BE49-F238E27FC236}">
-                <a16:creationId xmlns:a16="http://schemas.microsoft.com/office/drawing/2014/main" id="{2CBEA336-F452-4B27-B7A2-17A6D5A438EE}"/>
-              </a:ext>
-            </a:extLst>
-          </p:cNvPr>
-          <p:cNvSpPr txBox="1"/>
-          <p:nvPr/>
-        </p:nvSpPr>
-        <p:spPr>
-          <a:xfrm>
-            <a:off x="8233489" y="2646564"/>
-            <a:ext cx="429431" cy="246221"/>
-          </a:xfrm>
-          <a:prstGeom prst="rect">
-            <a:avLst/>
-          </a:prstGeom>
-          <a:noFill/>
-        </p:spPr>
-        <p:txBody>
-          <a:bodyPr wrap="square" rtlCol="0">
-            <a:spAutoFit/>
-          </a:bodyPr>
-          <a:lstStyle/>
-          <a:p>
-            <a:pPr algn="ctr"/>
-            <a:r>
-              <a:rPr lang="en-US" sz="1000" dirty="0">
-                <a:latin typeface="Times New Roman" panose="02020603050405020304" pitchFamily="18" charset="0"/>
-                <a:cs typeface="Times New Roman" panose="02020603050405020304" pitchFamily="18" charset="0"/>
-              </a:rPr>
-              <a:t>***</a:t>
-            </a:r>
-          </a:p>
-        </p:txBody>
-      </p:sp>
-      <p:cxnSp>
-        <p:nvCxnSpPr>
-          <p:cNvPr id="56" name="Straight Connector 55">
-            <a:extLst>
-              <a:ext uri="{FF2B5EF4-FFF2-40B4-BE49-F238E27FC236}">
-                <a16:creationId xmlns:a16="http://schemas.microsoft.com/office/drawing/2014/main" id="{73D42AEC-CE2E-450E-B19C-0A06468DFFD2}"/>
-              </a:ext>
-            </a:extLst>
-          </p:cNvPr>
-          <p:cNvCxnSpPr>
-            <a:cxnSpLocks/>
-          </p:cNvCxnSpPr>
-          <p:nvPr/>
-        </p:nvCxnSpPr>
-        <p:spPr>
-          <a:xfrm>
-            <a:off x="8257708" y="2829363"/>
-            <a:ext cx="380995" cy="0"/>
-          </a:xfrm>
-          <a:prstGeom prst="line">
-            <a:avLst/>
-          </a:prstGeom>
-          <a:ln w="19050">
-            <a:solidFill>
-              <a:schemeClr val="tx1"/>
-            </a:solidFill>
-          </a:ln>
-        </p:spPr>
-        <p:style>
-          <a:lnRef idx="1">
-            <a:schemeClr val="accent1"/>
-          </a:lnRef>
-          <a:fillRef idx="0">
-            <a:schemeClr val="accent1"/>
-          </a:fillRef>
-          <a:effectRef idx="0">
-            <a:schemeClr val="accent1"/>
-          </a:effectRef>
-          <a:fontRef idx="minor">
-            <a:schemeClr val="tx1"/>
-          </a:fontRef>
-        </p:style>
-      </p:cxnSp>
-      <p:sp>
-        <p:nvSpPr>
-          <p:cNvPr id="59" name="TextBox 58">
-            <a:extLst>
-              <a:ext uri="{FF2B5EF4-FFF2-40B4-BE49-F238E27FC236}">
-                <a16:creationId xmlns:a16="http://schemas.microsoft.com/office/drawing/2014/main" id="{3E87625C-F3C5-4B6D-8958-F22BB6D3E179}"/>
-              </a:ext>
-            </a:extLst>
-          </p:cNvPr>
-          <p:cNvSpPr txBox="1"/>
-          <p:nvPr/>
-        </p:nvSpPr>
-        <p:spPr>
-          <a:xfrm>
-            <a:off x="9693393" y="2646565"/>
-            <a:ext cx="429431" cy="246221"/>
-          </a:xfrm>
-          <a:prstGeom prst="rect">
-            <a:avLst/>
-          </a:prstGeom>
-          <a:noFill/>
-        </p:spPr>
-        <p:txBody>
-          <a:bodyPr wrap="square" rtlCol="0">
-            <a:spAutoFit/>
-          </a:bodyPr>
-          <a:lstStyle/>
-          <a:p>
-            <a:pPr algn="ctr"/>
-            <a:r>
-              <a:rPr lang="en-US" sz="1000" dirty="0">
-                <a:latin typeface="Times New Roman" panose="02020603050405020304" pitchFamily="18" charset="0"/>
-                <a:cs typeface="Times New Roman" panose="02020603050405020304" pitchFamily="18" charset="0"/>
-              </a:rPr>
-              <a:t>***</a:t>
-            </a:r>
-          </a:p>
-        </p:txBody>
-      </p:sp>
-      <p:cxnSp>
-        <p:nvCxnSpPr>
-          <p:cNvPr id="61" name="Straight Connector 60">
-            <a:extLst>
-              <a:ext uri="{FF2B5EF4-FFF2-40B4-BE49-F238E27FC236}">
-                <a16:creationId xmlns:a16="http://schemas.microsoft.com/office/drawing/2014/main" id="{F2A9D6A6-C89B-4751-A197-9712D0D10446}"/>
-              </a:ext>
-            </a:extLst>
-          </p:cNvPr>
-          <p:cNvCxnSpPr>
-            <a:cxnSpLocks/>
-          </p:cNvCxnSpPr>
-          <p:nvPr/>
-        </p:nvCxnSpPr>
-        <p:spPr>
-          <a:xfrm>
-            <a:off x="9303664" y="3506062"/>
-            <a:ext cx="380995" cy="0"/>
-          </a:xfrm>
-          <a:prstGeom prst="line">
-            <a:avLst/>
-          </a:prstGeom>
-          <a:ln w="19050">
-            <a:solidFill>
-              <a:schemeClr val="tx1"/>
-            </a:solidFill>
-          </a:ln>
-        </p:spPr>
-        <p:style>
-          <a:lnRef idx="1">
-            <a:schemeClr val="accent1"/>
-          </a:lnRef>
-          <a:fillRef idx="0">
-            <a:schemeClr val="accent1"/>
-          </a:fillRef>
-          <a:effectRef idx="0">
-            <a:schemeClr val="accent1"/>
-          </a:effectRef>
-          <a:fontRef idx="minor">
-            <a:schemeClr val="tx1"/>
-          </a:fontRef>
-        </p:style>
-      </p:cxnSp>
-      <p:cxnSp>
-        <p:nvCxnSpPr>
-          <p:cNvPr id="62" name="Straight Connector 61">
-            <a:extLst>
-              <a:ext uri="{FF2B5EF4-FFF2-40B4-BE49-F238E27FC236}">
-                <a16:creationId xmlns:a16="http://schemas.microsoft.com/office/drawing/2014/main" id="{FDA4883E-D5A2-4F3A-A8E6-2108C75934D2}"/>
-              </a:ext>
-            </a:extLst>
-          </p:cNvPr>
-          <p:cNvCxnSpPr>
-            <a:cxnSpLocks/>
-          </p:cNvCxnSpPr>
-          <p:nvPr/>
-        </p:nvCxnSpPr>
-        <p:spPr>
-          <a:xfrm>
-            <a:off x="9723269" y="2839312"/>
-            <a:ext cx="380995" cy="0"/>
-          </a:xfrm>
-          <a:prstGeom prst="line">
-            <a:avLst/>
-          </a:prstGeom>
-          <a:ln w="19050">
-            <a:solidFill>
-              <a:schemeClr val="tx1"/>
-            </a:solidFill>
-          </a:ln>
-        </p:spPr>
-        <p:style>
-          <a:lnRef idx="1">
-            <a:schemeClr val="accent1"/>
-          </a:lnRef>
-          <a:fillRef idx="0">
-            <a:schemeClr val="accent1"/>
-          </a:fillRef>
-          <a:effectRef idx="0">
-            <a:schemeClr val="accent1"/>
-          </a:effectRef>
-          <a:fontRef idx="minor">
-            <a:schemeClr val="tx1"/>
-          </a:fontRef>
-        </p:style>
-      </p:cxnSp>
-    </p:spTree>
-    <p:extLst>
-      <p:ext uri="{BB962C8B-B14F-4D97-AF65-F5344CB8AC3E}">
-        <p14:creationId xmlns:p14="http://schemas.microsoft.com/office/powerpoint/2010/main" val="2395570493"/>
-      </p:ext>
-    </p:extLst>
-  </p:cSld>
-  <p:clrMapOvr>
-    <a:masterClrMapping/>
-  </p:clrMapOvr>
-</p:sld>
-</file>
-
-<file path=ppt/slides/slide3.xml><?xml version="1.0" encoding="utf-8"?>
-<p:sld xmlns:a="http://schemas.openxmlformats.org/drawingml/2006/main" xmlns:r="http://schemas.openxmlformats.org/officeDocument/2006/relationships" xmlns:p="http://schemas.openxmlformats.org/presentationml/2006/main">
-  <p:cSld>
-    <p:spTree>
-      <p:nvGrpSpPr>
-        <p:cNvPr id="1" name=""/>
-        <p:cNvGrpSpPr/>
-        <p:nvPr/>
-      </p:nvGrpSpPr>
-      <p:grpSpPr>
-        <a:xfrm>
-          <a:off x="0" y="0"/>
-          <a:ext cx="0" cy="0"/>
-          <a:chOff x="0" y="0"/>
-          <a:chExt cx="0" cy="0"/>
-        </a:xfrm>
-      </p:grpSpPr>
       <p:sp>
         <p:nvSpPr>
           <p:cNvPr id="2" name="Title 1">
@@ -7489,7 +5965,7 @@
 </p:sld>
 </file>
 
-<file path=ppt/slides/slide4.xml><?xml version="1.0" encoding="utf-8"?>
+<file path=ppt/slides/slide3.xml><?xml version="1.0" encoding="utf-8"?>
 <p:sld xmlns:a="http://schemas.openxmlformats.org/drawingml/2006/main" xmlns:r="http://schemas.openxmlformats.org/officeDocument/2006/relationships" xmlns:p="http://schemas.openxmlformats.org/presentationml/2006/main">
   <p:cSld>
     <p:spTree>
@@ -7690,6 +6166,42 @@
           </p:spPr>
         </p:pic>
       </p:grpSp>
+      <p:pic>
+        <p:nvPicPr>
+          <p:cNvPr id="8" name="Picture 7">
+            <a:extLst>
+              <a:ext uri="{FF2B5EF4-FFF2-40B4-BE49-F238E27FC236}">
+                <a16:creationId xmlns:a16="http://schemas.microsoft.com/office/drawing/2014/main" id="{9340FB03-CC0E-4697-B710-B8725093E061}"/>
+              </a:ext>
+            </a:extLst>
+          </p:cNvPr>
+          <p:cNvPicPr>
+            <a:picLocks noChangeAspect="1"/>
+          </p:cNvPicPr>
+          <p:nvPr/>
+        </p:nvPicPr>
+        <p:blipFill>
+          <a:blip r:embed="rId5">
+            <a:extLst>
+              <a:ext uri="{28A0092B-C50C-407E-A947-70E740481C1C}">
+                <a14:useLocalDpi xmlns:a14="http://schemas.microsoft.com/office/drawing/2010/main" val="0"/>
+              </a:ext>
+            </a:extLst>
+          </a:blip>
+          <a:stretch>
+            <a:fillRect/>
+          </a:stretch>
+        </p:blipFill>
+        <p:spPr>
+          <a:xfrm>
+            <a:off x="6096000" y="1343816"/>
+            <a:ext cx="5256565" cy="4882034"/>
+          </a:xfrm>
+          <a:prstGeom prst="rect">
+            <a:avLst/>
+          </a:prstGeom>
+        </p:spPr>
+      </p:pic>
     </p:spTree>
     <p:extLst>
       <p:ext uri="{BB962C8B-B14F-4D97-AF65-F5344CB8AC3E}">
@@ -7703,7 +6215,7 @@
 </p:sld>
 </file>
 
-<file path=ppt/slides/slide5.xml><?xml version="1.0" encoding="utf-8"?>
+<file path=ppt/slides/slide4.xml><?xml version="1.0" encoding="utf-8"?>
 <p:sld xmlns:a="http://schemas.openxmlformats.org/drawingml/2006/main" xmlns:r="http://schemas.openxmlformats.org/officeDocument/2006/relationships" xmlns:p="http://schemas.openxmlformats.org/presentationml/2006/main">
   <p:cSld>
     <p:spTree>
@@ -7863,6 +6375,42 @@
           </a:prstGeom>
         </p:spPr>
       </p:pic>
+      <p:pic>
+        <p:nvPicPr>
+          <p:cNvPr id="6" name="Picture 5">
+            <a:extLst>
+              <a:ext uri="{FF2B5EF4-FFF2-40B4-BE49-F238E27FC236}">
+                <a16:creationId xmlns:a16="http://schemas.microsoft.com/office/drawing/2014/main" id="{0815A90D-5178-47B7-9DD2-BAFE7ED029D1}"/>
+              </a:ext>
+            </a:extLst>
+          </p:cNvPr>
+          <p:cNvPicPr>
+            <a:picLocks noChangeAspect="1"/>
+          </p:cNvPicPr>
+          <p:nvPr/>
+        </p:nvPicPr>
+        <p:blipFill>
+          <a:blip r:embed="rId5">
+            <a:extLst>
+              <a:ext uri="{28A0092B-C50C-407E-A947-70E740481C1C}">
+                <a14:useLocalDpi xmlns:a14="http://schemas.microsoft.com/office/drawing/2010/main" val="0"/>
+              </a:ext>
+            </a:extLst>
+          </a:blip>
+          <a:stretch>
+            <a:fillRect/>
+          </a:stretch>
+        </p:blipFill>
+        <p:spPr>
+          <a:xfrm>
+            <a:off x="6096000" y="1343816"/>
+            <a:ext cx="5256565" cy="4882034"/>
+          </a:xfrm>
+          <a:prstGeom prst="rect">
+            <a:avLst/>
+          </a:prstGeom>
+        </p:spPr>
+      </p:pic>
     </p:spTree>
     <p:extLst>
       <p:ext uri="{BB962C8B-B14F-4D97-AF65-F5344CB8AC3E}">
@@ -7876,7 +6424,7 @@
 </p:sld>
 </file>
 
-<file path=ppt/slides/slide6.xml><?xml version="1.0" encoding="utf-8"?>
+<file path=ppt/slides/slide5.xml><?xml version="1.0" encoding="utf-8"?>
 <p:sld xmlns:a="http://schemas.openxmlformats.org/drawingml/2006/main" xmlns:r="http://schemas.openxmlformats.org/officeDocument/2006/relationships" xmlns:p="http://schemas.openxmlformats.org/presentationml/2006/main">
   <p:cSld>
     <p:spTree>
@@ -8077,10 +6625,247 @@
           </p:spPr>
         </p:pic>
       </p:grpSp>
+      <p:pic>
+        <p:nvPicPr>
+          <p:cNvPr id="4" name="Picture 3">
+            <a:extLst>
+              <a:ext uri="{FF2B5EF4-FFF2-40B4-BE49-F238E27FC236}">
+                <a16:creationId xmlns:a16="http://schemas.microsoft.com/office/drawing/2014/main" id="{B2ABF22B-EF24-4534-8522-A39210E50695}"/>
+              </a:ext>
+            </a:extLst>
+          </p:cNvPr>
+          <p:cNvPicPr>
+            <a:picLocks noChangeAspect="1"/>
+          </p:cNvPicPr>
+          <p:nvPr/>
+        </p:nvPicPr>
+        <p:blipFill>
+          <a:blip r:embed="rId5">
+            <a:extLst>
+              <a:ext uri="{28A0092B-C50C-407E-A947-70E740481C1C}">
+                <a14:useLocalDpi xmlns:a14="http://schemas.microsoft.com/office/drawing/2010/main" val="0"/>
+              </a:ext>
+            </a:extLst>
+          </a:blip>
+          <a:stretch>
+            <a:fillRect/>
+          </a:stretch>
+        </p:blipFill>
+        <p:spPr>
+          <a:xfrm>
+            <a:off x="6095999" y="1343815"/>
+            <a:ext cx="5256565" cy="4882034"/>
+          </a:xfrm>
+          <a:prstGeom prst="rect">
+            <a:avLst/>
+          </a:prstGeom>
+        </p:spPr>
+      </p:pic>
     </p:spTree>
     <p:extLst>
       <p:ext uri="{BB962C8B-B14F-4D97-AF65-F5344CB8AC3E}">
         <p14:creationId xmlns:p14="http://schemas.microsoft.com/office/powerpoint/2010/main" val="1934448488"/>
+      </p:ext>
+    </p:extLst>
+  </p:cSld>
+  <p:clrMapOvr>
+    <a:masterClrMapping/>
+  </p:clrMapOvr>
+</p:sld>
+</file>
+
+<file path=ppt/slides/slide6.xml><?xml version="1.0" encoding="utf-8"?>
+<p:sld xmlns:a="http://schemas.openxmlformats.org/drawingml/2006/main" xmlns:r="http://schemas.openxmlformats.org/officeDocument/2006/relationships" xmlns:p="http://schemas.openxmlformats.org/presentationml/2006/main">
+  <p:cSld>
+    <p:spTree>
+      <p:nvGrpSpPr>
+        <p:cNvPr id="1" name=""/>
+        <p:cNvGrpSpPr/>
+        <p:nvPr/>
+      </p:nvGrpSpPr>
+      <p:grpSpPr>
+        <a:xfrm>
+          <a:off x="0" y="0"/>
+          <a:ext cx="0" cy="0"/>
+          <a:chOff x="0" y="0"/>
+          <a:chExt cx="0" cy="0"/>
+        </a:xfrm>
+      </p:grpSpPr>
+      <p:pic>
+        <p:nvPicPr>
+          <p:cNvPr id="12" name="Picture 11">
+            <a:extLst>
+              <a:ext uri="{FF2B5EF4-FFF2-40B4-BE49-F238E27FC236}">
+                <a16:creationId xmlns:a16="http://schemas.microsoft.com/office/drawing/2014/main" id="{AFE3D6D8-1D1B-4007-9C15-0773AC973C90}"/>
+              </a:ext>
+            </a:extLst>
+          </p:cNvPr>
+          <p:cNvPicPr>
+            <a:picLocks noChangeAspect="1"/>
+          </p:cNvPicPr>
+          <p:nvPr/>
+        </p:nvPicPr>
+        <p:blipFill>
+          <a:blip r:embed="rId2">
+            <a:extLst>
+              <a:ext uri="{28A0092B-C50C-407E-A947-70E740481C1C}">
+                <a14:useLocalDpi xmlns:a14="http://schemas.microsoft.com/office/drawing/2010/main" val="0"/>
+              </a:ext>
+            </a:extLst>
+          </a:blip>
+          <a:stretch>
+            <a:fillRect/>
+          </a:stretch>
+        </p:blipFill>
+        <p:spPr>
+          <a:xfrm>
+            <a:off x="839436" y="1343816"/>
+            <a:ext cx="5256563" cy="4882033"/>
+          </a:xfrm>
+          <a:prstGeom prst="rect">
+            <a:avLst/>
+          </a:prstGeom>
+        </p:spPr>
+      </p:pic>
+      <p:sp>
+        <p:nvSpPr>
+          <p:cNvPr id="2" name="Title 1">
+            <a:extLst>
+              <a:ext uri="{FF2B5EF4-FFF2-40B4-BE49-F238E27FC236}">
+                <a16:creationId xmlns:a16="http://schemas.microsoft.com/office/drawing/2014/main" id="{495E4F3F-E96A-4732-818E-D73A8534D33E}"/>
+              </a:ext>
+            </a:extLst>
+          </p:cNvPr>
+          <p:cNvSpPr>
+            <a:spLocks noGrp="1"/>
+          </p:cNvSpPr>
+          <p:nvPr>
+            <p:ph type="title"/>
+          </p:nvPr>
+        </p:nvSpPr>
+        <p:spPr>
+          <a:xfrm>
+            <a:off x="0" y="0"/>
+            <a:ext cx="10515600" cy="1325563"/>
+          </a:xfrm>
+        </p:spPr>
+        <p:txBody>
+          <a:bodyPr/>
+          <a:lstStyle/>
+          <a:p>
+            <a:r>
+              <a:rPr lang="en-US" dirty="0"/>
+              <a:t>Figure 6: Production (participants)</a:t>
+            </a:r>
+          </a:p>
+        </p:txBody>
+      </p:sp>
+      <p:pic>
+        <p:nvPicPr>
+          <p:cNvPr id="6" name="Picture 5">
+            <a:extLst>
+              <a:ext uri="{FF2B5EF4-FFF2-40B4-BE49-F238E27FC236}">
+                <a16:creationId xmlns:a16="http://schemas.microsoft.com/office/drawing/2014/main" id="{71C00AEE-0C5B-4CFF-9FED-1B9668802961}"/>
+              </a:ext>
+            </a:extLst>
+          </p:cNvPr>
+          <p:cNvPicPr>
+            <a:picLocks noChangeAspect="1"/>
+          </p:cNvPicPr>
+          <p:nvPr/>
+        </p:nvPicPr>
+        <p:blipFill>
+          <a:blip r:embed="rId3">
+            <a:extLst>
+              <a:ext uri="{28A0092B-C50C-407E-A947-70E740481C1C}">
+                <a14:useLocalDpi xmlns:a14="http://schemas.microsoft.com/office/drawing/2010/main" val="0"/>
+              </a:ext>
+            </a:extLst>
+          </a:blip>
+          <a:stretch>
+            <a:fillRect/>
+          </a:stretch>
+        </p:blipFill>
+        <p:spPr>
+          <a:xfrm>
+            <a:off x="6095998" y="1343816"/>
+            <a:ext cx="5256563" cy="4882033"/>
+          </a:xfrm>
+          <a:prstGeom prst="rect">
+            <a:avLst/>
+          </a:prstGeom>
+        </p:spPr>
+      </p:pic>
+      <p:pic>
+        <p:nvPicPr>
+          <p:cNvPr id="13" name="Picture 12">
+            <a:extLst>
+              <a:ext uri="{FF2B5EF4-FFF2-40B4-BE49-F238E27FC236}">
+                <a16:creationId xmlns:a16="http://schemas.microsoft.com/office/drawing/2014/main" id="{42167394-DB95-4D4D-9A3F-844A86A532C1}"/>
+              </a:ext>
+            </a:extLst>
+          </p:cNvPr>
+          <p:cNvPicPr>
+            <a:picLocks noChangeAspect="1"/>
+          </p:cNvPicPr>
+          <p:nvPr/>
+        </p:nvPicPr>
+        <p:blipFill>
+          <a:blip r:embed="rId4"/>
+          <a:stretch>
+            <a:fillRect/>
+          </a:stretch>
+        </p:blipFill>
+        <p:spPr>
+          <a:xfrm>
+            <a:off x="4289187" y="4990145"/>
+            <a:ext cx="1530869" cy="316732"/>
+          </a:xfrm>
+          <a:prstGeom prst="rect">
+            <a:avLst/>
+          </a:prstGeom>
+        </p:spPr>
+      </p:pic>
+      <p:pic>
+        <p:nvPicPr>
+          <p:cNvPr id="4" name="Picture 3">
+            <a:extLst>
+              <a:ext uri="{FF2B5EF4-FFF2-40B4-BE49-F238E27FC236}">
+                <a16:creationId xmlns:a16="http://schemas.microsoft.com/office/drawing/2014/main" id="{128CC392-7727-42B0-9526-D38CC6A3A4EB}"/>
+              </a:ext>
+            </a:extLst>
+          </p:cNvPr>
+          <p:cNvPicPr>
+            <a:picLocks noChangeAspect="1"/>
+          </p:cNvPicPr>
+          <p:nvPr/>
+        </p:nvPicPr>
+        <p:blipFill>
+          <a:blip r:embed="rId5">
+            <a:extLst>
+              <a:ext uri="{28A0092B-C50C-407E-A947-70E740481C1C}">
+                <a14:useLocalDpi xmlns:a14="http://schemas.microsoft.com/office/drawing/2010/main" val="0"/>
+              </a:ext>
+            </a:extLst>
+          </a:blip>
+          <a:stretch>
+            <a:fillRect/>
+          </a:stretch>
+        </p:blipFill>
+        <p:spPr>
+          <a:xfrm>
+            <a:off x="6095998" y="1343815"/>
+            <a:ext cx="5256565" cy="4882034"/>
+          </a:xfrm>
+          <a:prstGeom prst="rect">
+            <a:avLst/>
+          </a:prstGeom>
+        </p:spPr>
+      </p:pic>
+    </p:spTree>
+    <p:extLst>
+      <p:ext uri="{BB962C8B-B14F-4D97-AF65-F5344CB8AC3E}">
+        <p14:creationId xmlns:p14="http://schemas.microsoft.com/office/powerpoint/2010/main" val="2096111951"/>
       </p:ext>
     </p:extLst>
   </p:cSld>
@@ -8109,171 +6894,6 @@
       </p:grpSpPr>
       <p:pic>
         <p:nvPicPr>
-          <p:cNvPr id="12" name="Picture 11">
-            <a:extLst>
-              <a:ext uri="{FF2B5EF4-FFF2-40B4-BE49-F238E27FC236}">
-                <a16:creationId xmlns:a16="http://schemas.microsoft.com/office/drawing/2014/main" id="{AFE3D6D8-1D1B-4007-9C15-0773AC973C90}"/>
-              </a:ext>
-            </a:extLst>
-          </p:cNvPr>
-          <p:cNvPicPr>
-            <a:picLocks noChangeAspect="1"/>
-          </p:cNvPicPr>
-          <p:nvPr/>
-        </p:nvPicPr>
-        <p:blipFill>
-          <a:blip r:embed="rId2">
-            <a:extLst>
-              <a:ext uri="{28A0092B-C50C-407E-A947-70E740481C1C}">
-                <a14:useLocalDpi xmlns:a14="http://schemas.microsoft.com/office/drawing/2010/main" val="0"/>
-              </a:ext>
-            </a:extLst>
-          </a:blip>
-          <a:stretch>
-            <a:fillRect/>
-          </a:stretch>
-        </p:blipFill>
-        <p:spPr>
-          <a:xfrm>
-            <a:off x="839436" y="1343816"/>
-            <a:ext cx="5256563" cy="4882033"/>
-          </a:xfrm>
-          <a:prstGeom prst="rect">
-            <a:avLst/>
-          </a:prstGeom>
-        </p:spPr>
-      </p:pic>
-      <p:sp>
-        <p:nvSpPr>
-          <p:cNvPr id="2" name="Title 1">
-            <a:extLst>
-              <a:ext uri="{FF2B5EF4-FFF2-40B4-BE49-F238E27FC236}">
-                <a16:creationId xmlns:a16="http://schemas.microsoft.com/office/drawing/2014/main" id="{495E4F3F-E96A-4732-818E-D73A8534D33E}"/>
-              </a:ext>
-            </a:extLst>
-          </p:cNvPr>
-          <p:cNvSpPr>
-            <a:spLocks noGrp="1"/>
-          </p:cNvSpPr>
-          <p:nvPr>
-            <p:ph type="title"/>
-          </p:nvPr>
-        </p:nvSpPr>
-        <p:spPr>
-          <a:xfrm>
-            <a:off x="0" y="0"/>
-            <a:ext cx="10515600" cy="1325563"/>
-          </a:xfrm>
-        </p:spPr>
-        <p:txBody>
-          <a:bodyPr/>
-          <a:lstStyle/>
-          <a:p>
-            <a:r>
-              <a:rPr lang="en-US" dirty="0"/>
-              <a:t>Figure 6: Production (participants)</a:t>
-            </a:r>
-          </a:p>
-        </p:txBody>
-      </p:sp>
-      <p:pic>
-        <p:nvPicPr>
-          <p:cNvPr id="6" name="Picture 5">
-            <a:extLst>
-              <a:ext uri="{FF2B5EF4-FFF2-40B4-BE49-F238E27FC236}">
-                <a16:creationId xmlns:a16="http://schemas.microsoft.com/office/drawing/2014/main" id="{71C00AEE-0C5B-4CFF-9FED-1B9668802961}"/>
-              </a:ext>
-            </a:extLst>
-          </p:cNvPr>
-          <p:cNvPicPr>
-            <a:picLocks noChangeAspect="1"/>
-          </p:cNvPicPr>
-          <p:nvPr/>
-        </p:nvPicPr>
-        <p:blipFill>
-          <a:blip r:embed="rId3">
-            <a:extLst>
-              <a:ext uri="{28A0092B-C50C-407E-A947-70E740481C1C}">
-                <a14:useLocalDpi xmlns:a14="http://schemas.microsoft.com/office/drawing/2010/main" val="0"/>
-              </a:ext>
-            </a:extLst>
-          </a:blip>
-          <a:stretch>
-            <a:fillRect/>
-          </a:stretch>
-        </p:blipFill>
-        <p:spPr>
-          <a:xfrm>
-            <a:off x="6095998" y="1343816"/>
-            <a:ext cx="5256563" cy="4882033"/>
-          </a:xfrm>
-          <a:prstGeom prst="rect">
-            <a:avLst/>
-          </a:prstGeom>
-        </p:spPr>
-      </p:pic>
-      <p:pic>
-        <p:nvPicPr>
-          <p:cNvPr id="13" name="Picture 12">
-            <a:extLst>
-              <a:ext uri="{FF2B5EF4-FFF2-40B4-BE49-F238E27FC236}">
-                <a16:creationId xmlns:a16="http://schemas.microsoft.com/office/drawing/2014/main" id="{42167394-DB95-4D4D-9A3F-844A86A532C1}"/>
-              </a:ext>
-            </a:extLst>
-          </p:cNvPr>
-          <p:cNvPicPr>
-            <a:picLocks noChangeAspect="1"/>
-          </p:cNvPicPr>
-          <p:nvPr/>
-        </p:nvPicPr>
-        <p:blipFill>
-          <a:blip r:embed="rId4"/>
-          <a:stretch>
-            <a:fillRect/>
-          </a:stretch>
-        </p:blipFill>
-        <p:spPr>
-          <a:xfrm>
-            <a:off x="4289187" y="4990145"/>
-            <a:ext cx="1530869" cy="316732"/>
-          </a:xfrm>
-          <a:prstGeom prst="rect">
-            <a:avLst/>
-          </a:prstGeom>
-        </p:spPr>
-      </p:pic>
-    </p:spTree>
-    <p:extLst>
-      <p:ext uri="{BB962C8B-B14F-4D97-AF65-F5344CB8AC3E}">
-        <p14:creationId xmlns:p14="http://schemas.microsoft.com/office/powerpoint/2010/main" val="2096111951"/>
-      </p:ext>
-    </p:extLst>
-  </p:cSld>
-  <p:clrMapOvr>
-    <a:masterClrMapping/>
-  </p:clrMapOvr>
-</p:sld>
-</file>
-
-<file path=ppt/slides/slide8.xml><?xml version="1.0" encoding="utf-8"?>
-<p:sld xmlns:a="http://schemas.openxmlformats.org/drawingml/2006/main" xmlns:r="http://schemas.openxmlformats.org/officeDocument/2006/relationships" xmlns:p="http://schemas.openxmlformats.org/presentationml/2006/main">
-  <p:cSld>
-    <p:spTree>
-      <p:nvGrpSpPr>
-        <p:cNvPr id="1" name=""/>
-        <p:cNvGrpSpPr/>
-        <p:nvPr/>
-      </p:nvGrpSpPr>
-      <p:grpSpPr>
-        <a:xfrm>
-          <a:off x="0" y="0"/>
-          <a:ext cx="0" cy="0"/>
-          <a:chOff x="0" y="0"/>
-          <a:chExt cx="0" cy="0"/>
-        </a:xfrm>
-      </p:grpSpPr>
-      <p:pic>
-        <p:nvPicPr>
           <p:cNvPr id="8" name="Picture 7">
             <a:extLst>
               <a:ext uri="{FF2B5EF4-FFF2-40B4-BE49-F238E27FC236}">
@@ -8779,7 +7399,7 @@
 </p:sld>
 </file>
 
-<file path=ppt/slides/slide9.xml><?xml version="1.0" encoding="utf-8"?>
+<file path=ppt/slides/slide8.xml><?xml version="1.0" encoding="utf-8"?>
 <p:sld xmlns:a="http://schemas.openxmlformats.org/drawingml/2006/main" xmlns:r="http://schemas.openxmlformats.org/officeDocument/2006/relationships" xmlns:p="http://schemas.openxmlformats.org/presentationml/2006/main">
   <p:cSld>
     <p:spTree>

</xml_diff>

<commit_message>
Simulations + LDT final
</commit_message>
<xml_diff>
--- a/results/plots/FIGURES.pptx
+++ b/results/plots/FIGURES.pptx
@@ -268,7 +268,7 @@
           <a:p>
             <a:fld id="{03CE6F45-9AFD-49D1-9CCA-D11CA817383D}" type="datetimeFigureOut">
               <a:rPr lang="en-US" smtClean="0"/>
-              <a:t>3/22/2021</a:t>
+              <a:t>7/17/2021</a:t>
             </a:fld>
             <a:endParaRPr lang="en-US"/>
           </a:p>
@@ -466,7 +466,7 @@
           <a:p>
             <a:fld id="{03CE6F45-9AFD-49D1-9CCA-D11CA817383D}" type="datetimeFigureOut">
               <a:rPr lang="en-US" smtClean="0"/>
-              <a:t>3/22/2021</a:t>
+              <a:t>7/17/2021</a:t>
             </a:fld>
             <a:endParaRPr lang="en-US"/>
           </a:p>
@@ -674,7 +674,7 @@
           <a:p>
             <a:fld id="{03CE6F45-9AFD-49D1-9CCA-D11CA817383D}" type="datetimeFigureOut">
               <a:rPr lang="en-US" smtClean="0"/>
-              <a:t>3/22/2021</a:t>
+              <a:t>7/17/2021</a:t>
             </a:fld>
             <a:endParaRPr lang="en-US"/>
           </a:p>
@@ -872,7 +872,7 @@
           <a:p>
             <a:fld id="{03CE6F45-9AFD-49D1-9CCA-D11CA817383D}" type="datetimeFigureOut">
               <a:rPr lang="en-US" smtClean="0"/>
-              <a:t>3/22/2021</a:t>
+              <a:t>7/17/2021</a:t>
             </a:fld>
             <a:endParaRPr lang="en-US"/>
           </a:p>
@@ -1147,7 +1147,7 @@
           <a:p>
             <a:fld id="{03CE6F45-9AFD-49D1-9CCA-D11CA817383D}" type="datetimeFigureOut">
               <a:rPr lang="en-US" smtClean="0"/>
-              <a:t>3/22/2021</a:t>
+              <a:t>7/17/2021</a:t>
             </a:fld>
             <a:endParaRPr lang="en-US"/>
           </a:p>
@@ -1412,7 +1412,7 @@
           <a:p>
             <a:fld id="{03CE6F45-9AFD-49D1-9CCA-D11CA817383D}" type="datetimeFigureOut">
               <a:rPr lang="en-US" smtClean="0"/>
-              <a:t>3/22/2021</a:t>
+              <a:t>7/17/2021</a:t>
             </a:fld>
             <a:endParaRPr lang="en-US"/>
           </a:p>
@@ -1824,7 +1824,7 @@
           <a:p>
             <a:fld id="{03CE6F45-9AFD-49D1-9CCA-D11CA817383D}" type="datetimeFigureOut">
               <a:rPr lang="en-US" smtClean="0"/>
-              <a:t>3/22/2021</a:t>
+              <a:t>7/17/2021</a:t>
             </a:fld>
             <a:endParaRPr lang="en-US"/>
           </a:p>
@@ -1965,7 +1965,7 @@
           <a:p>
             <a:fld id="{03CE6F45-9AFD-49D1-9CCA-D11CA817383D}" type="datetimeFigureOut">
               <a:rPr lang="en-US" smtClean="0"/>
-              <a:t>3/22/2021</a:t>
+              <a:t>7/17/2021</a:t>
             </a:fld>
             <a:endParaRPr lang="en-US"/>
           </a:p>
@@ -2078,7 +2078,7 @@
           <a:p>
             <a:fld id="{03CE6F45-9AFD-49D1-9CCA-D11CA817383D}" type="datetimeFigureOut">
               <a:rPr lang="en-US" smtClean="0"/>
-              <a:t>3/22/2021</a:t>
+              <a:t>7/17/2021</a:t>
             </a:fld>
             <a:endParaRPr lang="en-US"/>
           </a:p>
@@ -2389,7 +2389,7 @@
           <a:p>
             <a:fld id="{03CE6F45-9AFD-49D1-9CCA-D11CA817383D}" type="datetimeFigureOut">
               <a:rPr lang="en-US" smtClean="0"/>
-              <a:t>3/22/2021</a:t>
+              <a:t>7/17/2021</a:t>
             </a:fld>
             <a:endParaRPr lang="en-US"/>
           </a:p>
@@ -2677,7 +2677,7 @@
           <a:p>
             <a:fld id="{03CE6F45-9AFD-49D1-9CCA-D11CA817383D}" type="datetimeFigureOut">
               <a:rPr lang="en-US" smtClean="0"/>
-              <a:t>3/22/2021</a:t>
+              <a:t>7/17/2021</a:t>
             </a:fld>
             <a:endParaRPr lang="en-US"/>
           </a:p>
@@ -2918,7 +2918,7 @@
           <a:p>
             <a:fld id="{03CE6F45-9AFD-49D1-9CCA-D11CA817383D}" type="datetimeFigureOut">
               <a:rPr lang="en-US" smtClean="0"/>
-              <a:t>3/22/2021</a:t>
+              <a:t>7/17/2021</a:t>
             </a:fld>
             <a:endParaRPr lang="en-US"/>
           </a:p>
@@ -3337,10 +3337,10 @@
       </p:grpSpPr>
       <p:pic>
         <p:nvPicPr>
-          <p:cNvPr id="5" name="Picture 4">
-            <a:extLst>
-              <a:ext uri="{FF2B5EF4-FFF2-40B4-BE49-F238E27FC236}">
-                <a16:creationId xmlns:a16="http://schemas.microsoft.com/office/drawing/2014/main" id="{E4228E03-6525-4CEE-99F3-B1894E0A3FDD}"/>
+          <p:cNvPr id="180" name="Picture 179">
+            <a:extLst>
+              <a:ext uri="{FF2B5EF4-FFF2-40B4-BE49-F238E27FC236}">
+                <a16:creationId xmlns:a16="http://schemas.microsoft.com/office/drawing/2014/main" id="{8F2177C7-539E-4885-8649-F10B88A5FAB4}"/>
               </a:ext>
             </a:extLst>
           </p:cNvPr>
@@ -3349,7 +3349,7 @@
           </p:cNvPicPr>
           <p:nvPr/>
         </p:nvPicPr>
-        <p:blipFill rotWithShape="1">
+        <p:blipFill>
           <a:blip r:embed="rId2">
             <a:extLst>
               <a:ext uri="{28A0092B-C50C-407E-A947-70E740481C1C}">
@@ -3357,13 +3357,14 @@
               </a:ext>
             </a:extLst>
           </a:blip>
-          <a:srcRect l="6033" b="5910"/>
-          <a:stretch/>
+          <a:stretch>
+            <a:fillRect/>
+          </a:stretch>
         </p:blipFill>
         <p:spPr>
           <a:xfrm>
-            <a:off x="6254562" y="1073202"/>
-            <a:ext cx="2808470" cy="2812145"/>
+            <a:off x="2341024" y="4302104"/>
+            <a:ext cx="2613089" cy="2102485"/>
           </a:xfrm>
           <a:prstGeom prst="rect">
             <a:avLst/>
@@ -3372,10 +3373,10 @@
       </p:pic>
       <p:pic>
         <p:nvPicPr>
-          <p:cNvPr id="30" name="Picture 29">
-            <a:extLst>
-              <a:ext uri="{FF2B5EF4-FFF2-40B4-BE49-F238E27FC236}">
-                <a16:creationId xmlns:a16="http://schemas.microsoft.com/office/drawing/2014/main" id="{426FB9A2-691A-48BE-9AA4-B08BCA83CDFD}"/>
+          <p:cNvPr id="104" name="Picture 103">
+            <a:extLst>
+              <a:ext uri="{FF2B5EF4-FFF2-40B4-BE49-F238E27FC236}">
+                <a16:creationId xmlns:a16="http://schemas.microsoft.com/office/drawing/2014/main" id="{954F1739-8612-401D-9E75-608C9334D566}"/>
               </a:ext>
             </a:extLst>
           </p:cNvPr>
@@ -3392,13 +3393,13 @@
               </a:ext>
             </a:extLst>
           </a:blip>
-          <a:srcRect l="4786" b="4682"/>
+          <a:srcRect l="2378" b="2317"/>
           <a:stretch/>
         </p:blipFill>
         <p:spPr>
           <a:xfrm>
-            <a:off x="2830630" y="4326605"/>
-            <a:ext cx="2305429" cy="1949095"/>
+            <a:off x="6279714" y="1082516"/>
+            <a:ext cx="2804673" cy="2865791"/>
           </a:xfrm>
           <a:prstGeom prst="rect">
             <a:avLst/>
@@ -3505,11 +3506,13 @@
             <a:avLst/>
           </a:prstGeom>
           <a:solidFill>
-            <a:schemeClr val="accent5">
-              <a:lumMod val="20000"/>
-              <a:lumOff val="80000"/>
-            </a:schemeClr>
+            <a:srgbClr val="666666"/>
           </a:solidFill>
+          <a:ln>
+            <a:solidFill>
+              <a:schemeClr val="tx1"/>
+            </a:solidFill>
+          </a:ln>
         </p:spPr>
         <p:style>
           <a:lnRef idx="2">
@@ -3535,12 +3538,12 @@
             <a:r>
               <a:rPr lang="en-US" dirty="0">
                 <a:solidFill>
-                  <a:schemeClr val="tx1"/>
+                  <a:schemeClr val="bg1"/>
                 </a:solidFill>
                 <a:latin typeface="Times New Roman" panose="02020603050405020304" pitchFamily="18" charset="0"/>
                 <a:cs typeface="Times New Roman" panose="02020603050405020304" pitchFamily="18" charset="0"/>
               </a:rPr>
-              <a:t>Embedding (32)</a:t>
+              <a:t>Embedding (16)</a:t>
             </a:r>
           </a:p>
         </p:txBody>
@@ -3566,11 +3569,13 @@
             <a:avLst/>
           </a:prstGeom>
           <a:solidFill>
-            <a:schemeClr val="accent4">
-              <a:lumMod val="40000"/>
-              <a:lumOff val="60000"/>
-            </a:schemeClr>
+            <a:srgbClr val="074C7A"/>
           </a:solidFill>
+          <a:ln>
+            <a:solidFill>
+              <a:schemeClr val="tx1"/>
+            </a:solidFill>
+          </a:ln>
         </p:spPr>
         <p:style>
           <a:lnRef idx="2">
@@ -3597,7 +3602,7 @@
               <a:rPr lang="en-US" dirty="0">
                 <a:ln w="0"/>
                 <a:solidFill>
-                  <a:schemeClr val="tx1"/>
+                  <a:schemeClr val="bg1"/>
                 </a:solidFill>
                 <a:effectLst/>
                 <a:latin typeface="Times New Roman" panose="02020603050405020304" pitchFamily="18" charset="0"/>
@@ -3606,6 +3611,9 @@
               <a:t>LSTM (128)</a:t>
             </a:r>
             <a:endParaRPr lang="en-US" dirty="0">
+              <a:solidFill>
+                <a:schemeClr val="bg1"/>
+              </a:solidFill>
               <a:effectLst/>
               <a:latin typeface="Times New Roman" panose="02020603050405020304" pitchFamily="18" charset="0"/>
               <a:cs typeface="Times New Roman" panose="02020603050405020304" pitchFamily="18" charset="0"/>
@@ -3634,11 +3642,13 @@
             <a:avLst/>
           </a:prstGeom>
           <a:solidFill>
-            <a:schemeClr val="accent6">
-              <a:lumMod val="40000"/>
-              <a:lumOff val="60000"/>
-            </a:schemeClr>
+            <a:srgbClr val="27AAE1"/>
           </a:solidFill>
+          <a:ln>
+            <a:solidFill>
+              <a:schemeClr val="tx1"/>
+            </a:solidFill>
+          </a:ln>
         </p:spPr>
         <p:style>
           <a:lnRef idx="2">
@@ -3664,12 +3674,12 @@
             <a:r>
               <a:rPr lang="en-US" dirty="0">
                 <a:solidFill>
-                  <a:schemeClr val="tx1"/>
+                  <a:schemeClr val="bg1"/>
                 </a:solidFill>
                 <a:latin typeface="Times New Roman" panose="02020603050405020304" pitchFamily="18" charset="0"/>
                 <a:cs typeface="Times New Roman" panose="02020603050405020304" pitchFamily="18" charset="0"/>
               </a:rPr>
-              <a:t>Output (28)</a:t>
+              <a:t>Output (27)</a:t>
             </a:r>
           </a:p>
         </p:txBody>
@@ -3821,7 +3831,7 @@
         </p:nvSpPr>
         <p:spPr>
           <a:xfrm>
-            <a:off x="2875804" y="800114"/>
+            <a:off x="2797283" y="760079"/>
             <a:ext cx="1638006" cy="338554"/>
           </a:xfrm>
           <a:prstGeom prst="rect">
@@ -3841,7 +3851,7 @@
                 <a:latin typeface="Times New Roman" panose="02020603050405020304" pitchFamily="18" charset="0"/>
                 <a:cs typeface="Times New Roman" panose="02020603050405020304" pitchFamily="18" charset="0"/>
               </a:rPr>
-              <a:t>&lt;s&gt; M O D _</a:t>
+              <a:t># M O D _</a:t>
             </a:r>
           </a:p>
         </p:txBody>
@@ -3880,7 +3890,7 @@
                 <a:latin typeface="Times New Roman" panose="02020603050405020304" pitchFamily="18" charset="0"/>
                 <a:cs typeface="Times New Roman" panose="02020603050405020304" pitchFamily="18" charset="0"/>
               </a:rPr>
-              <a:t>32 x 128 </a:t>
+              <a:t>16 x 128 </a:t>
             </a:r>
           </a:p>
           <a:p>
@@ -3978,7 +3988,7 @@
                 <a:latin typeface="Times New Roman" panose="02020603050405020304" pitchFamily="18" charset="0"/>
                 <a:cs typeface="Times New Roman" panose="02020603050405020304" pitchFamily="18" charset="0"/>
               </a:rPr>
-              <a:t>128 x 28 </a:t>
+              <a:t>128 x 27 </a:t>
             </a:r>
           </a:p>
           <a:p>
@@ -4027,7 +4037,7 @@
                 <a:latin typeface="Times New Roman" panose="02020603050405020304" pitchFamily="18" charset="0"/>
                 <a:cs typeface="Times New Roman" panose="02020603050405020304" pitchFamily="18" charset="0"/>
               </a:rPr>
-              <a:t>a</a:t>
+              <a:t>A</a:t>
             </a:r>
           </a:p>
         </p:txBody>
@@ -4066,7 +4076,7 @@
                 <a:latin typeface="Times New Roman" panose="02020603050405020304" pitchFamily="18" charset="0"/>
                 <a:cs typeface="Times New Roman" panose="02020603050405020304" pitchFamily="18" charset="0"/>
               </a:rPr>
-              <a:t>c</a:t>
+              <a:t>C</a:t>
             </a:r>
           </a:p>
         </p:txBody>
@@ -4105,7 +4115,7 @@
                 <a:latin typeface="Times New Roman" panose="02020603050405020304" pitchFamily="18" charset="0"/>
                 <a:cs typeface="Times New Roman" panose="02020603050405020304" pitchFamily="18" charset="0"/>
               </a:rPr>
-              <a:t>b</a:t>
+              <a:t>B</a:t>
             </a:r>
           </a:p>
         </p:txBody>
@@ -4122,13 +4132,14 @@
           <p:cNvCxnSpPr>
             <a:cxnSpLocks/>
             <a:stCxn id="8" idx="3"/>
+            <a:endCxn id="104" idx="1"/>
           </p:cNvCxnSpPr>
           <p:nvPr/>
         </p:nvCxnSpPr>
         <p:spPr>
           <a:xfrm flipV="1">
-            <a:off x="4898864" y="2524936"/>
-            <a:ext cx="1280539" cy="2"/>
+            <a:off x="4898864" y="2515412"/>
+            <a:ext cx="1380850" cy="9526"/>
           </a:xfrm>
           <a:prstGeom prst="straightConnector1">
             <a:avLst/>
@@ -4196,7 +4207,7 @@
                 <a:latin typeface="Times New Roman" panose="02020603050405020304" pitchFamily="18" charset="0"/>
                 <a:cs typeface="Times New Roman" panose="02020603050405020304" pitchFamily="18" charset="0"/>
               </a:rPr>
-              <a:t>(E | &lt;s&gt;,M,O,D)</a:t>
+              <a:t>(E | #,M,O,D)</a:t>
             </a:r>
             <a:endParaRPr lang="en-US" sz="1600" i="1" dirty="0">
               <a:latin typeface="Times New Roman" panose="02020603050405020304" pitchFamily="18" charset="0"/>
@@ -4222,8 +4233,8 @@
         </p:nvCxnSpPr>
         <p:spPr>
           <a:xfrm flipH="1">
-            <a:off x="4001242" y="4104553"/>
-            <a:ext cx="9" cy="255451"/>
+            <a:off x="4001148" y="4104553"/>
+            <a:ext cx="103" cy="247974"/>
           </a:xfrm>
           <a:prstGeom prst="straightConnector1">
             <a:avLst/>
@@ -4264,8 +4275,8 @@
         </p:nvSpPr>
         <p:spPr>
           <a:xfrm>
-            <a:off x="2442062" y="6206541"/>
-            <a:ext cx="417101" cy="492443"/>
+            <a:off x="2579219" y="6275536"/>
+            <a:ext cx="293670" cy="492443"/>
           </a:xfrm>
           <a:prstGeom prst="rect">
             <a:avLst/>
@@ -4305,7 +4316,7 @@
                 <a:latin typeface="Times New Roman" panose="02020603050405020304" pitchFamily="18" charset="0"/>
                 <a:cs typeface="Times New Roman" panose="02020603050405020304" pitchFamily="18" charset="0"/>
               </a:rPr>
-              <a:t>&lt;s&gt;</a:t>
+              <a:t>#</a:t>
             </a:r>
           </a:p>
         </p:txBody>
@@ -4324,7 +4335,7 @@
         </p:nvSpPr>
         <p:spPr>
           <a:xfrm>
-            <a:off x="2859061" y="6206541"/>
+            <a:off x="2896965" y="6275536"/>
             <a:ext cx="344966" cy="523220"/>
           </a:xfrm>
           <a:prstGeom prst="rect">
@@ -4384,7 +4395,7 @@
         </p:nvSpPr>
         <p:spPr>
           <a:xfrm>
-            <a:off x="3203925" y="6206541"/>
+            <a:off x="3266007" y="6275536"/>
             <a:ext cx="314510" cy="523220"/>
           </a:xfrm>
           <a:prstGeom prst="rect">
@@ -4444,7 +4455,7 @@
         </p:nvSpPr>
         <p:spPr>
           <a:xfrm>
-            <a:off x="3518333" y="6206541"/>
+            <a:off x="3604593" y="6275536"/>
             <a:ext cx="314510" cy="523220"/>
           </a:xfrm>
           <a:prstGeom prst="rect">
@@ -4504,7 +4515,7 @@
         </p:nvSpPr>
         <p:spPr>
           <a:xfrm>
-            <a:off x="3832741" y="6206541"/>
+            <a:off x="3943179" y="6275536"/>
             <a:ext cx="293670" cy="523220"/>
           </a:xfrm>
           <a:prstGeom prst="rect">
@@ -4564,7 +4575,7 @@
         </p:nvSpPr>
         <p:spPr>
           <a:xfrm>
-            <a:off x="4126309" y="6206541"/>
+            <a:off x="4260925" y="6275536"/>
             <a:ext cx="293670" cy="523220"/>
           </a:xfrm>
           <a:prstGeom prst="rect">
@@ -4624,8 +4635,8 @@
         </p:nvSpPr>
         <p:spPr>
           <a:xfrm>
-            <a:off x="4419875" y="6210449"/>
-            <a:ext cx="460382" cy="492443"/>
+            <a:off x="4578673" y="6279444"/>
+            <a:ext cx="293670" cy="492443"/>
           </a:xfrm>
           <a:prstGeom prst="rect">
             <a:avLst/>
@@ -4661,7 +4672,7 @@
                 <a:latin typeface="Times New Roman" panose="02020603050405020304" pitchFamily="18" charset="0"/>
                 <a:cs typeface="Times New Roman" panose="02020603050405020304" pitchFamily="18" charset="0"/>
               </a:rPr>
-              <a:t>&lt;/s&gt;</a:t>
+              <a:t>#</a:t>
             </a:r>
           </a:p>
         </p:txBody>
@@ -4700,7 +4711,7 @@
                 <a:latin typeface="Times New Roman" panose="02020603050405020304" pitchFamily="18" charset="0"/>
                 <a:cs typeface="Times New Roman" panose="02020603050405020304" pitchFamily="18" charset="0"/>
               </a:rPr>
-              <a:t>d</a:t>
+              <a:t>D</a:t>
             </a:r>
           </a:p>
         </p:txBody>
@@ -4798,318 +4809,6 @@
       </p:cxnSp>
       <p:sp>
         <p:nvSpPr>
-          <p:cNvPr id="46" name="Rectangle 45">
-            <a:extLst>
-              <a:ext uri="{FF2B5EF4-FFF2-40B4-BE49-F238E27FC236}">
-                <a16:creationId xmlns:a16="http://schemas.microsoft.com/office/drawing/2014/main" id="{143BAB1E-DAD5-4A19-AD61-18CC98901AEC}"/>
-              </a:ext>
-            </a:extLst>
-          </p:cNvPr>
-          <p:cNvSpPr/>
-          <p:nvPr/>
-        </p:nvSpPr>
-        <p:spPr>
-          <a:xfrm>
-            <a:off x="2846333" y="5872197"/>
-            <a:ext cx="326364" cy="360840"/>
-          </a:xfrm>
-          <a:prstGeom prst="rect">
-            <a:avLst/>
-          </a:prstGeom>
-          <a:noFill/>
-          <a:ln>
-            <a:solidFill>
-              <a:srgbClr val="C00000"/>
-            </a:solidFill>
-          </a:ln>
-        </p:spPr>
-        <p:style>
-          <a:lnRef idx="2">
-            <a:schemeClr val="accent1">
-              <a:shade val="50000"/>
-            </a:schemeClr>
-          </a:lnRef>
-          <a:fillRef idx="1">
-            <a:schemeClr val="accent1"/>
-          </a:fillRef>
-          <a:effectRef idx="0">
-            <a:schemeClr val="accent1"/>
-          </a:effectRef>
-          <a:fontRef idx="minor">
-            <a:schemeClr val="lt1"/>
-          </a:fontRef>
-        </p:style>
-        <p:txBody>
-          <a:bodyPr rtlCol="0" anchor="ctr"/>
-          <a:lstStyle/>
-          <a:p>
-            <a:pPr algn="ctr"/>
-            <a:endParaRPr lang="en-US"/>
-          </a:p>
-        </p:txBody>
-      </p:sp>
-      <p:sp>
-        <p:nvSpPr>
-          <p:cNvPr id="47" name="Rectangle 46">
-            <a:extLst>
-              <a:ext uri="{FF2B5EF4-FFF2-40B4-BE49-F238E27FC236}">
-                <a16:creationId xmlns:a16="http://schemas.microsoft.com/office/drawing/2014/main" id="{6C83CEF2-5B3C-4C33-89A9-3C0C50E97BFF}"/>
-              </a:ext>
-            </a:extLst>
-          </p:cNvPr>
-          <p:cNvSpPr/>
-          <p:nvPr/>
-        </p:nvSpPr>
-        <p:spPr>
-          <a:xfrm>
-            <a:off x="3160488" y="4757074"/>
-            <a:ext cx="326364" cy="360840"/>
-          </a:xfrm>
-          <a:prstGeom prst="rect">
-            <a:avLst/>
-          </a:prstGeom>
-          <a:noFill/>
-          <a:ln>
-            <a:solidFill>
-              <a:srgbClr val="C00000"/>
-            </a:solidFill>
-          </a:ln>
-        </p:spPr>
-        <p:style>
-          <a:lnRef idx="2">
-            <a:schemeClr val="accent1">
-              <a:shade val="50000"/>
-            </a:schemeClr>
-          </a:lnRef>
-          <a:fillRef idx="1">
-            <a:schemeClr val="accent1"/>
-          </a:fillRef>
-          <a:effectRef idx="0">
-            <a:schemeClr val="accent1"/>
-          </a:effectRef>
-          <a:fontRef idx="minor">
-            <a:schemeClr val="lt1"/>
-          </a:fontRef>
-        </p:style>
-        <p:txBody>
-          <a:bodyPr rtlCol="0" anchor="ctr"/>
-          <a:lstStyle/>
-          <a:p>
-            <a:pPr algn="ctr"/>
-            <a:endParaRPr lang="en-US"/>
-          </a:p>
-        </p:txBody>
-      </p:sp>
-      <p:sp>
-        <p:nvSpPr>
-          <p:cNvPr id="48" name="Rectangle 47">
-            <a:extLst>
-              <a:ext uri="{FF2B5EF4-FFF2-40B4-BE49-F238E27FC236}">
-                <a16:creationId xmlns:a16="http://schemas.microsoft.com/office/drawing/2014/main" id="{15BD95CF-661C-4FE5-BB23-F587764BB964}"/>
-              </a:ext>
-            </a:extLst>
-          </p:cNvPr>
-          <p:cNvSpPr/>
-          <p:nvPr/>
-        </p:nvSpPr>
-        <p:spPr>
-          <a:xfrm>
-            <a:off x="3486852" y="5511725"/>
-            <a:ext cx="326364" cy="360840"/>
-          </a:xfrm>
-          <a:prstGeom prst="rect">
-            <a:avLst/>
-          </a:prstGeom>
-          <a:noFill/>
-          <a:ln>
-            <a:solidFill>
-              <a:srgbClr val="C00000"/>
-            </a:solidFill>
-          </a:ln>
-        </p:spPr>
-        <p:style>
-          <a:lnRef idx="2">
-            <a:schemeClr val="accent1">
-              <a:shade val="50000"/>
-            </a:schemeClr>
-          </a:lnRef>
-          <a:fillRef idx="1">
-            <a:schemeClr val="accent1"/>
-          </a:fillRef>
-          <a:effectRef idx="0">
-            <a:schemeClr val="accent1"/>
-          </a:effectRef>
-          <a:fontRef idx="minor">
-            <a:schemeClr val="lt1"/>
-          </a:fontRef>
-        </p:style>
-        <p:txBody>
-          <a:bodyPr rtlCol="0" anchor="ctr"/>
-          <a:lstStyle/>
-          <a:p>
-            <a:pPr algn="ctr"/>
-            <a:endParaRPr lang="en-US"/>
-          </a:p>
-        </p:txBody>
-      </p:sp>
-      <p:sp>
-        <p:nvSpPr>
-          <p:cNvPr id="49" name="Rectangle 48">
-            <a:extLst>
-              <a:ext uri="{FF2B5EF4-FFF2-40B4-BE49-F238E27FC236}">
-                <a16:creationId xmlns:a16="http://schemas.microsoft.com/office/drawing/2014/main" id="{D19B3ED6-E76F-4942-A928-B4BF02C28886}"/>
-              </a:ext>
-            </a:extLst>
-          </p:cNvPr>
-          <p:cNvSpPr/>
-          <p:nvPr/>
-        </p:nvSpPr>
-        <p:spPr>
-          <a:xfrm>
-            <a:off x="3798798" y="4389143"/>
-            <a:ext cx="326364" cy="360840"/>
-          </a:xfrm>
-          <a:prstGeom prst="rect">
-            <a:avLst/>
-          </a:prstGeom>
-          <a:noFill/>
-          <a:ln>
-            <a:solidFill>
-              <a:srgbClr val="C00000"/>
-            </a:solidFill>
-          </a:ln>
-        </p:spPr>
-        <p:style>
-          <a:lnRef idx="2">
-            <a:schemeClr val="accent1">
-              <a:shade val="50000"/>
-            </a:schemeClr>
-          </a:lnRef>
-          <a:fillRef idx="1">
-            <a:schemeClr val="accent1"/>
-          </a:fillRef>
-          <a:effectRef idx="0">
-            <a:schemeClr val="accent1"/>
-          </a:effectRef>
-          <a:fontRef idx="minor">
-            <a:schemeClr val="lt1"/>
-          </a:fontRef>
-        </p:style>
-        <p:txBody>
-          <a:bodyPr rtlCol="0" anchor="ctr"/>
-          <a:lstStyle/>
-          <a:p>
-            <a:pPr algn="ctr"/>
-            <a:endParaRPr lang="en-US"/>
-          </a:p>
-        </p:txBody>
-      </p:sp>
-      <p:sp>
-        <p:nvSpPr>
-          <p:cNvPr id="50" name="Rectangle 49">
-            <a:extLst>
-              <a:ext uri="{FF2B5EF4-FFF2-40B4-BE49-F238E27FC236}">
-                <a16:creationId xmlns:a16="http://schemas.microsoft.com/office/drawing/2014/main" id="{FF49D1D2-220C-4EF2-801E-27DA0B2A489C}"/>
-              </a:ext>
-            </a:extLst>
-          </p:cNvPr>
-          <p:cNvSpPr/>
-          <p:nvPr/>
-        </p:nvSpPr>
-        <p:spPr>
-          <a:xfrm>
-            <a:off x="4125162" y="5128480"/>
-            <a:ext cx="326364" cy="360840"/>
-          </a:xfrm>
-          <a:prstGeom prst="rect">
-            <a:avLst/>
-          </a:prstGeom>
-          <a:noFill/>
-          <a:ln>
-            <a:solidFill>
-              <a:srgbClr val="C00000"/>
-            </a:solidFill>
-          </a:ln>
-        </p:spPr>
-        <p:style>
-          <a:lnRef idx="2">
-            <a:schemeClr val="accent1">
-              <a:shade val="50000"/>
-            </a:schemeClr>
-          </a:lnRef>
-          <a:fillRef idx="1">
-            <a:schemeClr val="accent1"/>
-          </a:fillRef>
-          <a:effectRef idx="0">
-            <a:schemeClr val="accent1"/>
-          </a:effectRef>
-          <a:fontRef idx="minor">
-            <a:schemeClr val="lt1"/>
-          </a:fontRef>
-        </p:style>
-        <p:txBody>
-          <a:bodyPr rtlCol="0" anchor="ctr"/>
-          <a:lstStyle/>
-          <a:p>
-            <a:pPr algn="ctr"/>
-            <a:endParaRPr lang="en-US" dirty="0"/>
-          </a:p>
-        </p:txBody>
-      </p:sp>
-      <p:sp>
-        <p:nvSpPr>
-          <p:cNvPr id="51" name="Rectangle 50">
-            <a:extLst>
-              <a:ext uri="{FF2B5EF4-FFF2-40B4-BE49-F238E27FC236}">
-                <a16:creationId xmlns:a16="http://schemas.microsoft.com/office/drawing/2014/main" id="{329A8805-9050-4490-AAA7-731678CD5216}"/>
-              </a:ext>
-            </a:extLst>
-          </p:cNvPr>
-          <p:cNvSpPr/>
-          <p:nvPr/>
-        </p:nvSpPr>
-        <p:spPr>
-          <a:xfrm>
-            <a:off x="4449546" y="5506977"/>
-            <a:ext cx="326364" cy="360840"/>
-          </a:xfrm>
-          <a:prstGeom prst="rect">
-            <a:avLst/>
-          </a:prstGeom>
-          <a:noFill/>
-          <a:ln>
-            <a:solidFill>
-              <a:srgbClr val="C00000"/>
-            </a:solidFill>
-          </a:ln>
-        </p:spPr>
-        <p:style>
-          <a:lnRef idx="2">
-            <a:schemeClr val="accent1">
-              <a:shade val="50000"/>
-            </a:schemeClr>
-          </a:lnRef>
-          <a:fillRef idx="1">
-            <a:schemeClr val="accent1"/>
-          </a:fillRef>
-          <a:effectRef idx="0">
-            <a:schemeClr val="accent1"/>
-          </a:effectRef>
-          <a:fontRef idx="minor">
-            <a:schemeClr val="lt1"/>
-          </a:fontRef>
-        </p:style>
-        <p:txBody>
-          <a:bodyPr rtlCol="0" anchor="ctr"/>
-          <a:lstStyle/>
-          <a:p>
-            <a:pPr algn="ctr"/>
-            <a:endParaRPr lang="en-US"/>
-          </a:p>
-        </p:txBody>
-      </p:sp>
-      <p:sp>
-        <p:nvSpPr>
           <p:cNvPr id="53" name="TextBox 52">
             <a:extLst>
               <a:ext uri="{FF2B5EF4-FFF2-40B4-BE49-F238E27FC236}">
@@ -5142,7 +4841,7 @@
                 <a:latin typeface="Times New Roman" panose="02020603050405020304" pitchFamily="18" charset="0"/>
                 <a:cs typeface="Times New Roman" panose="02020603050405020304" pitchFamily="18" charset="0"/>
               </a:rPr>
-              <a:t>28 x 32 </a:t>
+              <a:t>27 x 16 </a:t>
             </a:r>
           </a:p>
           <a:p>
@@ -5171,7 +4870,7 @@
         </p:nvSpPr>
         <p:spPr>
           <a:xfrm>
-            <a:off x="9246112" y="1021126"/>
+            <a:off x="9086010" y="1877633"/>
             <a:ext cx="659132" cy="1384995"/>
           </a:xfrm>
           <a:prstGeom prst="rect">
@@ -5204,7 +4903,7 @@
                 <a:latin typeface="Times New Roman" panose="02020603050405020304" pitchFamily="18" charset="0"/>
                 <a:cs typeface="Times New Roman" panose="02020603050405020304" pitchFamily="18" charset="0"/>
               </a:rPr>
-              <a:t>kids</a:t>
+              <a:t>wake</a:t>
             </a:r>
           </a:p>
           <a:p>
@@ -5214,7 +4913,7 @@
                 <a:latin typeface="Times New Roman" panose="02020603050405020304" pitchFamily="18" charset="0"/>
                 <a:cs typeface="Times New Roman" panose="02020603050405020304" pitchFamily="18" charset="0"/>
               </a:rPr>
-              <a:t>kiddy</a:t>
+              <a:t>weak</a:t>
             </a:r>
           </a:p>
           <a:p>
@@ -5224,7 +4923,7 @@
                 <a:latin typeface="Times New Roman" panose="02020603050405020304" pitchFamily="18" charset="0"/>
                 <a:cs typeface="Times New Roman" panose="02020603050405020304" pitchFamily="18" charset="0"/>
               </a:rPr>
-              <a:t>nifty</a:t>
+              <a:t>windy</a:t>
             </a:r>
           </a:p>
           <a:p>
@@ -5234,7 +4933,7 @@
                 <a:latin typeface="Times New Roman" panose="02020603050405020304" pitchFamily="18" charset="0"/>
                 <a:cs typeface="Times New Roman" panose="02020603050405020304" pitchFamily="18" charset="0"/>
               </a:rPr>
-              <a:t>thank</a:t>
+              <a:t>wispy</a:t>
             </a:r>
           </a:p>
           <a:p>
@@ -5244,7 +4943,7 @@
                 <a:latin typeface="Times New Roman" panose="02020603050405020304" pitchFamily="18" charset="0"/>
                 <a:cs typeface="Times New Roman" panose="02020603050405020304" pitchFamily="18" charset="0"/>
               </a:rPr>
-              <a:t>they</a:t>
+              <a:t>wry</a:t>
             </a:r>
           </a:p>
           <a:p>
@@ -5273,7 +4972,7 @@
         </p:nvSpPr>
         <p:spPr>
           <a:xfrm>
-            <a:off x="5461047" y="2678151"/>
+            <a:off x="5316664" y="2665476"/>
             <a:ext cx="669853" cy="1384995"/>
           </a:xfrm>
           <a:prstGeom prst="rect">
@@ -5306,7 +5005,7 @@
                 <a:latin typeface="Times New Roman" panose="02020603050405020304" pitchFamily="18" charset="0"/>
                 <a:cs typeface="Times New Roman" panose="02020603050405020304" pitchFamily="18" charset="0"/>
               </a:rPr>
-              <a:t>libra</a:t>
+              <a:t>plum</a:t>
             </a:r>
           </a:p>
           <a:p>
@@ -5316,7 +5015,7 @@
                 <a:latin typeface="Times New Roman" panose="02020603050405020304" pitchFamily="18" charset="0"/>
                 <a:cs typeface="Times New Roman" panose="02020603050405020304" pitchFamily="18" charset="0"/>
               </a:rPr>
-              <a:t>liana</a:t>
+              <a:t>pluma</a:t>
             </a:r>
           </a:p>
           <a:p>
@@ -5326,7 +5025,7 @@
                 <a:latin typeface="Times New Roman" panose="02020603050405020304" pitchFamily="18" charset="0"/>
                 <a:cs typeface="Times New Roman" panose="02020603050405020304" pitchFamily="18" charset="0"/>
               </a:rPr>
-              <a:t>laguna</a:t>
+              <a:t>perch</a:t>
             </a:r>
           </a:p>
           <a:p>
@@ -5336,7 +5035,7 @@
                 <a:latin typeface="Times New Roman" panose="02020603050405020304" pitchFamily="18" charset="0"/>
                 <a:cs typeface="Times New Roman" panose="02020603050405020304" pitchFamily="18" charset="0"/>
               </a:rPr>
-              <a:t>lagoon</a:t>
+              <a:t>percha</a:t>
             </a:r>
           </a:p>
           <a:p>
@@ -5346,7 +5045,7 @@
                 <a:latin typeface="Times New Roman" panose="02020603050405020304" pitchFamily="18" charset="0"/>
                 <a:cs typeface="Times New Roman" panose="02020603050405020304" pitchFamily="18" charset="0"/>
               </a:rPr>
-              <a:t>legion</a:t>
+              <a:t>plural</a:t>
             </a:r>
           </a:p>
           <a:p>
@@ -5400,58 +5099,6 @@
           </a:p>
         </p:txBody>
       </p:sp>
-      <p:sp>
-        <p:nvSpPr>
-          <p:cNvPr id="93" name="Rectangle 92">
-            <a:extLst>
-              <a:ext uri="{FF2B5EF4-FFF2-40B4-BE49-F238E27FC236}">
-                <a16:creationId xmlns:a16="http://schemas.microsoft.com/office/drawing/2014/main" id="{6087EC84-C5AB-4EC8-BC07-39BB9387EEAA}"/>
-              </a:ext>
-            </a:extLst>
-          </p:cNvPr>
-          <p:cNvSpPr/>
-          <p:nvPr/>
-        </p:nvSpPr>
-        <p:spPr>
-          <a:xfrm>
-            <a:off x="7502000" y="1731963"/>
-            <a:ext cx="320675" cy="327025"/>
-          </a:xfrm>
-          <a:prstGeom prst="rect">
-            <a:avLst/>
-          </a:prstGeom>
-          <a:noFill/>
-          <a:ln>
-            <a:solidFill>
-              <a:schemeClr val="tx1"/>
-            </a:solidFill>
-          </a:ln>
-        </p:spPr>
-        <p:style>
-          <a:lnRef idx="2">
-            <a:schemeClr val="accent1">
-              <a:shade val="50000"/>
-            </a:schemeClr>
-          </a:lnRef>
-          <a:fillRef idx="1">
-            <a:schemeClr val="accent1"/>
-          </a:fillRef>
-          <a:effectRef idx="0">
-            <a:schemeClr val="accent1"/>
-          </a:effectRef>
-          <a:fontRef idx="minor">
-            <a:schemeClr val="lt1"/>
-          </a:fontRef>
-        </p:style>
-        <p:txBody>
-          <a:bodyPr rtlCol="0" anchor="ctr"/>
-          <a:lstStyle/>
-          <a:p>
-            <a:pPr algn="ctr"/>
-            <a:endParaRPr lang="en-US"/>
-          </a:p>
-        </p:txBody>
-      </p:sp>
       <p:cxnSp>
         <p:nvCxnSpPr>
           <p:cNvPr id="97" name="Straight Connector 96">
@@ -5463,13 +5110,14 @@
           </p:cNvPr>
           <p:cNvCxnSpPr>
             <a:cxnSpLocks/>
+            <a:stCxn id="114" idx="7"/>
           </p:cNvCxnSpPr>
           <p:nvPr/>
         </p:nvCxnSpPr>
         <p:spPr>
           <a:xfrm flipV="1">
-            <a:off x="7822675" y="1021127"/>
-            <a:ext cx="1423437" cy="710836"/>
+            <a:off x="8052141" y="1877633"/>
+            <a:ext cx="1052157" cy="337896"/>
           </a:xfrm>
           <a:prstGeom prst="line">
             <a:avLst/>
@@ -5506,13 +5154,15 @@
           </p:cNvPr>
           <p:cNvCxnSpPr>
             <a:cxnSpLocks/>
+            <a:stCxn id="114" idx="5"/>
+            <a:endCxn id="39" idx="1"/>
           </p:cNvCxnSpPr>
           <p:nvPr/>
         </p:nvCxnSpPr>
         <p:spPr>
           <a:xfrm>
-            <a:off x="7502000" y="2058988"/>
-            <a:ext cx="1744112" cy="347133"/>
+            <a:off x="8052141" y="2368452"/>
+            <a:ext cx="1033869" cy="201679"/>
           </a:xfrm>
           <a:prstGeom prst="line">
             <a:avLst/>
@@ -5549,14 +5199,14 @@
           </p:cNvPr>
           <p:cNvCxnSpPr>
             <a:cxnSpLocks/>
-            <a:endCxn id="31" idx="0"/>
+            <a:endCxn id="31" idx="1"/>
           </p:cNvCxnSpPr>
           <p:nvPr/>
         </p:nvCxnSpPr>
         <p:spPr>
           <a:xfrm>
-            <a:off x="6130900" y="2678151"/>
-            <a:ext cx="631765" cy="58332"/>
+            <a:off x="5972410" y="2665476"/>
+            <a:ext cx="577079" cy="106164"/>
           </a:xfrm>
           <a:prstGeom prst="line">
             <a:avLst/>
@@ -5596,7 +5246,7 @@
         </p:nvSpPr>
         <p:spPr>
           <a:xfrm>
-            <a:off x="6986168" y="2599267"/>
+            <a:off x="6905413" y="2025029"/>
             <a:ext cx="96198" cy="136868"/>
           </a:xfrm>
           <a:prstGeom prst="rect">
@@ -5645,14 +5295,15 @@
           </p:cNvPr>
           <p:cNvCxnSpPr>
             <a:cxnSpLocks/>
-            <a:endCxn id="31" idx="5"/>
+            <a:stCxn id="76" idx="3"/>
+            <a:endCxn id="31" idx="3"/>
           </p:cNvCxnSpPr>
           <p:nvPr/>
         </p:nvCxnSpPr>
         <p:spPr>
           <a:xfrm flipV="1">
-            <a:off x="6130900" y="2921078"/>
-            <a:ext cx="710281" cy="1142068"/>
+            <a:off x="5986517" y="2924563"/>
+            <a:ext cx="562972" cy="433411"/>
           </a:xfrm>
           <a:prstGeom prst="line">
             <a:avLst/>
@@ -5692,8 +5343,8 @@
         </p:nvSpPr>
         <p:spPr>
           <a:xfrm rot="16200000">
-            <a:off x="4598780" y="5147263"/>
-            <a:ext cx="1285929" cy="307777"/>
+            <a:off x="1503942" y="5196894"/>
+            <a:ext cx="1435008" cy="307777"/>
           </a:xfrm>
           <a:prstGeom prst="rect">
             <a:avLst/>
@@ -5718,7 +5369,7 @@
                 <a:latin typeface="Times New Roman" panose="02020603050405020304" pitchFamily="18" charset="0"/>
                 <a:cs typeface="Times New Roman" panose="02020603050405020304" pitchFamily="18" charset="0"/>
               </a:rPr>
-              <a:t>(char|context)</a:t>
+              <a:t>(letter | context)</a:t>
             </a:r>
           </a:p>
         </p:txBody>
@@ -5737,7 +5388,7 @@
         </p:nvSpPr>
         <p:spPr>
           <a:xfrm>
-            <a:off x="6651625" y="2736483"/>
+            <a:off x="6516966" y="2739968"/>
             <a:ext cx="222079" cy="216267"/>
           </a:xfrm>
           <a:prstGeom prst="ellipse">
@@ -5775,46 +5426,6 @@
           </a:p>
         </p:txBody>
       </p:sp>
-      <p:pic>
-        <p:nvPicPr>
-          <p:cNvPr id="55" name="Picture 54">
-            <a:extLst>
-              <a:ext uri="{FF2B5EF4-FFF2-40B4-BE49-F238E27FC236}">
-                <a16:creationId xmlns:a16="http://schemas.microsoft.com/office/drawing/2014/main" id="{FB60B88C-4C3D-4E5A-B462-6C4FB81C74A0}"/>
-              </a:ext>
-            </a:extLst>
-          </p:cNvPr>
-          <p:cNvPicPr>
-            <a:picLocks noChangeAspect="1"/>
-          </p:cNvPicPr>
-          <p:nvPr/>
-        </p:nvPicPr>
-        <p:blipFill rotWithShape="1">
-          <a:blip r:embed="rId4">
-            <a:extLst>
-              <a:ext uri="{28A0092B-C50C-407E-A947-70E740481C1C}">
-                <a14:useLocalDpi xmlns:a14="http://schemas.microsoft.com/office/drawing/2010/main" val="0"/>
-              </a:ext>
-            </a:extLst>
-          </a:blip>
-          <a:srcRect l="10344" b="14904"/>
-          <a:stretch/>
-        </p:blipFill>
-        <p:spPr>
-          <a:xfrm>
-            <a:off x="5890682" y="4360004"/>
-            <a:ext cx="3146622" cy="1976956"/>
-          </a:xfrm>
-          <a:prstGeom prst="rect">
-            <a:avLst/>
-          </a:prstGeom>
-          <a:ln w="12700">
-            <a:solidFill>
-              <a:schemeClr val="tx1"/>
-            </a:solidFill>
-          </a:ln>
-        </p:spPr>
-      </p:pic>
       <p:cxnSp>
         <p:nvCxnSpPr>
           <p:cNvPr id="58" name="Straight Arrow Connector 57">
@@ -5827,13 +5438,14 @@
           <p:cNvCxnSpPr>
             <a:cxnSpLocks/>
             <a:stCxn id="117" idx="2"/>
+            <a:endCxn id="157" idx="0"/>
           </p:cNvCxnSpPr>
           <p:nvPr/>
         </p:nvCxnSpPr>
         <p:spPr>
           <a:xfrm>
-            <a:off x="7034267" y="2736135"/>
-            <a:ext cx="0" cy="1623869"/>
+            <a:off x="6953512" y="2161897"/>
+            <a:ext cx="412192" cy="2213779"/>
           </a:xfrm>
           <a:prstGeom prst="straightConnector1">
             <a:avLst/>
@@ -5860,6 +5472,777 @@
           </a:fontRef>
         </p:style>
       </p:cxnSp>
+      <p:sp>
+        <p:nvSpPr>
+          <p:cNvPr id="114" name="Oval 113">
+            <a:extLst>
+              <a:ext uri="{FF2B5EF4-FFF2-40B4-BE49-F238E27FC236}">
+                <a16:creationId xmlns:a16="http://schemas.microsoft.com/office/drawing/2014/main" id="{9FA58836-E777-4C4B-84B1-630938DB5701}"/>
+              </a:ext>
+            </a:extLst>
+          </p:cNvPr>
+          <p:cNvSpPr/>
+          <p:nvPr/>
+        </p:nvSpPr>
+        <p:spPr>
+          <a:xfrm>
+            <a:off x="7862585" y="2183857"/>
+            <a:ext cx="222079" cy="216267"/>
+          </a:xfrm>
+          <a:prstGeom prst="ellipse">
+            <a:avLst/>
+          </a:prstGeom>
+          <a:noFill/>
+          <a:ln w="12700">
+            <a:solidFill>
+              <a:schemeClr val="tx1"/>
+            </a:solidFill>
+          </a:ln>
+        </p:spPr>
+        <p:style>
+          <a:lnRef idx="2">
+            <a:schemeClr val="accent1">
+              <a:shade val="50000"/>
+            </a:schemeClr>
+          </a:lnRef>
+          <a:fillRef idx="1">
+            <a:schemeClr val="accent1"/>
+          </a:fillRef>
+          <a:effectRef idx="0">
+            <a:schemeClr val="accent1"/>
+          </a:effectRef>
+          <a:fontRef idx="minor">
+            <a:schemeClr val="lt1"/>
+          </a:fontRef>
+        </p:style>
+        <p:txBody>
+          <a:bodyPr rtlCol="0" anchor="ctr"/>
+          <a:lstStyle/>
+          <a:p>
+            <a:pPr algn="ctr"/>
+            <a:endParaRPr lang="en-US"/>
+          </a:p>
+        </p:txBody>
+      </p:sp>
+      <p:grpSp>
+        <p:nvGrpSpPr>
+          <p:cNvPr id="101" name="Group 100">
+            <a:extLst>
+              <a:ext uri="{FF2B5EF4-FFF2-40B4-BE49-F238E27FC236}">
+                <a16:creationId xmlns:a16="http://schemas.microsoft.com/office/drawing/2014/main" id="{FEDB12EA-C99E-4C86-BFA3-5744E86F4590}"/>
+              </a:ext>
+            </a:extLst>
+          </p:cNvPr>
+          <p:cNvGrpSpPr/>
+          <p:nvPr/>
+        </p:nvGrpSpPr>
+        <p:grpSpPr>
+          <a:xfrm>
+            <a:off x="6068849" y="3330569"/>
+            <a:ext cx="803012" cy="833182"/>
+            <a:chOff x="6059014" y="3298095"/>
+            <a:chExt cx="803012" cy="833182"/>
+          </a:xfrm>
+        </p:grpSpPr>
+        <p:cxnSp>
+          <p:nvCxnSpPr>
+            <p:cNvPr id="64" name="Straight Arrow Connector 63">
+              <a:extLst>
+                <a:ext uri="{FF2B5EF4-FFF2-40B4-BE49-F238E27FC236}">
+                  <a16:creationId xmlns:a16="http://schemas.microsoft.com/office/drawing/2014/main" id="{0A94A772-58A2-4797-B13D-6561BE9E63DE}"/>
+                </a:ext>
+              </a:extLst>
+            </p:cNvPr>
+            <p:cNvCxnSpPr>
+              <a:cxnSpLocks/>
+            </p:cNvCxnSpPr>
+            <p:nvPr/>
+          </p:nvCxnSpPr>
+          <p:spPr>
+            <a:xfrm flipV="1">
+              <a:off x="6246877" y="3931506"/>
+              <a:ext cx="586672" cy="1"/>
+            </a:xfrm>
+            <a:prstGeom prst="straightConnector1">
+              <a:avLst/>
+            </a:prstGeom>
+            <a:ln>
+              <a:tailEnd type="triangle"/>
+            </a:ln>
+          </p:spPr>
+          <p:style>
+            <a:lnRef idx="1">
+              <a:schemeClr val="dk1"/>
+            </a:lnRef>
+            <a:fillRef idx="0">
+              <a:schemeClr val="dk1"/>
+            </a:fillRef>
+            <a:effectRef idx="0">
+              <a:schemeClr val="dk1"/>
+            </a:effectRef>
+            <a:fontRef idx="minor">
+              <a:schemeClr val="tx1"/>
+            </a:fontRef>
+          </p:style>
+        </p:cxnSp>
+        <p:cxnSp>
+          <p:nvCxnSpPr>
+            <p:cNvPr id="69" name="Straight Arrow Connector 68">
+              <a:extLst>
+                <a:ext uri="{FF2B5EF4-FFF2-40B4-BE49-F238E27FC236}">
+                  <a16:creationId xmlns:a16="http://schemas.microsoft.com/office/drawing/2014/main" id="{166F9C32-D6BD-4436-A948-CECCF60800D2}"/>
+                </a:ext>
+              </a:extLst>
+            </p:cNvPr>
+            <p:cNvCxnSpPr>
+              <a:cxnSpLocks/>
+            </p:cNvCxnSpPr>
+            <p:nvPr/>
+          </p:nvCxnSpPr>
+          <p:spPr>
+            <a:xfrm flipV="1">
+              <a:off x="6249967" y="3321828"/>
+              <a:ext cx="0" cy="609678"/>
+            </a:xfrm>
+            <a:prstGeom prst="straightConnector1">
+              <a:avLst/>
+            </a:prstGeom>
+            <a:ln>
+              <a:tailEnd type="triangle"/>
+            </a:ln>
+          </p:spPr>
+          <p:style>
+            <a:lnRef idx="1">
+              <a:schemeClr val="dk1"/>
+            </a:lnRef>
+            <a:fillRef idx="0">
+              <a:schemeClr val="dk1"/>
+            </a:fillRef>
+            <a:effectRef idx="0">
+              <a:schemeClr val="dk1"/>
+            </a:effectRef>
+            <a:fontRef idx="minor">
+              <a:schemeClr val="tx1"/>
+            </a:fontRef>
+          </p:style>
+        </p:cxnSp>
+        <p:sp>
+          <p:nvSpPr>
+            <p:cNvPr id="73" name="TextBox 72">
+              <a:extLst>
+                <a:ext uri="{FF2B5EF4-FFF2-40B4-BE49-F238E27FC236}">
+                  <a16:creationId xmlns:a16="http://schemas.microsoft.com/office/drawing/2014/main" id="{4968A88A-32C7-4BE8-8BA4-3EF7E1B3AD4C}"/>
+                </a:ext>
+              </a:extLst>
+            </p:cNvPr>
+            <p:cNvSpPr txBox="1"/>
+            <p:nvPr/>
+          </p:nvSpPr>
+          <p:spPr>
+            <a:xfrm rot="16200000">
+              <a:off x="5807696" y="3549413"/>
+              <a:ext cx="718079" cy="215444"/>
+            </a:xfrm>
+            <a:prstGeom prst="rect">
+              <a:avLst/>
+            </a:prstGeom>
+            <a:noFill/>
+          </p:spPr>
+          <p:txBody>
+            <a:bodyPr wrap="square" rtlCol="0">
+              <a:spAutoFit/>
+            </a:bodyPr>
+            <a:lstStyle/>
+            <a:p>
+              <a:r>
+                <a:rPr lang="en-US" sz="800" dirty="0"/>
+                <a:t>Dimension 2</a:t>
+              </a:r>
+            </a:p>
+          </p:txBody>
+        </p:sp>
+        <p:sp>
+          <p:nvSpPr>
+            <p:cNvPr id="78" name="TextBox 77">
+              <a:extLst>
+                <a:ext uri="{FF2B5EF4-FFF2-40B4-BE49-F238E27FC236}">
+                  <a16:creationId xmlns:a16="http://schemas.microsoft.com/office/drawing/2014/main" id="{AA93211F-6DB4-4FF2-B8CE-07A3EC8AB124}"/>
+                </a:ext>
+              </a:extLst>
+            </p:cNvPr>
+            <p:cNvSpPr txBox="1"/>
+            <p:nvPr/>
+          </p:nvSpPr>
+          <p:spPr>
+            <a:xfrm>
+              <a:off x="6152237" y="3915833"/>
+              <a:ext cx="709789" cy="215444"/>
+            </a:xfrm>
+            <a:prstGeom prst="rect">
+              <a:avLst/>
+            </a:prstGeom>
+            <a:noFill/>
+          </p:spPr>
+          <p:txBody>
+            <a:bodyPr wrap="square" rtlCol="0">
+              <a:spAutoFit/>
+            </a:bodyPr>
+            <a:lstStyle/>
+            <a:p>
+              <a:r>
+                <a:rPr lang="en-US" sz="800" dirty="0"/>
+                <a:t>Dimension 1</a:t>
+              </a:r>
+            </a:p>
+          </p:txBody>
+        </p:sp>
+      </p:grpSp>
+      <p:grpSp>
+        <p:nvGrpSpPr>
+          <p:cNvPr id="158" name="Group 157">
+            <a:extLst>
+              <a:ext uri="{FF2B5EF4-FFF2-40B4-BE49-F238E27FC236}">
+                <a16:creationId xmlns:a16="http://schemas.microsoft.com/office/drawing/2014/main" id="{5E3E7C01-6C13-4FBE-9583-E8BD380C34A0}"/>
+              </a:ext>
+            </a:extLst>
+          </p:cNvPr>
+          <p:cNvGrpSpPr/>
+          <p:nvPr/>
+        </p:nvGrpSpPr>
+        <p:grpSpPr>
+          <a:xfrm>
+            <a:off x="5787744" y="4375676"/>
+            <a:ext cx="3155919" cy="2096776"/>
+            <a:chOff x="5823542" y="4320918"/>
+            <a:chExt cx="3155919" cy="2096776"/>
+          </a:xfrm>
+        </p:grpSpPr>
+        <p:pic>
+          <p:nvPicPr>
+            <p:cNvPr id="157" name="Picture 156">
+              <a:extLst>
+                <a:ext uri="{FF2B5EF4-FFF2-40B4-BE49-F238E27FC236}">
+                  <a16:creationId xmlns:a16="http://schemas.microsoft.com/office/drawing/2014/main" id="{627CFC26-7549-4795-B74C-BB71E4389989}"/>
+                </a:ext>
+              </a:extLst>
+            </p:cNvPr>
+            <p:cNvPicPr>
+              <a:picLocks noChangeAspect="1"/>
+            </p:cNvPicPr>
+            <p:nvPr/>
+          </p:nvPicPr>
+          <p:blipFill rotWithShape="1">
+            <a:blip r:embed="rId4">
+              <a:extLst>
+                <a:ext uri="{28A0092B-C50C-407E-A947-70E740481C1C}">
+                  <a14:useLocalDpi xmlns:a14="http://schemas.microsoft.com/office/drawing/2010/main" val="0"/>
+                </a:ext>
+              </a:extLst>
+            </a:blip>
+            <a:srcRect l="2574" b="3466"/>
+            <a:stretch/>
+          </p:blipFill>
+          <p:spPr>
+            <a:xfrm>
+              <a:off x="5823542" y="4320918"/>
+              <a:ext cx="3155919" cy="2096776"/>
+            </a:xfrm>
+            <a:prstGeom prst="rect">
+              <a:avLst/>
+            </a:prstGeom>
+            <a:ln>
+              <a:solidFill>
+                <a:schemeClr val="tx1"/>
+              </a:solidFill>
+            </a:ln>
+          </p:spPr>
+        </p:pic>
+        <p:grpSp>
+          <p:nvGrpSpPr>
+            <p:cNvPr id="144" name="Group 143">
+              <a:extLst>
+                <a:ext uri="{FF2B5EF4-FFF2-40B4-BE49-F238E27FC236}">
+                  <a16:creationId xmlns:a16="http://schemas.microsoft.com/office/drawing/2014/main" id="{97F531ED-A231-4F2E-BDCD-2DB62390DD11}"/>
+                </a:ext>
+              </a:extLst>
+            </p:cNvPr>
+            <p:cNvGrpSpPr/>
+            <p:nvPr/>
+          </p:nvGrpSpPr>
+          <p:grpSpPr>
+            <a:xfrm>
+              <a:off x="5823542" y="5731675"/>
+              <a:ext cx="656629" cy="686019"/>
+              <a:chOff x="6052968" y="3298096"/>
+              <a:chExt cx="809058" cy="845271"/>
+            </a:xfrm>
+          </p:grpSpPr>
+          <p:cxnSp>
+            <p:nvCxnSpPr>
+              <p:cNvPr id="145" name="Straight Arrow Connector 144">
+                <a:extLst>
+                  <a:ext uri="{FF2B5EF4-FFF2-40B4-BE49-F238E27FC236}">
+                    <a16:creationId xmlns:a16="http://schemas.microsoft.com/office/drawing/2014/main" id="{9CCA71BF-255E-4DC6-90F4-50FA842BF61E}"/>
+                  </a:ext>
+                </a:extLst>
+              </p:cNvPr>
+              <p:cNvCxnSpPr>
+                <a:cxnSpLocks/>
+              </p:cNvCxnSpPr>
+              <p:nvPr/>
+            </p:nvCxnSpPr>
+            <p:spPr>
+              <a:xfrm flipV="1">
+                <a:off x="6246877" y="3931506"/>
+                <a:ext cx="586672" cy="1"/>
+              </a:xfrm>
+              <a:prstGeom prst="straightConnector1">
+                <a:avLst/>
+              </a:prstGeom>
+              <a:ln>
+                <a:tailEnd type="triangle"/>
+              </a:ln>
+            </p:spPr>
+            <p:style>
+              <a:lnRef idx="1">
+                <a:schemeClr val="dk1"/>
+              </a:lnRef>
+              <a:fillRef idx="0">
+                <a:schemeClr val="dk1"/>
+              </a:fillRef>
+              <a:effectRef idx="0">
+                <a:schemeClr val="dk1"/>
+              </a:effectRef>
+              <a:fontRef idx="minor">
+                <a:schemeClr val="tx1"/>
+              </a:fontRef>
+            </p:style>
+          </p:cxnSp>
+          <p:cxnSp>
+            <p:nvCxnSpPr>
+              <p:cNvPr id="146" name="Straight Arrow Connector 145">
+                <a:extLst>
+                  <a:ext uri="{FF2B5EF4-FFF2-40B4-BE49-F238E27FC236}">
+                    <a16:creationId xmlns:a16="http://schemas.microsoft.com/office/drawing/2014/main" id="{115D95B2-FBB5-408A-A34A-C3F2FAC59F45}"/>
+                  </a:ext>
+                </a:extLst>
+              </p:cNvPr>
+              <p:cNvCxnSpPr>
+                <a:cxnSpLocks/>
+              </p:cNvCxnSpPr>
+              <p:nvPr/>
+            </p:nvCxnSpPr>
+            <p:spPr>
+              <a:xfrm flipV="1">
+                <a:off x="6249967" y="3321828"/>
+                <a:ext cx="0" cy="609678"/>
+              </a:xfrm>
+              <a:prstGeom prst="straightConnector1">
+                <a:avLst/>
+              </a:prstGeom>
+              <a:ln>
+                <a:tailEnd type="triangle"/>
+              </a:ln>
+            </p:spPr>
+            <p:style>
+              <a:lnRef idx="1">
+                <a:schemeClr val="dk1"/>
+              </a:lnRef>
+              <a:fillRef idx="0">
+                <a:schemeClr val="dk1"/>
+              </a:fillRef>
+              <a:effectRef idx="0">
+                <a:schemeClr val="dk1"/>
+              </a:effectRef>
+              <a:fontRef idx="minor">
+                <a:schemeClr val="tx1"/>
+              </a:fontRef>
+            </p:style>
+          </p:cxnSp>
+          <p:sp>
+            <p:nvSpPr>
+              <p:cNvPr id="147" name="TextBox 146">
+                <a:extLst>
+                  <a:ext uri="{FF2B5EF4-FFF2-40B4-BE49-F238E27FC236}">
+                    <a16:creationId xmlns:a16="http://schemas.microsoft.com/office/drawing/2014/main" id="{DB82F09B-2747-44D0-B6D7-F230938DDD47}"/>
+                  </a:ext>
+                </a:extLst>
+              </p:cNvPr>
+              <p:cNvSpPr txBox="1"/>
+              <p:nvPr/>
+            </p:nvSpPr>
+            <p:spPr>
+              <a:xfrm rot="16200000">
+                <a:off x="5807695" y="3543369"/>
+                <a:ext cx="718080" cy="227534"/>
+              </a:xfrm>
+              <a:prstGeom prst="rect">
+                <a:avLst/>
+              </a:prstGeom>
+              <a:noFill/>
+            </p:spPr>
+            <p:txBody>
+              <a:bodyPr wrap="square" rtlCol="0">
+                <a:spAutoFit/>
+              </a:bodyPr>
+              <a:lstStyle/>
+              <a:p>
+                <a:r>
+                  <a:rPr lang="en-US" sz="600" dirty="0"/>
+                  <a:t>Dimension 2</a:t>
+                </a:r>
+              </a:p>
+            </p:txBody>
+          </p:sp>
+          <p:sp>
+            <p:nvSpPr>
+              <p:cNvPr id="148" name="TextBox 147">
+                <a:extLst>
+                  <a:ext uri="{FF2B5EF4-FFF2-40B4-BE49-F238E27FC236}">
+                    <a16:creationId xmlns:a16="http://schemas.microsoft.com/office/drawing/2014/main" id="{1FDDBC85-E485-44DD-8FA5-AB5AD2CC992C}"/>
+                  </a:ext>
+                </a:extLst>
+              </p:cNvPr>
+              <p:cNvSpPr txBox="1"/>
+              <p:nvPr/>
+            </p:nvSpPr>
+            <p:spPr>
+              <a:xfrm>
+                <a:off x="6152236" y="3915833"/>
+                <a:ext cx="709790" cy="227534"/>
+              </a:xfrm>
+              <a:prstGeom prst="rect">
+                <a:avLst/>
+              </a:prstGeom>
+              <a:noFill/>
+            </p:spPr>
+            <p:txBody>
+              <a:bodyPr wrap="square" rtlCol="0">
+                <a:spAutoFit/>
+              </a:bodyPr>
+              <a:lstStyle/>
+              <a:p>
+                <a:r>
+                  <a:rPr lang="en-US" sz="600" dirty="0"/>
+                  <a:t>Dimension 1</a:t>
+                </a:r>
+              </a:p>
+            </p:txBody>
+          </p:sp>
+        </p:grpSp>
+      </p:grpSp>
+      <p:sp>
+        <p:nvSpPr>
+          <p:cNvPr id="171" name="Rectangle 170">
+            <a:extLst>
+              <a:ext uri="{FF2B5EF4-FFF2-40B4-BE49-F238E27FC236}">
+                <a16:creationId xmlns:a16="http://schemas.microsoft.com/office/drawing/2014/main" id="{BA271CC2-1BC0-4D01-A3C5-D08046165007}"/>
+              </a:ext>
+            </a:extLst>
+          </p:cNvPr>
+          <p:cNvSpPr/>
+          <p:nvPr/>
+        </p:nvSpPr>
+        <p:spPr>
+          <a:xfrm>
+            <a:off x="2900364" y="5930933"/>
+            <a:ext cx="340862" cy="390492"/>
+          </a:xfrm>
+          <a:prstGeom prst="rect">
+            <a:avLst/>
+          </a:prstGeom>
+          <a:noFill/>
+          <a:ln>
+            <a:solidFill>
+              <a:srgbClr val="C00000"/>
+            </a:solidFill>
+          </a:ln>
+        </p:spPr>
+        <p:style>
+          <a:lnRef idx="2">
+            <a:schemeClr val="accent1">
+              <a:shade val="50000"/>
+            </a:schemeClr>
+          </a:lnRef>
+          <a:fillRef idx="1">
+            <a:schemeClr val="accent1"/>
+          </a:fillRef>
+          <a:effectRef idx="0">
+            <a:schemeClr val="accent1"/>
+          </a:effectRef>
+          <a:fontRef idx="minor">
+            <a:schemeClr val="lt1"/>
+          </a:fontRef>
+        </p:style>
+        <p:txBody>
+          <a:bodyPr rtlCol="0" anchor="ctr"/>
+          <a:lstStyle/>
+          <a:p>
+            <a:pPr algn="ctr"/>
+            <a:endParaRPr lang="en-US"/>
+          </a:p>
+        </p:txBody>
+      </p:sp>
+      <p:sp>
+        <p:nvSpPr>
+          <p:cNvPr id="174" name="Rectangle 173">
+            <a:extLst>
+              <a:ext uri="{FF2B5EF4-FFF2-40B4-BE49-F238E27FC236}">
+                <a16:creationId xmlns:a16="http://schemas.microsoft.com/office/drawing/2014/main" id="{51E66390-739F-4DED-94C1-AFC5E834D6E5}"/>
+              </a:ext>
+            </a:extLst>
+          </p:cNvPr>
+          <p:cNvSpPr/>
+          <p:nvPr/>
+        </p:nvSpPr>
+        <p:spPr>
+          <a:xfrm>
+            <a:off x="3226296" y="4756575"/>
+            <a:ext cx="340862" cy="390492"/>
+          </a:xfrm>
+          <a:prstGeom prst="rect">
+            <a:avLst/>
+          </a:prstGeom>
+          <a:noFill/>
+          <a:ln>
+            <a:solidFill>
+              <a:srgbClr val="C00000"/>
+            </a:solidFill>
+          </a:ln>
+        </p:spPr>
+        <p:style>
+          <a:lnRef idx="2">
+            <a:schemeClr val="accent1">
+              <a:shade val="50000"/>
+            </a:schemeClr>
+          </a:lnRef>
+          <a:fillRef idx="1">
+            <a:schemeClr val="accent1"/>
+          </a:fillRef>
+          <a:effectRef idx="0">
+            <a:schemeClr val="accent1"/>
+          </a:effectRef>
+          <a:fontRef idx="minor">
+            <a:schemeClr val="lt1"/>
+          </a:fontRef>
+        </p:style>
+        <p:txBody>
+          <a:bodyPr rtlCol="0" anchor="ctr"/>
+          <a:lstStyle/>
+          <a:p>
+            <a:pPr algn="ctr"/>
+            <a:endParaRPr lang="en-US"/>
+          </a:p>
+        </p:txBody>
+      </p:sp>
+      <p:sp>
+        <p:nvSpPr>
+          <p:cNvPr id="175" name="Rectangle 174">
+            <a:extLst>
+              <a:ext uri="{FF2B5EF4-FFF2-40B4-BE49-F238E27FC236}">
+                <a16:creationId xmlns:a16="http://schemas.microsoft.com/office/drawing/2014/main" id="{F1C4FEA6-7AE4-4F69-A11A-4F421202DF68}"/>
+              </a:ext>
+            </a:extLst>
+          </p:cNvPr>
+          <p:cNvSpPr/>
+          <p:nvPr/>
+        </p:nvSpPr>
+        <p:spPr>
+          <a:xfrm>
+            <a:off x="3565570" y="5143198"/>
+            <a:ext cx="340862" cy="390492"/>
+          </a:xfrm>
+          <a:prstGeom prst="rect">
+            <a:avLst/>
+          </a:prstGeom>
+          <a:noFill/>
+          <a:ln>
+            <a:solidFill>
+              <a:srgbClr val="C00000"/>
+            </a:solidFill>
+          </a:ln>
+        </p:spPr>
+        <p:style>
+          <a:lnRef idx="2">
+            <a:schemeClr val="accent1">
+              <a:shade val="50000"/>
+            </a:schemeClr>
+          </a:lnRef>
+          <a:fillRef idx="1">
+            <a:schemeClr val="accent1"/>
+          </a:fillRef>
+          <a:effectRef idx="0">
+            <a:schemeClr val="accent1"/>
+          </a:effectRef>
+          <a:fontRef idx="minor">
+            <a:schemeClr val="lt1"/>
+          </a:fontRef>
+        </p:style>
+        <p:txBody>
+          <a:bodyPr rtlCol="0" anchor="ctr"/>
+          <a:lstStyle/>
+          <a:p>
+            <a:pPr algn="ctr"/>
+            <a:endParaRPr lang="en-US"/>
+          </a:p>
+        </p:txBody>
+      </p:sp>
+      <p:sp>
+        <p:nvSpPr>
+          <p:cNvPr id="176" name="Rectangle 175">
+            <a:extLst>
+              <a:ext uri="{FF2B5EF4-FFF2-40B4-BE49-F238E27FC236}">
+                <a16:creationId xmlns:a16="http://schemas.microsoft.com/office/drawing/2014/main" id="{7AD8E4BC-B2C7-41B8-A0B6-622712E16148}"/>
+              </a:ext>
+            </a:extLst>
+          </p:cNvPr>
+          <p:cNvSpPr/>
+          <p:nvPr/>
+        </p:nvSpPr>
+        <p:spPr>
+          <a:xfrm>
+            <a:off x="3897103" y="4366988"/>
+            <a:ext cx="340862" cy="390492"/>
+          </a:xfrm>
+          <a:prstGeom prst="rect">
+            <a:avLst/>
+          </a:prstGeom>
+          <a:noFill/>
+          <a:ln>
+            <a:solidFill>
+              <a:srgbClr val="C00000"/>
+            </a:solidFill>
+          </a:ln>
+        </p:spPr>
+        <p:style>
+          <a:lnRef idx="2">
+            <a:schemeClr val="accent1">
+              <a:shade val="50000"/>
+            </a:schemeClr>
+          </a:lnRef>
+          <a:fillRef idx="1">
+            <a:schemeClr val="accent1"/>
+          </a:fillRef>
+          <a:effectRef idx="0">
+            <a:schemeClr val="accent1"/>
+          </a:effectRef>
+          <a:fontRef idx="minor">
+            <a:schemeClr val="lt1"/>
+          </a:fontRef>
+        </p:style>
+        <p:txBody>
+          <a:bodyPr rtlCol="0" anchor="ctr"/>
+          <a:lstStyle/>
+          <a:p>
+            <a:pPr algn="ctr"/>
+            <a:endParaRPr lang="en-US"/>
+          </a:p>
+        </p:txBody>
+      </p:sp>
+      <p:sp>
+        <p:nvSpPr>
+          <p:cNvPr id="177" name="Rectangle 176">
+            <a:extLst>
+              <a:ext uri="{FF2B5EF4-FFF2-40B4-BE49-F238E27FC236}">
+                <a16:creationId xmlns:a16="http://schemas.microsoft.com/office/drawing/2014/main" id="{F3D39731-1A2B-4261-948C-7EF7BEC62F41}"/>
+              </a:ext>
+            </a:extLst>
+          </p:cNvPr>
+          <p:cNvSpPr/>
+          <p:nvPr/>
+        </p:nvSpPr>
+        <p:spPr>
+          <a:xfrm>
+            <a:off x="4230975" y="4756575"/>
+            <a:ext cx="340862" cy="390492"/>
+          </a:xfrm>
+          <a:prstGeom prst="rect">
+            <a:avLst/>
+          </a:prstGeom>
+          <a:noFill/>
+          <a:ln>
+            <a:solidFill>
+              <a:srgbClr val="C00000"/>
+            </a:solidFill>
+          </a:ln>
+        </p:spPr>
+        <p:style>
+          <a:lnRef idx="2">
+            <a:schemeClr val="accent1">
+              <a:shade val="50000"/>
+            </a:schemeClr>
+          </a:lnRef>
+          <a:fillRef idx="1">
+            <a:schemeClr val="accent1"/>
+          </a:fillRef>
+          <a:effectRef idx="0">
+            <a:schemeClr val="accent1"/>
+          </a:effectRef>
+          <a:fontRef idx="minor">
+            <a:schemeClr val="lt1"/>
+          </a:fontRef>
+        </p:style>
+        <p:txBody>
+          <a:bodyPr rtlCol="0" anchor="ctr"/>
+          <a:lstStyle/>
+          <a:p>
+            <a:pPr algn="ctr"/>
+            <a:endParaRPr lang="en-US"/>
+          </a:p>
+        </p:txBody>
+      </p:sp>
+      <p:sp>
+        <p:nvSpPr>
+          <p:cNvPr id="178" name="Rectangle 177">
+            <a:extLst>
+              <a:ext uri="{FF2B5EF4-FFF2-40B4-BE49-F238E27FC236}">
+                <a16:creationId xmlns:a16="http://schemas.microsoft.com/office/drawing/2014/main" id="{4C41C1A0-6AFD-44DA-9595-1B41C7D21BC6}"/>
+              </a:ext>
+            </a:extLst>
+          </p:cNvPr>
+          <p:cNvSpPr/>
+          <p:nvPr/>
+        </p:nvSpPr>
+        <p:spPr>
+          <a:xfrm>
+            <a:off x="4568180" y="5543060"/>
+            <a:ext cx="340862" cy="390492"/>
+          </a:xfrm>
+          <a:prstGeom prst="rect">
+            <a:avLst/>
+          </a:prstGeom>
+          <a:noFill/>
+          <a:ln>
+            <a:solidFill>
+              <a:srgbClr val="C00000"/>
+            </a:solidFill>
+          </a:ln>
+        </p:spPr>
+        <p:style>
+          <a:lnRef idx="2">
+            <a:schemeClr val="accent1">
+              <a:shade val="50000"/>
+            </a:schemeClr>
+          </a:lnRef>
+          <a:fillRef idx="1">
+            <a:schemeClr val="accent1"/>
+          </a:fillRef>
+          <a:effectRef idx="0">
+            <a:schemeClr val="accent1"/>
+          </a:effectRef>
+          <a:fontRef idx="minor">
+            <a:schemeClr val="lt1"/>
+          </a:fontRef>
+        </p:style>
+        <p:txBody>
+          <a:bodyPr rtlCol="0" anchor="ctr"/>
+          <a:lstStyle/>
+          <a:p>
+            <a:pPr algn="ctr"/>
+            <a:endParaRPr lang="en-US"/>
+          </a:p>
+        </p:txBody>
+      </p:sp>
     </p:spTree>
     <p:extLst>
       <p:ext uri="{BB962C8B-B14F-4D97-AF65-F5344CB8AC3E}">
@@ -8399,6 +8782,110 @@
               <a:rPr lang="en-US" dirty="0"/>
               <a:t>KL Divergence</a:t>
             </a:r>
+          </a:p>
+        </p:txBody>
+      </p:sp>
+      <p:sp>
+        <p:nvSpPr>
+          <p:cNvPr id="3" name="Rectangle 2">
+            <a:extLst>
+              <a:ext uri="{FF2B5EF4-FFF2-40B4-BE49-F238E27FC236}">
+                <a16:creationId xmlns:a16="http://schemas.microsoft.com/office/drawing/2014/main" id="{CDAC5C93-7330-4673-A5D5-5024E306BC06}"/>
+              </a:ext>
+            </a:extLst>
+          </p:cNvPr>
+          <p:cNvSpPr/>
+          <p:nvPr/>
+        </p:nvSpPr>
+        <p:spPr>
+          <a:xfrm>
+            <a:off x="4769560" y="1517635"/>
+            <a:ext cx="315589" cy="5106074"/>
+          </a:xfrm>
+          <a:prstGeom prst="rect">
+            <a:avLst/>
+          </a:prstGeom>
+          <a:noFill/>
+          <a:ln w="19050">
+            <a:solidFill>
+              <a:schemeClr val="tx1"/>
+            </a:solidFill>
+          </a:ln>
+        </p:spPr>
+        <p:style>
+          <a:lnRef idx="2">
+            <a:schemeClr val="accent1">
+              <a:shade val="50000"/>
+            </a:schemeClr>
+          </a:lnRef>
+          <a:fillRef idx="1">
+            <a:schemeClr val="accent1"/>
+          </a:fillRef>
+          <a:effectRef idx="0">
+            <a:schemeClr val="accent1"/>
+          </a:effectRef>
+          <a:fontRef idx="minor">
+            <a:schemeClr val="lt1"/>
+          </a:fontRef>
+        </p:style>
+        <p:txBody>
+          <a:bodyPr rtlCol="0" anchor="ctr"/>
+          <a:lstStyle/>
+          <a:p>
+            <a:pPr algn="ctr"/>
+            <a:endParaRPr lang="en-US"/>
+          </a:p>
+        </p:txBody>
+      </p:sp>
+      <p:sp>
+        <p:nvSpPr>
+          <p:cNvPr id="14" name="Rectangle 13">
+            <a:extLst>
+              <a:ext uri="{FF2B5EF4-FFF2-40B4-BE49-F238E27FC236}">
+                <a16:creationId xmlns:a16="http://schemas.microsoft.com/office/drawing/2014/main" id="{9C0DFB3B-0A5C-4BAE-830F-76B4B38892C4}"/>
+              </a:ext>
+            </a:extLst>
+          </p:cNvPr>
+          <p:cNvSpPr/>
+          <p:nvPr/>
+        </p:nvSpPr>
+        <p:spPr>
+          <a:xfrm>
+            <a:off x="7592332" y="1517635"/>
+            <a:ext cx="315589" cy="5106074"/>
+          </a:xfrm>
+          <a:prstGeom prst="rect">
+            <a:avLst/>
+          </a:prstGeom>
+          <a:noFill/>
+          <a:ln w="19050">
+            <a:solidFill>
+              <a:schemeClr val="tx1"/>
+            </a:solidFill>
+          </a:ln>
+        </p:spPr>
+        <p:style>
+          <a:lnRef idx="2">
+            <a:schemeClr val="accent1">
+              <a:shade val="50000"/>
+            </a:schemeClr>
+          </a:lnRef>
+          <a:fillRef idx="1">
+            <a:schemeClr val="accent1"/>
+          </a:fillRef>
+          <a:effectRef idx="0">
+            <a:schemeClr val="accent1"/>
+          </a:effectRef>
+          <a:fontRef idx="minor">
+            <a:schemeClr val="lt1"/>
+          </a:fontRef>
+        </p:style>
+        <p:txBody>
+          <a:bodyPr rtlCol="0" anchor="ctr"/>
+          <a:lstStyle/>
+          <a:p>
+            <a:pPr algn="ctr"/>
+            <a:endParaRPr lang="en-US"/>
           </a:p>
         </p:txBody>
       </p:sp>

</xml_diff>